<commit_message>
About to include primitive arrays
</commit_message>
<xml_diff>
--- a/docs/beam-extapi.pptx
+++ b/docs/beam-extapi.pptx
@@ -297,7 +297,7 @@
           <a:p>
             <a:fld id="{1BA50D42-C9CD-4801-B293-61D1F53EC57E}" type="datetimeFigureOut">
               <a:rPr lang="de-DE" smtClean="0"/>
-              <a:t>22.10.2012</a:t>
+              <a:t>31.10.2012</a:t>
             </a:fld>
             <a:endParaRPr lang="de-DE"/>
           </a:p>
@@ -462,7 +462,7 @@
           <a:p>
             <a:fld id="{1BA50D42-C9CD-4801-B293-61D1F53EC57E}" type="datetimeFigureOut">
               <a:rPr lang="de-DE" smtClean="0"/>
-              <a:t>22.10.2012</a:t>
+              <a:t>31.10.2012</a:t>
             </a:fld>
             <a:endParaRPr lang="de-DE"/>
           </a:p>
@@ -637,7 +637,7 @@
           <a:p>
             <a:fld id="{1BA50D42-C9CD-4801-B293-61D1F53EC57E}" type="datetimeFigureOut">
               <a:rPr lang="de-DE" smtClean="0"/>
-              <a:t>22.10.2012</a:t>
+              <a:t>31.10.2012</a:t>
             </a:fld>
             <a:endParaRPr lang="de-DE"/>
           </a:p>
@@ -802,7 +802,7 @@
           <a:p>
             <a:fld id="{1BA50D42-C9CD-4801-B293-61D1F53EC57E}" type="datetimeFigureOut">
               <a:rPr lang="de-DE" smtClean="0"/>
-              <a:t>22.10.2012</a:t>
+              <a:t>31.10.2012</a:t>
             </a:fld>
             <a:endParaRPr lang="de-DE"/>
           </a:p>
@@ -1043,7 +1043,7 @@
           <a:p>
             <a:fld id="{1BA50D42-C9CD-4801-B293-61D1F53EC57E}" type="datetimeFigureOut">
               <a:rPr lang="de-DE" smtClean="0"/>
-              <a:t>22.10.2012</a:t>
+              <a:t>31.10.2012</a:t>
             </a:fld>
             <a:endParaRPr lang="de-DE"/>
           </a:p>
@@ -1326,7 +1326,7 @@
           <a:p>
             <a:fld id="{1BA50D42-C9CD-4801-B293-61D1F53EC57E}" type="datetimeFigureOut">
               <a:rPr lang="de-DE" smtClean="0"/>
-              <a:t>22.10.2012</a:t>
+              <a:t>31.10.2012</a:t>
             </a:fld>
             <a:endParaRPr lang="de-DE"/>
           </a:p>
@@ -1743,7 +1743,7 @@
           <a:p>
             <a:fld id="{1BA50D42-C9CD-4801-B293-61D1F53EC57E}" type="datetimeFigureOut">
               <a:rPr lang="de-DE" smtClean="0"/>
-              <a:t>22.10.2012</a:t>
+              <a:t>31.10.2012</a:t>
             </a:fld>
             <a:endParaRPr lang="de-DE"/>
           </a:p>
@@ -1856,7 +1856,7 @@
           <a:p>
             <a:fld id="{1BA50D42-C9CD-4801-B293-61D1F53EC57E}" type="datetimeFigureOut">
               <a:rPr lang="de-DE" smtClean="0"/>
-              <a:t>22.10.2012</a:t>
+              <a:t>31.10.2012</a:t>
             </a:fld>
             <a:endParaRPr lang="de-DE"/>
           </a:p>
@@ -1946,7 +1946,7 @@
           <a:p>
             <a:fld id="{1BA50D42-C9CD-4801-B293-61D1F53EC57E}" type="datetimeFigureOut">
               <a:rPr lang="de-DE" smtClean="0"/>
-              <a:t>22.10.2012</a:t>
+              <a:t>31.10.2012</a:t>
             </a:fld>
             <a:endParaRPr lang="de-DE"/>
           </a:p>
@@ -2218,7 +2218,7 @@
           <a:p>
             <a:fld id="{1BA50D42-C9CD-4801-B293-61D1F53EC57E}" type="datetimeFigureOut">
               <a:rPr lang="de-DE" smtClean="0"/>
-              <a:t>22.10.2012</a:t>
+              <a:t>31.10.2012</a:t>
             </a:fld>
             <a:endParaRPr lang="de-DE"/>
           </a:p>
@@ -2466,7 +2466,7 @@
           <a:p>
             <a:fld id="{1BA50D42-C9CD-4801-B293-61D1F53EC57E}" type="datetimeFigureOut">
               <a:rPr lang="de-DE" smtClean="0"/>
-              <a:t>22.10.2012</a:t>
+              <a:t>31.10.2012</a:t>
             </a:fld>
             <a:endParaRPr lang="de-DE"/>
           </a:p>
@@ -2674,7 +2674,7 @@
           <a:p>
             <a:fld id="{1BA50D42-C9CD-4801-B293-61D1F53EC57E}" type="datetimeFigureOut">
               <a:rPr lang="de-DE" smtClean="0"/>
-              <a:t>22.10.2012</a:t>
+              <a:t>31.10.2012</a:t>
             </a:fld>
             <a:endParaRPr lang="de-DE"/>
           </a:p>
@@ -3694,6 +3694,13 @@
   <p:clrMapOvr>
     <a:masterClrMapping/>
   </p:clrMapOvr>
+  <p:timing>
+    <p:tnLst>
+      <p:par>
+        <p:cTn id="1" dur="indefinite" restart="never" nodeType="tmRoot"/>
+      </p:par>
+    </p:tnLst>
+  </p:timing>
 </p:sld>
 </file>
 
@@ -3753,16 +3760,14 @@
           </a:prstGeom>
         </p:spPr>
         <p:style>
-          <a:lnRef idx="2">
-            <a:schemeClr val="accent1">
-              <a:shade val="50000"/>
-            </a:schemeClr>
+          <a:lnRef idx="3">
+            <a:schemeClr val="lt1"/>
           </a:lnRef>
           <a:fillRef idx="1">
-            <a:schemeClr val="accent1"/>
+            <a:schemeClr val="accent5"/>
           </a:fillRef>
-          <a:effectRef idx="0">
-            <a:schemeClr val="accent1"/>
+          <a:effectRef idx="1">
+            <a:schemeClr val="accent5"/>
           </a:effectRef>
           <a:fontRef idx="minor">
             <a:schemeClr val="lt1"/>
@@ -3775,7 +3780,11 @@
             <a:pPr algn="ctr"/>
             <a:r>
               <a:rPr lang="en-GB" dirty="0" smtClean="0"/>
-              <a:t>C-</a:t>
+              <a:t>C</a:t>
+            </a:r>
+            <a:r>
+              <a:rPr lang="en-GB" dirty="0" smtClean="0"/>
+              <a:t/>
             </a:r>
             <a:br>
               <a:rPr lang="en-GB" dirty="0" smtClean="0"/>
@@ -3802,7 +3811,7 @@
         </p:nvGrpSpPr>
         <p:grpSpPr>
           <a:xfrm>
-            <a:off x="755576" y="3212426"/>
+            <a:off x="1187624" y="3218944"/>
             <a:ext cx="360040" cy="818939"/>
             <a:chOff x="683568" y="1844824"/>
             <a:chExt cx="720080" cy="1728192"/>
@@ -3982,9 +3991,9 @@
           <p:nvPr/>
         </p:nvCxnSpPr>
         <p:spPr>
-          <a:xfrm>
-            <a:off x="1385795" y="3628414"/>
-            <a:ext cx="1020737" cy="1"/>
+          <a:xfrm flipV="1">
+            <a:off x="1691680" y="3628415"/>
+            <a:ext cx="714852" cy="1583"/>
           </a:xfrm>
           <a:prstGeom prst="straightConnector1">
             <a:avLst/>
@@ -4024,16 +4033,14 @@
           </a:prstGeom>
         </p:spPr>
         <p:style>
-          <a:lnRef idx="2">
-            <a:schemeClr val="accent1">
-              <a:shade val="50000"/>
-            </a:schemeClr>
+          <a:lnRef idx="3">
+            <a:schemeClr val="lt1"/>
           </a:lnRef>
           <a:fillRef idx="1">
-            <a:schemeClr val="accent1"/>
+            <a:schemeClr val="accent3"/>
           </a:fillRef>
-          <a:effectRef idx="0">
-            <a:schemeClr val="accent1"/>
+          <a:effectRef idx="1">
+            <a:schemeClr val="accent3"/>
           </a:effectRef>
           <a:fontRef idx="minor">
             <a:schemeClr val="lt1"/>
@@ -4053,8 +4060,9 @@
             </a:br>
             <a:r>
               <a:rPr lang="en-GB" dirty="0" smtClean="0"/>
-              <a:t>C-API</a:t>
-            </a:r>
+              <a:t>C API</a:t>
+            </a:r>
+            <a:endParaRPr lang="en-GB" dirty="0" smtClean="0"/>
           </a:p>
           <a:p>
             <a:pPr algn="ctr"/>
@@ -4125,16 +4133,14 @@
           </a:prstGeom>
         </p:spPr>
         <p:style>
-          <a:lnRef idx="2">
-            <a:schemeClr val="accent1">
-              <a:shade val="50000"/>
-            </a:schemeClr>
+          <a:lnRef idx="3">
+            <a:schemeClr val="lt1"/>
           </a:lnRef>
           <a:fillRef idx="1">
-            <a:schemeClr val="accent1"/>
+            <a:schemeClr val="accent3"/>
           </a:fillRef>
-          <a:effectRef idx="0">
-            <a:schemeClr val="accent1"/>
+          <a:effectRef idx="1">
+            <a:schemeClr val="accent3"/>
           </a:effectRef>
           <a:fontRef idx="minor">
             <a:schemeClr val="lt1"/>
@@ -4147,7 +4153,22 @@
             <a:pPr algn="ctr"/>
             <a:r>
               <a:rPr lang="en-GB" dirty="0" smtClean="0"/>
-              <a:t>BEAM Java API</a:t>
+              <a:t>BEAM </a:t>
+            </a:r>
+            <a:r>
+              <a:rPr lang="en-GB" dirty="0" smtClean="0"/>
+              <a:t/>
+            </a:r>
+            <a:br>
+              <a:rPr lang="en-GB" dirty="0" smtClean="0"/>
+            </a:br>
+            <a:r>
+              <a:rPr lang="en-GB" dirty="0" smtClean="0"/>
+              <a:t>Java </a:t>
+            </a:r>
+            <a:r>
+              <a:rPr lang="en-GB" dirty="0" smtClean="0"/>
+              <a:t>API</a:t>
             </a:r>
           </a:p>
           <a:p>
@@ -4211,16 +4232,14 @@
           </a:prstGeom>
         </p:spPr>
         <p:style>
-          <a:lnRef idx="2">
-            <a:schemeClr val="accent1">
-              <a:shade val="50000"/>
-            </a:schemeClr>
+          <a:lnRef idx="3">
+            <a:schemeClr val="lt1"/>
           </a:lnRef>
           <a:fillRef idx="1">
-            <a:schemeClr val="accent1"/>
+            <a:schemeClr val="accent5"/>
           </a:fillRef>
-          <a:effectRef idx="0">
-            <a:schemeClr val="accent1"/>
+          <a:effectRef idx="1">
+            <a:schemeClr val="accent5"/>
           </a:effectRef>
           <a:fontRef idx="minor">
             <a:schemeClr val="lt1"/>
@@ -4233,8 +4252,16 @@
             <a:pPr algn="ctr"/>
             <a:r>
               <a:rPr lang="en-GB" dirty="0" smtClean="0"/>
-              <a:t>Python-Program</a:t>
-            </a:r>
+              <a:t>Python</a:t>
+            </a:r>
+            <a:br>
+              <a:rPr lang="en-GB" dirty="0" smtClean="0"/>
+            </a:br>
+            <a:r>
+              <a:rPr lang="en-GB" dirty="0" smtClean="0"/>
+              <a:t>Program</a:t>
+            </a:r>
+            <a:endParaRPr lang="en-GB" dirty="0" smtClean="0"/>
           </a:p>
           <a:p>
             <a:pPr algn="ctr"/>
@@ -4262,7 +4289,7 @@
         </p:nvGrpSpPr>
         <p:grpSpPr>
           <a:xfrm>
-            <a:off x="755576" y="4695368"/>
+            <a:off x="1187624" y="4658064"/>
             <a:ext cx="360040" cy="818939"/>
             <a:chOff x="683568" y="1844824"/>
             <a:chExt cx="720080" cy="1728192"/>
@@ -4443,8 +4470,8 @@
         </p:nvCxnSpPr>
         <p:spPr>
           <a:xfrm>
-            <a:off x="1385795" y="5067535"/>
-            <a:ext cx="1020737" cy="0"/>
+            <a:off x="1691680" y="5067535"/>
+            <a:ext cx="714852" cy="0"/>
           </a:xfrm>
           <a:prstGeom prst="straightConnector1">
             <a:avLst/>
@@ -4484,16 +4511,14 @@
           </a:prstGeom>
         </p:spPr>
         <p:style>
-          <a:lnRef idx="2">
-            <a:schemeClr val="accent1">
-              <a:shade val="50000"/>
-            </a:schemeClr>
+          <a:lnRef idx="3">
+            <a:schemeClr val="lt1"/>
           </a:lnRef>
           <a:fillRef idx="1">
-            <a:schemeClr val="accent1"/>
+            <a:schemeClr val="accent3"/>
           </a:fillRef>
-          <a:effectRef idx="0">
-            <a:schemeClr val="accent1"/>
+          <a:effectRef idx="1">
+            <a:schemeClr val="accent3"/>
           </a:effectRef>
           <a:fontRef idx="minor">
             <a:schemeClr val="lt1"/>
@@ -4614,7 +4639,7 @@
         </p:nvGrpSpPr>
         <p:grpSpPr>
           <a:xfrm>
-            <a:off x="755576" y="1777744"/>
+            <a:off x="1187624" y="1794673"/>
             <a:ext cx="360040" cy="818939"/>
             <a:chOff x="683568" y="1844824"/>
             <a:chExt cx="720080" cy="1728192"/>
@@ -4831,8 +4856,8 @@
         </p:nvCxnSpPr>
         <p:spPr>
           <a:xfrm>
-            <a:off x="1331640" y="2204144"/>
-            <a:ext cx="1074892" cy="0"/>
+            <a:off x="1691680" y="2204144"/>
+            <a:ext cx="714852" cy="0"/>
           </a:xfrm>
           <a:prstGeom prst="straightConnector1">
             <a:avLst/>
@@ -4840,8 +4865,8 @@
           <a:ln w="38100">
             <a:solidFill>
               <a:schemeClr val="accent1">
-                <a:lumMod val="20000"/>
-                <a:lumOff val="80000"/>
+                <a:lumMod val="60000"/>
+                <a:lumOff val="40000"/>
               </a:schemeClr>
             </a:solidFill>
             <a:tailEnd type="arrow"/>
@@ -4877,31 +4902,21 @@
             <a:avLst/>
           </a:prstGeom>
           <a:solidFill>
-            <a:schemeClr val="accent1">
-              <a:lumMod val="40000"/>
-              <a:lumOff val="60000"/>
+            <a:schemeClr val="accent5">
+              <a:alpha val="30000"/>
             </a:schemeClr>
           </a:solidFill>
-          <a:ln>
-            <a:solidFill>
-              <a:schemeClr val="accent1">
-                <a:lumMod val="20000"/>
-                <a:lumOff val="80000"/>
-              </a:schemeClr>
-            </a:solidFill>
-          </a:ln>
+          <a:ln/>
         </p:spPr>
         <p:style>
-          <a:lnRef idx="2">
-            <a:schemeClr val="accent1">
-              <a:shade val="50000"/>
-            </a:schemeClr>
+          <a:lnRef idx="3">
+            <a:schemeClr val="lt1"/>
           </a:lnRef>
           <a:fillRef idx="1">
-            <a:schemeClr val="accent1"/>
+            <a:schemeClr val="accent5"/>
           </a:fillRef>
-          <a:effectRef idx="0">
-            <a:schemeClr val="accent1"/>
+          <a:effectRef idx="1">
+            <a:schemeClr val="accent5"/>
           </a:effectRef>
           <a:fontRef idx="minor">
             <a:schemeClr val="lt1"/>
@@ -4914,20 +4929,24 @@
             <a:pPr algn="ctr"/>
             <a:r>
               <a:rPr lang="en-GB" dirty="0" smtClean="0"/>
-              <a:t>Java-</a:t>
+              <a:t>Java</a:t>
+            </a:r>
+            <a:r>
+              <a:rPr lang="en-GB" dirty="0"/>
+              <a:t/>
             </a:r>
             <a:br>
-              <a:rPr lang="en-GB" dirty="0" smtClean="0"/>
+              <a:rPr lang="en-GB" dirty="0"/>
             </a:br>
             <a:r>
-              <a:rPr lang="en-GB" dirty="0" smtClean="0"/>
+              <a:rPr lang="en-GB" dirty="0"/>
               <a:t>Program</a:t>
             </a:r>
           </a:p>
           <a:p>
             <a:pPr algn="ctr"/>
             <a:r>
-              <a:rPr lang="en-GB" dirty="0" smtClean="0"/>
+              <a:rPr lang="en-GB" dirty="0"/>
               <a:t>(jar)</a:t>
             </a:r>
           </a:p>
@@ -4953,8 +4972,8 @@
           <a:ln w="38100">
             <a:solidFill>
               <a:schemeClr val="accent1">
-                <a:lumMod val="20000"/>
-                <a:lumOff val="80000"/>
+                <a:lumMod val="60000"/>
+                <a:lumOff val="40000"/>
               </a:schemeClr>
             </a:solidFill>
             <a:tailEnd type="arrow"/>
@@ -5051,16 +5070,14 @@
           </a:prstGeom>
         </p:spPr>
         <p:style>
-          <a:lnRef idx="2">
-            <a:schemeClr val="accent1">
-              <a:shade val="50000"/>
-            </a:schemeClr>
+          <a:lnRef idx="3">
+            <a:schemeClr val="lt1"/>
           </a:lnRef>
           <a:fillRef idx="1">
-            <a:schemeClr val="accent1"/>
+            <a:schemeClr val="accent5"/>
           </a:fillRef>
-          <a:effectRef idx="0">
-            <a:schemeClr val="accent1"/>
+          <a:effectRef idx="1">
+            <a:schemeClr val="accent5"/>
           </a:effectRef>
           <a:fontRef idx="minor">
             <a:schemeClr val="lt1"/>
@@ -5073,7 +5090,11 @@
             <a:pPr algn="ctr"/>
             <a:r>
               <a:rPr lang="en-GB" dirty="0" smtClean="0"/>
-              <a:t>C-</a:t>
+              <a:t>C</a:t>
+            </a:r>
+            <a:r>
+              <a:rPr lang="en-GB" dirty="0" smtClean="0"/>
+              <a:t/>
             </a:r>
             <a:br>
               <a:rPr lang="en-GB" dirty="0" smtClean="0"/>
@@ -5108,7 +5129,7 @@
         </p:nvGrpSpPr>
         <p:grpSpPr>
           <a:xfrm>
-            <a:off x="7380312" y="3212426"/>
+            <a:off x="6876256" y="3222165"/>
             <a:ext cx="360040" cy="818939"/>
             <a:chOff x="683568" y="1844824"/>
             <a:chExt cx="720080" cy="1728192"/>
@@ -5295,16 +5316,14 @@
           </a:prstGeom>
         </p:spPr>
         <p:style>
-          <a:lnRef idx="2">
-            <a:schemeClr val="accent1">
-              <a:shade val="50000"/>
-            </a:schemeClr>
+          <a:lnRef idx="3">
+            <a:schemeClr val="lt1"/>
           </a:lnRef>
           <a:fillRef idx="1">
-            <a:schemeClr val="accent1"/>
+            <a:schemeClr val="accent3"/>
           </a:fillRef>
-          <a:effectRef idx="0">
-            <a:schemeClr val="accent1"/>
+          <a:effectRef idx="1">
+            <a:schemeClr val="accent3"/>
           </a:effectRef>
           <a:fontRef idx="minor">
             <a:schemeClr val="lt1"/>
@@ -5324,8 +5343,9 @@
             </a:br>
             <a:r>
               <a:rPr lang="en-GB" dirty="0" smtClean="0"/>
-              <a:t>C-API</a:t>
-            </a:r>
+              <a:t>C API</a:t>
+            </a:r>
+            <a:endParaRPr lang="en-GB" dirty="0" smtClean="0"/>
           </a:p>
           <a:p>
             <a:pPr algn="ctr"/>
@@ -5360,16 +5380,14 @@
           </a:prstGeom>
         </p:spPr>
         <p:style>
-          <a:lnRef idx="2">
-            <a:schemeClr val="accent1">
-              <a:shade val="50000"/>
-            </a:schemeClr>
+          <a:lnRef idx="3">
+            <a:schemeClr val="lt1"/>
           </a:lnRef>
           <a:fillRef idx="1">
-            <a:schemeClr val="accent1"/>
+            <a:schemeClr val="accent3"/>
           </a:fillRef>
-          <a:effectRef idx="0">
-            <a:schemeClr val="accent1"/>
+          <a:effectRef idx="1">
+            <a:schemeClr val="accent3"/>
           </a:effectRef>
           <a:fontRef idx="minor">
             <a:schemeClr val="lt1"/>
@@ -5382,7 +5400,22 @@
             <a:pPr algn="ctr"/>
             <a:r>
               <a:rPr lang="en-GB" dirty="0" smtClean="0"/>
-              <a:t>BEAM Java API</a:t>
+              <a:t>BEAM </a:t>
+            </a:r>
+            <a:r>
+              <a:rPr lang="en-GB" dirty="0" smtClean="0"/>
+              <a:t/>
+            </a:r>
+            <a:br>
+              <a:rPr lang="en-GB" dirty="0" smtClean="0"/>
+            </a:br>
+            <a:r>
+              <a:rPr lang="en-GB" dirty="0" smtClean="0"/>
+              <a:t>Java </a:t>
+            </a:r>
+            <a:r>
+              <a:rPr lang="en-GB" dirty="0" smtClean="0"/>
+              <a:t>API</a:t>
             </a:r>
           </a:p>
           <a:p>
@@ -5410,16 +5443,14 @@
           </a:prstGeom>
         </p:spPr>
         <p:style>
-          <a:lnRef idx="2">
-            <a:schemeClr val="accent1">
-              <a:shade val="50000"/>
-            </a:schemeClr>
+          <a:lnRef idx="3">
+            <a:schemeClr val="lt1"/>
           </a:lnRef>
           <a:fillRef idx="1">
-            <a:schemeClr val="accent1"/>
+            <a:schemeClr val="accent5"/>
           </a:fillRef>
-          <a:effectRef idx="0">
-            <a:schemeClr val="accent1"/>
+          <a:effectRef idx="1">
+            <a:schemeClr val="accent5"/>
           </a:effectRef>
           <a:fontRef idx="minor">
             <a:schemeClr val="lt1"/>
@@ -5432,8 +5463,9 @@
             <a:pPr algn="ctr"/>
             <a:r>
               <a:rPr lang="en-GB" dirty="0" smtClean="0"/>
-              <a:t>Python-</a:t>
-            </a:r>
+              <a:t>Python</a:t>
+            </a:r>
+            <a:endParaRPr lang="en-GB" dirty="0" smtClean="0"/>
           </a:p>
           <a:p>
             <a:pPr algn="ctr"/>
@@ -5476,16 +5508,14 @@
           </a:prstGeom>
         </p:spPr>
         <p:style>
-          <a:lnRef idx="2">
-            <a:schemeClr val="accent1">
-              <a:shade val="50000"/>
-            </a:schemeClr>
+          <a:lnRef idx="3">
+            <a:schemeClr val="lt1"/>
           </a:lnRef>
           <a:fillRef idx="1">
-            <a:schemeClr val="accent1"/>
+            <a:schemeClr val="accent3"/>
           </a:fillRef>
-          <a:effectRef idx="0">
-            <a:schemeClr val="accent1"/>
+          <a:effectRef idx="1">
+            <a:schemeClr val="accent3"/>
           </a:effectRef>
           <a:fontRef idx="minor">
             <a:schemeClr val="lt1"/>
@@ -5534,7 +5564,7 @@
         </p:nvGrpSpPr>
         <p:grpSpPr>
           <a:xfrm>
-            <a:off x="7334690" y="1786950"/>
+            <a:off x="6876256" y="1786950"/>
             <a:ext cx="360040" cy="818939"/>
             <a:chOff x="683568" y="1844824"/>
             <a:chExt cx="720080" cy="1728192"/>
@@ -5822,6 +5852,11 @@
             <a:avLst/>
           </a:prstGeom>
           <a:ln w="38100">
+            <a:solidFill>
+              <a:schemeClr val="accent6">
+                <a:lumMod val="75000"/>
+              </a:schemeClr>
+            </a:solidFill>
             <a:tailEnd type="arrow"/>
           </a:ln>
         </p:spPr>
@@ -5855,6 +5890,11 @@
             <a:avLst/>
           </a:prstGeom>
           <a:ln w="38100">
+            <a:solidFill>
+              <a:schemeClr val="accent6">
+                <a:lumMod val="75000"/>
+              </a:schemeClr>
+            </a:solidFill>
             <a:tailEnd type="arrow"/>
           </a:ln>
         </p:spPr>
@@ -5888,6 +5928,11 @@
             <a:avLst/>
           </a:prstGeom>
           <a:ln w="38100">
+            <a:solidFill>
+              <a:schemeClr val="accent6">
+                <a:lumMod val="75000"/>
+              </a:schemeClr>
+            </a:solidFill>
             <a:tailEnd type="arrow"/>
           </a:ln>
         </p:spPr>
@@ -5954,6 +5999,11 @@
             <a:avLst/>
           </a:prstGeom>
           <a:ln w="38100">
+            <a:solidFill>
+              <a:schemeClr val="accent6">
+                <a:lumMod val="75000"/>
+              </a:schemeClr>
+            </a:solidFill>
             <a:tailEnd type="arrow"/>
           </a:ln>
         </p:spPr>
@@ -6015,8 +6065,8 @@
         </p:nvCxnSpPr>
         <p:spPr>
           <a:xfrm flipH="1">
-            <a:off x="5961856" y="3631636"/>
-            <a:ext cx="1202432" cy="0"/>
+            <a:off x="5961856" y="3631635"/>
+            <a:ext cx="770384" cy="1"/>
           </a:xfrm>
           <a:prstGeom prst="straightConnector1">
             <a:avLst/>
@@ -6049,7 +6099,7 @@
         <p:spPr>
           <a:xfrm flipH="1">
             <a:off x="6012160" y="5069172"/>
-            <a:ext cx="1202432" cy="0"/>
+            <a:ext cx="720080" cy="0"/>
           </a:xfrm>
           <a:prstGeom prst="straightConnector1">
             <a:avLst/>
@@ -6081,7 +6131,7 @@
         </p:nvGrpSpPr>
         <p:grpSpPr>
           <a:xfrm>
-            <a:off x="7424700" y="4582766"/>
+            <a:off x="6876256" y="4659702"/>
             <a:ext cx="360040" cy="818939"/>
             <a:chOff x="683568" y="1844824"/>
             <a:chExt cx="720080" cy="1728192"/>
@@ -6267,31 +6317,21 @@
             <a:avLst/>
           </a:prstGeom>
           <a:solidFill>
-            <a:schemeClr val="accent1">
-              <a:lumMod val="40000"/>
-              <a:lumOff val="60000"/>
+            <a:schemeClr val="accent5">
+              <a:alpha val="30000"/>
             </a:schemeClr>
           </a:solidFill>
-          <a:ln>
-            <a:solidFill>
-              <a:schemeClr val="accent1">
-                <a:lumMod val="60000"/>
-                <a:lumOff val="40000"/>
-              </a:schemeClr>
-            </a:solidFill>
-          </a:ln>
+          <a:ln/>
         </p:spPr>
         <p:style>
-          <a:lnRef idx="2">
-            <a:schemeClr val="accent1">
-              <a:shade val="50000"/>
-            </a:schemeClr>
+          <a:lnRef idx="3">
+            <a:schemeClr val="lt1"/>
           </a:lnRef>
           <a:fillRef idx="1">
-            <a:schemeClr val="accent1"/>
+            <a:schemeClr val="accent5"/>
           </a:fillRef>
-          <a:effectRef idx="0">
-            <a:schemeClr val="accent1"/>
+          <a:effectRef idx="1">
+            <a:schemeClr val="accent5"/>
           </a:effectRef>
           <a:fontRef idx="minor">
             <a:schemeClr val="lt1"/>
@@ -6304,20 +6344,24 @@
             <a:pPr algn="ctr"/>
             <a:r>
               <a:rPr lang="en-GB" dirty="0" smtClean="0"/>
-              <a:t>Java-</a:t>
+              <a:t>Java</a:t>
+            </a:r>
+            <a:r>
+              <a:rPr lang="en-GB" dirty="0"/>
+              <a:t/>
             </a:r>
             <a:br>
-              <a:rPr lang="en-GB" dirty="0" smtClean="0"/>
+              <a:rPr lang="en-GB" dirty="0"/>
             </a:br>
             <a:r>
-              <a:rPr lang="en-GB" dirty="0" smtClean="0"/>
+              <a:rPr lang="en-GB" dirty="0"/>
               <a:t>Extension</a:t>
             </a:r>
           </a:p>
           <a:p>
             <a:pPr algn="ctr"/>
             <a:r>
-              <a:rPr lang="en-GB" dirty="0" smtClean="0"/>
+              <a:rPr lang="en-GB" dirty="0"/>
               <a:t>(jar)</a:t>
             </a:r>
           </a:p>
@@ -6332,6 +6376,45 @@
         <p:spPr>
           <a:xfrm>
             <a:off x="3842512" y="1986227"/>
+            <a:ext cx="679183" cy="0"/>
+          </a:xfrm>
+          <a:prstGeom prst="straightConnector1">
+            <a:avLst/>
+          </a:prstGeom>
+          <a:ln w="38100">
+            <a:solidFill>
+              <a:schemeClr val="accent6">
+                <a:lumMod val="60000"/>
+                <a:lumOff val="40000"/>
+              </a:schemeClr>
+            </a:solidFill>
+            <a:tailEnd type="arrow"/>
+          </a:ln>
+        </p:spPr>
+        <p:style>
+          <a:lnRef idx="1">
+            <a:schemeClr val="accent1"/>
+          </a:lnRef>
+          <a:fillRef idx="0">
+            <a:schemeClr val="accent1"/>
+          </a:fillRef>
+          <a:effectRef idx="0">
+            <a:schemeClr val="accent1"/>
+          </a:effectRef>
+          <a:fontRef idx="minor">
+            <a:schemeClr val="tx1"/>
+          </a:fontRef>
+        </p:style>
+      </p:cxnSp>
+      <p:cxnSp>
+        <p:nvCxnSpPr>
+          <p:cNvPr id="98" name="Gerade Verbindung mit Pfeil 97"/>
+          <p:cNvCxnSpPr/>
+          <p:nvPr/>
+        </p:nvCxnSpPr>
+        <p:spPr>
+          <a:xfrm flipH="1">
+            <a:off x="3842511" y="2446227"/>
             <a:ext cx="679183" cy="0"/>
           </a:xfrm>
           <a:prstGeom prst="straightConnector1">
@@ -6364,45 +6447,6 @@
       </p:cxnSp>
       <p:cxnSp>
         <p:nvCxnSpPr>
-          <p:cNvPr id="98" name="Gerade Verbindung mit Pfeil 97"/>
-          <p:cNvCxnSpPr/>
-          <p:nvPr/>
-        </p:nvCxnSpPr>
-        <p:spPr>
-          <a:xfrm flipH="1">
-            <a:off x="3842511" y="2446227"/>
-            <a:ext cx="679183" cy="0"/>
-          </a:xfrm>
-          <a:prstGeom prst="straightConnector1">
-            <a:avLst/>
-          </a:prstGeom>
-          <a:ln w="38100">
-            <a:solidFill>
-              <a:schemeClr val="accent1">
-                <a:lumMod val="60000"/>
-                <a:lumOff val="40000"/>
-              </a:schemeClr>
-            </a:solidFill>
-            <a:tailEnd type="arrow"/>
-          </a:ln>
-        </p:spPr>
-        <p:style>
-          <a:lnRef idx="1">
-            <a:schemeClr val="accent1"/>
-          </a:lnRef>
-          <a:fillRef idx="0">
-            <a:schemeClr val="accent1"/>
-          </a:fillRef>
-          <a:effectRef idx="0">
-            <a:schemeClr val="accent1"/>
-          </a:effectRef>
-          <a:fontRef idx="minor">
-            <a:schemeClr val="tx1"/>
-          </a:fontRef>
-        </p:style>
-      </p:cxnSp>
-      <p:cxnSp>
-        <p:nvCxnSpPr>
           <p:cNvPr id="99" name="Gerade Verbindung mit Pfeil 98"/>
           <p:cNvCxnSpPr/>
           <p:nvPr/>
@@ -6410,7 +6454,7 @@
         <p:spPr>
           <a:xfrm flipH="1">
             <a:off x="5961856" y="2196420"/>
-            <a:ext cx="1202432" cy="0"/>
+            <a:ext cx="770384" cy="0"/>
           </a:xfrm>
           <a:prstGeom prst="straightConnector1">
             <a:avLst/>
@@ -6516,16 +6560,14 @@
           </a:prstGeom>
         </p:spPr>
         <p:style>
-          <a:lnRef idx="2">
-            <a:schemeClr val="accent1">
-              <a:shade val="50000"/>
-            </a:schemeClr>
+          <a:lnRef idx="3">
+            <a:schemeClr val="lt1"/>
           </a:lnRef>
           <a:fillRef idx="1">
-            <a:schemeClr val="accent1"/>
+            <a:schemeClr val="accent5"/>
           </a:fillRef>
-          <a:effectRef idx="0">
-            <a:schemeClr val="accent1"/>
+          <a:effectRef idx="1">
+            <a:schemeClr val="accent5"/>
           </a:effectRef>
           <a:fontRef idx="minor">
             <a:schemeClr val="lt1"/>
@@ -6538,7 +6580,11 @@
             <a:pPr algn="ctr"/>
             <a:r>
               <a:rPr lang="en-GB" dirty="0" smtClean="0"/>
-              <a:t>C-</a:t>
+              <a:t>C</a:t>
+            </a:r>
+            <a:r>
+              <a:rPr lang="en-GB" dirty="0" smtClean="0"/>
+              <a:t/>
             </a:r>
             <a:br>
               <a:rPr lang="en-GB" dirty="0" smtClean="0"/>
@@ -6760,16 +6806,14 @@
           </a:prstGeom>
         </p:spPr>
         <p:style>
-          <a:lnRef idx="2">
-            <a:schemeClr val="accent1">
-              <a:shade val="50000"/>
-            </a:schemeClr>
+          <a:lnRef idx="3">
+            <a:schemeClr val="lt1"/>
           </a:lnRef>
           <a:fillRef idx="1">
-            <a:schemeClr val="accent1"/>
+            <a:schemeClr val="accent3"/>
           </a:fillRef>
-          <a:effectRef idx="0">
-            <a:schemeClr val="accent1"/>
+          <a:effectRef idx="1">
+            <a:schemeClr val="accent3"/>
           </a:effectRef>
           <a:fontRef idx="minor">
             <a:schemeClr val="lt1"/>
@@ -6789,8 +6833,9 @@
             </a:br>
             <a:r>
               <a:rPr lang="en-GB" dirty="0" smtClean="0"/>
-              <a:t>C-API</a:t>
-            </a:r>
+              <a:t>C API</a:t>
+            </a:r>
+            <a:endParaRPr lang="en-GB" dirty="0"/>
           </a:p>
           <a:p>
             <a:pPr algn="ctr"/>
@@ -6825,16 +6870,14 @@
           </a:prstGeom>
         </p:spPr>
         <p:style>
-          <a:lnRef idx="2">
-            <a:schemeClr val="accent1">
-              <a:shade val="50000"/>
-            </a:schemeClr>
+          <a:lnRef idx="3">
+            <a:schemeClr val="lt1"/>
           </a:lnRef>
           <a:fillRef idx="1">
-            <a:schemeClr val="accent1"/>
+            <a:schemeClr val="accent3"/>
           </a:fillRef>
-          <a:effectRef idx="0">
-            <a:schemeClr val="accent1"/>
+          <a:effectRef idx="1">
+            <a:schemeClr val="accent3"/>
           </a:effectRef>
           <a:fontRef idx="minor">
             <a:schemeClr val="lt1"/>
@@ -6847,7 +6890,18 @@
             <a:pPr algn="ctr"/>
             <a:r>
               <a:rPr lang="en-GB" dirty="0" smtClean="0"/>
-              <a:t>BEAM Java API</a:t>
+              <a:t>BEAM</a:t>
+            </a:r>
+            <a:br>
+              <a:rPr lang="en-GB" dirty="0" smtClean="0"/>
+            </a:br>
+            <a:r>
+              <a:rPr lang="en-GB" dirty="0" smtClean="0"/>
+              <a:t>Java </a:t>
+            </a:r>
+            <a:r>
+              <a:rPr lang="en-GB" dirty="0"/>
+              <a:t>API</a:t>
             </a:r>
           </a:p>
           <a:p>
@@ -6875,16 +6929,14 @@
           </a:prstGeom>
         </p:spPr>
         <p:style>
-          <a:lnRef idx="2">
-            <a:schemeClr val="accent1">
-              <a:shade val="50000"/>
-            </a:schemeClr>
+          <a:lnRef idx="3">
+            <a:schemeClr val="lt1"/>
           </a:lnRef>
           <a:fillRef idx="1">
-            <a:schemeClr val="accent1"/>
+            <a:schemeClr val="accent5"/>
           </a:fillRef>
-          <a:effectRef idx="0">
-            <a:schemeClr val="accent1"/>
+          <a:effectRef idx="1">
+            <a:schemeClr val="accent5"/>
           </a:effectRef>
           <a:fontRef idx="minor">
             <a:schemeClr val="lt1"/>
@@ -6897,7 +6949,7 @@
             <a:pPr algn="ctr"/>
             <a:r>
               <a:rPr lang="en-GB" dirty="0" smtClean="0"/>
-              <a:t>Python-</a:t>
+              <a:t>Python</a:t>
             </a:r>
           </a:p>
           <a:p>
@@ -6906,6 +6958,7 @@
               <a:rPr lang="en-GB" dirty="0" smtClean="0"/>
               <a:t>Extension</a:t>
             </a:r>
+            <a:endParaRPr lang="en-GB" dirty="0" smtClean="0"/>
           </a:p>
           <a:p>
             <a:pPr algn="ctr"/>
@@ -6941,16 +6994,14 @@
           </a:prstGeom>
         </p:spPr>
         <p:style>
-          <a:lnRef idx="2">
-            <a:schemeClr val="accent1">
-              <a:shade val="50000"/>
-            </a:schemeClr>
+          <a:lnRef idx="3">
+            <a:schemeClr val="lt1"/>
           </a:lnRef>
           <a:fillRef idx="1">
-            <a:schemeClr val="accent1"/>
+            <a:schemeClr val="accent3"/>
           </a:fillRef>
-          <a:effectRef idx="0">
-            <a:schemeClr val="accent1"/>
+          <a:effectRef idx="1">
+            <a:schemeClr val="accent3"/>
           </a:effectRef>
           <a:fontRef idx="minor">
             <a:schemeClr val="lt1"/>
@@ -7287,6 +7338,11 @@
             <a:avLst/>
           </a:prstGeom>
           <a:ln w="38100">
+            <a:solidFill>
+              <a:schemeClr val="accent6">
+                <a:lumMod val="75000"/>
+              </a:schemeClr>
+            </a:solidFill>
             <a:tailEnd type="arrow"/>
           </a:ln>
         </p:spPr>
@@ -7320,6 +7376,11 @@
             <a:avLst/>
           </a:prstGeom>
           <a:ln w="38100">
+            <a:solidFill>
+              <a:schemeClr val="accent6">
+                <a:lumMod val="75000"/>
+              </a:schemeClr>
+            </a:solidFill>
             <a:tailEnd type="arrow"/>
           </a:ln>
         </p:spPr>
@@ -7345,14 +7406,19 @@
           <p:nvPr/>
         </p:nvCxnSpPr>
         <p:spPr>
-          <a:xfrm>
-            <a:off x="5292080" y="3451282"/>
-            <a:ext cx="679183" cy="0"/>
+          <a:xfrm flipV="1">
+            <a:off x="5342384" y="3451282"/>
+            <a:ext cx="628879" cy="10209"/>
           </a:xfrm>
           <a:prstGeom prst="straightConnector1">
             <a:avLst/>
           </a:prstGeom>
           <a:ln w="38100">
+            <a:solidFill>
+              <a:schemeClr val="accent6">
+                <a:lumMod val="75000"/>
+              </a:schemeClr>
+            </a:solidFill>
             <a:tailEnd type="arrow"/>
           </a:ln>
         </p:spPr>
@@ -7419,6 +7485,11 @@
             <a:avLst/>
           </a:prstGeom>
           <a:ln w="38100">
+            <a:solidFill>
+              <a:schemeClr val="accent6">
+                <a:lumMod val="75000"/>
+              </a:schemeClr>
+            </a:solidFill>
             <a:tailEnd type="arrow"/>
           </a:ln>
         </p:spPr>
@@ -7732,31 +7803,21 @@
             <a:avLst/>
           </a:prstGeom>
           <a:solidFill>
-            <a:schemeClr val="accent1">
-              <a:lumMod val="40000"/>
-              <a:lumOff val="60000"/>
+            <a:schemeClr val="accent5">
+              <a:alpha val="30000"/>
             </a:schemeClr>
           </a:solidFill>
-          <a:ln>
-            <a:solidFill>
-              <a:schemeClr val="accent1">
-                <a:lumMod val="60000"/>
-                <a:lumOff val="40000"/>
-              </a:schemeClr>
-            </a:solidFill>
-          </a:ln>
+          <a:ln/>
         </p:spPr>
         <p:style>
-          <a:lnRef idx="2">
-            <a:schemeClr val="accent1">
-              <a:shade val="50000"/>
-            </a:schemeClr>
+          <a:lnRef idx="3">
+            <a:schemeClr val="lt1"/>
           </a:lnRef>
           <a:fillRef idx="1">
-            <a:schemeClr val="accent1"/>
+            <a:schemeClr val="accent5"/>
           </a:fillRef>
-          <a:effectRef idx="0">
-            <a:schemeClr val="accent1"/>
+          <a:effectRef idx="1">
+            <a:schemeClr val="accent5"/>
           </a:effectRef>
           <a:fontRef idx="minor">
             <a:schemeClr val="lt1"/>
@@ -7769,20 +7830,24 @@
             <a:pPr algn="ctr"/>
             <a:r>
               <a:rPr lang="en-GB" dirty="0" smtClean="0"/>
-              <a:t>Java-</a:t>
+              <a:t>Java</a:t>
+            </a:r>
+            <a:r>
+              <a:rPr lang="en-GB" dirty="0"/>
+              <a:t/>
             </a:r>
             <a:br>
-              <a:rPr lang="en-GB" dirty="0" smtClean="0"/>
+              <a:rPr lang="en-GB" dirty="0"/>
             </a:br>
             <a:r>
-              <a:rPr lang="en-GB" dirty="0" smtClean="0"/>
+              <a:rPr lang="en-GB" dirty="0"/>
               <a:t>Extension</a:t>
             </a:r>
           </a:p>
           <a:p>
             <a:pPr algn="ctr"/>
             <a:r>
-              <a:rPr lang="en-GB" dirty="0" smtClean="0"/>
+              <a:rPr lang="en-GB" dirty="0"/>
               <a:t>(jar)</a:t>
             </a:r>
           </a:p>
@@ -7797,6 +7862,45 @@
         <p:spPr>
           <a:xfrm>
             <a:off x="5292079" y="1986226"/>
+            <a:ext cx="679183" cy="0"/>
+          </a:xfrm>
+          <a:prstGeom prst="straightConnector1">
+            <a:avLst/>
+          </a:prstGeom>
+          <a:ln w="38100">
+            <a:solidFill>
+              <a:schemeClr val="accent6">
+                <a:lumMod val="60000"/>
+                <a:lumOff val="40000"/>
+              </a:schemeClr>
+            </a:solidFill>
+            <a:tailEnd type="arrow"/>
+          </a:ln>
+        </p:spPr>
+        <p:style>
+          <a:lnRef idx="1">
+            <a:schemeClr val="accent1"/>
+          </a:lnRef>
+          <a:fillRef idx="0">
+            <a:schemeClr val="accent1"/>
+          </a:fillRef>
+          <a:effectRef idx="0">
+            <a:schemeClr val="accent1"/>
+          </a:effectRef>
+          <a:fontRef idx="minor">
+            <a:schemeClr val="tx1"/>
+          </a:fontRef>
+        </p:style>
+      </p:cxnSp>
+      <p:cxnSp>
+        <p:nvCxnSpPr>
+          <p:cNvPr id="98" name="Gerade Verbindung mit Pfeil 97"/>
+          <p:cNvCxnSpPr/>
+          <p:nvPr/>
+        </p:nvCxnSpPr>
+        <p:spPr>
+          <a:xfrm flipH="1">
+            <a:off x="5292078" y="2446226"/>
             <a:ext cx="679183" cy="0"/>
           </a:xfrm>
           <a:prstGeom prst="straightConnector1">
@@ -7829,14 +7933,14 @@
       </p:cxnSp>
       <p:cxnSp>
         <p:nvCxnSpPr>
-          <p:cNvPr id="98" name="Gerade Verbindung mit Pfeil 97"/>
+          <p:cNvPr id="99" name="Gerade Verbindung mit Pfeil 98"/>
           <p:cNvCxnSpPr/>
           <p:nvPr/>
         </p:nvCxnSpPr>
         <p:spPr>
           <a:xfrm flipH="1">
-            <a:off x="5292078" y="2446226"/>
-            <a:ext cx="679183" cy="0"/>
+            <a:off x="7411423" y="2196419"/>
+            <a:ext cx="760977" cy="0"/>
           </a:xfrm>
           <a:prstGeom prst="straightConnector1">
             <a:avLst/>
@@ -7866,45 +7970,6 @@
           </a:fontRef>
         </p:style>
       </p:cxnSp>
-      <p:cxnSp>
-        <p:nvCxnSpPr>
-          <p:cNvPr id="99" name="Gerade Verbindung mit Pfeil 98"/>
-          <p:cNvCxnSpPr/>
-          <p:nvPr/>
-        </p:nvCxnSpPr>
-        <p:spPr>
-          <a:xfrm flipH="1">
-            <a:off x="7411423" y="2196419"/>
-            <a:ext cx="760977" cy="0"/>
-          </a:xfrm>
-          <a:prstGeom prst="straightConnector1">
-            <a:avLst/>
-          </a:prstGeom>
-          <a:ln w="38100">
-            <a:solidFill>
-              <a:schemeClr val="accent1">
-                <a:lumMod val="60000"/>
-                <a:lumOff val="40000"/>
-              </a:schemeClr>
-            </a:solidFill>
-            <a:tailEnd type="arrow"/>
-          </a:ln>
-        </p:spPr>
-        <p:style>
-          <a:lnRef idx="1">
-            <a:schemeClr val="accent1"/>
-          </a:lnRef>
-          <a:fillRef idx="0">
-            <a:schemeClr val="accent1"/>
-          </a:fillRef>
-          <a:effectRef idx="0">
-            <a:schemeClr val="accent1"/>
-          </a:effectRef>
-          <a:fontRef idx="minor">
-            <a:schemeClr val="tx1"/>
-          </a:fontRef>
-        </p:style>
-      </p:cxnSp>
       <p:sp>
         <p:nvSpPr>
           <p:cNvPr id="43" name="Rechteck 42"/>
@@ -7921,16 +7986,14 @@
           </a:prstGeom>
         </p:spPr>
         <p:style>
-          <a:lnRef idx="2">
-            <a:schemeClr val="accent1">
-              <a:shade val="50000"/>
-            </a:schemeClr>
+          <a:lnRef idx="3">
+            <a:schemeClr val="lt1"/>
           </a:lnRef>
           <a:fillRef idx="1">
-            <a:schemeClr val="accent1"/>
+            <a:schemeClr val="accent5"/>
           </a:fillRef>
-          <a:effectRef idx="0">
-            <a:schemeClr val="accent1"/>
+          <a:effectRef idx="1">
+            <a:schemeClr val="accent5"/>
           </a:effectRef>
           <a:fontRef idx="minor">
             <a:schemeClr val="lt1"/>
@@ -7943,7 +8006,11 @@
             <a:pPr algn="ctr"/>
             <a:r>
               <a:rPr lang="en-GB" dirty="0" smtClean="0"/>
-              <a:t>C-</a:t>
+              <a:t>C</a:t>
+            </a:r>
+            <a:r>
+              <a:rPr lang="en-GB" dirty="0" smtClean="0"/>
+              <a:t/>
             </a:r>
             <a:br>
               <a:rPr lang="en-GB" dirty="0" smtClean="0"/>
@@ -8228,16 +8295,14 @@
           </a:prstGeom>
         </p:spPr>
         <p:style>
-          <a:lnRef idx="2">
-            <a:schemeClr val="accent1">
-              <a:shade val="50000"/>
-            </a:schemeClr>
+          <a:lnRef idx="3">
+            <a:schemeClr val="lt1"/>
           </a:lnRef>
           <a:fillRef idx="1">
-            <a:schemeClr val="accent1"/>
+            <a:schemeClr val="accent5"/>
           </a:fillRef>
-          <a:effectRef idx="0">
-            <a:schemeClr val="accent1"/>
+          <a:effectRef idx="1">
+            <a:schemeClr val="accent5"/>
           </a:effectRef>
           <a:fontRef idx="minor">
             <a:schemeClr val="lt1"/>
@@ -8755,8 +8820,8 @@
           <a:ln w="38100">
             <a:solidFill>
               <a:schemeClr val="accent1">
-                <a:lumMod val="20000"/>
-                <a:lumOff val="80000"/>
+                <a:lumMod val="60000"/>
+                <a:lumOff val="40000"/>
               </a:schemeClr>
             </a:solidFill>
             <a:tailEnd type="arrow"/>
@@ -8792,31 +8857,21 @@
             <a:avLst/>
           </a:prstGeom>
           <a:solidFill>
-            <a:schemeClr val="accent1">
-              <a:lumMod val="40000"/>
-              <a:lumOff val="60000"/>
+            <a:schemeClr val="accent5">
+              <a:alpha val="30000"/>
             </a:schemeClr>
           </a:solidFill>
-          <a:ln>
-            <a:solidFill>
-              <a:schemeClr val="accent1">
-                <a:lumMod val="20000"/>
-                <a:lumOff val="80000"/>
-              </a:schemeClr>
-            </a:solidFill>
-          </a:ln>
+          <a:ln/>
         </p:spPr>
         <p:style>
-          <a:lnRef idx="2">
-            <a:schemeClr val="accent1">
-              <a:shade val="50000"/>
-            </a:schemeClr>
+          <a:lnRef idx="3">
+            <a:schemeClr val="lt1"/>
           </a:lnRef>
           <a:fillRef idx="1">
-            <a:schemeClr val="accent1"/>
+            <a:schemeClr val="accent5"/>
           </a:fillRef>
-          <a:effectRef idx="0">
-            <a:schemeClr val="accent1"/>
+          <a:effectRef idx="1">
+            <a:schemeClr val="accent5"/>
           </a:effectRef>
           <a:fontRef idx="minor">
             <a:schemeClr val="lt1"/>
@@ -8868,8 +8923,8 @@
           <a:ln w="38100">
             <a:solidFill>
               <a:schemeClr val="accent1">
-                <a:lumMod val="20000"/>
-                <a:lumOff val="80000"/>
+                <a:lumMod val="60000"/>
+                <a:lumOff val="40000"/>
               </a:schemeClr>
             </a:solidFill>
             <a:tailEnd type="arrow"/>
@@ -11316,7 +11371,7 @@
         <p:spPr/>
         <p:txBody>
           <a:bodyPr>
-            <a:normAutofit fontScale="92500" lnSpcReduction="20000"/>
+            <a:normAutofit fontScale="85000" lnSpcReduction="20000"/>
           </a:bodyPr>
           <a:lstStyle/>
           <a:p>
@@ -11376,8 +11431,33 @@
           <a:p>
             <a:r>
               <a:rPr lang="en-GB" dirty="0" smtClean="0"/>
-              <a:t>consider annotations to control code generation</a:t>
-            </a:r>
+              <a:t>consider </a:t>
+            </a:r>
+            <a:r>
+              <a:rPr lang="en-GB" dirty="0" smtClean="0"/>
+              <a:t>Java annotations </a:t>
+            </a:r>
+            <a:r>
+              <a:rPr lang="en-GB" dirty="0" smtClean="0"/>
+              <a:t>to control code </a:t>
+            </a:r>
+            <a:r>
+              <a:rPr lang="en-GB" dirty="0" smtClean="0"/>
+              <a:t>generation (e.g. parameter annotations </a:t>
+            </a:r>
+            <a:r>
+              <a:rPr lang="en-GB" dirty="0" smtClean="0"/>
+              <a:t>@In, @Out, @</a:t>
+            </a:r>
+            <a:r>
+              <a:rPr lang="en-GB" dirty="0" err="1" smtClean="0"/>
+              <a:t>InOut</a:t>
+            </a:r>
+            <a:r>
+              <a:rPr lang="en-GB" dirty="0" smtClean="0"/>
+              <a:t>)</a:t>
+            </a:r>
+            <a:endParaRPr lang="en-GB" dirty="0" smtClean="0"/>
           </a:p>
           <a:p>
             <a:r>

</xml_diff>

<commit_message>
more about array buffers
</commit_message>
<xml_diff>
--- a/docs/beam-extapi.pptx
+++ b/docs/beam-extapi.pptx
@@ -16,8 +16,12 @@
     <p:sldId id="267" r:id="rId10"/>
     <p:sldId id="266" r:id="rId11"/>
     <p:sldId id="268" r:id="rId12"/>
-    <p:sldId id="269" r:id="rId13"/>
-    <p:sldId id="270" r:id="rId14"/>
+    <p:sldId id="272" r:id="rId13"/>
+    <p:sldId id="275" r:id="rId14"/>
+    <p:sldId id="274" r:id="rId15"/>
+    <p:sldId id="269" r:id="rId16"/>
+    <p:sldId id="270" r:id="rId17"/>
+    <p:sldId id="273" r:id="rId18"/>
   </p:sldIdLst>
   <p:sldSz cx="9144000" cy="6858000" type="screen4x3"/>
   <p:notesSz cx="6858000" cy="9144000"/>
@@ -300,7 +304,7 @@
           <a:p>
             <a:fld id="{1BA50D42-C9CD-4801-B293-61D1F53EC57E}" type="datetimeFigureOut">
               <a:rPr lang="de-DE" smtClean="0"/>
-              <a:t>10.03.2013</a:t>
+              <a:t>14.03.2013</a:t>
             </a:fld>
             <a:endParaRPr lang="de-DE"/>
           </a:p>
@@ -465,7 +469,7 @@
           <a:p>
             <a:fld id="{1BA50D42-C9CD-4801-B293-61D1F53EC57E}" type="datetimeFigureOut">
               <a:rPr lang="de-DE" smtClean="0"/>
-              <a:t>10.03.2013</a:t>
+              <a:t>14.03.2013</a:t>
             </a:fld>
             <a:endParaRPr lang="de-DE"/>
           </a:p>
@@ -640,7 +644,7 @@
           <a:p>
             <a:fld id="{1BA50D42-C9CD-4801-B293-61D1F53EC57E}" type="datetimeFigureOut">
               <a:rPr lang="de-DE" smtClean="0"/>
-              <a:t>10.03.2013</a:t>
+              <a:t>14.03.2013</a:t>
             </a:fld>
             <a:endParaRPr lang="de-DE"/>
           </a:p>
@@ -805,7 +809,7 @@
           <a:p>
             <a:fld id="{1BA50D42-C9CD-4801-B293-61D1F53EC57E}" type="datetimeFigureOut">
               <a:rPr lang="de-DE" smtClean="0"/>
-              <a:t>10.03.2013</a:t>
+              <a:t>14.03.2013</a:t>
             </a:fld>
             <a:endParaRPr lang="de-DE"/>
           </a:p>
@@ -1046,7 +1050,7 @@
           <a:p>
             <a:fld id="{1BA50D42-C9CD-4801-B293-61D1F53EC57E}" type="datetimeFigureOut">
               <a:rPr lang="de-DE" smtClean="0"/>
-              <a:t>10.03.2013</a:t>
+              <a:t>14.03.2013</a:t>
             </a:fld>
             <a:endParaRPr lang="de-DE"/>
           </a:p>
@@ -1329,7 +1333,7 @@
           <a:p>
             <a:fld id="{1BA50D42-C9CD-4801-B293-61D1F53EC57E}" type="datetimeFigureOut">
               <a:rPr lang="de-DE" smtClean="0"/>
-              <a:t>10.03.2013</a:t>
+              <a:t>14.03.2013</a:t>
             </a:fld>
             <a:endParaRPr lang="de-DE"/>
           </a:p>
@@ -1746,7 +1750,7 @@
           <a:p>
             <a:fld id="{1BA50D42-C9CD-4801-B293-61D1F53EC57E}" type="datetimeFigureOut">
               <a:rPr lang="de-DE" smtClean="0"/>
-              <a:t>10.03.2013</a:t>
+              <a:t>14.03.2013</a:t>
             </a:fld>
             <a:endParaRPr lang="de-DE"/>
           </a:p>
@@ -1859,7 +1863,7 @@
           <a:p>
             <a:fld id="{1BA50D42-C9CD-4801-B293-61D1F53EC57E}" type="datetimeFigureOut">
               <a:rPr lang="de-DE" smtClean="0"/>
-              <a:t>10.03.2013</a:t>
+              <a:t>14.03.2013</a:t>
             </a:fld>
             <a:endParaRPr lang="de-DE"/>
           </a:p>
@@ -1949,7 +1953,7 @@
           <a:p>
             <a:fld id="{1BA50D42-C9CD-4801-B293-61D1F53EC57E}" type="datetimeFigureOut">
               <a:rPr lang="de-DE" smtClean="0"/>
-              <a:t>10.03.2013</a:t>
+              <a:t>14.03.2013</a:t>
             </a:fld>
             <a:endParaRPr lang="de-DE"/>
           </a:p>
@@ -2221,7 +2225,7 @@
           <a:p>
             <a:fld id="{1BA50D42-C9CD-4801-B293-61D1F53EC57E}" type="datetimeFigureOut">
               <a:rPr lang="de-DE" smtClean="0"/>
-              <a:t>10.03.2013</a:t>
+              <a:t>14.03.2013</a:t>
             </a:fld>
             <a:endParaRPr lang="de-DE"/>
           </a:p>
@@ -2469,7 +2473,7 @@
           <a:p>
             <a:fld id="{1BA50D42-C9CD-4801-B293-61D1F53EC57E}" type="datetimeFigureOut">
               <a:rPr lang="de-DE" smtClean="0"/>
-              <a:t>10.03.2013</a:t>
+              <a:t>14.03.2013</a:t>
             </a:fld>
             <a:endParaRPr lang="de-DE"/>
           </a:p>
@@ -2677,7 +2681,7 @@
           <a:p>
             <a:fld id="{1BA50D42-C9CD-4801-B293-61D1F53EC57E}" type="datetimeFigureOut">
               <a:rPr lang="de-DE" smtClean="0"/>
-              <a:t>10.03.2013</a:t>
+              <a:t>14.03.2013</a:t>
             </a:fld>
             <a:endParaRPr lang="de-DE"/>
           </a:p>
@@ -3516,7 +3520,11 @@
           <a:p>
             <a:r>
               <a:rPr lang="en-GB" dirty="0" smtClean="0"/>
-              <a:t>Data Arrays</a:t>
+              <a:t>Data Arrays (</a:t>
+            </a:r>
+            <a:r>
+              <a:rPr lang="en-GB" dirty="0" smtClean="0"/>
+              <a:t>1/3)</a:t>
             </a:r>
             <a:endParaRPr lang="en-GB" dirty="0"/>
           </a:p>
@@ -3974,7 +3982,11 @@
           <a:p>
             <a:r>
               <a:rPr lang="en-GB" dirty="0" smtClean="0"/>
-              <a:t>Alternatives (1/2)</a:t>
+              <a:t>Data Arrays (</a:t>
+            </a:r>
+            <a:r>
+              <a:rPr lang="en-GB" dirty="0" smtClean="0"/>
+              <a:t>2/3)</a:t>
             </a:r>
             <a:endParaRPr lang="en-GB" dirty="0"/>
           </a:p>
@@ -3992,87 +4004,290 @@
         </p:nvSpPr>
         <p:spPr/>
         <p:txBody>
-          <a:bodyPr/>
+          <a:bodyPr>
+            <a:normAutofit fontScale="62500" lnSpcReduction="20000"/>
+          </a:bodyPr>
           <a:lstStyle/>
           <a:p>
             <a:r>
-              <a:rPr lang="en-GB" b="1" dirty="0" err="1"/>
-              <a:t>Jep</a:t>
+              <a:rPr lang="en-GB" dirty="0" smtClean="0"/>
+              <a:t>Parsing buffer arguments:</a:t>
+            </a:r>
+          </a:p>
+          <a:p>
+            <a:pPr marL="457200" lvl="1" indent="0">
+              <a:buNone/>
+            </a:pPr>
+            <a:r>
+              <a:rPr lang="en-GB" dirty="0" err="1" smtClean="0"/>
+              <a:t>Py_buffer</a:t>
             </a:r>
             <a:r>
               <a:rPr lang="en-GB" dirty="0"/>
-              <a:t> - Java Embedded Python</a:t>
+              <a:t> </a:t>
+            </a:r>
+            <a:r>
+              <a:rPr lang="en-GB" dirty="0" smtClean="0"/>
+              <a:t>b;</a:t>
+            </a:r>
+            <a:endParaRPr lang="en-GB" dirty="0"/>
+          </a:p>
+          <a:p>
+            <a:pPr marL="457200" lvl="1" indent="0">
+              <a:buNone/>
+            </a:pPr>
+            <a:r>
+              <a:rPr lang="en-GB" dirty="0"/>
+              <a:t>ret = </a:t>
+            </a:r>
+            <a:r>
+              <a:rPr lang="en-GB" dirty="0" err="1" smtClean="0"/>
+              <a:t>PyArg_ParseTuple</a:t>
+            </a:r>
+            <a:r>
+              <a:rPr lang="en-GB" dirty="0" smtClean="0"/>
+              <a:t>(</a:t>
+            </a:r>
+            <a:r>
+              <a:rPr lang="en-GB" dirty="0" err="1" smtClean="0"/>
+              <a:t>args</a:t>
+            </a:r>
+            <a:r>
+              <a:rPr lang="en-GB" dirty="0"/>
+              <a:t>, </a:t>
+            </a:r>
+            <a:r>
+              <a:rPr lang="en-GB" dirty="0" smtClean="0"/>
+              <a:t>“y*”, &amp;b); </a:t>
             </a:r>
           </a:p>
           <a:p>
             <a:pPr lvl="1"/>
             <a:r>
-              <a:rPr lang="en-GB" dirty="0" err="1"/>
-              <a:t>Jep</a:t>
+              <a:rPr lang="en-GB" dirty="0" smtClean="0"/>
+              <a:t>See “Parsing </a:t>
             </a:r>
             <a:r>
               <a:rPr lang="en-GB" dirty="0"/>
-              <a:t> embeds </a:t>
-            </a:r>
-            <a:r>
-              <a:rPr lang="en-GB" dirty="0" err="1"/>
-              <a:t>CPython</a:t>
+              <a:t>arguments and building </a:t>
+            </a:r>
+            <a:r>
+              <a:rPr lang="en-GB" dirty="0" smtClean="0"/>
+              <a:t>values” in Python/C API Reference Manual</a:t>
+            </a:r>
+          </a:p>
+          <a:p>
+            <a:r>
+              <a:rPr lang="en-GB" dirty="0" smtClean="0"/>
+              <a:t>Directly using buffer arguments</a:t>
+            </a:r>
+          </a:p>
+          <a:p>
+            <a:pPr marL="457200" lvl="1" indent="0">
+              <a:buNone/>
+            </a:pPr>
+            <a:r>
+              <a:rPr lang="en-GB" dirty="0" err="1" smtClean="0"/>
+              <a:t>PyObject_CheckBuffer</a:t>
+            </a:r>
+            <a:r>
+              <a:rPr lang="en-GB" dirty="0" smtClean="0"/>
+              <a:t>(</a:t>
+            </a:r>
+            <a:r>
+              <a:rPr lang="en-GB" dirty="0" err="1" smtClean="0"/>
+              <a:t>obj</a:t>
+            </a:r>
+            <a:r>
+              <a:rPr lang="en-GB" dirty="0" smtClean="0"/>
+              <a:t>) == 1</a:t>
             </a:r>
             <a:r>
               <a:rPr lang="en-GB" dirty="0"/>
-              <a:t> in Java. It is safe to use in a heavily threaded environment, it is quite fast and its stability is a main feature and goal.</a:t>
-            </a:r>
-          </a:p>
-          <a:p>
-            <a:pPr lvl="1"/>
-            <a:r>
-              <a:rPr lang="en-GB" dirty="0" smtClean="0">
-                <a:hlinkClick r:id="rId2"/>
-              </a:rPr>
-              <a:t>https</a:t>
-            </a:r>
-            <a:r>
-              <a:rPr lang="en-GB" dirty="0">
-                <a:hlinkClick r:id="rId2"/>
-              </a:rPr>
-              <a:t>://</a:t>
-            </a:r>
-            <a:r>
-              <a:rPr lang="en-GB" dirty="0" smtClean="0">
-                <a:hlinkClick r:id="rId2"/>
-              </a:rPr>
-              <a:t>github.com/mrj0/jep</a:t>
+              <a:t/>
+            </a:r>
+            <a:br>
+              <a:rPr lang="en-GB" dirty="0"/>
+            </a:br>
+            <a:r>
+              <a:rPr lang="en-GB" dirty="0"/>
+              <a:t>ret = </a:t>
+            </a:r>
+            <a:r>
+              <a:rPr lang="en-GB" dirty="0" err="1" smtClean="0"/>
+              <a:t>PyObject_GetBuffer</a:t>
+            </a:r>
+            <a:r>
+              <a:rPr lang="en-GB" dirty="0" smtClean="0"/>
+              <a:t>(</a:t>
+            </a:r>
+            <a:r>
+              <a:rPr lang="en-GB" dirty="0" err="1" smtClean="0"/>
+              <a:t>obj</a:t>
+            </a:r>
+            <a:r>
+              <a:rPr lang="en-GB" dirty="0"/>
+              <a:t>, </a:t>
+            </a:r>
+            <a:r>
+              <a:rPr lang="en-GB" dirty="0" smtClean="0"/>
+              <a:t>&amp;</a:t>
+            </a:r>
+            <a:r>
+              <a:rPr lang="en-GB" dirty="0"/>
+              <a:t>b, </a:t>
+            </a:r>
+            <a:r>
+              <a:rPr lang="en-GB" dirty="0" err="1" smtClean="0"/>
+              <a:t>PyBUF_WRITABLE</a:t>
+            </a:r>
+            <a:r>
+              <a:rPr lang="en-GB" dirty="0" smtClean="0"/>
+              <a:t>); </a:t>
+            </a:r>
+          </a:p>
+          <a:p>
+            <a:r>
+              <a:rPr lang="en-GB" dirty="0" smtClean="0"/>
+              <a:t>In any case</a:t>
+            </a:r>
+            <a:endParaRPr lang="en-GB" dirty="0"/>
+          </a:p>
+          <a:p>
+            <a:pPr marL="457200" lvl="1" indent="0">
+              <a:buNone/>
+            </a:pPr>
+            <a:r>
+              <a:rPr lang="en-GB" dirty="0" err="1" smtClean="0"/>
+              <a:t>PyBuffer_Release</a:t>
+            </a:r>
+            <a:r>
+              <a:rPr lang="en-GB" dirty="0" smtClean="0"/>
+              <a:t>(&amp;b);</a:t>
+            </a:r>
+          </a:p>
+          <a:p>
+            <a:r>
+              <a:rPr lang="en-GB" dirty="0" smtClean="0"/>
+              <a:t>Consider</a:t>
+            </a:r>
+          </a:p>
+          <a:p>
+            <a:pPr marL="457200" lvl="1" indent="0">
+              <a:buNone/>
+            </a:pPr>
+            <a:r>
+              <a:rPr lang="en-GB" dirty="0"/>
+              <a:t>ret = </a:t>
+            </a:r>
+            <a:r>
+              <a:rPr lang="en-GB" dirty="0" err="1" smtClean="0"/>
+              <a:t>PyObject_TypeCheck</a:t>
+            </a:r>
+            <a:r>
+              <a:rPr lang="en-GB" dirty="0" smtClean="0"/>
+              <a:t>(</a:t>
+            </a:r>
+            <a:r>
+              <a:rPr lang="en-GB" dirty="0" err="1" smtClean="0"/>
+              <a:t>obj</a:t>
+            </a:r>
+            <a:r>
+              <a:rPr lang="en-GB" dirty="0" smtClean="0"/>
+              <a:t>, </a:t>
+            </a:r>
+            <a:r>
+              <a:rPr lang="en-GB" dirty="0" err="1" smtClean="0"/>
+              <a:t>type_obj</a:t>
+            </a:r>
+            <a:r>
+              <a:rPr lang="en-GB" dirty="0" smtClean="0"/>
+              <a:t>);</a:t>
+            </a:r>
+          </a:p>
+          <a:p>
+            <a:pPr marL="457200" lvl="1" indent="0">
+              <a:buNone/>
+            </a:pPr>
+            <a:r>
+              <a:rPr lang="en-GB" dirty="0" smtClean="0"/>
+              <a:t>or</a:t>
+            </a:r>
+          </a:p>
+          <a:p>
+            <a:pPr marL="457200" lvl="1" indent="0">
+              <a:buNone/>
+            </a:pPr>
+            <a:r>
+              <a:rPr lang="en-GB" dirty="0" err="1" smtClean="0"/>
+              <a:t>PyObject_Type</a:t>
+            </a:r>
+            <a:r>
+              <a:rPr lang="en-GB" dirty="0" smtClean="0"/>
+              <a:t>(</a:t>
+            </a:r>
+            <a:r>
+              <a:rPr lang="en-GB" dirty="0" err="1" smtClean="0"/>
+              <a:t>obj</a:t>
+            </a:r>
+            <a:r>
+              <a:rPr lang="en-GB" dirty="0" smtClean="0"/>
+              <a:t>) == </a:t>
+            </a:r>
+            <a:r>
+              <a:rPr lang="en-GB" dirty="0" err="1" smtClean="0"/>
+              <a:t>type_obj</a:t>
             </a:r>
             <a:endParaRPr lang="en-GB" dirty="0" smtClean="0"/>
           </a:p>
           <a:p>
-            <a:pPr lvl="1"/>
-            <a:r>
-              <a:rPr lang="en-GB" dirty="0" smtClean="0"/>
-              <a:t>Check: can it be used to call Python from Java</a:t>
-            </a:r>
-          </a:p>
-          <a:p>
-            <a:pPr lvl="1"/>
-            <a:r>
-              <a:rPr lang="en-GB" dirty="0" smtClean="0"/>
-              <a:t>Check: No windows support</a:t>
-            </a:r>
-          </a:p>
-          <a:p>
-            <a:pPr lvl="1"/>
-            <a:r>
-              <a:rPr lang="en-GB" dirty="0" smtClean="0"/>
-              <a:t>Check: last activity 9 months ago</a:t>
-            </a:r>
-            <a:endParaRPr lang="en-GB" dirty="0"/>
+            <a:pPr marL="457200" lvl="1" indent="0">
+              <a:buNone/>
+            </a:pPr>
+            <a:r>
+              <a:rPr lang="en-GB" dirty="0" smtClean="0"/>
+              <a:t>or simpler</a:t>
+            </a:r>
+          </a:p>
+          <a:p>
+            <a:pPr marL="457200" lvl="1" indent="0">
+              <a:buNone/>
+            </a:pPr>
+            <a:r>
+              <a:rPr lang="en-GB" dirty="0" err="1" smtClean="0"/>
+              <a:t>obj</a:t>
+            </a:r>
+            <a:r>
+              <a:rPr lang="en-GB" dirty="0"/>
+              <a:t>-</a:t>
+            </a:r>
+            <a:r>
+              <a:rPr lang="en-GB" dirty="0" smtClean="0"/>
+              <a:t>&gt;</a:t>
+            </a:r>
+            <a:r>
+              <a:rPr lang="en-GB" dirty="0" err="1" smtClean="0"/>
+              <a:t>ob_type</a:t>
+            </a:r>
+            <a:r>
+              <a:rPr lang="en-GB" dirty="0" smtClean="0"/>
+              <a:t> == </a:t>
+            </a:r>
+            <a:r>
+              <a:rPr lang="en-GB" dirty="0" err="1" smtClean="0"/>
+              <a:t>type_obj</a:t>
+            </a:r>
+            <a:r>
+              <a:rPr lang="en-GB" dirty="0" smtClean="0"/>
+              <a:t>  </a:t>
+            </a:r>
           </a:p>
         </p:txBody>
       </p:sp>
     </p:spTree>
     <p:extLst>
       <p:ext uri="{BB962C8B-B14F-4D97-AF65-F5344CB8AC3E}">
-        <p14:creationId xmlns:p14="http://schemas.microsoft.com/office/powerpoint/2010/main" val="1310829027"/>
+        <p14:creationId xmlns:p14="http://schemas.microsoft.com/office/powerpoint/2010/main" val="2973595614"/>
       </p:ext>
     </p:extLst>
   </p:cSld>
@@ -4123,7 +4338,19 @@
           <a:p>
             <a:r>
               <a:rPr lang="en-GB" dirty="0" smtClean="0"/>
-              <a:t>Alternatives (2/2)</a:t>
+              <a:t>Data Arrays </a:t>
+            </a:r>
+            <a:r>
+              <a:rPr lang="en-GB" dirty="0" smtClean="0"/>
+              <a:t>(</a:t>
+            </a:r>
+            <a:r>
+              <a:rPr lang="en-GB" dirty="0"/>
+              <a:t>3</a:t>
+            </a:r>
+            <a:r>
+              <a:rPr lang="en-GB" dirty="0" smtClean="0"/>
+              <a:t>/3)</a:t>
             </a:r>
             <a:endParaRPr lang="en-GB" dirty="0"/>
           </a:p>
@@ -4142,6 +4369,511 @@
         <p:spPr/>
         <p:txBody>
           <a:bodyPr>
+            <a:normAutofit/>
+          </a:bodyPr>
+          <a:lstStyle/>
+          <a:p>
+            <a:r>
+              <a:rPr lang="en-GB" dirty="0" err="1" smtClean="0"/>
+              <a:t>CArray</a:t>
+            </a:r>
+            <a:endParaRPr lang="en-GB" dirty="0" smtClean="0"/>
+          </a:p>
+          <a:p>
+            <a:pPr lvl="1"/>
+            <a:r>
+              <a:rPr lang="en-GB" dirty="0" smtClean="0"/>
+              <a:t>implements </a:t>
+            </a:r>
+            <a:r>
+              <a:rPr lang="en-GB" smtClean="0"/>
+              <a:t>Buffer protocol  </a:t>
+            </a:r>
+            <a:endParaRPr lang="en-GB" dirty="0" smtClean="0"/>
+          </a:p>
+          <a:p>
+            <a:pPr lvl="1"/>
+            <a:r>
+              <a:rPr lang="en-GB" dirty="0" smtClean="0"/>
+              <a:t>implements Sequence protocol</a:t>
+            </a:r>
+          </a:p>
+          <a:p>
+            <a:r>
+              <a:rPr lang="en-GB" dirty="0" smtClean="0"/>
+              <a:t>TODO</a:t>
+            </a:r>
+          </a:p>
+          <a:p>
+            <a:pPr lvl="1"/>
+            <a:r>
+              <a:rPr lang="en-GB" dirty="0" smtClean="0"/>
+              <a:t>Make </a:t>
+            </a:r>
+            <a:r>
+              <a:rPr lang="en-GB" dirty="0" err="1" smtClean="0"/>
+              <a:t>dtype</a:t>
+            </a:r>
+            <a:r>
+              <a:rPr lang="en-GB" dirty="0" smtClean="0"/>
+              <a:t>-format-string conform to Python ‘</a:t>
+            </a:r>
+            <a:r>
+              <a:rPr lang="en-GB" dirty="0" err="1" smtClean="0"/>
+              <a:t>struct</a:t>
+            </a:r>
+            <a:r>
+              <a:rPr lang="en-GB" dirty="0" smtClean="0"/>
+              <a:t>’ module, see </a:t>
+            </a:r>
+            <a:br>
+              <a:rPr lang="en-GB" dirty="0" smtClean="0"/>
+            </a:br>
+            <a:r>
+              <a:rPr lang="en-GB" dirty="0" smtClean="0"/>
+              <a:t>6.3.  </a:t>
+            </a:r>
+            <a:r>
+              <a:rPr lang="en-GB" dirty="0" err="1" smtClean="0"/>
+              <a:t>struct</a:t>
+            </a:r>
+            <a:r>
+              <a:rPr lang="en-GB" dirty="0" smtClean="0"/>
+              <a:t> </a:t>
+            </a:r>
+            <a:r>
+              <a:rPr lang="en-GB" dirty="0"/>
+              <a:t>— Interpret bytes as packed binary </a:t>
+            </a:r>
+            <a:r>
+              <a:rPr lang="en-GB" dirty="0" smtClean="0"/>
+              <a:t>data, see also</a:t>
+            </a:r>
+            <a:br>
+              <a:rPr lang="en-GB" dirty="0" smtClean="0"/>
+            </a:br>
+            <a:r>
+              <a:rPr lang="en-GB" dirty="0" err="1" smtClean="0"/>
+              <a:t>PyBuffer_SizeFromFormat</a:t>
+            </a:r>
+            <a:r>
+              <a:rPr lang="en-GB" dirty="0" smtClean="0"/>
+              <a:t>(format) </a:t>
+            </a:r>
+            <a:endParaRPr lang="en-GB" dirty="0"/>
+          </a:p>
+          <a:p>
+            <a:pPr lvl="1"/>
+            <a:endParaRPr lang="en-GB" dirty="0" smtClean="0"/>
+          </a:p>
+        </p:txBody>
+      </p:sp>
+    </p:spTree>
+    <p:extLst>
+      <p:ext uri="{BB962C8B-B14F-4D97-AF65-F5344CB8AC3E}">
+        <p14:creationId xmlns:p14="http://schemas.microsoft.com/office/powerpoint/2010/main" val="845572741"/>
+      </p:ext>
+    </p:extLst>
+  </p:cSld>
+  <p:clrMapOvr>
+    <a:masterClrMapping/>
+  </p:clrMapOvr>
+  <p:timing>
+    <p:tnLst>
+      <p:par>
+        <p:cTn id="1" dur="indefinite" restart="never" nodeType="tmRoot"/>
+      </p:par>
+    </p:tnLst>
+  </p:timing>
+</p:sld>
+</file>
+
+<file path=ppt/slides/slide14.xml><?xml version="1.0" encoding="utf-8"?>
+<p:sld xmlns:a="http://schemas.openxmlformats.org/drawingml/2006/main" xmlns:r="http://schemas.openxmlformats.org/officeDocument/2006/relationships" xmlns:p="http://schemas.openxmlformats.org/presentationml/2006/main">
+  <p:cSld>
+    <p:spTree>
+      <p:nvGrpSpPr>
+        <p:cNvPr id="1" name=""/>
+        <p:cNvGrpSpPr/>
+        <p:nvPr/>
+      </p:nvGrpSpPr>
+      <p:grpSpPr>
+        <a:xfrm>
+          <a:off x="0" y="0"/>
+          <a:ext cx="0" cy="0"/>
+          <a:chOff x="0" y="0"/>
+          <a:chExt cx="0" cy="0"/>
+        </a:xfrm>
+      </p:grpSpPr>
+      <p:sp>
+        <p:nvSpPr>
+          <p:cNvPr id="2" name="Titel 1"/>
+          <p:cNvSpPr>
+            <a:spLocks noGrp="1"/>
+          </p:cNvSpPr>
+          <p:nvPr>
+            <p:ph type="title"/>
+          </p:nvPr>
+        </p:nvSpPr>
+        <p:spPr/>
+        <p:txBody>
+          <a:bodyPr/>
+          <a:lstStyle/>
+          <a:p>
+            <a:r>
+              <a:rPr lang="en-GB" dirty="0" smtClean="0"/>
+              <a:t>Multithreading</a:t>
+            </a:r>
+            <a:endParaRPr lang="en-GB" dirty="0"/>
+          </a:p>
+        </p:txBody>
+      </p:sp>
+      <p:sp>
+        <p:nvSpPr>
+          <p:cNvPr id="3" name="Inhaltsplatzhalter 2"/>
+          <p:cNvSpPr>
+            <a:spLocks noGrp="1"/>
+          </p:cNvSpPr>
+          <p:nvPr>
+            <p:ph idx="1"/>
+          </p:nvPr>
+        </p:nvSpPr>
+        <p:spPr/>
+        <p:txBody>
+          <a:bodyPr>
+            <a:normAutofit lnSpcReduction="10000"/>
+          </a:bodyPr>
+          <a:lstStyle/>
+          <a:p>
+            <a:r>
+              <a:rPr lang="en-GB" dirty="0" smtClean="0"/>
+              <a:t>If BEAM Java calls into Python from multiple Java threads for executing e.g. a tile computation, we can consider</a:t>
+            </a:r>
+          </a:p>
+          <a:p>
+            <a:pPr lvl="1"/>
+            <a:r>
+              <a:rPr lang="en-GB" dirty="0" err="1" smtClean="0"/>
+              <a:t>PyThreadState</a:t>
+            </a:r>
+            <a:r>
+              <a:rPr lang="en-GB" dirty="0" smtClean="0"/>
+              <a:t>* </a:t>
+            </a:r>
+            <a:r>
+              <a:rPr lang="en-GB" dirty="0" err="1" smtClean="0"/>
+              <a:t>tstate</a:t>
+            </a:r>
+            <a:r>
+              <a:rPr lang="en-GB" dirty="0" smtClean="0"/>
+              <a:t>;</a:t>
+            </a:r>
+          </a:p>
+          <a:p>
+            <a:pPr lvl="1"/>
+            <a:r>
+              <a:rPr lang="en-GB" dirty="0" err="1" smtClean="0"/>
+              <a:t>tstate</a:t>
+            </a:r>
+            <a:r>
+              <a:rPr lang="en-GB" dirty="0" smtClean="0"/>
+              <a:t> = </a:t>
+            </a:r>
+            <a:r>
+              <a:rPr lang="en-GB" dirty="0" err="1"/>
+              <a:t>Py_NewInterpreter</a:t>
+            </a:r>
+            <a:r>
+              <a:rPr lang="en-GB" dirty="0" smtClean="0"/>
+              <a:t>();</a:t>
+            </a:r>
+          </a:p>
+          <a:p>
+            <a:pPr lvl="1"/>
+            <a:r>
+              <a:rPr lang="en-GB" dirty="0" smtClean="0"/>
+              <a:t>…</a:t>
+            </a:r>
+            <a:r>
+              <a:rPr lang="en-GB" i="1" dirty="0" smtClean="0"/>
+              <a:t> call into python code</a:t>
+            </a:r>
+          </a:p>
+          <a:p>
+            <a:pPr lvl="1"/>
+            <a:r>
+              <a:rPr lang="en-GB" dirty="0" err="1" smtClean="0"/>
+              <a:t>Py_EndInterpreter</a:t>
+            </a:r>
+            <a:r>
+              <a:rPr lang="en-GB" dirty="0" smtClean="0"/>
+              <a:t>(</a:t>
+            </a:r>
+            <a:r>
+              <a:rPr lang="en-GB" dirty="0" err="1" smtClean="0"/>
+              <a:t>tstate</a:t>
+            </a:r>
+            <a:r>
+              <a:rPr lang="en-GB" dirty="0" smtClean="0"/>
+              <a:t>);  </a:t>
+            </a:r>
+          </a:p>
+          <a:p>
+            <a:pPr marL="342900" lvl="1" indent="-342900">
+              <a:buFont typeface="Arial" pitchFamily="34" charset="0"/>
+              <a:buChar char="•"/>
+            </a:pPr>
+            <a:r>
+              <a:rPr lang="en-GB" dirty="0"/>
+              <a:t>See </a:t>
+            </a:r>
+            <a:r>
+              <a:rPr lang="en-GB" dirty="0" smtClean="0"/>
+              <a:t>“Initialization</a:t>
+            </a:r>
+            <a:r>
+              <a:rPr lang="en-GB" dirty="0"/>
+              <a:t>, Finalization, and </a:t>
+            </a:r>
+            <a:r>
+              <a:rPr lang="en-GB" dirty="0" smtClean="0"/>
+              <a:t>Threads” </a:t>
+            </a:r>
+            <a:r>
+              <a:rPr lang="en-GB" dirty="0"/>
+              <a:t>in Python/C API Reference Manual</a:t>
+            </a:r>
+          </a:p>
+          <a:p>
+            <a:pPr marL="0" indent="0">
+              <a:buNone/>
+            </a:pPr>
+            <a:endParaRPr lang="en-GB" dirty="0"/>
+          </a:p>
+        </p:txBody>
+      </p:sp>
+    </p:spTree>
+    <p:extLst>
+      <p:ext uri="{BB962C8B-B14F-4D97-AF65-F5344CB8AC3E}">
+        <p14:creationId xmlns:p14="http://schemas.microsoft.com/office/powerpoint/2010/main" val="183588086"/>
+      </p:ext>
+    </p:extLst>
+  </p:cSld>
+  <p:clrMapOvr>
+    <a:masterClrMapping/>
+  </p:clrMapOvr>
+  <p:timing>
+    <p:tnLst>
+      <p:par>
+        <p:cTn id="1" dur="indefinite" restart="never" nodeType="tmRoot"/>
+      </p:par>
+    </p:tnLst>
+  </p:timing>
+</p:sld>
+</file>
+
+<file path=ppt/slides/slide15.xml><?xml version="1.0" encoding="utf-8"?>
+<p:sld xmlns:a="http://schemas.openxmlformats.org/drawingml/2006/main" xmlns:r="http://schemas.openxmlformats.org/officeDocument/2006/relationships" xmlns:p="http://schemas.openxmlformats.org/presentationml/2006/main">
+  <p:cSld>
+    <p:spTree>
+      <p:nvGrpSpPr>
+        <p:cNvPr id="1" name=""/>
+        <p:cNvGrpSpPr/>
+        <p:nvPr/>
+      </p:nvGrpSpPr>
+      <p:grpSpPr>
+        <a:xfrm>
+          <a:off x="0" y="0"/>
+          <a:ext cx="0" cy="0"/>
+          <a:chOff x="0" y="0"/>
+          <a:chExt cx="0" cy="0"/>
+        </a:xfrm>
+      </p:grpSpPr>
+      <p:sp>
+        <p:nvSpPr>
+          <p:cNvPr id="2" name="Titel 1"/>
+          <p:cNvSpPr>
+            <a:spLocks noGrp="1"/>
+          </p:cNvSpPr>
+          <p:nvPr>
+            <p:ph type="title"/>
+          </p:nvPr>
+        </p:nvSpPr>
+        <p:spPr/>
+        <p:txBody>
+          <a:bodyPr/>
+          <a:lstStyle/>
+          <a:p>
+            <a:r>
+              <a:rPr lang="en-GB" dirty="0" smtClean="0"/>
+              <a:t>Alternatives (1/2)</a:t>
+            </a:r>
+            <a:endParaRPr lang="en-GB" dirty="0"/>
+          </a:p>
+        </p:txBody>
+      </p:sp>
+      <p:sp>
+        <p:nvSpPr>
+          <p:cNvPr id="3" name="Inhaltsplatzhalter 2"/>
+          <p:cNvSpPr>
+            <a:spLocks noGrp="1"/>
+          </p:cNvSpPr>
+          <p:nvPr>
+            <p:ph idx="1"/>
+          </p:nvPr>
+        </p:nvSpPr>
+        <p:spPr/>
+        <p:txBody>
+          <a:bodyPr/>
+          <a:lstStyle/>
+          <a:p>
+            <a:r>
+              <a:rPr lang="en-GB" b="1" dirty="0" err="1"/>
+              <a:t>Jep</a:t>
+            </a:r>
+            <a:r>
+              <a:rPr lang="en-GB" dirty="0"/>
+              <a:t> - Java Embedded Python</a:t>
+            </a:r>
+          </a:p>
+          <a:p>
+            <a:pPr lvl="1"/>
+            <a:r>
+              <a:rPr lang="en-GB" dirty="0" err="1"/>
+              <a:t>Jep</a:t>
+            </a:r>
+            <a:r>
+              <a:rPr lang="en-GB" dirty="0"/>
+              <a:t> embeds </a:t>
+            </a:r>
+            <a:r>
+              <a:rPr lang="en-GB" dirty="0" err="1"/>
+              <a:t>CPython</a:t>
+            </a:r>
+            <a:r>
+              <a:rPr lang="en-GB" dirty="0"/>
+              <a:t> in Java. It is safe to use in a heavily threaded environment, it is quite fast and its stability is a main feature and goal.</a:t>
+            </a:r>
+          </a:p>
+          <a:p>
+            <a:pPr lvl="1"/>
+            <a:r>
+              <a:rPr lang="en-GB" dirty="0" smtClean="0">
+                <a:hlinkClick r:id="rId2"/>
+              </a:rPr>
+              <a:t>https</a:t>
+            </a:r>
+            <a:r>
+              <a:rPr lang="en-GB" dirty="0">
+                <a:hlinkClick r:id="rId2"/>
+              </a:rPr>
+              <a:t>://</a:t>
+            </a:r>
+            <a:r>
+              <a:rPr lang="en-GB" dirty="0" smtClean="0">
+                <a:hlinkClick r:id="rId2"/>
+              </a:rPr>
+              <a:t>github.com/mrj0/jep</a:t>
+            </a:r>
+            <a:endParaRPr lang="en-GB" dirty="0" smtClean="0"/>
+          </a:p>
+          <a:p>
+            <a:pPr lvl="1"/>
+            <a:r>
+              <a:rPr lang="en-GB" dirty="0" smtClean="0"/>
+              <a:t>Check: can it be used to call Python from Java</a:t>
+            </a:r>
+          </a:p>
+          <a:p>
+            <a:pPr lvl="1"/>
+            <a:r>
+              <a:rPr lang="en-GB" dirty="0" smtClean="0"/>
+              <a:t>Check: No windows support</a:t>
+            </a:r>
+          </a:p>
+          <a:p>
+            <a:pPr lvl="1"/>
+            <a:r>
+              <a:rPr lang="en-GB" dirty="0" smtClean="0"/>
+              <a:t>Check: last activity 9 months ago</a:t>
+            </a:r>
+            <a:endParaRPr lang="en-GB" dirty="0"/>
+          </a:p>
+        </p:txBody>
+      </p:sp>
+    </p:spTree>
+    <p:extLst>
+      <p:ext uri="{BB962C8B-B14F-4D97-AF65-F5344CB8AC3E}">
+        <p14:creationId xmlns:p14="http://schemas.microsoft.com/office/powerpoint/2010/main" val="1310829027"/>
+      </p:ext>
+    </p:extLst>
+  </p:cSld>
+  <p:clrMapOvr>
+    <a:masterClrMapping/>
+  </p:clrMapOvr>
+  <p:timing>
+    <p:tnLst>
+      <p:par>
+        <p:cTn id="1" dur="indefinite" restart="never" nodeType="tmRoot"/>
+      </p:par>
+    </p:tnLst>
+  </p:timing>
+</p:sld>
+</file>
+
+<file path=ppt/slides/slide16.xml><?xml version="1.0" encoding="utf-8"?>
+<p:sld xmlns:a="http://schemas.openxmlformats.org/drawingml/2006/main" xmlns:r="http://schemas.openxmlformats.org/officeDocument/2006/relationships" xmlns:p="http://schemas.openxmlformats.org/presentationml/2006/main">
+  <p:cSld>
+    <p:spTree>
+      <p:nvGrpSpPr>
+        <p:cNvPr id="1" name=""/>
+        <p:cNvGrpSpPr/>
+        <p:nvPr/>
+      </p:nvGrpSpPr>
+      <p:grpSpPr>
+        <a:xfrm>
+          <a:off x="0" y="0"/>
+          <a:ext cx="0" cy="0"/>
+          <a:chOff x="0" y="0"/>
+          <a:chExt cx="0" cy="0"/>
+        </a:xfrm>
+      </p:grpSpPr>
+      <p:sp>
+        <p:nvSpPr>
+          <p:cNvPr id="2" name="Titel 1"/>
+          <p:cNvSpPr>
+            <a:spLocks noGrp="1"/>
+          </p:cNvSpPr>
+          <p:nvPr>
+            <p:ph type="title"/>
+          </p:nvPr>
+        </p:nvSpPr>
+        <p:spPr/>
+        <p:txBody>
+          <a:bodyPr/>
+          <a:lstStyle/>
+          <a:p>
+            <a:r>
+              <a:rPr lang="en-GB" dirty="0" smtClean="0"/>
+              <a:t>Alternatives (2/2)</a:t>
+            </a:r>
+            <a:endParaRPr lang="en-GB" dirty="0"/>
+          </a:p>
+        </p:txBody>
+      </p:sp>
+      <p:sp>
+        <p:nvSpPr>
+          <p:cNvPr id="3" name="Inhaltsplatzhalter 2"/>
+          <p:cNvSpPr>
+            <a:spLocks noGrp="1"/>
+          </p:cNvSpPr>
+          <p:nvPr>
+            <p:ph idx="1"/>
+          </p:nvPr>
+        </p:nvSpPr>
+        <p:spPr/>
+        <p:txBody>
+          <a:bodyPr>
             <a:normAutofit fontScale="92500" lnSpcReduction="20000"/>
           </a:bodyPr>
           <a:lstStyle/>
@@ -4267,6 +4999,156 @@
     <p:extLst>
       <p:ext uri="{BB962C8B-B14F-4D97-AF65-F5344CB8AC3E}">
         <p14:creationId xmlns:p14="http://schemas.microsoft.com/office/powerpoint/2010/main" val="1553940326"/>
+      </p:ext>
+    </p:extLst>
+  </p:cSld>
+  <p:clrMapOvr>
+    <a:masterClrMapping/>
+  </p:clrMapOvr>
+  <p:timing>
+    <p:tnLst>
+      <p:par>
+        <p:cTn id="1" dur="indefinite" restart="never" nodeType="tmRoot"/>
+      </p:par>
+    </p:tnLst>
+  </p:timing>
+</p:sld>
+</file>
+
+<file path=ppt/slides/slide17.xml><?xml version="1.0" encoding="utf-8"?>
+<p:sld xmlns:a="http://schemas.openxmlformats.org/drawingml/2006/main" xmlns:r="http://schemas.openxmlformats.org/officeDocument/2006/relationships" xmlns:p="http://schemas.openxmlformats.org/presentationml/2006/main">
+  <p:cSld>
+    <p:spTree>
+      <p:nvGrpSpPr>
+        <p:cNvPr id="1" name=""/>
+        <p:cNvGrpSpPr/>
+        <p:nvPr/>
+      </p:nvGrpSpPr>
+      <p:grpSpPr>
+        <a:xfrm>
+          <a:off x="0" y="0"/>
+          <a:ext cx="0" cy="0"/>
+          <a:chOff x="0" y="0"/>
+          <a:chExt cx="0" cy="0"/>
+        </a:xfrm>
+      </p:grpSpPr>
+      <p:sp>
+        <p:nvSpPr>
+          <p:cNvPr id="2" name="Titel 1"/>
+          <p:cNvSpPr>
+            <a:spLocks noGrp="1"/>
+          </p:cNvSpPr>
+          <p:nvPr>
+            <p:ph type="title"/>
+          </p:nvPr>
+        </p:nvSpPr>
+        <p:spPr/>
+        <p:txBody>
+          <a:bodyPr/>
+          <a:lstStyle/>
+          <a:p>
+            <a:r>
+              <a:rPr lang="en-GB" dirty="0" smtClean="0"/>
+              <a:t>Potential Users (External Testers)</a:t>
+            </a:r>
+            <a:endParaRPr lang="en-GB" dirty="0"/>
+          </a:p>
+        </p:txBody>
+      </p:sp>
+      <p:sp>
+        <p:nvSpPr>
+          <p:cNvPr id="3" name="Inhaltsplatzhalter 2"/>
+          <p:cNvSpPr>
+            <a:spLocks noGrp="1"/>
+          </p:cNvSpPr>
+          <p:nvPr>
+            <p:ph idx="1"/>
+          </p:nvPr>
+        </p:nvSpPr>
+        <p:spPr/>
+        <p:txBody>
+          <a:bodyPr/>
+          <a:lstStyle/>
+          <a:p>
+            <a:r>
+              <a:rPr lang="en-GB" dirty="0"/>
+              <a:t>Philipp </a:t>
+            </a:r>
+            <a:r>
+              <a:rPr lang="en-GB" dirty="0" err="1" smtClean="0"/>
+              <a:t>Groetsch</a:t>
+            </a:r>
+            <a:r>
+              <a:rPr lang="en-GB" dirty="0" smtClean="0"/>
+              <a:t/>
+            </a:r>
+            <a:br>
+              <a:rPr lang="en-GB" dirty="0" smtClean="0"/>
+            </a:br>
+            <a:r>
+              <a:rPr lang="en-GB" dirty="0" smtClean="0"/>
+              <a:t>Water Insight / Tartu Observatory, </a:t>
+            </a:r>
+            <a:r>
+              <a:rPr lang="en-GB" dirty="0" smtClean="0">
+                <a:hlinkClick r:id="rId2"/>
+              </a:rPr>
+              <a:t>groetsch@waterinsight.nl</a:t>
+            </a:r>
+            <a:endParaRPr lang="en-GB" dirty="0" smtClean="0"/>
+          </a:p>
+          <a:p>
+            <a:r>
+              <a:rPr lang="en-GB" dirty="0" err="1" smtClean="0"/>
+              <a:t>Alexeander</a:t>
+            </a:r>
+            <a:r>
+              <a:rPr lang="en-GB" dirty="0" smtClean="0"/>
+              <a:t> </a:t>
+            </a:r>
+            <a:r>
+              <a:rPr lang="en-GB" dirty="0" err="1" smtClean="0"/>
+              <a:t>Loew</a:t>
+            </a:r>
+            <a:r>
+              <a:rPr lang="en-GB" dirty="0" smtClean="0"/>
+              <a:t/>
+            </a:r>
+            <a:br>
+              <a:rPr lang="en-GB" dirty="0" smtClean="0"/>
+            </a:br>
+            <a:r>
+              <a:rPr lang="en-GB" dirty="0" smtClean="0"/>
+              <a:t>Max-Planck-Institute</a:t>
+            </a:r>
+          </a:p>
+          <a:p>
+            <a:r>
+              <a:rPr lang="en-GB" dirty="0" smtClean="0"/>
+              <a:t>Rene </a:t>
+            </a:r>
+            <a:r>
+              <a:rPr lang="en-GB" dirty="0" err="1" smtClean="0"/>
+              <a:t>Preusker</a:t>
+            </a:r>
+            <a:r>
+              <a:rPr lang="en-GB" dirty="0"/>
+              <a:t/>
+            </a:r>
+            <a:br>
+              <a:rPr lang="en-GB" dirty="0"/>
+            </a:br>
+            <a:r>
+              <a:rPr lang="en-GB" dirty="0" smtClean="0"/>
+              <a:t>FUB</a:t>
+            </a:r>
+          </a:p>
+        </p:txBody>
+      </p:sp>
+    </p:spTree>
+    <p:extLst>
+      <p:ext uri="{BB962C8B-B14F-4D97-AF65-F5344CB8AC3E}">
+        <p14:creationId xmlns:p14="http://schemas.microsoft.com/office/powerpoint/2010/main" val="1630517429"/>
       </p:ext>
     </p:extLst>
   </p:cSld>

</xml_diff>

<commit_message>
added slide about type transformations
</commit_message>
<xml_diff>
--- a/docs/beam-extapi.pptx
+++ b/docs/beam-extapi.pptx
@@ -12,16 +12,18 @@
     <p:sldId id="263" r:id="rId6"/>
     <p:sldId id="257" r:id="rId7"/>
     <p:sldId id="259" r:id="rId8"/>
-    <p:sldId id="265" r:id="rId9"/>
-    <p:sldId id="267" r:id="rId10"/>
-    <p:sldId id="266" r:id="rId11"/>
-    <p:sldId id="268" r:id="rId12"/>
-    <p:sldId id="272" r:id="rId13"/>
-    <p:sldId id="275" r:id="rId14"/>
-    <p:sldId id="274" r:id="rId15"/>
-    <p:sldId id="269" r:id="rId16"/>
-    <p:sldId id="270" r:id="rId17"/>
-    <p:sldId id="273" r:id="rId18"/>
+    <p:sldId id="277" r:id="rId9"/>
+    <p:sldId id="265" r:id="rId10"/>
+    <p:sldId id="267" r:id="rId11"/>
+    <p:sldId id="266" r:id="rId12"/>
+    <p:sldId id="268" r:id="rId13"/>
+    <p:sldId id="272" r:id="rId14"/>
+    <p:sldId id="275" r:id="rId15"/>
+    <p:sldId id="276" r:id="rId16"/>
+    <p:sldId id="274" r:id="rId17"/>
+    <p:sldId id="269" r:id="rId18"/>
+    <p:sldId id="270" r:id="rId19"/>
+    <p:sldId id="273" r:id="rId20"/>
   </p:sldIdLst>
   <p:sldSz cx="9144000" cy="6858000" type="screen4x3"/>
   <p:notesSz cx="6858000" cy="9144000"/>
@@ -304,7 +306,7 @@
           <a:p>
             <a:fld id="{1BA50D42-C9CD-4801-B293-61D1F53EC57E}" type="datetimeFigureOut">
               <a:rPr lang="de-DE" smtClean="0"/>
-              <a:t>15.03.2013</a:t>
+              <a:t>26.03.2013</a:t>
             </a:fld>
             <a:endParaRPr lang="de-DE"/>
           </a:p>
@@ -469,7 +471,7 @@
           <a:p>
             <a:fld id="{1BA50D42-C9CD-4801-B293-61D1F53EC57E}" type="datetimeFigureOut">
               <a:rPr lang="de-DE" smtClean="0"/>
-              <a:t>15.03.2013</a:t>
+              <a:t>26.03.2013</a:t>
             </a:fld>
             <a:endParaRPr lang="de-DE"/>
           </a:p>
@@ -644,7 +646,7 @@
           <a:p>
             <a:fld id="{1BA50D42-C9CD-4801-B293-61D1F53EC57E}" type="datetimeFigureOut">
               <a:rPr lang="de-DE" smtClean="0"/>
-              <a:t>15.03.2013</a:t>
+              <a:t>26.03.2013</a:t>
             </a:fld>
             <a:endParaRPr lang="de-DE"/>
           </a:p>
@@ -809,7 +811,7 @@
           <a:p>
             <a:fld id="{1BA50D42-C9CD-4801-B293-61D1F53EC57E}" type="datetimeFigureOut">
               <a:rPr lang="de-DE" smtClean="0"/>
-              <a:t>15.03.2013</a:t>
+              <a:t>26.03.2013</a:t>
             </a:fld>
             <a:endParaRPr lang="de-DE"/>
           </a:p>
@@ -1050,7 +1052,7 @@
           <a:p>
             <a:fld id="{1BA50D42-C9CD-4801-B293-61D1F53EC57E}" type="datetimeFigureOut">
               <a:rPr lang="de-DE" smtClean="0"/>
-              <a:t>15.03.2013</a:t>
+              <a:t>26.03.2013</a:t>
             </a:fld>
             <a:endParaRPr lang="de-DE"/>
           </a:p>
@@ -1333,7 +1335,7 @@
           <a:p>
             <a:fld id="{1BA50D42-C9CD-4801-B293-61D1F53EC57E}" type="datetimeFigureOut">
               <a:rPr lang="de-DE" smtClean="0"/>
-              <a:t>15.03.2013</a:t>
+              <a:t>26.03.2013</a:t>
             </a:fld>
             <a:endParaRPr lang="de-DE"/>
           </a:p>
@@ -1750,7 +1752,7 @@
           <a:p>
             <a:fld id="{1BA50D42-C9CD-4801-B293-61D1F53EC57E}" type="datetimeFigureOut">
               <a:rPr lang="de-DE" smtClean="0"/>
-              <a:t>15.03.2013</a:t>
+              <a:t>26.03.2013</a:t>
             </a:fld>
             <a:endParaRPr lang="de-DE"/>
           </a:p>
@@ -1863,7 +1865,7 @@
           <a:p>
             <a:fld id="{1BA50D42-C9CD-4801-B293-61D1F53EC57E}" type="datetimeFigureOut">
               <a:rPr lang="de-DE" smtClean="0"/>
-              <a:t>15.03.2013</a:t>
+              <a:t>26.03.2013</a:t>
             </a:fld>
             <a:endParaRPr lang="de-DE"/>
           </a:p>
@@ -1953,7 +1955,7 @@
           <a:p>
             <a:fld id="{1BA50D42-C9CD-4801-B293-61D1F53EC57E}" type="datetimeFigureOut">
               <a:rPr lang="de-DE" smtClean="0"/>
-              <a:t>15.03.2013</a:t>
+              <a:t>26.03.2013</a:t>
             </a:fld>
             <a:endParaRPr lang="de-DE"/>
           </a:p>
@@ -2225,7 +2227,7 @@
           <a:p>
             <a:fld id="{1BA50D42-C9CD-4801-B293-61D1F53EC57E}" type="datetimeFigureOut">
               <a:rPr lang="de-DE" smtClean="0"/>
-              <a:t>15.03.2013</a:t>
+              <a:t>26.03.2013</a:t>
             </a:fld>
             <a:endParaRPr lang="de-DE"/>
           </a:p>
@@ -2473,7 +2475,7 @@
           <a:p>
             <a:fld id="{1BA50D42-C9CD-4801-B293-61D1F53EC57E}" type="datetimeFigureOut">
               <a:rPr lang="de-DE" smtClean="0"/>
-              <a:t>15.03.2013</a:t>
+              <a:t>26.03.2013</a:t>
             </a:fld>
             <a:endParaRPr lang="de-DE"/>
           </a:p>
@@ -2681,7 +2683,7 @@
           <a:p>
             <a:fld id="{1BA50D42-C9CD-4801-B293-61D1F53EC57E}" type="datetimeFigureOut">
               <a:rPr lang="de-DE" smtClean="0"/>
-              <a:t>15.03.2013</a:t>
+              <a:t>26.03.2013</a:t>
             </a:fld>
             <a:endParaRPr lang="de-DE"/>
           </a:p>
@@ -3151,11 +3153,7 @@
           <a:p>
             <a:r>
               <a:rPr lang="en-GB" dirty="0" smtClean="0"/>
-              <a:t>Design </a:t>
-            </a:r>
-            <a:r>
-              <a:rPr lang="en-GB" dirty="0" err="1" smtClean="0"/>
-              <a:t>Decisons</a:t>
+              <a:t>Compiler Design Issues</a:t>
             </a:r>
             <a:endParaRPr lang="en-GB" dirty="0"/>
           </a:p>
@@ -3174,302 +3172,89 @@
         <p:spPr/>
         <p:txBody>
           <a:bodyPr>
-            <a:normAutofit fontScale="47500" lnSpcReduction="20000"/>
+            <a:normAutofit fontScale="85000" lnSpcReduction="20000"/>
           </a:bodyPr>
           <a:lstStyle/>
           <a:p>
             <a:r>
+              <a:rPr lang="en-GB" dirty="0" smtClean="0"/>
+              <a:t>In order to avoid binding of all Java code,</a:t>
+            </a:r>
+          </a:p>
+          <a:p>
+            <a:pPr lvl="1"/>
+            <a:r>
+              <a:rPr lang="en-GB" dirty="0" smtClean="0"/>
+              <a:t>define a list of types for which code shall be generated (Product, Band, </a:t>
+            </a:r>
+            <a:r>
+              <a:rPr lang="en-GB" dirty="0" err="1" smtClean="0"/>
+              <a:t>TiePointGrid</a:t>
+            </a:r>
+            <a:r>
+              <a:rPr lang="en-GB" dirty="0" smtClean="0"/>
+              <a:t>, …)</a:t>
+            </a:r>
+          </a:p>
+          <a:p>
+            <a:pPr lvl="1"/>
+            <a:r>
               <a:rPr lang="en-GB" dirty="0"/>
-              <a:t>Use JNI types in </a:t>
-            </a:r>
-            <a:r>
-              <a:rPr lang="en-GB" dirty="0" smtClean="0"/>
-              <a:t>C-interfaces</a:t>
-            </a:r>
+              <a:t>f</a:t>
+            </a:r>
+            <a:r>
+              <a:rPr lang="en-GB" dirty="0" smtClean="0"/>
+              <a:t>or some types or single methods, we will provide hand-written code (File, String, …)</a:t>
+            </a:r>
+            <a:endParaRPr lang="en-GB" dirty="0"/>
           </a:p>
           <a:p>
             <a:pPr lvl="1"/>
             <a:r>
               <a:rPr lang="en-GB" dirty="0" smtClean="0"/>
-              <a:t>Yes</a:t>
-            </a:r>
-            <a:r>
-              <a:rPr lang="en-GB" dirty="0"/>
-              <a:t>, because BEAM API is Java and as such it is much less </a:t>
-            </a:r>
-            <a:r>
-              <a:rPr lang="en-GB" dirty="0" err="1"/>
-              <a:t>verbous</a:t>
-            </a:r>
-            <a:r>
-              <a:rPr lang="en-GB" dirty="0"/>
-              <a:t> and more concise to reuse JNI types, and is </a:t>
-            </a:r>
-            <a:r>
-              <a:rPr lang="en-GB" dirty="0" err="1"/>
-              <a:t>aloso</a:t>
-            </a:r>
-            <a:r>
-              <a:rPr lang="en-GB" dirty="0"/>
-              <a:t> less </a:t>
-            </a:r>
-            <a:r>
-              <a:rPr lang="en-GB" dirty="0" smtClean="0"/>
-              <a:t>work</a:t>
-            </a:r>
-          </a:p>
-          <a:p>
-            <a:pPr lvl="1"/>
-            <a:r>
-              <a:rPr lang="en-GB" dirty="0" smtClean="0"/>
-              <a:t>No</a:t>
-            </a:r>
-            <a:r>
-              <a:rPr lang="en-GB" dirty="0"/>
-              <a:t>, because the C-API shall be independent of its implementation or </a:t>
-            </a:r>
-            <a:r>
-              <a:rPr lang="en-GB" dirty="0" smtClean="0"/>
-              <a:t>origin</a:t>
-            </a:r>
-            <a:endParaRPr lang="en-GB" dirty="0"/>
-          </a:p>
-          <a:p>
-            <a:r>
-              <a:rPr lang="en-GB" dirty="0"/>
-              <a:t>Duplicate Java API (or parts) 1:1?  (e.g. any method in Java gets its C counterpart)</a:t>
-            </a:r>
-          </a:p>
-          <a:p>
-            <a:pPr lvl="1"/>
-            <a:r>
-              <a:rPr lang="en-GB" dirty="0" smtClean="0"/>
-              <a:t>Yes</a:t>
-            </a:r>
-            <a:r>
-              <a:rPr lang="en-GB" dirty="0"/>
-              <a:t>, because the Java API docs can be reused for C API</a:t>
-            </a:r>
-            <a:r>
-              <a:rPr lang="en-GB" dirty="0" smtClean="0"/>
-              <a:t>.</a:t>
-            </a:r>
-          </a:p>
-          <a:p>
-            <a:pPr lvl="1"/>
-            <a:r>
-              <a:rPr lang="en-GB" dirty="0" smtClean="0"/>
-              <a:t>No</a:t>
-            </a:r>
-            <a:r>
-              <a:rPr lang="en-GB" dirty="0"/>
-              <a:t>, because a more concise C-API can be generated. And no, because changes in the Java API need to be reflected </a:t>
-            </a:r>
-            <a:r>
-              <a:rPr lang="en-GB" dirty="0" smtClean="0"/>
-              <a:t>in the </a:t>
-            </a:r>
-            <a:r>
-              <a:rPr lang="en-GB" dirty="0"/>
-              <a:t>C API </a:t>
-            </a:r>
-            <a:r>
-              <a:rPr lang="en-GB" dirty="0" smtClean="0"/>
-              <a:t>which </a:t>
-            </a:r>
-            <a:r>
-              <a:rPr lang="en-GB" dirty="0"/>
-              <a:t>will introduce a lot of work</a:t>
-            </a:r>
-            <a:r>
-              <a:rPr lang="en-GB" dirty="0" smtClean="0"/>
-              <a:t>.</a:t>
-            </a:r>
-            <a:endParaRPr lang="en-GB" dirty="0"/>
-          </a:p>
-          <a:p>
-            <a:r>
-              <a:rPr lang="en-GB" dirty="0"/>
-              <a:t>Shall C API functions return string buffers that users have to release </a:t>
-            </a:r>
-            <a:r>
-              <a:rPr lang="en-GB" dirty="0" smtClean="0"/>
-              <a:t>later?</a:t>
-            </a:r>
-          </a:p>
-          <a:p>
-            <a:pPr lvl="1"/>
-            <a:r>
-              <a:rPr lang="en-GB" dirty="0" smtClean="0"/>
-              <a:t>Yes</a:t>
-            </a:r>
-            <a:r>
-              <a:rPr lang="en-GB" dirty="0"/>
-              <a:t>, otherwise the signature of Java counterparts is will be different, because by-reference arguments passing </a:t>
-            </a:r>
-            <a:r>
-              <a:rPr lang="en-GB" dirty="0" smtClean="0"/>
-              <a:t>is required then.</a:t>
-            </a:r>
-            <a:br>
-              <a:rPr lang="en-GB" dirty="0" smtClean="0"/>
-            </a:br>
-            <a:r>
-              <a:rPr lang="en-GB" dirty="0" smtClean="0"/>
-              <a:t>E.g</a:t>
-            </a:r>
-            <a:r>
-              <a:rPr lang="en-GB" dirty="0"/>
-              <a:t>. instead </a:t>
-            </a:r>
-            <a:r>
-              <a:rPr lang="en-GB" dirty="0" smtClean="0"/>
-              <a:t>of</a:t>
-            </a:r>
-            <a:br>
-              <a:rPr lang="en-GB" dirty="0" smtClean="0"/>
-            </a:br>
-            <a:r>
-              <a:rPr lang="en-GB" dirty="0" smtClean="0"/>
-              <a:t>             </a:t>
-            </a:r>
-            <a:r>
-              <a:rPr lang="en-GB" dirty="0"/>
-              <a:t>char* name = </a:t>
-            </a:r>
-            <a:r>
-              <a:rPr lang="en-GB" dirty="0" err="1"/>
-              <a:t>get_name</a:t>
-            </a:r>
-            <a:r>
-              <a:rPr lang="en-GB" dirty="0"/>
-              <a:t>(</a:t>
-            </a:r>
-            <a:r>
-              <a:rPr lang="en-GB" dirty="0" err="1"/>
-              <a:t>obj</a:t>
-            </a:r>
-            <a:r>
-              <a:rPr lang="en-GB" dirty="0" smtClean="0"/>
-              <a:t>);</a:t>
-            </a:r>
-            <a:br>
-              <a:rPr lang="en-GB" dirty="0" smtClean="0"/>
-            </a:br>
-            <a:r>
-              <a:rPr lang="en-GB" dirty="0" smtClean="0"/>
-              <a:t>              ...</a:t>
-            </a:r>
-            <a:br>
-              <a:rPr lang="en-GB" dirty="0" smtClean="0"/>
-            </a:br>
-            <a:r>
-              <a:rPr lang="en-GB" dirty="0" smtClean="0"/>
-              <a:t>              </a:t>
-            </a:r>
-            <a:r>
-              <a:rPr lang="en-GB" dirty="0"/>
-              <a:t>free(name</a:t>
-            </a:r>
-            <a:r>
-              <a:rPr lang="en-GB" dirty="0" smtClean="0"/>
-              <a:t>);</a:t>
-            </a:r>
-            <a:br>
-              <a:rPr lang="en-GB" dirty="0" smtClean="0"/>
-            </a:br>
-            <a:r>
-              <a:rPr lang="en-GB" dirty="0" smtClean="0"/>
-              <a:t>we have</a:t>
-            </a:r>
-            <a:br>
-              <a:rPr lang="en-GB" dirty="0" smtClean="0"/>
-            </a:br>
-            <a:r>
-              <a:rPr lang="en-GB" dirty="0" smtClean="0"/>
-              <a:t>              </a:t>
-            </a:r>
-            <a:r>
-              <a:rPr lang="en-GB" dirty="0"/>
-              <a:t>char name[81</a:t>
-            </a:r>
-            <a:r>
-              <a:rPr lang="en-GB" dirty="0" smtClean="0"/>
-              <a:t>];</a:t>
-            </a:r>
-            <a:br>
-              <a:rPr lang="en-GB" dirty="0" smtClean="0"/>
-            </a:br>
-            <a:r>
-              <a:rPr lang="en-GB" dirty="0" smtClean="0"/>
-              <a:t>              </a:t>
-            </a:r>
-            <a:r>
-              <a:rPr lang="en-GB" dirty="0" err="1"/>
-              <a:t>get_name</a:t>
-            </a:r>
-            <a:r>
-              <a:rPr lang="en-GB" dirty="0"/>
-              <a:t>(</a:t>
-            </a:r>
-            <a:r>
-              <a:rPr lang="en-GB" dirty="0" err="1"/>
-              <a:t>obj</a:t>
-            </a:r>
-            <a:r>
-              <a:rPr lang="en-GB" dirty="0"/>
-              <a:t>, name, 80</a:t>
-            </a:r>
-            <a:r>
-              <a:rPr lang="en-GB" dirty="0" smtClean="0"/>
-              <a:t>);</a:t>
-            </a:r>
-          </a:p>
-          <a:p>
-            <a:pPr lvl="1"/>
-            <a:r>
-              <a:rPr lang="en-GB" dirty="0" smtClean="0"/>
-              <a:t>No</a:t>
-            </a:r>
-            <a:r>
-              <a:rPr lang="en-GB" dirty="0"/>
-              <a:t>, because it is </a:t>
-            </a:r>
-            <a:r>
-              <a:rPr lang="en-GB" dirty="0" smtClean="0"/>
-              <a:t>obvious </a:t>
-            </a:r>
-            <a:r>
-              <a:rPr lang="en-GB" dirty="0"/>
-              <a:t>that strings need to be freed on the users side</a:t>
-            </a:r>
-            <a:r>
-              <a:rPr lang="en-GB" dirty="0" smtClean="0"/>
-              <a:t>.</a:t>
-            </a:r>
-          </a:p>
-          <a:p>
-            <a:r>
-              <a:rPr lang="en-GB" dirty="0" smtClean="0"/>
-              <a:t>Shall </a:t>
-            </a:r>
-            <a:r>
-              <a:rPr lang="en-GB" dirty="0"/>
-              <a:t>the API allow for modification of single structures elements that are passed as arguments by-reference.?</a:t>
-            </a:r>
-          </a:p>
-          <a:p>
-            <a:endParaRPr lang="en-GB" dirty="0"/>
-          </a:p>
-          <a:p>
-            <a:endParaRPr lang="en-GB" dirty="0"/>
+              <a:t>methods that have types in their signature, that are not in this list, will not be translated</a:t>
+            </a:r>
+          </a:p>
+          <a:p>
+            <a:r>
+              <a:rPr lang="en-GB" dirty="0" smtClean="0"/>
+              <a:t>consider </a:t>
+            </a:r>
+            <a:r>
+              <a:rPr lang="en-GB" dirty="0" err="1" smtClean="0"/>
+              <a:t>javacc</a:t>
+            </a:r>
+            <a:r>
+              <a:rPr lang="en-GB" dirty="0" smtClean="0"/>
+              <a:t> to do the job</a:t>
+            </a:r>
+          </a:p>
+          <a:p>
+            <a:r>
+              <a:rPr lang="en-GB" dirty="0" smtClean="0"/>
+              <a:t>consider Java annotations to control code generation (e.g. parameter annotations @In, @Out, @</a:t>
+            </a:r>
+            <a:r>
+              <a:rPr lang="en-GB" dirty="0" err="1" smtClean="0"/>
+              <a:t>InOut</a:t>
+            </a:r>
+            <a:r>
+              <a:rPr lang="en-GB" dirty="0" smtClean="0"/>
+              <a:t>)</a:t>
+            </a:r>
+          </a:p>
+          <a:p>
+            <a:r>
+              <a:rPr lang="en-GB" dirty="0" smtClean="0"/>
+              <a:t>code generation might be done through patterns, e.g. implemented by velocity templates</a:t>
+            </a:r>
           </a:p>
         </p:txBody>
       </p:sp>
     </p:spTree>
     <p:extLst>
       <p:ext uri="{BB962C8B-B14F-4D97-AF65-F5344CB8AC3E}">
-        <p14:creationId xmlns:p14="http://schemas.microsoft.com/office/powerpoint/2010/main" val="1103487878"/>
+        <p14:creationId xmlns:p14="http://schemas.microsoft.com/office/powerpoint/2010/main" val="1053306664"/>
       </p:ext>
     </p:extLst>
   </p:cSld>
@@ -3520,7 +3305,11 @@
           <a:p>
             <a:r>
               <a:rPr lang="en-GB" dirty="0" smtClean="0"/>
-              <a:t>Data Arrays (1/3)</a:t>
+              <a:t>Design </a:t>
+            </a:r>
+            <a:r>
+              <a:rPr lang="en-GB" dirty="0" err="1" smtClean="0"/>
+              <a:t>Decisons</a:t>
             </a:r>
             <a:endParaRPr lang="en-GB" dirty="0"/>
           </a:p>
@@ -3544,390 +3333,297 @@
           <a:lstStyle/>
           <a:p>
             <a:r>
-              <a:rPr lang="en-GB" dirty="0" smtClean="0"/>
-              <a:t>We shall try to find a way to directly use the arrays allocated and returned by the C-API without copying them</a:t>
-            </a:r>
-          </a:p>
-          <a:p>
-            <a:endParaRPr lang="en-GB" dirty="0" smtClean="0"/>
-          </a:p>
-          <a:p>
-            <a:r>
-              <a:rPr lang="en-GB" b="1" dirty="0" smtClean="0"/>
-              <a:t>array</a:t>
+              <a:rPr lang="en-GB" dirty="0"/>
+              <a:t>Use JNI types in </a:t>
+            </a:r>
+            <a:r>
+              <a:rPr lang="en-GB" dirty="0" smtClean="0"/>
+              <a:t>C-interfaces</a:t>
             </a:r>
           </a:p>
           <a:p>
             <a:pPr lvl="1"/>
             <a:r>
-              <a:rPr lang="en-GB" b="1" dirty="0" smtClean="0"/>
-              <a:t>array</a:t>
-            </a:r>
-            <a:r>
-              <a:rPr lang="en-GB" dirty="0" smtClean="0"/>
+              <a:rPr lang="en-GB" dirty="0" smtClean="0"/>
+              <a:t>Yes</a:t>
+            </a:r>
+            <a:r>
+              <a:rPr lang="en-GB" dirty="0"/>
+              <a:t>, because BEAM API is Java and as such it is much less </a:t>
+            </a:r>
+            <a:r>
+              <a:rPr lang="en-GB" dirty="0" err="1"/>
+              <a:t>verbous</a:t>
+            </a:r>
+            <a:r>
+              <a:rPr lang="en-GB" dirty="0"/>
+              <a:t> and more concise to reuse JNI types, and is </a:t>
+            </a:r>
+            <a:r>
+              <a:rPr lang="en-GB" dirty="0" err="1"/>
+              <a:t>aloso</a:t>
+            </a:r>
+            <a:r>
+              <a:rPr lang="en-GB" dirty="0"/>
+              <a:t> less </a:t>
+            </a:r>
+            <a:r>
+              <a:rPr lang="en-GB" dirty="0" smtClean="0"/>
+              <a:t>work</a:t>
+            </a:r>
+          </a:p>
+          <a:p>
+            <a:pPr lvl="1"/>
+            <a:r>
+              <a:rPr lang="en-GB" dirty="0" smtClean="0"/>
+              <a:t>No</a:t>
+            </a:r>
+            <a:r>
+              <a:rPr lang="en-GB" dirty="0"/>
+              <a:t>, because the C-API shall be independent of its implementation or </a:t>
+            </a:r>
+            <a:r>
+              <a:rPr lang="en-GB" dirty="0" smtClean="0"/>
+              <a:t>origin</a:t>
+            </a:r>
+            <a:endParaRPr lang="en-GB" dirty="0"/>
+          </a:p>
+          <a:p>
+            <a:r>
+              <a:rPr lang="en-GB" dirty="0"/>
+              <a:t>Duplicate Java API (or parts) 1:1?  (e.g. any method in Java gets its C counterpart)</a:t>
+            </a:r>
+          </a:p>
+          <a:p>
+            <a:pPr lvl="1"/>
+            <a:r>
+              <a:rPr lang="en-GB" dirty="0" smtClean="0"/>
+              <a:t>Yes</a:t>
+            </a:r>
+            <a:r>
+              <a:rPr lang="en-GB" dirty="0"/>
+              <a:t>, because the Java API docs can be reused for C API</a:t>
+            </a:r>
+            <a:r>
+              <a:rPr lang="en-GB" dirty="0" smtClean="0"/>
+              <a:t>.</a:t>
+            </a:r>
+          </a:p>
+          <a:p>
+            <a:pPr lvl="1"/>
+            <a:r>
+              <a:rPr lang="en-GB" dirty="0" smtClean="0"/>
+              <a:t>No</a:t>
+            </a:r>
+            <a:r>
+              <a:rPr lang="en-GB" dirty="0"/>
+              <a:t>, because a more concise C-API can be generated. And no, because changes in the Java API need to be reflected </a:t>
+            </a:r>
+            <a:r>
+              <a:rPr lang="en-GB" dirty="0" smtClean="0"/>
+              <a:t>in the </a:t>
+            </a:r>
+            <a:r>
+              <a:rPr lang="en-GB" dirty="0"/>
+              <a:t>C API </a:t>
+            </a:r>
+            <a:r>
+              <a:rPr lang="en-GB" dirty="0" smtClean="0"/>
+              <a:t>which </a:t>
+            </a:r>
+            <a:r>
+              <a:rPr lang="en-GB" dirty="0"/>
+              <a:t>will introduce a lot of work</a:t>
+            </a:r>
+            <a:r>
+              <a:rPr lang="en-GB" dirty="0" smtClean="0"/>
+              <a:t>.</a:t>
+            </a:r>
+            <a:endParaRPr lang="en-GB" dirty="0"/>
+          </a:p>
+          <a:p>
+            <a:r>
+              <a:rPr lang="en-GB" dirty="0"/>
+              <a:t>Shall C API functions return string buffers that users have to release </a:t>
+            </a:r>
+            <a:r>
+              <a:rPr lang="en-GB" dirty="0" smtClean="0"/>
+              <a:t>later?</a:t>
+            </a:r>
+          </a:p>
+          <a:p>
+            <a:pPr lvl="1"/>
+            <a:r>
+              <a:rPr lang="en-GB" dirty="0" smtClean="0"/>
+              <a:t>Yes</a:t>
+            </a:r>
+            <a:r>
+              <a:rPr lang="en-GB" dirty="0"/>
+              <a:t>, otherwise the signature of Java counterparts is will be different, because by-reference arguments passing </a:t>
+            </a:r>
+            <a:r>
+              <a:rPr lang="en-GB" dirty="0" smtClean="0"/>
+              <a:t>is required then.</a:t>
+            </a:r>
+            <a:br>
+              <a:rPr lang="en-GB" dirty="0" smtClean="0"/>
+            </a:br>
+            <a:r>
+              <a:rPr lang="en-GB" dirty="0" smtClean="0"/>
+              <a:t>E.g</a:t>
+            </a:r>
+            <a:r>
+              <a:rPr lang="en-GB" dirty="0"/>
+              <a:t>. instead </a:t>
+            </a:r>
+            <a:r>
+              <a:rPr lang="en-GB" dirty="0" smtClean="0"/>
+              <a:t>of</a:t>
+            </a:r>
+            <a:br>
+              <a:rPr lang="en-GB" dirty="0" smtClean="0"/>
+            </a:br>
+            <a:r>
+              <a:rPr lang="en-GB" dirty="0" smtClean="0"/>
+              <a:t>             </a:t>
+            </a:r>
+            <a:r>
+              <a:rPr lang="en-GB" dirty="0"/>
+              <a:t>char* name = </a:t>
+            </a:r>
+            <a:r>
+              <a:rPr lang="en-GB" dirty="0" err="1"/>
+              <a:t>get_name</a:t>
+            </a:r>
+            <a:r>
+              <a:rPr lang="en-GB" dirty="0"/>
               <a:t>(</a:t>
             </a:r>
             <a:r>
-              <a:rPr lang="en-GB" i="1" dirty="0" err="1" smtClean="0"/>
-              <a:t>typecode</a:t>
+              <a:rPr lang="en-GB" dirty="0" err="1"/>
+              <a:t>obj</a:t>
+            </a:r>
+            <a:r>
+              <a:rPr lang="en-GB" dirty="0" smtClean="0"/>
+              <a:t>);</a:t>
+            </a:r>
+            <a:br>
+              <a:rPr lang="en-GB" dirty="0" smtClean="0"/>
+            </a:br>
+            <a:r>
+              <a:rPr lang="en-GB" dirty="0" smtClean="0"/>
+              <a:t>              ...</a:t>
+            </a:r>
+            <a:br>
+              <a:rPr lang="en-GB" dirty="0" smtClean="0"/>
+            </a:br>
+            <a:r>
+              <a:rPr lang="en-GB" dirty="0" smtClean="0"/>
+              <a:t>              </a:t>
             </a:r>
             <a:r>
               <a:rPr lang="en-GB" dirty="0"/>
-              <a:t>[, </a:t>
-            </a:r>
-            <a:r>
-              <a:rPr lang="en-GB" i="1" dirty="0"/>
-              <a:t>initializer</a:t>
+              <a:t>free(name</a:t>
+            </a:r>
+            <a:r>
+              <a:rPr lang="en-GB" dirty="0" smtClean="0"/>
+              <a:t>);</a:t>
+            </a:r>
+            <a:br>
+              <a:rPr lang="en-GB" dirty="0" smtClean="0"/>
+            </a:br>
+            <a:r>
+              <a:rPr lang="en-GB" dirty="0" smtClean="0"/>
+              <a:t>we have</a:t>
+            </a:r>
+            <a:br>
+              <a:rPr lang="en-GB" dirty="0" smtClean="0"/>
+            </a:br>
+            <a:r>
+              <a:rPr lang="en-GB" dirty="0" smtClean="0"/>
+              <a:t>              </a:t>
             </a:r>
             <a:r>
               <a:rPr lang="en-GB" dirty="0"/>
-              <a:t>])</a:t>
+              <a:t>char name[81</a:t>
+            </a:r>
+            <a:r>
+              <a:rPr lang="en-GB" dirty="0" smtClean="0"/>
+              <a:t>];</a:t>
             </a:r>
             <a:br>
+              <a:rPr lang="en-GB" dirty="0" smtClean="0"/>
+            </a:br>
+            <a:r>
+              <a:rPr lang="en-GB" dirty="0" smtClean="0"/>
+              <a:t>              </a:t>
+            </a:r>
+            <a:r>
+              <a:rPr lang="en-GB" dirty="0" err="1"/>
+              <a:t>get_name</a:t>
+            </a:r>
+            <a:r>
               <a:rPr lang="en-GB" dirty="0"/>
-            </a:br>
-            <a:r>
-              <a:rPr lang="en-GB" sz="2900" i="1" dirty="0">
-                <a:solidFill>
-                  <a:schemeClr val="accent1">
-                    <a:lumMod val="75000"/>
-                  </a:schemeClr>
-                </a:solidFill>
-              </a:rPr>
-              <a:t>A new array whose items are restricted by </a:t>
-            </a:r>
-            <a:r>
-              <a:rPr lang="en-GB" sz="2900" i="1" dirty="0" err="1">
-                <a:solidFill>
-                  <a:schemeClr val="accent1">
-                    <a:lumMod val="75000"/>
-                  </a:schemeClr>
-                </a:solidFill>
-              </a:rPr>
-              <a:t>typecode</a:t>
-            </a:r>
-            <a:r>
-              <a:rPr lang="en-GB" sz="2900" i="1" dirty="0">
-                <a:solidFill>
-                  <a:schemeClr val="accent1">
-                    <a:lumMod val="75000"/>
-                  </a:schemeClr>
-                </a:solidFill>
-              </a:rPr>
-              <a:t>, and initialized from the optional initializer value, which must be a list, object supporting the buffer interface, or </a:t>
-            </a:r>
-            <a:r>
-              <a:rPr lang="en-GB" sz="2900" i="1" dirty="0" err="1">
-                <a:solidFill>
-                  <a:schemeClr val="accent1">
-                    <a:lumMod val="75000"/>
-                  </a:schemeClr>
-                </a:solidFill>
-              </a:rPr>
-              <a:t>iterable</a:t>
-            </a:r>
-            <a:r>
-              <a:rPr lang="en-GB" sz="2900" i="1" dirty="0">
-                <a:solidFill>
-                  <a:schemeClr val="accent1">
-                    <a:lumMod val="75000"/>
-                  </a:schemeClr>
-                </a:solidFill>
-              </a:rPr>
-              <a:t> over elements of the appropriate type.</a:t>
+              <a:t>(</a:t>
+            </a:r>
+            <a:r>
+              <a:rPr lang="en-GB" dirty="0" err="1"/>
+              <a:t>obj</a:t>
+            </a:r>
+            <a:r>
+              <a:rPr lang="en-GB" dirty="0"/>
+              <a:t>, name, 80</a:t>
+            </a:r>
+            <a:r>
+              <a:rPr lang="en-GB" dirty="0" smtClean="0"/>
+              <a:t>);</a:t>
             </a:r>
           </a:p>
           <a:p>
             <a:pPr lvl="1"/>
             <a:r>
               <a:rPr lang="en-GB" dirty="0" smtClean="0"/>
-              <a:t>Note: the </a:t>
-            </a:r>
-            <a:r>
-              <a:rPr lang="en-GB" b="1" dirty="0" smtClean="0"/>
-              <a:t>array</a:t>
-            </a:r>
-            <a:r>
-              <a:rPr lang="en-GB" dirty="0" smtClean="0"/>
-              <a:t> constructor always make copies of buffers passed in as </a:t>
-            </a:r>
-            <a:r>
-              <a:rPr lang="en-GB" i="1" dirty="0"/>
-              <a:t>initializer</a:t>
-            </a:r>
-            <a:r>
-              <a:rPr lang="en-GB" dirty="0" smtClean="0"/>
-              <a:t> </a:t>
-            </a:r>
-          </a:p>
-          <a:p>
-            <a:pPr lvl="1"/>
-            <a:r>
-              <a:rPr lang="en-GB" dirty="0" smtClean="0"/>
-              <a:t>Note: arrays support the buffer interface</a:t>
-            </a:r>
-          </a:p>
-          <a:p>
-            <a:r>
-              <a:rPr lang="en-GB" b="1" dirty="0" err="1" smtClean="0"/>
-              <a:t>numpy</a:t>
-            </a:r>
-            <a:endParaRPr lang="en-GB" b="1" dirty="0" smtClean="0"/>
-          </a:p>
-          <a:p>
-            <a:pPr lvl="1"/>
-            <a:r>
-              <a:rPr lang="en-GB" b="1" dirty="0" err="1" smtClean="0"/>
-              <a:t>frombuffer</a:t>
-            </a:r>
-            <a:r>
-              <a:rPr lang="en-GB" dirty="0" smtClean="0"/>
-              <a:t>(buffer</a:t>
+              <a:t>No</a:t>
             </a:r>
             <a:r>
               <a:rPr lang="en-GB" dirty="0"/>
-              <a:t>[, </a:t>
-            </a:r>
-            <a:r>
-              <a:rPr lang="en-GB" dirty="0" err="1"/>
-              <a:t>dtype</a:t>
+              <a:t>, because it is </a:t>
+            </a:r>
+            <a:r>
+              <a:rPr lang="en-GB" dirty="0" smtClean="0"/>
+              <a:t>obvious </a:t>
             </a:r>
             <a:r>
               <a:rPr lang="en-GB" dirty="0"/>
-              <a:t>, count, offset</a:t>
-            </a:r>
-            <a:r>
-              <a:rPr lang="en-GB" dirty="0" smtClean="0"/>
-              <a:t>]) </a:t>
-            </a:r>
-            <a:br>
-              <a:rPr lang="en-GB" dirty="0" smtClean="0"/>
-            </a:br>
-            <a:r>
-              <a:rPr lang="en-GB" i="1" dirty="0" smtClean="0">
-                <a:solidFill>
-                  <a:schemeClr val="accent1">
-                    <a:lumMod val="75000"/>
-                  </a:schemeClr>
-                </a:solidFill>
-              </a:rPr>
-              <a:t>Interpret </a:t>
-            </a:r>
-            <a:r>
-              <a:rPr lang="en-GB" i="1" dirty="0">
-                <a:solidFill>
-                  <a:schemeClr val="accent1">
-                    <a:lumMod val="75000"/>
-                  </a:schemeClr>
-                </a:solidFill>
-              </a:rPr>
-              <a:t>a buffer as a 1-dimensional </a:t>
-            </a:r>
-            <a:r>
-              <a:rPr lang="en-GB" i="1" dirty="0" smtClean="0">
-                <a:solidFill>
-                  <a:schemeClr val="accent1">
-                    <a:lumMod val="75000"/>
-                  </a:schemeClr>
-                </a:solidFill>
-              </a:rPr>
-              <a:t>array.</a:t>
-            </a:r>
-            <a:endParaRPr lang="en-GB" i="1" dirty="0">
-              <a:solidFill>
-                <a:schemeClr val="accent1">
-                  <a:lumMod val="75000"/>
-                </a:schemeClr>
-              </a:solidFill>
-            </a:endParaRPr>
-          </a:p>
-          <a:p>
-            <a:pPr lvl="1"/>
-            <a:r>
-              <a:rPr lang="en-GB" b="1" dirty="0" smtClean="0"/>
-              <a:t>reshape</a:t>
-            </a:r>
-            <a:r>
-              <a:rPr lang="en-GB" dirty="0" smtClean="0"/>
-              <a:t>(array,</a:t>
+              <a:t>that strings need to be freed on the users side</a:t>
+            </a:r>
+            <a:r>
+              <a:rPr lang="en-GB" dirty="0" smtClean="0"/>
+              <a:t>.</a:t>
+            </a:r>
+          </a:p>
+          <a:p>
+            <a:r>
+              <a:rPr lang="en-GB" dirty="0" smtClean="0"/>
+              <a:t>Shall </a:t>
             </a:r>
             <a:r>
               <a:rPr lang="en-GB" dirty="0"/>
-              <a:t> </a:t>
-            </a:r>
-            <a:r>
-              <a:rPr lang="en-GB" dirty="0" err="1" smtClean="0"/>
-              <a:t>newshape</a:t>
-            </a:r>
-            <a:r>
-              <a:rPr lang="en-GB" dirty="0" smtClean="0"/>
-              <a:t>[,</a:t>
-            </a:r>
-            <a:r>
-              <a:rPr lang="en-GB" dirty="0"/>
-              <a:t> </a:t>
-            </a:r>
-            <a:r>
-              <a:rPr lang="en-GB" dirty="0" smtClean="0"/>
-              <a:t>order])</a:t>
-            </a:r>
-            <a:br>
-              <a:rPr lang="en-GB" dirty="0" smtClean="0"/>
-            </a:br>
-            <a:r>
-              <a:rPr lang="en-GB" i="1" dirty="0">
-                <a:solidFill>
-                  <a:schemeClr val="accent1">
-                    <a:lumMod val="75000"/>
-                  </a:schemeClr>
-                </a:solidFill>
-              </a:rPr>
-              <a:t>Gives a new shape to an array without changing its data</a:t>
-            </a:r>
-            <a:r>
-              <a:rPr lang="en-GB" i="1" dirty="0" smtClean="0">
-                <a:solidFill>
-                  <a:schemeClr val="accent1">
-                    <a:lumMod val="75000"/>
-                  </a:schemeClr>
-                </a:solidFill>
-              </a:rPr>
-              <a:t>.</a:t>
-            </a:r>
-          </a:p>
-          <a:p>
-            <a:pPr lvl="1"/>
-            <a:r>
-              <a:rPr lang="en-GB" dirty="0"/>
-              <a:t>Note: </a:t>
-            </a:r>
-            <a:r>
-              <a:rPr lang="en-GB" dirty="0" smtClean="0"/>
-              <a:t>Neither </a:t>
-            </a:r>
-            <a:r>
-              <a:rPr lang="en-GB" b="1" dirty="0" err="1"/>
-              <a:t>frombuffer</a:t>
-            </a:r>
-            <a:r>
-              <a:rPr lang="en-GB" dirty="0" smtClean="0"/>
-              <a:t> nor </a:t>
-            </a:r>
-            <a:r>
-              <a:rPr lang="en-GB" b="1" dirty="0" smtClean="0"/>
-              <a:t>reshape </a:t>
-            </a:r>
-            <a:r>
-              <a:rPr lang="en-GB" dirty="0" smtClean="0"/>
-              <a:t>make copies of the input data</a:t>
-            </a:r>
-          </a:p>
-          <a:p>
-            <a:endParaRPr lang="en-GB" u="sng" dirty="0" smtClean="0"/>
-          </a:p>
-          <a:p>
-            <a:r>
-              <a:rPr lang="en-GB" u="sng" dirty="0" smtClean="0"/>
-              <a:t>Conclusion</a:t>
-            </a:r>
-            <a:r>
-              <a:rPr lang="en-GB" dirty="0" smtClean="0"/>
-              <a:t>: pixel data passed in and returned by the BEAM Python API shall be Python objects that support the </a:t>
-            </a:r>
-            <a:r>
-              <a:rPr lang="en-GB" b="1" i="1" dirty="0" smtClean="0"/>
-              <a:t>buffer interface </a:t>
-            </a:r>
-            <a:r>
-              <a:rPr lang="en-GB" dirty="0" smtClean="0"/>
-              <a:t>so that the data can be efficiently used with </a:t>
-            </a:r>
-            <a:r>
-              <a:rPr lang="en-GB" dirty="0" err="1" smtClean="0"/>
-              <a:t>numpy</a:t>
-            </a:r>
-            <a:r>
-              <a:rPr lang="en-GB" dirty="0" smtClean="0"/>
-              <a:t>.</a:t>
-            </a:r>
-          </a:p>
-          <a:p>
-            <a:pPr lvl="1"/>
-            <a:r>
-              <a:rPr lang="en-GB" dirty="0">
-                <a:hlinkClick r:id="rId2"/>
-              </a:rPr>
-              <a:t>http://</a:t>
-            </a:r>
-            <a:r>
-              <a:rPr lang="en-GB" dirty="0" smtClean="0">
-                <a:hlinkClick r:id="rId2"/>
-              </a:rPr>
-              <a:t>docs.python.org/3.2/c-api/buffer.html?highlight=buffer#Py_buffer</a:t>
-            </a:r>
-            <a:r>
-              <a:rPr lang="en-GB" dirty="0" smtClean="0"/>
-              <a:t> </a:t>
-            </a:r>
-          </a:p>
-          <a:p>
-            <a:pPr lvl="1"/>
-            <a:r>
-              <a:rPr lang="en-GB" dirty="0">
-                <a:hlinkClick r:id="rId3"/>
-              </a:rPr>
-              <a:t>http://</a:t>
-            </a:r>
-            <a:r>
-              <a:rPr lang="en-GB" dirty="0" smtClean="0">
-                <a:hlinkClick r:id="rId3"/>
-              </a:rPr>
-              <a:t>docs.python.org/3.2/c-api/typeobj.html#buffer-structs</a:t>
-            </a:r>
-            <a:endParaRPr lang="en-GB" dirty="0" smtClean="0"/>
-          </a:p>
-          <a:p>
-            <a:pPr lvl="1"/>
-            <a:r>
-              <a:rPr lang="en-GB" dirty="0" smtClean="0">
-                <a:hlinkClick r:id="rId4"/>
-              </a:rPr>
-              <a:t>http</a:t>
-            </a:r>
-            <a:r>
-              <a:rPr lang="en-GB" dirty="0">
-                <a:hlinkClick r:id="rId4"/>
-              </a:rPr>
-              <a:t>://</a:t>
-            </a:r>
-            <a:r>
-              <a:rPr lang="en-GB" dirty="0" smtClean="0">
-                <a:hlinkClick r:id="rId4"/>
-              </a:rPr>
-              <a:t>docs.python.org/3.2/library/stdtypes.html#memoryview</a:t>
-            </a:r>
-            <a:r>
-              <a:rPr lang="en-GB" dirty="0" smtClean="0"/>
-              <a:t> </a:t>
-            </a:r>
+              <a:t>the API allow for modification of single structures elements that are passed as arguments by-reference.?</a:t>
+            </a:r>
+          </a:p>
+          <a:p>
             <a:endParaRPr lang="en-GB" dirty="0"/>
           </a:p>
           <a:p>
-            <a:pPr lvl="1"/>
-            <a:endParaRPr lang="en-GB" i="1" dirty="0">
-              <a:solidFill>
-                <a:schemeClr val="accent1">
-                  <a:lumMod val="75000"/>
-                </a:schemeClr>
-              </a:solidFill>
-            </a:endParaRPr>
+            <a:endParaRPr lang="en-GB" dirty="0"/>
           </a:p>
         </p:txBody>
       </p:sp>
     </p:spTree>
     <p:extLst>
       <p:ext uri="{BB962C8B-B14F-4D97-AF65-F5344CB8AC3E}">
-        <p14:creationId xmlns:p14="http://schemas.microsoft.com/office/powerpoint/2010/main" val="3309612122"/>
+        <p14:creationId xmlns:p14="http://schemas.microsoft.com/office/powerpoint/2010/main" val="1103487878"/>
       </p:ext>
     </p:extLst>
   </p:cSld>
@@ -3978,7 +3674,7 @@
           <a:p>
             <a:r>
               <a:rPr lang="en-GB" dirty="0" smtClean="0"/>
-              <a:t>Data Arrays (2/3)</a:t>
+              <a:t>Data Arrays (1/3)</a:t>
             </a:r>
             <a:endParaRPr lang="en-GB" dirty="0"/>
           </a:p>
@@ -3997,289 +3693,395 @@
         <p:spPr/>
         <p:txBody>
           <a:bodyPr>
-            <a:normAutofit fontScale="62500" lnSpcReduction="20000"/>
+            <a:normAutofit fontScale="47500" lnSpcReduction="20000"/>
           </a:bodyPr>
           <a:lstStyle/>
           <a:p>
             <a:r>
               <a:rPr lang="en-GB" dirty="0" smtClean="0"/>
-              <a:t>Parsing buffer arguments:</a:t>
-            </a:r>
-          </a:p>
-          <a:p>
-            <a:pPr marL="457200" lvl="1" indent="0">
-              <a:buNone/>
-            </a:pPr>
-            <a:r>
-              <a:rPr lang="en-GB" dirty="0" err="1" smtClean="0"/>
-              <a:t>Py_buffer</a:t>
+              <a:t>We shall try to find a way to directly use the arrays allocated and returned by the C-API without copying them</a:t>
+            </a:r>
+          </a:p>
+          <a:p>
+            <a:endParaRPr lang="en-GB" dirty="0" smtClean="0"/>
+          </a:p>
+          <a:p>
+            <a:r>
+              <a:rPr lang="en-GB" b="1" dirty="0" smtClean="0"/>
+              <a:t>array</a:t>
+            </a:r>
+          </a:p>
+          <a:p>
+            <a:pPr lvl="1"/>
+            <a:r>
+              <a:rPr lang="en-GB" b="1" dirty="0" smtClean="0"/>
+              <a:t>array</a:t>
+            </a:r>
+            <a:r>
+              <a:rPr lang="en-GB" dirty="0" smtClean="0"/>
+              <a:t>(</a:t>
+            </a:r>
+            <a:r>
+              <a:rPr lang="en-GB" i="1" dirty="0" err="1" smtClean="0"/>
+              <a:t>typecode</a:t>
             </a:r>
             <a:r>
               <a:rPr lang="en-GB" dirty="0"/>
-              <a:t> </a:t>
-            </a:r>
-            <a:r>
-              <a:rPr lang="en-GB" dirty="0" smtClean="0"/>
-              <a:t>b;</a:t>
-            </a:r>
-            <a:endParaRPr lang="en-GB" dirty="0"/>
-          </a:p>
-          <a:p>
-            <a:pPr marL="457200" lvl="1" indent="0">
-              <a:buNone/>
-            </a:pPr>
+              <a:t>[, </a:t>
+            </a:r>
+            <a:r>
+              <a:rPr lang="en-GB" i="1" dirty="0"/>
+              <a:t>initializer</a:t>
+            </a:r>
             <a:r>
               <a:rPr lang="en-GB" dirty="0"/>
-              <a:t>ret = </a:t>
-            </a:r>
-            <a:r>
-              <a:rPr lang="en-GB" dirty="0" err="1" smtClean="0"/>
-              <a:t>PyArg_ParseTuple</a:t>
-            </a:r>
-            <a:r>
-              <a:rPr lang="en-GB" dirty="0" smtClean="0"/>
-              <a:t>(</a:t>
-            </a:r>
-            <a:r>
-              <a:rPr lang="en-GB" dirty="0" err="1" smtClean="0"/>
-              <a:t>args</a:t>
-            </a:r>
-            <a:r>
-              <a:rPr lang="en-GB" dirty="0"/>
-              <a:t>, </a:t>
-            </a:r>
-            <a:r>
-              <a:rPr lang="en-GB" dirty="0" smtClean="0"/>
-              <a:t>“y*”, &amp;b); </a:t>
-            </a:r>
-          </a:p>
-          <a:p>
-            <a:pPr lvl="1"/>
-            <a:r>
-              <a:rPr lang="en-GB" dirty="0" smtClean="0"/>
-              <a:t>See “Parsing </a:t>
-            </a:r>
-            <a:r>
-              <a:rPr lang="en-GB" dirty="0"/>
-              <a:t>arguments and building </a:t>
-            </a:r>
-            <a:r>
-              <a:rPr lang="en-GB" dirty="0" smtClean="0"/>
-              <a:t>values” in Python/C API Reference Manual</a:t>
-            </a:r>
-          </a:p>
-          <a:p>
-            <a:r>
-              <a:rPr lang="en-GB" dirty="0" smtClean="0"/>
-              <a:t>Directly using buffer arguments</a:t>
-            </a:r>
-          </a:p>
-          <a:p>
-            <a:pPr marL="457200" lvl="1" indent="0">
-              <a:buNone/>
-            </a:pPr>
-            <a:r>
-              <a:rPr lang="en-GB" dirty="0" err="1" smtClean="0"/>
-              <a:t>PyObject_CheckBuffer</a:t>
-            </a:r>
-            <a:r>
-              <a:rPr lang="en-GB" dirty="0" smtClean="0"/>
-              <a:t>(</a:t>
-            </a:r>
-            <a:r>
-              <a:rPr lang="en-GB" dirty="0" err="1" smtClean="0"/>
-              <a:t>obj</a:t>
-            </a:r>
-            <a:r>
-              <a:rPr lang="en-GB" dirty="0" smtClean="0"/>
-              <a:t>) == 1</a:t>
-            </a:r>
-            <a:r>
-              <a:rPr lang="en-GB" dirty="0"/>
-              <a:t/>
+              <a:t>])</a:t>
             </a:r>
             <a:br>
               <a:rPr lang="en-GB" dirty="0"/>
             </a:br>
             <a:r>
+              <a:rPr lang="en-GB" sz="2900" i="1" dirty="0">
+                <a:solidFill>
+                  <a:schemeClr val="accent1">
+                    <a:lumMod val="75000"/>
+                  </a:schemeClr>
+                </a:solidFill>
+              </a:rPr>
+              <a:t>A new array whose items are restricted by </a:t>
+            </a:r>
+            <a:r>
+              <a:rPr lang="en-GB" sz="2900" i="1" dirty="0" err="1">
+                <a:solidFill>
+                  <a:schemeClr val="accent1">
+                    <a:lumMod val="75000"/>
+                  </a:schemeClr>
+                </a:solidFill>
+              </a:rPr>
+              <a:t>typecode</a:t>
+            </a:r>
+            <a:r>
+              <a:rPr lang="en-GB" sz="2900" i="1" dirty="0">
+                <a:solidFill>
+                  <a:schemeClr val="accent1">
+                    <a:lumMod val="75000"/>
+                  </a:schemeClr>
+                </a:solidFill>
+              </a:rPr>
+              <a:t>, and initialized from the optional initializer value, which must be a list, object supporting the buffer interface, or </a:t>
+            </a:r>
+            <a:r>
+              <a:rPr lang="en-GB" sz="2900" i="1" dirty="0" err="1">
+                <a:solidFill>
+                  <a:schemeClr val="accent1">
+                    <a:lumMod val="75000"/>
+                  </a:schemeClr>
+                </a:solidFill>
+              </a:rPr>
+              <a:t>iterable</a:t>
+            </a:r>
+            <a:r>
+              <a:rPr lang="en-GB" sz="2900" i="1" dirty="0">
+                <a:solidFill>
+                  <a:schemeClr val="accent1">
+                    <a:lumMod val="75000"/>
+                  </a:schemeClr>
+                </a:solidFill>
+              </a:rPr>
+              <a:t> over elements of the appropriate type.</a:t>
+            </a:r>
+          </a:p>
+          <a:p>
+            <a:pPr lvl="1"/>
+            <a:r>
+              <a:rPr lang="en-GB" dirty="0" smtClean="0"/>
+              <a:t>Note: the </a:t>
+            </a:r>
+            <a:r>
+              <a:rPr lang="en-GB" b="1" dirty="0" smtClean="0"/>
+              <a:t>array</a:t>
+            </a:r>
+            <a:r>
+              <a:rPr lang="en-GB" dirty="0" smtClean="0"/>
+              <a:t> constructor always make copies of buffers passed in as </a:t>
+            </a:r>
+            <a:r>
+              <a:rPr lang="en-GB" i="1" dirty="0"/>
+              <a:t>initializer</a:t>
+            </a:r>
+            <a:r>
+              <a:rPr lang="en-GB" dirty="0" smtClean="0"/>
+              <a:t> </a:t>
+            </a:r>
+          </a:p>
+          <a:p>
+            <a:pPr lvl="1"/>
+            <a:r>
+              <a:rPr lang="en-GB" dirty="0" smtClean="0"/>
+              <a:t>Note: arrays support the buffer interface</a:t>
+            </a:r>
+          </a:p>
+          <a:p>
+            <a:r>
+              <a:rPr lang="en-GB" b="1" dirty="0" err="1" smtClean="0"/>
+              <a:t>numpy</a:t>
+            </a:r>
+            <a:endParaRPr lang="en-GB" b="1" dirty="0" smtClean="0"/>
+          </a:p>
+          <a:p>
+            <a:pPr lvl="1"/>
+            <a:r>
+              <a:rPr lang="en-GB" b="1" dirty="0" err="1" smtClean="0"/>
+              <a:t>frombuffer</a:t>
+            </a:r>
+            <a:r>
+              <a:rPr lang="en-GB" dirty="0" smtClean="0"/>
+              <a:t>(buffer</a:t>
+            </a:r>
+            <a:r>
               <a:rPr lang="en-GB" dirty="0"/>
-              <a:t>ret = </a:t>
+              <a:t>[, </a:t>
+            </a:r>
+            <a:r>
+              <a:rPr lang="en-GB" dirty="0" err="1"/>
+              <a:t>dtype</a:t>
+            </a:r>
+            <a:r>
+              <a:rPr lang="en-GB" dirty="0"/>
+              <a:t>, count, offset</a:t>
+            </a:r>
+            <a:r>
+              <a:rPr lang="en-GB" dirty="0" smtClean="0"/>
+              <a:t>]) </a:t>
+            </a:r>
+            <a:br>
+              <a:rPr lang="en-GB" dirty="0" smtClean="0"/>
+            </a:br>
+            <a:r>
+              <a:rPr lang="en-GB" i="1" dirty="0" smtClean="0">
+                <a:solidFill>
+                  <a:schemeClr val="accent1">
+                    <a:lumMod val="75000"/>
+                  </a:schemeClr>
+                </a:solidFill>
+              </a:rPr>
+              <a:t>Interpret </a:t>
+            </a:r>
+            <a:r>
+              <a:rPr lang="en-GB" i="1" dirty="0">
+                <a:solidFill>
+                  <a:schemeClr val="accent1">
+                    <a:lumMod val="75000"/>
+                  </a:schemeClr>
+                </a:solidFill>
+              </a:rPr>
+              <a:t>a buffer as a 1-dimensional </a:t>
+            </a:r>
+            <a:r>
+              <a:rPr lang="en-GB" i="1" dirty="0" smtClean="0">
+                <a:solidFill>
+                  <a:schemeClr val="accent1">
+                    <a:lumMod val="75000"/>
+                  </a:schemeClr>
+                </a:solidFill>
+              </a:rPr>
+              <a:t>array.</a:t>
+            </a:r>
+            <a:endParaRPr lang="en-GB" i="1" dirty="0">
+              <a:solidFill>
+                <a:schemeClr val="accent1">
+                  <a:lumMod val="75000"/>
+                </a:schemeClr>
+              </a:solidFill>
+            </a:endParaRPr>
+          </a:p>
+          <a:p>
+            <a:pPr lvl="1"/>
+            <a:r>
+              <a:rPr lang="en-GB" b="1" dirty="0" smtClean="0"/>
+              <a:t>reshape</a:t>
+            </a:r>
+            <a:r>
+              <a:rPr lang="en-GB" dirty="0" smtClean="0"/>
+              <a:t>(array,</a:t>
+            </a:r>
+            <a:r>
+              <a:rPr lang="en-GB" dirty="0"/>
+              <a:t> </a:t>
             </a:r>
             <a:r>
               <a:rPr lang="en-GB" dirty="0" err="1" smtClean="0"/>
-              <a:t>PyObject_GetBuffer</a:t>
-            </a:r>
-            <a:r>
-              <a:rPr lang="en-GB" dirty="0" smtClean="0"/>
-              <a:t>(</a:t>
+              <a:t>newshape</a:t>
+            </a:r>
+            <a:r>
+              <a:rPr lang="en-GB" dirty="0" smtClean="0"/>
+              <a:t>[,</a:t>
+            </a:r>
+            <a:r>
+              <a:rPr lang="en-GB" dirty="0"/>
+              <a:t> </a:t>
+            </a:r>
+            <a:r>
+              <a:rPr lang="en-GB" dirty="0" smtClean="0"/>
+              <a:t>order])</a:t>
+            </a:r>
+            <a:br>
+              <a:rPr lang="en-GB" dirty="0" smtClean="0"/>
+            </a:br>
+            <a:r>
+              <a:rPr lang="en-GB" i="1" dirty="0">
+                <a:solidFill>
+                  <a:schemeClr val="accent1">
+                    <a:lumMod val="75000"/>
+                  </a:schemeClr>
+                </a:solidFill>
+              </a:rPr>
+              <a:t>Gives a new shape to an array without changing its data</a:t>
+            </a:r>
+            <a:r>
+              <a:rPr lang="en-GB" i="1" dirty="0" smtClean="0">
+                <a:solidFill>
+                  <a:schemeClr val="accent1">
+                    <a:lumMod val="75000"/>
+                  </a:schemeClr>
+                </a:solidFill>
+              </a:rPr>
+              <a:t>.</a:t>
+            </a:r>
+          </a:p>
+          <a:p>
+            <a:pPr lvl="1"/>
+            <a:r>
+              <a:rPr lang="en-GB" dirty="0"/>
+              <a:t>Note: </a:t>
+            </a:r>
+            <a:r>
+              <a:rPr lang="en-GB" dirty="0" smtClean="0"/>
+              <a:t>Neither </a:t>
+            </a:r>
+            <a:r>
+              <a:rPr lang="en-GB" b="1" dirty="0" err="1"/>
+              <a:t>frombuffer</a:t>
+            </a:r>
+            <a:r>
+              <a:rPr lang="en-GB" dirty="0" smtClean="0"/>
+              <a:t> nor </a:t>
+            </a:r>
+            <a:r>
+              <a:rPr lang="en-GB" b="1" dirty="0" smtClean="0"/>
+              <a:t>reshape </a:t>
+            </a:r>
+            <a:r>
+              <a:rPr lang="en-GB" dirty="0" smtClean="0"/>
+              <a:t>make copies of the input data</a:t>
+            </a:r>
+          </a:p>
+          <a:p>
+            <a:endParaRPr lang="en-GB" u="sng" dirty="0" smtClean="0"/>
+          </a:p>
+          <a:p>
+            <a:r>
+              <a:rPr lang="en-GB" u="sng" dirty="0" smtClean="0"/>
+              <a:t>Conclusion</a:t>
+            </a:r>
+            <a:r>
+              <a:rPr lang="en-GB" dirty="0" smtClean="0"/>
+              <a:t>: pixel data passed in and returned by the BEAM Python API shall be Python objects that support the </a:t>
+            </a:r>
+            <a:r>
+              <a:rPr lang="en-GB" b="1" i="1" dirty="0" smtClean="0"/>
+              <a:t>buffer interface </a:t>
+            </a:r>
+            <a:r>
+              <a:rPr lang="en-GB" dirty="0" smtClean="0"/>
+              <a:t>so that the data can be efficiently used with </a:t>
             </a:r>
             <a:r>
               <a:rPr lang="en-GB" dirty="0" err="1" smtClean="0"/>
-              <a:t>obj</a:t>
-            </a:r>
-            <a:r>
-              <a:rPr lang="en-GB" dirty="0"/>
-              <a:t>, </a:t>
-            </a:r>
-            <a:r>
-              <a:rPr lang="en-GB" dirty="0" smtClean="0"/>
-              <a:t>&amp;</a:t>
-            </a:r>
-            <a:r>
-              <a:rPr lang="en-GB" dirty="0"/>
-              <a:t>b, </a:t>
-            </a:r>
-            <a:r>
-              <a:rPr lang="en-GB" dirty="0" err="1" smtClean="0"/>
-              <a:t>PyBUF_WRITABLE</a:t>
-            </a:r>
-            <a:r>
-              <a:rPr lang="en-GB" dirty="0" smtClean="0"/>
-              <a:t>); </a:t>
-            </a:r>
-          </a:p>
-          <a:p>
-            <a:r>
-              <a:rPr lang="en-GB" dirty="0" smtClean="0"/>
-              <a:t>In any case</a:t>
+              <a:t>numpy</a:t>
+            </a:r>
+            <a:r>
+              <a:rPr lang="en-GB" dirty="0" smtClean="0"/>
+              <a:t>.</a:t>
+            </a:r>
+          </a:p>
+          <a:p>
+            <a:pPr lvl="1"/>
+            <a:r>
+              <a:rPr lang="en-GB" dirty="0">
+                <a:hlinkClick r:id="rId2"/>
+              </a:rPr>
+              <a:t>http://</a:t>
+            </a:r>
+            <a:r>
+              <a:rPr lang="en-GB" dirty="0" smtClean="0">
+                <a:hlinkClick r:id="rId2"/>
+              </a:rPr>
+              <a:t>docs.python.org/3.2/c-api/buffer.html?highlight=buffer#Py_buffer</a:t>
+            </a:r>
+            <a:r>
+              <a:rPr lang="en-GB" dirty="0" smtClean="0"/>
+              <a:t> </a:t>
+            </a:r>
+          </a:p>
+          <a:p>
+            <a:pPr lvl="1"/>
+            <a:r>
+              <a:rPr lang="en-GB" dirty="0">
+                <a:hlinkClick r:id="rId3"/>
+              </a:rPr>
+              <a:t>http://</a:t>
+            </a:r>
+            <a:r>
+              <a:rPr lang="en-GB" dirty="0" smtClean="0">
+                <a:hlinkClick r:id="rId3"/>
+              </a:rPr>
+              <a:t>docs.python.org/3.2/c-api/typeobj.html#buffer-structs</a:t>
+            </a:r>
+            <a:endParaRPr lang="en-GB" dirty="0" smtClean="0"/>
+          </a:p>
+          <a:p>
+            <a:pPr lvl="1"/>
+            <a:r>
+              <a:rPr lang="en-GB" dirty="0" smtClean="0">
+                <a:hlinkClick r:id="rId4"/>
+              </a:rPr>
+              <a:t>http</a:t>
+            </a:r>
+            <a:r>
+              <a:rPr lang="en-GB" dirty="0">
+                <a:hlinkClick r:id="rId4"/>
+              </a:rPr>
+              <a:t>://</a:t>
+            </a:r>
+            <a:r>
+              <a:rPr lang="en-GB" dirty="0" smtClean="0">
+                <a:hlinkClick r:id="rId4"/>
+              </a:rPr>
+              <a:t>docs.python.org/3.2/library/stdtypes.html#memoryview</a:t>
+            </a:r>
+            <a:r>
+              <a:rPr lang="en-GB" dirty="0" smtClean="0"/>
+              <a:t> </a:t>
             </a:r>
             <a:endParaRPr lang="en-GB" dirty="0"/>
           </a:p>
           <a:p>
-            <a:pPr marL="457200" lvl="1" indent="0">
-              <a:buNone/>
-            </a:pPr>
-            <a:r>
-              <a:rPr lang="en-GB" dirty="0" err="1" smtClean="0"/>
-              <a:t>PyBuffer_Release</a:t>
-            </a:r>
-            <a:r>
-              <a:rPr lang="en-GB" dirty="0" smtClean="0"/>
-              <a:t>(&amp;b);</a:t>
-            </a:r>
-          </a:p>
-          <a:p>
-            <a:r>
-              <a:rPr lang="en-GB" dirty="0" smtClean="0"/>
-              <a:t>Consider</a:t>
-            </a:r>
-          </a:p>
-          <a:p>
-            <a:pPr marL="457200" lvl="1" indent="0">
-              <a:buNone/>
-            </a:pPr>
-            <a:r>
-              <a:rPr lang="en-GB" dirty="0"/>
-              <a:t>ret = </a:t>
-            </a:r>
-            <a:r>
-              <a:rPr lang="en-GB" dirty="0" err="1" smtClean="0"/>
-              <a:t>PyObject_TypeCheck</a:t>
-            </a:r>
-            <a:r>
-              <a:rPr lang="en-GB" dirty="0" smtClean="0"/>
-              <a:t>(</a:t>
-            </a:r>
-            <a:r>
-              <a:rPr lang="en-GB" dirty="0" err="1" smtClean="0"/>
-              <a:t>obj</a:t>
-            </a:r>
-            <a:r>
-              <a:rPr lang="en-GB" dirty="0" smtClean="0"/>
-              <a:t>, </a:t>
-            </a:r>
-            <a:r>
-              <a:rPr lang="en-GB" dirty="0" err="1" smtClean="0"/>
-              <a:t>type_obj</a:t>
-            </a:r>
-            <a:r>
-              <a:rPr lang="en-GB" dirty="0" smtClean="0"/>
-              <a:t>);</a:t>
-            </a:r>
-          </a:p>
-          <a:p>
-            <a:pPr marL="457200" lvl="1" indent="0">
-              <a:buNone/>
-            </a:pPr>
-            <a:r>
-              <a:rPr lang="en-GB" dirty="0" smtClean="0"/>
-              <a:t>or</a:t>
-            </a:r>
-          </a:p>
-          <a:p>
-            <a:pPr marL="457200" lvl="1" indent="0">
-              <a:buNone/>
-            </a:pPr>
-            <a:r>
-              <a:rPr lang="en-GB" dirty="0" err="1" smtClean="0"/>
-              <a:t>PyObject_Type</a:t>
-            </a:r>
-            <a:r>
-              <a:rPr lang="en-GB" dirty="0" smtClean="0"/>
-              <a:t>(</a:t>
-            </a:r>
-            <a:r>
-              <a:rPr lang="en-GB" dirty="0" err="1" smtClean="0"/>
-              <a:t>obj</a:t>
-            </a:r>
-            <a:r>
-              <a:rPr lang="en-GB" dirty="0" smtClean="0"/>
-              <a:t>) == </a:t>
-            </a:r>
-            <a:r>
-              <a:rPr lang="en-GB" dirty="0" err="1" smtClean="0"/>
-              <a:t>type_obj</a:t>
-            </a:r>
-            <a:endParaRPr lang="en-GB" dirty="0" smtClean="0"/>
-          </a:p>
-          <a:p>
-            <a:pPr marL="457200" lvl="1" indent="0">
-              <a:buNone/>
-            </a:pPr>
-            <a:r>
-              <a:rPr lang="en-GB" dirty="0" smtClean="0"/>
-              <a:t>or simpler</a:t>
-            </a:r>
-          </a:p>
-          <a:p>
-            <a:pPr marL="457200" lvl="1" indent="0">
-              <a:buNone/>
-            </a:pPr>
-            <a:r>
-              <a:rPr lang="en-GB" dirty="0" err="1" smtClean="0"/>
-              <a:t>obj</a:t>
-            </a:r>
-            <a:r>
-              <a:rPr lang="en-GB" dirty="0"/>
-              <a:t>-</a:t>
-            </a:r>
-            <a:r>
-              <a:rPr lang="en-GB" dirty="0" smtClean="0"/>
-              <a:t>&gt;</a:t>
-            </a:r>
-            <a:r>
-              <a:rPr lang="en-GB" dirty="0" err="1" smtClean="0"/>
-              <a:t>ob_type</a:t>
-            </a:r>
-            <a:r>
-              <a:rPr lang="en-GB" dirty="0" smtClean="0"/>
-              <a:t> == </a:t>
-            </a:r>
-            <a:r>
-              <a:rPr lang="en-GB" dirty="0" err="1" smtClean="0"/>
-              <a:t>type_obj</a:t>
-            </a:r>
-            <a:r>
-              <a:rPr lang="en-GB" dirty="0" smtClean="0"/>
-              <a:t>  </a:t>
-            </a:r>
+            <a:pPr lvl="1"/>
+            <a:endParaRPr lang="en-GB" i="1" dirty="0">
+              <a:solidFill>
+                <a:schemeClr val="accent1">
+                  <a:lumMod val="75000"/>
+                </a:schemeClr>
+              </a:solidFill>
+            </a:endParaRPr>
           </a:p>
         </p:txBody>
       </p:sp>
     </p:spTree>
     <p:extLst>
       <p:ext uri="{BB962C8B-B14F-4D97-AF65-F5344CB8AC3E}">
-        <p14:creationId xmlns:p14="http://schemas.microsoft.com/office/powerpoint/2010/main" val="2973595614"/>
+        <p14:creationId xmlns:p14="http://schemas.microsoft.com/office/powerpoint/2010/main" val="3309612122"/>
       </p:ext>
     </p:extLst>
   </p:cSld>
@@ -4330,15 +4132,7 @@
           <a:p>
             <a:r>
               <a:rPr lang="en-GB" dirty="0" smtClean="0"/>
-              <a:t>Data Arrays (</a:t>
-            </a:r>
-            <a:r>
-              <a:rPr lang="en-GB" dirty="0"/>
-              <a:t>3</a:t>
-            </a:r>
-            <a:r>
-              <a:rPr lang="en-GB" dirty="0" smtClean="0"/>
-              <a:t>/3)</a:t>
+              <a:t>Data Arrays (2/3)</a:t>
             </a:r>
             <a:endParaRPr lang="en-GB" dirty="0"/>
           </a:p>
@@ -4357,104 +4151,289 @@
         <p:spPr/>
         <p:txBody>
           <a:bodyPr>
-            <a:normAutofit/>
+            <a:normAutofit fontScale="62500" lnSpcReduction="20000"/>
           </a:bodyPr>
           <a:lstStyle/>
           <a:p>
             <a:r>
+              <a:rPr lang="en-GB" dirty="0" smtClean="0"/>
+              <a:t>Parsing buffer arguments:</a:t>
+            </a:r>
+          </a:p>
+          <a:p>
+            <a:pPr marL="457200" lvl="1" indent="0">
+              <a:buNone/>
+            </a:pPr>
+            <a:r>
               <a:rPr lang="en-GB" dirty="0" err="1" smtClean="0"/>
-              <a:t>CArray</a:t>
+              <a:t>Py_buffer</a:t>
+            </a:r>
+            <a:r>
+              <a:rPr lang="en-GB" dirty="0"/>
+              <a:t> </a:t>
+            </a:r>
+            <a:r>
+              <a:rPr lang="en-GB" dirty="0" smtClean="0"/>
+              <a:t>b;</a:t>
+            </a:r>
+            <a:endParaRPr lang="en-GB" dirty="0"/>
+          </a:p>
+          <a:p>
+            <a:pPr marL="457200" lvl="1" indent="0">
+              <a:buNone/>
+            </a:pPr>
+            <a:r>
+              <a:rPr lang="en-GB" dirty="0"/>
+              <a:t>ret = </a:t>
+            </a:r>
+            <a:r>
+              <a:rPr lang="en-GB" dirty="0" err="1" smtClean="0"/>
+              <a:t>PyArg_ParseTuple</a:t>
+            </a:r>
+            <a:r>
+              <a:rPr lang="en-GB" dirty="0" smtClean="0"/>
+              <a:t>(</a:t>
+            </a:r>
+            <a:r>
+              <a:rPr lang="en-GB" dirty="0" err="1" smtClean="0"/>
+              <a:t>args</a:t>
+            </a:r>
+            <a:r>
+              <a:rPr lang="en-GB" dirty="0"/>
+              <a:t>, </a:t>
+            </a:r>
+            <a:r>
+              <a:rPr lang="en-GB" dirty="0" smtClean="0"/>
+              <a:t>“y*”, &amp;b); </a:t>
+            </a:r>
+          </a:p>
+          <a:p>
+            <a:pPr lvl="1"/>
+            <a:r>
+              <a:rPr lang="en-GB" dirty="0" smtClean="0"/>
+              <a:t>See “Parsing </a:t>
+            </a:r>
+            <a:r>
+              <a:rPr lang="en-GB" dirty="0"/>
+              <a:t>arguments and building </a:t>
+            </a:r>
+            <a:r>
+              <a:rPr lang="en-GB" dirty="0" smtClean="0"/>
+              <a:t>values” in Python/C API Reference Manual</a:t>
+            </a:r>
+          </a:p>
+          <a:p>
+            <a:r>
+              <a:rPr lang="en-GB" dirty="0" smtClean="0"/>
+              <a:t>Directly using buffer arguments</a:t>
+            </a:r>
+          </a:p>
+          <a:p>
+            <a:pPr marL="457200" lvl="1" indent="0">
+              <a:buNone/>
+            </a:pPr>
+            <a:r>
+              <a:rPr lang="en-GB" dirty="0" err="1" smtClean="0"/>
+              <a:t>PyObject_CheckBuffer</a:t>
+            </a:r>
+            <a:r>
+              <a:rPr lang="en-GB" dirty="0" smtClean="0"/>
+              <a:t>(</a:t>
+            </a:r>
+            <a:r>
+              <a:rPr lang="en-GB" dirty="0" err="1" smtClean="0"/>
+              <a:t>obj</a:t>
+            </a:r>
+            <a:r>
+              <a:rPr lang="en-GB" dirty="0" smtClean="0"/>
+              <a:t>) == 1</a:t>
+            </a:r>
+            <a:r>
+              <a:rPr lang="en-GB" dirty="0"/>
+              <a:t/>
+            </a:r>
+            <a:br>
+              <a:rPr lang="en-GB" dirty="0"/>
+            </a:br>
+            <a:r>
+              <a:rPr lang="en-GB" dirty="0"/>
+              <a:t>ret = </a:t>
+            </a:r>
+            <a:r>
+              <a:rPr lang="en-GB" dirty="0" err="1" smtClean="0"/>
+              <a:t>PyObject_GetBuffer</a:t>
+            </a:r>
+            <a:r>
+              <a:rPr lang="en-GB" dirty="0" smtClean="0"/>
+              <a:t>(</a:t>
+            </a:r>
+            <a:r>
+              <a:rPr lang="en-GB" dirty="0" err="1" smtClean="0"/>
+              <a:t>obj</a:t>
+            </a:r>
+            <a:r>
+              <a:rPr lang="en-GB" dirty="0"/>
+              <a:t>, </a:t>
+            </a:r>
+            <a:r>
+              <a:rPr lang="en-GB" dirty="0" smtClean="0"/>
+              <a:t>&amp;</a:t>
+            </a:r>
+            <a:r>
+              <a:rPr lang="en-GB" dirty="0"/>
+              <a:t>b, </a:t>
+            </a:r>
+            <a:r>
+              <a:rPr lang="en-GB" dirty="0" err="1" smtClean="0"/>
+              <a:t>PyBUF_WRITABLE</a:t>
+            </a:r>
+            <a:r>
+              <a:rPr lang="en-GB" dirty="0" smtClean="0"/>
+              <a:t>); </a:t>
+            </a:r>
+          </a:p>
+          <a:p>
+            <a:r>
+              <a:rPr lang="en-GB" dirty="0" smtClean="0"/>
+              <a:t>In any case</a:t>
+            </a:r>
+            <a:endParaRPr lang="en-GB" dirty="0"/>
+          </a:p>
+          <a:p>
+            <a:pPr marL="457200" lvl="1" indent="0">
+              <a:buNone/>
+            </a:pPr>
+            <a:r>
+              <a:rPr lang="en-GB" dirty="0" err="1" smtClean="0"/>
+              <a:t>PyBuffer_Release</a:t>
+            </a:r>
+            <a:r>
+              <a:rPr lang="en-GB" dirty="0" smtClean="0"/>
+              <a:t>(&amp;b);</a:t>
+            </a:r>
+          </a:p>
+          <a:p>
+            <a:r>
+              <a:rPr lang="en-GB" dirty="0" smtClean="0"/>
+              <a:t>Consider</a:t>
+            </a:r>
+          </a:p>
+          <a:p>
+            <a:pPr marL="457200" lvl="1" indent="0">
+              <a:buNone/>
+            </a:pPr>
+            <a:r>
+              <a:rPr lang="en-GB" dirty="0"/>
+              <a:t>ret = </a:t>
+            </a:r>
+            <a:r>
+              <a:rPr lang="en-GB" dirty="0" err="1" smtClean="0"/>
+              <a:t>PyObject_TypeCheck</a:t>
+            </a:r>
+            <a:r>
+              <a:rPr lang="en-GB" dirty="0" smtClean="0"/>
+              <a:t>(</a:t>
+            </a:r>
+            <a:r>
+              <a:rPr lang="en-GB" dirty="0" err="1" smtClean="0"/>
+              <a:t>obj</a:t>
+            </a:r>
+            <a:r>
+              <a:rPr lang="en-GB" dirty="0" smtClean="0"/>
+              <a:t>, </a:t>
+            </a:r>
+            <a:r>
+              <a:rPr lang="en-GB" dirty="0" err="1" smtClean="0"/>
+              <a:t>type_obj</a:t>
+            </a:r>
+            <a:r>
+              <a:rPr lang="en-GB" dirty="0" smtClean="0"/>
+              <a:t>);</a:t>
+            </a:r>
+          </a:p>
+          <a:p>
+            <a:pPr marL="457200" lvl="1" indent="0">
+              <a:buNone/>
+            </a:pPr>
+            <a:r>
+              <a:rPr lang="en-GB" dirty="0" smtClean="0"/>
+              <a:t>or</a:t>
+            </a:r>
+          </a:p>
+          <a:p>
+            <a:pPr marL="457200" lvl="1" indent="0">
+              <a:buNone/>
+            </a:pPr>
+            <a:r>
+              <a:rPr lang="en-GB" dirty="0" err="1" smtClean="0"/>
+              <a:t>PyObject_Type</a:t>
+            </a:r>
+            <a:r>
+              <a:rPr lang="en-GB" dirty="0" smtClean="0"/>
+              <a:t>(</a:t>
+            </a:r>
+            <a:r>
+              <a:rPr lang="en-GB" dirty="0" err="1" smtClean="0"/>
+              <a:t>obj</a:t>
+            </a:r>
+            <a:r>
+              <a:rPr lang="en-GB" dirty="0" smtClean="0"/>
+              <a:t>) == </a:t>
+            </a:r>
+            <a:r>
+              <a:rPr lang="en-GB" dirty="0" err="1" smtClean="0"/>
+              <a:t>type_obj</a:t>
             </a:r>
             <a:endParaRPr lang="en-GB" dirty="0" smtClean="0"/>
           </a:p>
           <a:p>
-            <a:pPr lvl="1"/>
-            <a:r>
-              <a:rPr lang="en-GB" dirty="0" smtClean="0"/>
-              <a:t>implements Buffer protocol  </a:t>
-            </a:r>
-          </a:p>
-          <a:p>
-            <a:pPr lvl="1"/>
-            <a:r>
-              <a:rPr lang="en-GB" dirty="0" smtClean="0"/>
-              <a:t>implements Sequence protocol</a:t>
-            </a:r>
-          </a:p>
-          <a:p>
-            <a:r>
-              <a:rPr lang="en-GB" dirty="0" smtClean="0"/>
-              <a:t>TODO</a:t>
-            </a:r>
-          </a:p>
-          <a:p>
-            <a:pPr lvl="1"/>
-            <a:r>
-              <a:rPr lang="en-GB" dirty="0" smtClean="0"/>
-              <a:t>Make </a:t>
-            </a:r>
+            <a:pPr marL="457200" lvl="1" indent="0">
+              <a:buNone/>
+            </a:pPr>
+            <a:r>
+              <a:rPr lang="en-GB" dirty="0" smtClean="0"/>
+              <a:t>or simpler</a:t>
+            </a:r>
+          </a:p>
+          <a:p>
+            <a:pPr marL="457200" lvl="1" indent="0">
+              <a:buNone/>
+            </a:pPr>
             <a:r>
               <a:rPr lang="en-GB" dirty="0" err="1" smtClean="0"/>
-              <a:t>dtype</a:t>
-            </a:r>
-            <a:r>
-              <a:rPr lang="en-GB" dirty="0" smtClean="0"/>
-              <a:t>-format-string conform to Python ‘</a:t>
+              <a:t>obj</a:t>
+            </a:r>
+            <a:r>
+              <a:rPr lang="en-GB" dirty="0"/>
+              <a:t>-</a:t>
+            </a:r>
+            <a:r>
+              <a:rPr lang="en-GB" dirty="0" smtClean="0"/>
+              <a:t>&gt;</a:t>
             </a:r>
             <a:r>
               <a:rPr lang="en-GB" dirty="0" err="1" smtClean="0"/>
-              <a:t>struct</a:t>
-            </a:r>
-            <a:r>
-              <a:rPr lang="en-GB" dirty="0" smtClean="0"/>
-              <a:t>’ module, see </a:t>
-            </a:r>
-            <a:br>
-              <a:rPr lang="en-GB" dirty="0" smtClean="0"/>
-            </a:br>
-            <a:r>
-              <a:rPr lang="en-GB" dirty="0" smtClean="0"/>
-              <a:t>6.3.  </a:t>
+              <a:t>ob_type</a:t>
+            </a:r>
+            <a:r>
+              <a:rPr lang="en-GB" dirty="0" smtClean="0"/>
+              <a:t> == </a:t>
             </a:r>
             <a:r>
               <a:rPr lang="en-GB" dirty="0" err="1" smtClean="0"/>
-              <a:t>struct</a:t>
-            </a:r>
-            <a:r>
-              <a:rPr lang="en-GB" dirty="0" smtClean="0"/>
-              <a:t> </a:t>
-            </a:r>
-            <a:r>
-              <a:rPr lang="en-GB" dirty="0"/>
-              <a:t>— Interpret bytes as packed binary </a:t>
-            </a:r>
-            <a:r>
-              <a:rPr lang="en-GB" dirty="0" smtClean="0"/>
-              <a:t>data, see also</a:t>
-            </a:r>
-            <a:br>
-              <a:rPr lang="en-GB" dirty="0" smtClean="0"/>
-            </a:br>
-            <a:r>
-              <a:rPr lang="en-GB" dirty="0" err="1" smtClean="0"/>
-              <a:t>PyBuffer_SizeFromFormat</a:t>
-            </a:r>
-            <a:r>
-              <a:rPr lang="en-GB" dirty="0" smtClean="0"/>
-              <a:t>(format) </a:t>
-            </a:r>
-            <a:endParaRPr lang="en-GB" dirty="0"/>
-          </a:p>
-          <a:p>
-            <a:pPr lvl="1"/>
-            <a:endParaRPr lang="en-GB" dirty="0" smtClean="0"/>
+              <a:t>type_obj</a:t>
+            </a:r>
+            <a:r>
+              <a:rPr lang="en-GB" dirty="0" smtClean="0"/>
+              <a:t>  </a:t>
+            </a:r>
           </a:p>
         </p:txBody>
       </p:sp>
     </p:spTree>
     <p:extLst>
       <p:ext uri="{BB962C8B-B14F-4D97-AF65-F5344CB8AC3E}">
-        <p14:creationId xmlns:p14="http://schemas.microsoft.com/office/powerpoint/2010/main" val="845572741"/>
+        <p14:creationId xmlns:p14="http://schemas.microsoft.com/office/powerpoint/2010/main" val="2973595614"/>
       </p:ext>
     </p:extLst>
   </p:cSld>
@@ -4505,7 +4484,15 @@
           <a:p>
             <a:r>
               <a:rPr lang="en-GB" dirty="0" smtClean="0"/>
-              <a:t>Multithreading</a:t>
+              <a:t>Data Arrays (</a:t>
+            </a:r>
+            <a:r>
+              <a:rPr lang="en-GB" dirty="0"/>
+              <a:t>3</a:t>
+            </a:r>
+            <a:r>
+              <a:rPr lang="en-GB" dirty="0" smtClean="0"/>
+              <a:t>/3)</a:t>
             </a:r>
             <a:endParaRPr lang="en-GB" dirty="0"/>
           </a:p>
@@ -4524,121 +4511,104 @@
         <p:spPr/>
         <p:txBody>
           <a:bodyPr>
-            <a:normAutofit lnSpcReduction="10000"/>
+            <a:normAutofit/>
           </a:bodyPr>
           <a:lstStyle/>
           <a:p>
             <a:r>
-              <a:rPr lang="en-GB" dirty="0" smtClean="0"/>
-              <a:t>If BEAM Java calls into Python from multiple Java threads for executing e.g. a tile computation, we can consider</a:t>
-            </a:r>
+              <a:rPr lang="en-GB" dirty="0" err="1" smtClean="0"/>
+              <a:t>CArray</a:t>
+            </a:r>
+            <a:endParaRPr lang="en-GB" dirty="0" smtClean="0"/>
           </a:p>
           <a:p>
             <a:pPr lvl="1"/>
             <a:r>
+              <a:rPr lang="en-GB" dirty="0" smtClean="0"/>
+              <a:t>implements Buffer protocol  </a:t>
+            </a:r>
+          </a:p>
+          <a:p>
+            <a:pPr lvl="1"/>
+            <a:r>
+              <a:rPr lang="en-GB" dirty="0" smtClean="0"/>
+              <a:t>implements Sequence protocol</a:t>
+            </a:r>
+          </a:p>
+          <a:p>
+            <a:r>
+              <a:rPr lang="en-GB" dirty="0" smtClean="0"/>
+              <a:t>TODO</a:t>
+            </a:r>
+          </a:p>
+          <a:p>
+            <a:pPr lvl="1"/>
+            <a:r>
+              <a:rPr lang="en-GB" dirty="0" smtClean="0"/>
+              <a:t>Make </a:t>
+            </a:r>
+            <a:r>
               <a:rPr lang="en-GB" dirty="0" err="1" smtClean="0"/>
-              <a:t>PyThreadState</a:t>
-            </a:r>
-            <a:r>
-              <a:rPr lang="en-GB" dirty="0" smtClean="0"/>
-              <a:t>* </a:t>
+              <a:t>dtype</a:t>
+            </a:r>
+            <a:r>
+              <a:rPr lang="en-GB" dirty="0" smtClean="0"/>
+              <a:t>-format-string conform to Python ‘</a:t>
             </a:r>
             <a:r>
               <a:rPr lang="en-GB" dirty="0" err="1" smtClean="0"/>
-              <a:t>tstate</a:t>
-            </a:r>
-            <a:r>
-              <a:rPr lang="en-GB" dirty="0" smtClean="0"/>
-              <a:t>;</a:t>
-            </a:r>
+              <a:t>struct</a:t>
+            </a:r>
+            <a:r>
+              <a:rPr lang="en-GB" dirty="0" smtClean="0"/>
+              <a:t>’ module, see </a:t>
+            </a:r>
+            <a:br>
+              <a:rPr lang="en-GB" dirty="0" smtClean="0"/>
+            </a:br>
+            <a:r>
+              <a:rPr lang="en-GB" dirty="0" smtClean="0"/>
+              <a:t>6.3.  </a:t>
+            </a:r>
+            <a:r>
+              <a:rPr lang="en-GB" dirty="0" err="1" smtClean="0"/>
+              <a:t>struct</a:t>
+            </a:r>
+            <a:r>
+              <a:rPr lang="en-GB" dirty="0" smtClean="0"/>
+              <a:t> </a:t>
+            </a:r>
+            <a:r>
+              <a:rPr lang="en-GB" dirty="0"/>
+              <a:t>— Interpret bytes as packed binary </a:t>
+            </a:r>
+            <a:r>
+              <a:rPr lang="en-GB" dirty="0" smtClean="0"/>
+              <a:t>data, see also</a:t>
+            </a:r>
+            <a:br>
+              <a:rPr lang="en-GB" dirty="0" smtClean="0"/>
+            </a:br>
+            <a:r>
+              <a:rPr lang="en-GB" dirty="0" err="1" smtClean="0"/>
+              <a:t>PyBuffer_SizeFromFormat</a:t>
+            </a:r>
+            <a:r>
+              <a:rPr lang="en-GB" dirty="0" smtClean="0"/>
+              <a:t>(format) </a:t>
+            </a:r>
+            <a:endParaRPr lang="en-GB" dirty="0"/>
           </a:p>
           <a:p>
             <a:pPr lvl="1"/>
-            <a:r>
-              <a:rPr lang="en-GB" dirty="0" err="1" smtClean="0"/>
-              <a:t>tstate</a:t>
-            </a:r>
-            <a:r>
-              <a:rPr lang="en-GB" dirty="0" smtClean="0"/>
-              <a:t> = </a:t>
-            </a:r>
-            <a:r>
-              <a:rPr lang="en-GB" dirty="0" err="1"/>
-              <a:t>Py_NewInterpreter</a:t>
-            </a:r>
-            <a:r>
-              <a:rPr lang="en-GB" dirty="0" smtClean="0"/>
-              <a:t>();</a:t>
-            </a:r>
-          </a:p>
-          <a:p>
-            <a:pPr lvl="1"/>
-            <a:r>
-              <a:rPr lang="en-GB" dirty="0" smtClean="0"/>
-              <a:t>…</a:t>
-            </a:r>
-            <a:r>
-              <a:rPr lang="en-GB" i="1" dirty="0" smtClean="0"/>
-              <a:t> call into python code</a:t>
-            </a:r>
-          </a:p>
-          <a:p>
-            <a:pPr lvl="1"/>
-            <a:r>
-              <a:rPr lang="en-GB" dirty="0" err="1" smtClean="0"/>
-              <a:t>Py_EndInterpreter</a:t>
-            </a:r>
-            <a:r>
-              <a:rPr lang="en-GB" dirty="0" smtClean="0"/>
-              <a:t>(</a:t>
-            </a:r>
-            <a:r>
-              <a:rPr lang="en-GB" dirty="0" err="1" smtClean="0"/>
-              <a:t>tstate</a:t>
-            </a:r>
-            <a:r>
-              <a:rPr lang="en-GB" dirty="0" smtClean="0"/>
-              <a:t>);  </a:t>
-            </a:r>
-          </a:p>
-          <a:p>
-            <a:pPr marL="342900" lvl="1" indent="-342900">
-              <a:buFont typeface="Arial" pitchFamily="34" charset="0"/>
-              <a:buChar char="•"/>
-            </a:pPr>
-            <a:r>
-              <a:rPr lang="en-GB" dirty="0"/>
-              <a:t>See </a:t>
-            </a:r>
-            <a:r>
-              <a:rPr lang="en-GB" dirty="0" smtClean="0"/>
-              <a:t>“Initialization</a:t>
-            </a:r>
-            <a:r>
-              <a:rPr lang="en-GB" dirty="0"/>
-              <a:t>, Finalization, and </a:t>
-            </a:r>
-            <a:r>
-              <a:rPr lang="en-GB" dirty="0" smtClean="0"/>
-              <a:t>Threads” </a:t>
-            </a:r>
-            <a:r>
-              <a:rPr lang="en-GB" dirty="0"/>
-              <a:t>in Python/C API Reference Manual</a:t>
-            </a:r>
-          </a:p>
-          <a:p>
-            <a:pPr marL="0" indent="0">
-              <a:buNone/>
-            </a:pPr>
-            <a:endParaRPr lang="en-GB" dirty="0"/>
+            <a:endParaRPr lang="en-GB" dirty="0" smtClean="0"/>
           </a:p>
         </p:txBody>
       </p:sp>
     </p:spTree>
     <p:extLst>
       <p:ext uri="{BB962C8B-B14F-4D97-AF65-F5344CB8AC3E}">
-        <p14:creationId xmlns:p14="http://schemas.microsoft.com/office/powerpoint/2010/main" val="183588086"/>
+        <p14:creationId xmlns:p14="http://schemas.microsoft.com/office/powerpoint/2010/main" val="845572741"/>
       </p:ext>
     </p:extLst>
   </p:cSld>
@@ -4689,105 +4659,687 @@
           <a:p>
             <a:r>
               <a:rPr lang="en-GB" dirty="0" smtClean="0"/>
-              <a:t>Alternatives (1/2)</a:t>
+              <a:t>Data Type Mappings</a:t>
             </a:r>
             <a:endParaRPr lang="en-GB" dirty="0"/>
           </a:p>
         </p:txBody>
       </p:sp>
-      <p:sp>
-        <p:nvSpPr>
-          <p:cNvPr id="3" name="Inhaltsplatzhalter 2"/>
-          <p:cNvSpPr>
-            <a:spLocks noGrp="1"/>
-          </p:cNvSpPr>
+      <p:graphicFrame>
+        <p:nvGraphicFramePr>
+          <p:cNvPr id="4" name="Inhaltsplatzhalter 3"/>
+          <p:cNvGraphicFramePr>
+            <a:graphicFrameLocks noGrp="1"/>
+          </p:cNvGraphicFramePr>
           <p:nvPr>
             <p:ph idx="1"/>
+            <p:extLst>
+              <p:ext uri="{D42A27DB-BD31-4B8C-83A1-F6EECF244321}">
+                <p14:modId xmlns:p14="http://schemas.microsoft.com/office/powerpoint/2010/main" val="664400467"/>
+              </p:ext>
+            </p:extLst>
           </p:nvPr>
-        </p:nvSpPr>
-        <p:spPr/>
-        <p:txBody>
-          <a:bodyPr/>
-          <a:lstStyle/>
-          <a:p>
-            <a:r>
-              <a:rPr lang="en-GB" b="1" dirty="0" err="1"/>
-              <a:t>Jep</a:t>
-            </a:r>
-            <a:r>
-              <a:rPr lang="en-GB" dirty="0"/>
-              <a:t> - Java Embedded Python</a:t>
-            </a:r>
-          </a:p>
-          <a:p>
-            <a:pPr lvl="1"/>
-            <a:r>
-              <a:rPr lang="en-GB" dirty="0" err="1"/>
-              <a:t>Jep</a:t>
-            </a:r>
-            <a:r>
-              <a:rPr lang="en-GB" dirty="0"/>
-              <a:t> embeds </a:t>
-            </a:r>
-            <a:r>
-              <a:rPr lang="en-GB" dirty="0" err="1"/>
-              <a:t>CPython</a:t>
-            </a:r>
-            <a:r>
-              <a:rPr lang="en-GB" dirty="0"/>
-              <a:t> in Java. It is safe to use in a heavily threaded environment, it is quite fast and its stability is a main feature and goal.</a:t>
-            </a:r>
-          </a:p>
-          <a:p>
-            <a:pPr lvl="1"/>
-            <a:r>
-              <a:rPr lang="en-GB" dirty="0" smtClean="0">
-                <a:hlinkClick r:id="rId2"/>
-              </a:rPr>
-              <a:t>https</a:t>
-            </a:r>
-            <a:r>
-              <a:rPr lang="en-GB" dirty="0">
-                <a:hlinkClick r:id="rId2"/>
-              </a:rPr>
-              <a:t>://</a:t>
-            </a:r>
-            <a:r>
-              <a:rPr lang="en-GB" dirty="0" smtClean="0">
-                <a:hlinkClick r:id="rId2"/>
-              </a:rPr>
-              <a:t>github.com/mrj0/jep</a:t>
-            </a:r>
-            <a:endParaRPr lang="en-GB" dirty="0" smtClean="0"/>
-          </a:p>
-          <a:p>
-            <a:pPr lvl="1"/>
-            <a:r>
-              <a:rPr lang="en-GB" dirty="0" smtClean="0"/>
-              <a:t>Check: can it be used to call Python from Java</a:t>
-            </a:r>
-          </a:p>
-          <a:p>
-            <a:pPr lvl="1"/>
-            <a:r>
-              <a:rPr lang="en-GB" dirty="0" smtClean="0"/>
-              <a:t>Check: No windows support</a:t>
-            </a:r>
-          </a:p>
-          <a:p>
-            <a:pPr lvl="1"/>
-            <a:r>
-              <a:rPr lang="en-GB" dirty="0" smtClean="0"/>
-              <a:t>Check: last activity 9 months ago</a:t>
-            </a:r>
-            <a:endParaRPr lang="en-GB" dirty="0"/>
-          </a:p>
-        </p:txBody>
-      </p:sp>
+        </p:nvGraphicFramePr>
+        <p:xfrm>
+          <a:off x="457200" y="1600200"/>
+          <a:ext cx="8229600" cy="4719320"/>
+        </p:xfrm>
+        <a:graphic>
+          <a:graphicData uri="http://schemas.openxmlformats.org/drawingml/2006/table">
+            <a:tbl>
+              <a:tblPr firstRow="1" bandRow="1">
+                <a:tableStyleId>{5C22544A-7EE6-4342-B048-85BDC9FD1C3A}</a:tableStyleId>
+              </a:tblPr>
+              <a:tblGrid>
+                <a:gridCol w="2743200"/>
+                <a:gridCol w="2743200"/>
+                <a:gridCol w="2743200"/>
+              </a:tblGrid>
+              <a:tr h="370840">
+                <a:tc>
+                  <a:txBody>
+                    <a:bodyPr/>
+                    <a:lstStyle/>
+                    <a:p>
+                      <a:r>
+                        <a:rPr lang="en-GB" dirty="0" smtClean="0"/>
+                        <a:t>Java</a:t>
+                      </a:r>
+                      <a:endParaRPr lang="en-GB" dirty="0"/>
+                    </a:p>
+                  </a:txBody>
+                  <a:tcPr/>
+                </a:tc>
+                <a:tc>
+                  <a:txBody>
+                    <a:bodyPr/>
+                    <a:lstStyle/>
+                    <a:p>
+                      <a:r>
+                        <a:rPr lang="en-GB" dirty="0" smtClean="0"/>
+                        <a:t>C</a:t>
+                      </a:r>
+                      <a:endParaRPr lang="en-GB" dirty="0"/>
+                    </a:p>
+                  </a:txBody>
+                  <a:tcPr/>
+                </a:tc>
+                <a:tc>
+                  <a:txBody>
+                    <a:bodyPr/>
+                    <a:lstStyle/>
+                    <a:p>
+                      <a:r>
+                        <a:rPr lang="en-GB" dirty="0" smtClean="0"/>
+                        <a:t>Python</a:t>
+                      </a:r>
+                      <a:endParaRPr lang="en-GB" dirty="0"/>
+                    </a:p>
+                  </a:txBody>
+                  <a:tcPr/>
+                </a:tc>
+              </a:tr>
+              <a:tr h="370840">
+                <a:tc>
+                  <a:txBody>
+                    <a:bodyPr/>
+                    <a:lstStyle/>
+                    <a:p>
+                      <a:r>
+                        <a:rPr lang="en-GB" dirty="0" smtClean="0"/>
+                        <a:t>Object</a:t>
+                      </a:r>
+                      <a:endParaRPr lang="en-GB" dirty="0"/>
+                    </a:p>
+                  </a:txBody>
+                  <a:tcPr/>
+                </a:tc>
+                <a:tc>
+                  <a:txBody>
+                    <a:bodyPr/>
+                    <a:lstStyle/>
+                    <a:p>
+                      <a:pPr marL="0" marR="0" indent="0" algn="l" defTabSz="914400" rtl="0" eaLnBrk="1" fontAlgn="auto" latinLnBrk="0" hangingPunct="1">
+                        <a:lnSpc>
+                          <a:spcPct val="100000"/>
+                        </a:lnSpc>
+                        <a:spcBef>
+                          <a:spcPts val="0"/>
+                        </a:spcBef>
+                        <a:spcAft>
+                          <a:spcPts val="0"/>
+                        </a:spcAft>
+                        <a:buClrTx/>
+                        <a:buSzTx/>
+                        <a:buFontTx/>
+                        <a:buNone/>
+                        <a:tabLst/>
+                        <a:defRPr/>
+                      </a:pPr>
+                      <a:r>
+                        <a:rPr lang="en-GB" dirty="0" smtClean="0"/>
+                        <a:t>void*</a:t>
+                      </a:r>
+                    </a:p>
+                  </a:txBody>
+                  <a:tcPr/>
+                </a:tc>
+                <a:tc>
+                  <a:txBody>
+                    <a:bodyPr/>
+                    <a:lstStyle/>
+                    <a:p>
+                      <a:r>
+                        <a:rPr lang="en-GB" dirty="0" smtClean="0"/>
+                        <a:t>(&lt;type&gt;, &lt;pointer&gt;)</a:t>
+                      </a:r>
+                      <a:endParaRPr lang="en-GB" dirty="0"/>
+                    </a:p>
+                  </a:txBody>
+                  <a:tcPr/>
+                </a:tc>
+              </a:tr>
+              <a:tr h="370840">
+                <a:tc>
+                  <a:txBody>
+                    <a:bodyPr/>
+                    <a:lstStyle/>
+                    <a:p>
+                      <a:r>
+                        <a:rPr lang="en-GB" dirty="0" smtClean="0"/>
+                        <a:t>Prim. arrays</a:t>
+                      </a:r>
+                      <a:endParaRPr lang="en-GB" dirty="0"/>
+                    </a:p>
+                  </a:txBody>
+                  <a:tcPr/>
+                </a:tc>
+                <a:tc>
+                  <a:txBody>
+                    <a:bodyPr/>
+                    <a:lstStyle/>
+                    <a:p>
+                      <a:pPr marL="0" marR="0" indent="0" algn="l" defTabSz="914400" rtl="0" eaLnBrk="1" fontAlgn="auto" latinLnBrk="0" hangingPunct="1">
+                        <a:lnSpc>
+                          <a:spcPct val="100000"/>
+                        </a:lnSpc>
+                        <a:spcBef>
+                          <a:spcPts val="0"/>
+                        </a:spcBef>
+                        <a:spcAft>
+                          <a:spcPts val="0"/>
+                        </a:spcAft>
+                        <a:buClrTx/>
+                        <a:buSzTx/>
+                        <a:buFontTx/>
+                        <a:buNone/>
+                        <a:tabLst/>
+                        <a:defRPr/>
+                      </a:pPr>
+                      <a:r>
+                        <a:rPr lang="en-GB" dirty="0" smtClean="0"/>
+                        <a:t>&lt;type&gt;*, length</a:t>
+                      </a:r>
+                    </a:p>
+                  </a:txBody>
+                  <a:tcPr/>
+                </a:tc>
+                <a:tc>
+                  <a:txBody>
+                    <a:bodyPr/>
+                    <a:lstStyle/>
+                    <a:p>
+                      <a:r>
+                        <a:rPr lang="en-GB" dirty="0" smtClean="0"/>
+                        <a:t>buffer, </a:t>
+                      </a:r>
+                      <a:r>
+                        <a:rPr lang="en-GB" dirty="0" err="1" smtClean="0"/>
+                        <a:t>array.array</a:t>
+                      </a:r>
+                      <a:r>
+                        <a:rPr lang="en-GB" dirty="0" smtClean="0"/>
+                        <a:t>, </a:t>
+                      </a:r>
+                      <a:r>
+                        <a:rPr lang="en-GB" dirty="0" err="1" smtClean="0"/>
+                        <a:t>numpy.array</a:t>
+                      </a:r>
+                      <a:endParaRPr lang="en-GB" dirty="0"/>
+                    </a:p>
+                  </a:txBody>
+                  <a:tcPr/>
+                </a:tc>
+              </a:tr>
+              <a:tr h="370840">
+                <a:tc>
+                  <a:txBody>
+                    <a:bodyPr/>
+                    <a:lstStyle/>
+                    <a:p>
+                      <a:r>
+                        <a:rPr lang="en-GB" dirty="0" smtClean="0"/>
+                        <a:t>String</a:t>
+                      </a:r>
+                      <a:endParaRPr lang="en-GB" dirty="0"/>
+                    </a:p>
+                  </a:txBody>
+                  <a:tcPr/>
+                </a:tc>
+                <a:tc>
+                  <a:txBody>
+                    <a:bodyPr/>
+                    <a:lstStyle/>
+                    <a:p>
+                      <a:r>
+                        <a:rPr lang="en-GB" dirty="0" smtClean="0"/>
+                        <a:t>char* (zero terminated)</a:t>
+                      </a:r>
+                      <a:endParaRPr lang="en-GB" dirty="0"/>
+                    </a:p>
+                  </a:txBody>
+                  <a:tcPr/>
+                </a:tc>
+                <a:tc>
+                  <a:txBody>
+                    <a:bodyPr/>
+                    <a:lstStyle/>
+                    <a:p>
+                      <a:r>
+                        <a:rPr lang="en-GB" dirty="0" smtClean="0"/>
+                        <a:t>string</a:t>
+                      </a:r>
+                      <a:endParaRPr lang="en-GB" dirty="0"/>
+                    </a:p>
+                  </a:txBody>
+                  <a:tcPr/>
+                </a:tc>
+              </a:tr>
+              <a:tr h="370840">
+                <a:tc>
+                  <a:txBody>
+                    <a:bodyPr/>
+                    <a:lstStyle/>
+                    <a:p>
+                      <a:r>
+                        <a:rPr lang="en-GB" dirty="0" smtClean="0"/>
+                        <a:t>Map</a:t>
+                      </a:r>
+                      <a:endParaRPr lang="en-GB" dirty="0"/>
+                    </a:p>
+                  </a:txBody>
+                  <a:tcPr/>
+                </a:tc>
+                <a:tc>
+                  <a:txBody>
+                    <a:bodyPr/>
+                    <a:lstStyle/>
+                    <a:p>
+                      <a:r>
+                        <a:rPr lang="en-GB" dirty="0" smtClean="0"/>
+                        <a:t>?</a:t>
+                      </a:r>
+                      <a:endParaRPr lang="en-GB" dirty="0"/>
+                    </a:p>
+                  </a:txBody>
+                  <a:tcPr/>
+                </a:tc>
+                <a:tc>
+                  <a:txBody>
+                    <a:bodyPr/>
+                    <a:lstStyle/>
+                    <a:p>
+                      <a:r>
+                        <a:rPr lang="en-GB" dirty="0" err="1" smtClean="0"/>
+                        <a:t>dict</a:t>
+                      </a:r>
+                      <a:endParaRPr lang="en-GB" dirty="0"/>
+                    </a:p>
+                  </a:txBody>
+                  <a:tcPr/>
+                </a:tc>
+              </a:tr>
+              <a:tr h="370840">
+                <a:tc>
+                  <a:txBody>
+                    <a:bodyPr/>
+                    <a:lstStyle/>
+                    <a:p>
+                      <a:r>
+                        <a:rPr lang="en-GB" dirty="0" smtClean="0"/>
+                        <a:t>Set</a:t>
+                      </a:r>
+                      <a:endParaRPr lang="en-GB" dirty="0"/>
+                    </a:p>
+                  </a:txBody>
+                  <a:tcPr/>
+                </a:tc>
+                <a:tc>
+                  <a:txBody>
+                    <a:bodyPr/>
+                    <a:lstStyle/>
+                    <a:p>
+                      <a:r>
+                        <a:rPr lang="en-GB" dirty="0" smtClean="0"/>
+                        <a:t>void**, length</a:t>
+                      </a:r>
+                      <a:endParaRPr lang="en-GB" dirty="0"/>
+                    </a:p>
+                  </a:txBody>
+                  <a:tcPr/>
+                </a:tc>
+                <a:tc>
+                  <a:txBody>
+                    <a:bodyPr/>
+                    <a:lstStyle/>
+                    <a:p>
+                      <a:pPr marL="0" marR="0" indent="0" algn="l" defTabSz="914400" rtl="0" eaLnBrk="1" fontAlgn="auto" latinLnBrk="0" hangingPunct="1">
+                        <a:lnSpc>
+                          <a:spcPct val="100000"/>
+                        </a:lnSpc>
+                        <a:spcBef>
+                          <a:spcPts val="0"/>
+                        </a:spcBef>
+                        <a:spcAft>
+                          <a:spcPts val="0"/>
+                        </a:spcAft>
+                        <a:buClrTx/>
+                        <a:buSzTx/>
+                        <a:buFontTx/>
+                        <a:buNone/>
+                        <a:tabLst/>
+                        <a:defRPr/>
+                      </a:pPr>
+                      <a:r>
+                        <a:rPr lang="en-GB" dirty="0" smtClean="0"/>
+                        <a:t>list,</a:t>
+                      </a:r>
+                      <a:r>
+                        <a:rPr lang="en-GB" baseline="0" dirty="0" smtClean="0"/>
+                        <a:t> </a:t>
+                      </a:r>
+                      <a:r>
+                        <a:rPr lang="en-GB" baseline="0" dirty="0" err="1" smtClean="0"/>
+                        <a:t>seq</a:t>
+                      </a:r>
+                      <a:r>
+                        <a:rPr lang="en-GB" baseline="0" dirty="0" smtClean="0"/>
+                        <a:t>, tuple</a:t>
+                      </a:r>
+                      <a:endParaRPr lang="en-GB" dirty="0" smtClean="0"/>
+                    </a:p>
+                  </a:txBody>
+                  <a:tcPr/>
+                </a:tc>
+              </a:tr>
+              <a:tr h="370840">
+                <a:tc>
+                  <a:txBody>
+                    <a:bodyPr/>
+                    <a:lstStyle/>
+                    <a:p>
+                      <a:r>
+                        <a:rPr lang="en-GB" dirty="0" smtClean="0"/>
+                        <a:t>List</a:t>
+                      </a:r>
+                      <a:endParaRPr lang="en-GB" dirty="0"/>
+                    </a:p>
+                  </a:txBody>
+                  <a:tcPr/>
+                </a:tc>
+                <a:tc>
+                  <a:txBody>
+                    <a:bodyPr/>
+                    <a:lstStyle/>
+                    <a:p>
+                      <a:r>
+                        <a:rPr lang="en-GB" dirty="0" smtClean="0"/>
+                        <a:t>void**, length</a:t>
+                      </a:r>
+                      <a:endParaRPr lang="en-GB" dirty="0"/>
+                    </a:p>
+                  </a:txBody>
+                  <a:tcPr/>
+                </a:tc>
+                <a:tc>
+                  <a:txBody>
+                    <a:bodyPr/>
+                    <a:lstStyle/>
+                    <a:p>
+                      <a:r>
+                        <a:rPr lang="en-GB" dirty="0" smtClean="0"/>
+                        <a:t>list,</a:t>
+                      </a:r>
+                      <a:r>
+                        <a:rPr lang="en-GB" baseline="0" dirty="0" smtClean="0"/>
+                        <a:t> </a:t>
+                      </a:r>
+                      <a:r>
+                        <a:rPr lang="en-GB" baseline="0" dirty="0" err="1" smtClean="0"/>
+                        <a:t>seq</a:t>
+                      </a:r>
+                      <a:r>
+                        <a:rPr lang="en-GB" baseline="0" dirty="0" smtClean="0"/>
+                        <a:t>, tuple</a:t>
+                      </a:r>
+                      <a:endParaRPr lang="en-GB" dirty="0"/>
+                    </a:p>
+                  </a:txBody>
+                  <a:tcPr/>
+                </a:tc>
+              </a:tr>
+              <a:tr h="370840">
+                <a:tc>
+                  <a:txBody>
+                    <a:bodyPr/>
+                    <a:lstStyle/>
+                    <a:p>
+                      <a:r>
+                        <a:rPr lang="en-GB" dirty="0" smtClean="0"/>
+                        <a:t>File</a:t>
+                      </a:r>
+                      <a:endParaRPr lang="en-GB" dirty="0"/>
+                    </a:p>
+                  </a:txBody>
+                  <a:tcPr/>
+                </a:tc>
+                <a:tc>
+                  <a:txBody>
+                    <a:bodyPr/>
+                    <a:lstStyle/>
+                    <a:p>
+                      <a:r>
+                        <a:rPr lang="en-GB" dirty="0" smtClean="0"/>
+                        <a:t>char* (zero terminated)</a:t>
+                      </a:r>
+                      <a:endParaRPr lang="en-GB" dirty="0"/>
+                    </a:p>
+                  </a:txBody>
+                  <a:tcPr/>
+                </a:tc>
+                <a:tc>
+                  <a:txBody>
+                    <a:bodyPr/>
+                    <a:lstStyle/>
+                    <a:p>
+                      <a:r>
+                        <a:rPr lang="en-GB" dirty="0" smtClean="0"/>
+                        <a:t>string</a:t>
+                      </a:r>
+                      <a:endParaRPr lang="en-GB" dirty="0"/>
+                    </a:p>
+                  </a:txBody>
+                  <a:tcPr/>
+                </a:tc>
+              </a:tr>
+              <a:tr h="370840">
+                <a:tc>
+                  <a:txBody>
+                    <a:bodyPr/>
+                    <a:lstStyle/>
+                    <a:p>
+                      <a:r>
+                        <a:rPr lang="en-GB" dirty="0" err="1" smtClean="0"/>
+                        <a:t>GeoPos</a:t>
+                      </a:r>
+                      <a:endParaRPr lang="en-GB" dirty="0"/>
+                    </a:p>
+                  </a:txBody>
+                  <a:tcPr/>
+                </a:tc>
+                <a:tc>
+                  <a:txBody>
+                    <a:bodyPr/>
+                    <a:lstStyle/>
+                    <a:p>
+                      <a:r>
+                        <a:rPr lang="en-GB" dirty="0" smtClean="0"/>
+                        <a:t>float[2]</a:t>
+                      </a:r>
+                      <a:endParaRPr lang="en-GB" dirty="0"/>
+                    </a:p>
+                  </a:txBody>
+                  <a:tcPr/>
+                </a:tc>
+                <a:tc>
+                  <a:txBody>
+                    <a:bodyPr/>
+                    <a:lstStyle/>
+                    <a:p>
+                      <a:r>
+                        <a:rPr lang="en-GB" smtClean="0"/>
+                        <a:t>(</a:t>
+                      </a:r>
+                      <a:r>
+                        <a:rPr lang="en-GB" dirty="0" err="1" smtClean="0"/>
+                        <a:t>lat</a:t>
+                      </a:r>
+                      <a:r>
+                        <a:rPr lang="en-GB" dirty="0" smtClean="0"/>
+                        <a:t>, </a:t>
+                      </a:r>
+                      <a:r>
+                        <a:rPr lang="en-GB" dirty="0" err="1" smtClean="0"/>
+                        <a:t>lon</a:t>
+                      </a:r>
+                      <a:r>
+                        <a:rPr lang="en-GB" dirty="0" smtClean="0"/>
+                        <a:t>)</a:t>
+                      </a:r>
+                      <a:endParaRPr lang="en-GB" dirty="0"/>
+                    </a:p>
+                  </a:txBody>
+                  <a:tcPr/>
+                </a:tc>
+              </a:tr>
+              <a:tr h="370840">
+                <a:tc>
+                  <a:txBody>
+                    <a:bodyPr/>
+                    <a:lstStyle/>
+                    <a:p>
+                      <a:r>
+                        <a:rPr lang="en-GB" dirty="0" err="1" smtClean="0"/>
+                        <a:t>PixelPos</a:t>
+                      </a:r>
+                      <a:endParaRPr lang="en-GB" dirty="0"/>
+                    </a:p>
+                  </a:txBody>
+                  <a:tcPr/>
+                </a:tc>
+                <a:tc>
+                  <a:txBody>
+                    <a:bodyPr/>
+                    <a:lstStyle/>
+                    <a:p>
+                      <a:r>
+                        <a:rPr lang="en-GB" dirty="0" smtClean="0"/>
+                        <a:t>float[2]</a:t>
+                      </a:r>
+                      <a:endParaRPr lang="en-GB" dirty="0"/>
+                    </a:p>
+                  </a:txBody>
+                  <a:tcPr/>
+                </a:tc>
+                <a:tc>
+                  <a:txBody>
+                    <a:bodyPr/>
+                    <a:lstStyle/>
+                    <a:p>
+                      <a:r>
+                        <a:rPr lang="en-GB" dirty="0" smtClean="0"/>
+                        <a:t>(x, y)</a:t>
+                      </a:r>
+                      <a:endParaRPr lang="en-GB" dirty="0"/>
+                    </a:p>
+                  </a:txBody>
+                  <a:tcPr/>
+                </a:tc>
+              </a:tr>
+              <a:tr h="370840">
+                <a:tc>
+                  <a:txBody>
+                    <a:bodyPr/>
+                    <a:lstStyle/>
+                    <a:p>
+                      <a:r>
+                        <a:rPr lang="en-GB" dirty="0" smtClean="0"/>
+                        <a:t>Point, Point2D</a:t>
+                      </a:r>
+                      <a:endParaRPr lang="en-GB" dirty="0"/>
+                    </a:p>
+                  </a:txBody>
+                  <a:tcPr/>
+                </a:tc>
+                <a:tc>
+                  <a:txBody>
+                    <a:bodyPr/>
+                    <a:lstStyle/>
+                    <a:p>
+                      <a:r>
+                        <a:rPr lang="en-GB" dirty="0" err="1" smtClean="0"/>
+                        <a:t>int</a:t>
+                      </a:r>
+                      <a:r>
+                        <a:rPr lang="en-GB" dirty="0" smtClean="0"/>
+                        <a:t>[2], float[2]</a:t>
+                      </a:r>
+                      <a:endParaRPr lang="en-GB" dirty="0"/>
+                    </a:p>
+                  </a:txBody>
+                  <a:tcPr/>
+                </a:tc>
+                <a:tc>
+                  <a:txBody>
+                    <a:bodyPr/>
+                    <a:lstStyle/>
+                    <a:p>
+                      <a:r>
+                        <a:rPr lang="en-GB" dirty="0" smtClean="0"/>
+                        <a:t>(x, y)</a:t>
+                      </a:r>
+                      <a:endParaRPr lang="en-GB" dirty="0"/>
+                    </a:p>
+                  </a:txBody>
+                  <a:tcPr/>
+                </a:tc>
+              </a:tr>
+              <a:tr h="370840">
+                <a:tc>
+                  <a:txBody>
+                    <a:bodyPr/>
+                    <a:lstStyle/>
+                    <a:p>
+                      <a:r>
+                        <a:rPr lang="en-GB" dirty="0" smtClean="0"/>
+                        <a:t>Rectangle, Rectangle2D</a:t>
+                      </a:r>
+                      <a:endParaRPr lang="en-GB" dirty="0"/>
+                    </a:p>
+                  </a:txBody>
+                  <a:tcPr/>
+                </a:tc>
+                <a:tc>
+                  <a:txBody>
+                    <a:bodyPr/>
+                    <a:lstStyle/>
+                    <a:p>
+                      <a:r>
+                        <a:rPr lang="en-GB" dirty="0" err="1" smtClean="0"/>
+                        <a:t>int</a:t>
+                      </a:r>
+                      <a:r>
+                        <a:rPr lang="en-GB" dirty="0" smtClean="0"/>
+                        <a:t>[4], float[4]</a:t>
+                      </a:r>
+                      <a:endParaRPr lang="en-GB" dirty="0"/>
+                    </a:p>
+                  </a:txBody>
+                  <a:tcPr/>
+                </a:tc>
+                <a:tc>
+                  <a:txBody>
+                    <a:bodyPr/>
+                    <a:lstStyle/>
+                    <a:p>
+                      <a:r>
+                        <a:rPr lang="en-GB" dirty="0" smtClean="0"/>
+                        <a:t>(x, y, w, h)</a:t>
+                      </a:r>
+                      <a:endParaRPr lang="en-GB" dirty="0"/>
+                    </a:p>
+                  </a:txBody>
+                  <a:tcPr/>
+                </a:tc>
+              </a:tr>
+            </a:tbl>
+          </a:graphicData>
+        </a:graphic>
+      </p:graphicFrame>
     </p:spTree>
     <p:extLst>
       <p:ext uri="{BB962C8B-B14F-4D97-AF65-F5344CB8AC3E}">
-        <p14:creationId xmlns:p14="http://schemas.microsoft.com/office/powerpoint/2010/main" val="1310829027"/>
+        <p14:creationId xmlns:p14="http://schemas.microsoft.com/office/powerpoint/2010/main" val="514377977"/>
       </p:ext>
     </p:extLst>
   </p:cSld>
@@ -4838,6 +5390,339 @@
           <a:p>
             <a:r>
               <a:rPr lang="en-GB" dirty="0" smtClean="0"/>
+              <a:t>Multithreading</a:t>
+            </a:r>
+            <a:endParaRPr lang="en-GB" dirty="0"/>
+          </a:p>
+        </p:txBody>
+      </p:sp>
+      <p:sp>
+        <p:nvSpPr>
+          <p:cNvPr id="3" name="Inhaltsplatzhalter 2"/>
+          <p:cNvSpPr>
+            <a:spLocks noGrp="1"/>
+          </p:cNvSpPr>
+          <p:nvPr>
+            <p:ph idx="1"/>
+          </p:nvPr>
+        </p:nvSpPr>
+        <p:spPr/>
+        <p:txBody>
+          <a:bodyPr>
+            <a:normAutofit lnSpcReduction="10000"/>
+          </a:bodyPr>
+          <a:lstStyle/>
+          <a:p>
+            <a:r>
+              <a:rPr lang="en-GB" dirty="0" smtClean="0"/>
+              <a:t>If BEAM Java calls into Python from multiple Java threads for executing e.g. a tile computation, we can consider</a:t>
+            </a:r>
+          </a:p>
+          <a:p>
+            <a:pPr lvl="1"/>
+            <a:r>
+              <a:rPr lang="en-GB" dirty="0" err="1" smtClean="0"/>
+              <a:t>PyThreadState</a:t>
+            </a:r>
+            <a:r>
+              <a:rPr lang="en-GB" dirty="0" smtClean="0"/>
+              <a:t>* </a:t>
+            </a:r>
+            <a:r>
+              <a:rPr lang="en-GB" dirty="0" err="1" smtClean="0"/>
+              <a:t>tstate</a:t>
+            </a:r>
+            <a:r>
+              <a:rPr lang="en-GB" dirty="0" smtClean="0"/>
+              <a:t>;</a:t>
+            </a:r>
+          </a:p>
+          <a:p>
+            <a:pPr lvl="1"/>
+            <a:r>
+              <a:rPr lang="en-GB" dirty="0" err="1" smtClean="0"/>
+              <a:t>tstate</a:t>
+            </a:r>
+            <a:r>
+              <a:rPr lang="en-GB" dirty="0" smtClean="0"/>
+              <a:t> = </a:t>
+            </a:r>
+            <a:r>
+              <a:rPr lang="en-GB" dirty="0" err="1"/>
+              <a:t>Py_NewInterpreter</a:t>
+            </a:r>
+            <a:r>
+              <a:rPr lang="en-GB" dirty="0" smtClean="0"/>
+              <a:t>();</a:t>
+            </a:r>
+          </a:p>
+          <a:p>
+            <a:pPr lvl="1"/>
+            <a:r>
+              <a:rPr lang="en-GB" dirty="0" smtClean="0"/>
+              <a:t>…</a:t>
+            </a:r>
+            <a:r>
+              <a:rPr lang="en-GB" i="1" dirty="0" smtClean="0"/>
+              <a:t> call into python code</a:t>
+            </a:r>
+          </a:p>
+          <a:p>
+            <a:pPr lvl="1"/>
+            <a:r>
+              <a:rPr lang="en-GB" dirty="0" err="1" smtClean="0"/>
+              <a:t>Py_EndInterpreter</a:t>
+            </a:r>
+            <a:r>
+              <a:rPr lang="en-GB" dirty="0" smtClean="0"/>
+              <a:t>(</a:t>
+            </a:r>
+            <a:r>
+              <a:rPr lang="en-GB" dirty="0" err="1" smtClean="0"/>
+              <a:t>tstate</a:t>
+            </a:r>
+            <a:r>
+              <a:rPr lang="en-GB" dirty="0" smtClean="0"/>
+              <a:t>);  </a:t>
+            </a:r>
+          </a:p>
+          <a:p>
+            <a:pPr marL="342900" lvl="1" indent="-342900">
+              <a:buFont typeface="Arial" pitchFamily="34" charset="0"/>
+              <a:buChar char="•"/>
+            </a:pPr>
+            <a:r>
+              <a:rPr lang="en-GB" dirty="0"/>
+              <a:t>See </a:t>
+            </a:r>
+            <a:r>
+              <a:rPr lang="en-GB" dirty="0" smtClean="0"/>
+              <a:t>“Initialization</a:t>
+            </a:r>
+            <a:r>
+              <a:rPr lang="en-GB" dirty="0"/>
+              <a:t>, Finalization, and </a:t>
+            </a:r>
+            <a:r>
+              <a:rPr lang="en-GB" dirty="0" smtClean="0"/>
+              <a:t>Threads” </a:t>
+            </a:r>
+            <a:r>
+              <a:rPr lang="en-GB" dirty="0"/>
+              <a:t>in Python/C API Reference Manual</a:t>
+            </a:r>
+          </a:p>
+          <a:p>
+            <a:pPr marL="0" indent="0">
+              <a:buNone/>
+            </a:pPr>
+            <a:endParaRPr lang="en-GB" dirty="0"/>
+          </a:p>
+        </p:txBody>
+      </p:sp>
+    </p:spTree>
+    <p:extLst>
+      <p:ext uri="{BB962C8B-B14F-4D97-AF65-F5344CB8AC3E}">
+        <p14:creationId xmlns:p14="http://schemas.microsoft.com/office/powerpoint/2010/main" val="183588086"/>
+      </p:ext>
+    </p:extLst>
+  </p:cSld>
+  <p:clrMapOvr>
+    <a:masterClrMapping/>
+  </p:clrMapOvr>
+  <p:timing>
+    <p:tnLst>
+      <p:par>
+        <p:cTn id="1" dur="indefinite" restart="never" nodeType="tmRoot"/>
+      </p:par>
+    </p:tnLst>
+  </p:timing>
+</p:sld>
+</file>
+
+<file path=ppt/slides/slide17.xml><?xml version="1.0" encoding="utf-8"?>
+<p:sld xmlns:a="http://schemas.openxmlformats.org/drawingml/2006/main" xmlns:r="http://schemas.openxmlformats.org/officeDocument/2006/relationships" xmlns:p="http://schemas.openxmlformats.org/presentationml/2006/main">
+  <p:cSld>
+    <p:spTree>
+      <p:nvGrpSpPr>
+        <p:cNvPr id="1" name=""/>
+        <p:cNvGrpSpPr/>
+        <p:nvPr/>
+      </p:nvGrpSpPr>
+      <p:grpSpPr>
+        <a:xfrm>
+          <a:off x="0" y="0"/>
+          <a:ext cx="0" cy="0"/>
+          <a:chOff x="0" y="0"/>
+          <a:chExt cx="0" cy="0"/>
+        </a:xfrm>
+      </p:grpSpPr>
+      <p:sp>
+        <p:nvSpPr>
+          <p:cNvPr id="2" name="Titel 1"/>
+          <p:cNvSpPr>
+            <a:spLocks noGrp="1"/>
+          </p:cNvSpPr>
+          <p:nvPr>
+            <p:ph type="title"/>
+          </p:nvPr>
+        </p:nvSpPr>
+        <p:spPr/>
+        <p:txBody>
+          <a:bodyPr/>
+          <a:lstStyle/>
+          <a:p>
+            <a:r>
+              <a:rPr lang="en-GB" dirty="0" smtClean="0"/>
+              <a:t>Alternatives (1/2)</a:t>
+            </a:r>
+            <a:endParaRPr lang="en-GB" dirty="0"/>
+          </a:p>
+        </p:txBody>
+      </p:sp>
+      <p:sp>
+        <p:nvSpPr>
+          <p:cNvPr id="3" name="Inhaltsplatzhalter 2"/>
+          <p:cNvSpPr>
+            <a:spLocks noGrp="1"/>
+          </p:cNvSpPr>
+          <p:nvPr>
+            <p:ph idx="1"/>
+          </p:nvPr>
+        </p:nvSpPr>
+        <p:spPr/>
+        <p:txBody>
+          <a:bodyPr/>
+          <a:lstStyle/>
+          <a:p>
+            <a:r>
+              <a:rPr lang="en-GB" b="1" dirty="0" err="1"/>
+              <a:t>Jep</a:t>
+            </a:r>
+            <a:r>
+              <a:rPr lang="en-GB" dirty="0"/>
+              <a:t> - Java Embedded Python</a:t>
+            </a:r>
+          </a:p>
+          <a:p>
+            <a:pPr lvl="1"/>
+            <a:r>
+              <a:rPr lang="en-GB" dirty="0" err="1"/>
+              <a:t>Jep</a:t>
+            </a:r>
+            <a:r>
+              <a:rPr lang="en-GB" dirty="0"/>
+              <a:t> embeds </a:t>
+            </a:r>
+            <a:r>
+              <a:rPr lang="en-GB" dirty="0" err="1"/>
+              <a:t>CPython</a:t>
+            </a:r>
+            <a:r>
+              <a:rPr lang="en-GB" dirty="0"/>
+              <a:t> in Java. It is safe to use in a heavily threaded environment, it is quite fast and its stability is a main feature and goal.</a:t>
+            </a:r>
+          </a:p>
+          <a:p>
+            <a:pPr lvl="1"/>
+            <a:r>
+              <a:rPr lang="en-GB" dirty="0" smtClean="0">
+                <a:hlinkClick r:id="rId2"/>
+              </a:rPr>
+              <a:t>https</a:t>
+            </a:r>
+            <a:r>
+              <a:rPr lang="en-GB" dirty="0">
+                <a:hlinkClick r:id="rId2"/>
+              </a:rPr>
+              <a:t>://</a:t>
+            </a:r>
+            <a:r>
+              <a:rPr lang="en-GB" dirty="0" smtClean="0">
+                <a:hlinkClick r:id="rId2"/>
+              </a:rPr>
+              <a:t>github.com/mrj0/jep</a:t>
+            </a:r>
+            <a:endParaRPr lang="en-GB" dirty="0" smtClean="0"/>
+          </a:p>
+          <a:p>
+            <a:pPr lvl="1"/>
+            <a:r>
+              <a:rPr lang="en-GB" dirty="0" smtClean="0"/>
+              <a:t>Check: can it be used to call Python from Java</a:t>
+            </a:r>
+          </a:p>
+          <a:p>
+            <a:pPr lvl="1"/>
+            <a:r>
+              <a:rPr lang="en-GB" dirty="0" smtClean="0"/>
+              <a:t>Check: No windows support</a:t>
+            </a:r>
+          </a:p>
+          <a:p>
+            <a:pPr lvl="1"/>
+            <a:r>
+              <a:rPr lang="en-GB" dirty="0" smtClean="0"/>
+              <a:t>Check: last activity 9 months ago</a:t>
+            </a:r>
+            <a:endParaRPr lang="en-GB" dirty="0"/>
+          </a:p>
+        </p:txBody>
+      </p:sp>
+    </p:spTree>
+    <p:extLst>
+      <p:ext uri="{BB962C8B-B14F-4D97-AF65-F5344CB8AC3E}">
+        <p14:creationId xmlns:p14="http://schemas.microsoft.com/office/powerpoint/2010/main" val="1310829027"/>
+      </p:ext>
+    </p:extLst>
+  </p:cSld>
+  <p:clrMapOvr>
+    <a:masterClrMapping/>
+  </p:clrMapOvr>
+  <p:timing>
+    <p:tnLst>
+      <p:par>
+        <p:cTn id="1" dur="indefinite" restart="never" nodeType="tmRoot"/>
+      </p:par>
+    </p:tnLst>
+  </p:timing>
+</p:sld>
+</file>
+
+<file path=ppt/slides/slide18.xml><?xml version="1.0" encoding="utf-8"?>
+<p:sld xmlns:a="http://schemas.openxmlformats.org/drawingml/2006/main" xmlns:r="http://schemas.openxmlformats.org/officeDocument/2006/relationships" xmlns:p="http://schemas.openxmlformats.org/presentationml/2006/main">
+  <p:cSld>
+    <p:spTree>
+      <p:nvGrpSpPr>
+        <p:cNvPr id="1" name=""/>
+        <p:cNvGrpSpPr/>
+        <p:nvPr/>
+      </p:nvGrpSpPr>
+      <p:grpSpPr>
+        <a:xfrm>
+          <a:off x="0" y="0"/>
+          <a:ext cx="0" cy="0"/>
+          <a:chOff x="0" y="0"/>
+          <a:chExt cx="0" cy="0"/>
+        </a:xfrm>
+      </p:grpSpPr>
+      <p:sp>
+        <p:nvSpPr>
+          <p:cNvPr id="2" name="Titel 1"/>
+          <p:cNvSpPr>
+            <a:spLocks noGrp="1"/>
+          </p:cNvSpPr>
+          <p:nvPr>
+            <p:ph type="title"/>
+          </p:nvPr>
+        </p:nvSpPr>
+        <p:spPr/>
+        <p:txBody>
+          <a:bodyPr/>
+          <a:lstStyle/>
+          <a:p>
+            <a:r>
+              <a:rPr lang="en-GB" dirty="0" smtClean="0"/>
               <a:t>Alternatives (2/2)</a:t>
             </a:r>
             <a:endParaRPr lang="en-GB" dirty="0"/>
@@ -4998,7 +5883,7 @@
 </p:sld>
 </file>
 
-<file path=ppt/slides/slide17.xml><?xml version="1.0" encoding="utf-8"?>
+<file path=ppt/slides/slide19.xml><?xml version="1.0" encoding="utf-8"?>
 <p:sld xmlns:a="http://schemas.openxmlformats.org/drawingml/2006/main" xmlns:r="http://schemas.openxmlformats.org/officeDocument/2006/relationships" xmlns:p="http://schemas.openxmlformats.org/presentationml/2006/main">
   <p:cSld>
     <p:spTree>
@@ -12834,12 +13719,42 @@
         </p:nvSpPr>
         <p:spPr/>
         <p:txBody>
-          <a:bodyPr/>
+          <a:bodyPr>
+            <a:normAutofit fontScale="90000"/>
+          </a:bodyPr>
           <a:lstStyle/>
           <a:p>
             <a:r>
-              <a:rPr lang="en-GB" dirty="0" smtClean="0"/>
-              <a:t>Generate C and Python Code</a:t>
+              <a:rPr lang="en-GB" dirty="0" err="1"/>
+              <a:t>PyObject</a:t>
+            </a:r>
+            <a:r>
+              <a:rPr lang="en-GB" dirty="0"/>
+              <a:t>* F(</a:t>
+            </a:r>
+            <a:r>
+              <a:rPr lang="en-GB" dirty="0" err="1"/>
+              <a:t>PyObject</a:t>
+            </a:r>
+            <a:r>
+              <a:rPr lang="en-GB" dirty="0"/>
+              <a:t>* self, </a:t>
+            </a:r>
+            <a:r>
+              <a:rPr lang="en-GB" dirty="0" err="1"/>
+              <a:t>PyObject</a:t>
+            </a:r>
+            <a:r>
+              <a:rPr lang="en-GB" dirty="0"/>
+              <a:t> * </a:t>
+            </a:r>
+            <a:r>
+              <a:rPr lang="en-GB" dirty="0" err="1"/>
+              <a:t>args</a:t>
+            </a:r>
+            <a:r>
+              <a:rPr lang="en-GB" dirty="0" smtClean="0"/>
+              <a:t>)</a:t>
             </a:r>
             <a:endParaRPr lang="en-GB" dirty="0"/>
           </a:p>
@@ -12858,82 +13773,242 @@
         <p:spPr/>
         <p:txBody>
           <a:bodyPr>
-            <a:normAutofit fontScale="85000" lnSpcReduction="20000"/>
+            <a:normAutofit fontScale="62500" lnSpcReduction="20000"/>
           </a:bodyPr>
           <a:lstStyle/>
           <a:p>
-            <a:r>
-              <a:rPr lang="en-GB" dirty="0" smtClean="0"/>
-              <a:t>Create a compiler that generates the C and Python glue code</a:t>
-            </a:r>
-          </a:p>
-          <a:p>
-            <a:r>
-              <a:rPr lang="en-GB" dirty="0" smtClean="0"/>
-              <a:t>Pro</a:t>
-            </a:r>
-          </a:p>
-          <a:p>
-            <a:pPr lvl="1"/>
-            <a:r>
-              <a:rPr lang="en-GB" dirty="0" smtClean="0"/>
-              <a:t>Java API changes easily translate into Python/C code</a:t>
-            </a:r>
-          </a:p>
-          <a:p>
-            <a:pPr lvl="1"/>
-            <a:r>
-              <a:rPr lang="en-GB" dirty="0" smtClean="0"/>
-              <a:t>Also documentation can be generated from Java sources </a:t>
-            </a:r>
-          </a:p>
-          <a:p>
-            <a:pPr lvl="1"/>
-            <a:r>
-              <a:rPr lang="en-GB" dirty="0" smtClean="0"/>
-              <a:t>Code production can be automated</a:t>
-            </a:r>
-          </a:p>
-          <a:p>
-            <a:pPr lvl="1"/>
-            <a:r>
-              <a:rPr lang="en-GB" dirty="0" smtClean="0"/>
-              <a:t>Bugs are fixed in the compiler code, not in glue code</a:t>
-            </a:r>
-          </a:p>
-          <a:p>
-            <a:pPr lvl="1"/>
-            <a:r>
-              <a:rPr lang="en-GB" dirty="0" smtClean="0"/>
-              <a:t>Also test code might be generated</a:t>
-            </a:r>
-          </a:p>
-          <a:p>
-            <a:r>
-              <a:rPr lang="en-GB" dirty="0" smtClean="0"/>
-              <a:t>Contra</a:t>
-            </a:r>
-          </a:p>
-          <a:p>
-            <a:pPr lvl="1"/>
-            <a:r>
-              <a:rPr lang="en-GB" dirty="0" smtClean="0"/>
-              <a:t>It might take a long time to develop a mature compiler</a:t>
-            </a:r>
-          </a:p>
-          <a:p>
-            <a:pPr lvl="1"/>
-            <a:r>
-              <a:rPr lang="en-GB" dirty="0" smtClean="0"/>
-              <a:t>There might be a number of exceptions from rules</a:t>
-            </a:r>
+            <a:pPr marL="514350" indent="-514350">
+              <a:buFont typeface="+mj-lt"/>
+              <a:buAutoNum type="arabicPeriod"/>
+            </a:pPr>
+            <a:r>
+              <a:rPr lang="en-GB" dirty="0" smtClean="0"/>
+              <a:t>declare local variables:</a:t>
+            </a:r>
+          </a:p>
+          <a:p>
+            <a:pPr marL="914400" lvl="1" indent="-514350">
+              <a:buFont typeface="+mj-lt"/>
+              <a:buAutoNum type="arabicPeriod"/>
+            </a:pPr>
+            <a:r>
+              <a:rPr lang="en-GB" dirty="0" smtClean="0"/>
+              <a:t>declare python </a:t>
+            </a:r>
+            <a:r>
+              <a:rPr lang="en-GB" dirty="0" err="1" smtClean="0"/>
+              <a:t>args</a:t>
+            </a:r>
+            <a:r>
+              <a:rPr lang="en-GB" dirty="0" smtClean="0"/>
+              <a:t> </a:t>
+            </a:r>
+          </a:p>
+          <a:p>
+            <a:pPr marL="914400" lvl="1" indent="-514350">
+              <a:buFont typeface="+mj-lt"/>
+              <a:buAutoNum type="arabicPeriod"/>
+            </a:pPr>
+            <a:r>
+              <a:rPr lang="en-GB" dirty="0"/>
+              <a:t>declare python return value</a:t>
+            </a:r>
+          </a:p>
+          <a:p>
+            <a:pPr marL="914400" lvl="1" indent="-514350">
+              <a:buFont typeface="+mj-lt"/>
+              <a:buAutoNum type="arabicPeriod"/>
+            </a:pPr>
+            <a:r>
+              <a:rPr lang="en-GB" dirty="0" smtClean="0"/>
+              <a:t>declare java self</a:t>
+            </a:r>
+          </a:p>
+          <a:p>
+            <a:pPr marL="914400" lvl="1" indent="-514350">
+              <a:buFont typeface="+mj-lt"/>
+              <a:buAutoNum type="arabicPeriod"/>
+            </a:pPr>
+            <a:r>
+              <a:rPr lang="en-GB" dirty="0" smtClean="0"/>
+              <a:t>declare java </a:t>
+            </a:r>
+            <a:r>
+              <a:rPr lang="en-GB" dirty="0" err="1" smtClean="0"/>
+              <a:t>args</a:t>
+            </a:r>
+            <a:endParaRPr lang="en-GB" dirty="0" smtClean="0"/>
+          </a:p>
+          <a:p>
+            <a:pPr marL="914400" lvl="1" indent="-514350">
+              <a:buFont typeface="+mj-lt"/>
+              <a:buAutoNum type="arabicPeriod"/>
+            </a:pPr>
+            <a:r>
+              <a:rPr lang="en-GB" dirty="0" smtClean="0"/>
+              <a:t>declare java return value</a:t>
+            </a:r>
+          </a:p>
+          <a:p>
+            <a:pPr marL="514350" indent="-514350">
+              <a:buFont typeface="+mj-lt"/>
+              <a:buAutoNum type="arabicPeriod"/>
+            </a:pPr>
+            <a:r>
+              <a:rPr lang="en-GB" dirty="0" smtClean="0"/>
+              <a:t>parse python </a:t>
+            </a:r>
+            <a:r>
+              <a:rPr lang="en-GB" dirty="0" err="1" smtClean="0"/>
+              <a:t>args</a:t>
+            </a:r>
+            <a:endParaRPr lang="en-GB" dirty="0" smtClean="0"/>
+          </a:p>
+          <a:p>
+            <a:pPr marL="514350" indent="-514350">
+              <a:buFont typeface="+mj-lt"/>
+              <a:buAutoNum type="arabicPeriod"/>
+            </a:pPr>
+            <a:r>
+              <a:rPr lang="en-GB" dirty="0"/>
+              <a:t>transform python </a:t>
+            </a:r>
+            <a:r>
+              <a:rPr lang="en-GB" dirty="0" err="1"/>
+              <a:t>args</a:t>
+            </a:r>
+            <a:r>
+              <a:rPr lang="en-GB" dirty="0"/>
+              <a:t> to java </a:t>
+            </a:r>
+            <a:r>
+              <a:rPr lang="en-GB" dirty="0" err="1"/>
+              <a:t>args</a:t>
+            </a:r>
+            <a:endParaRPr lang="en-GB" dirty="0"/>
+          </a:p>
+          <a:p>
+            <a:pPr marL="514350" indent="-514350">
+              <a:buFont typeface="+mj-lt"/>
+              <a:buAutoNum type="arabicPeriod"/>
+            </a:pPr>
+            <a:r>
+              <a:rPr lang="en-GB" dirty="0" smtClean="0"/>
+              <a:t>transform </a:t>
+            </a:r>
+            <a:r>
+              <a:rPr lang="en-GB" dirty="0"/>
+              <a:t>python self to java self</a:t>
+            </a:r>
+          </a:p>
+          <a:p>
+            <a:pPr marL="514350" indent="-514350">
+              <a:buFont typeface="+mj-lt"/>
+              <a:buAutoNum type="arabicPeriod"/>
+            </a:pPr>
+            <a:r>
+              <a:rPr lang="en-GB" dirty="0" smtClean="0"/>
+              <a:t>java return value = java self </a:t>
+            </a:r>
+            <a:r>
+              <a:rPr lang="en-GB" dirty="0" smtClean="0">
+                <a:sym typeface="Wingdings" pitchFamily="2" charset="2"/>
+              </a:rPr>
+              <a:t> </a:t>
+            </a:r>
+            <a:r>
+              <a:rPr lang="en-GB" dirty="0" err="1" smtClean="0"/>
+              <a:t>F</a:t>
+            </a:r>
+            <a:r>
+              <a:rPr lang="en-GB" sz="2600" baseline="-25000" dirty="0" err="1" smtClean="0"/>
+              <a:t>Java</a:t>
+            </a:r>
+            <a:r>
+              <a:rPr lang="en-GB" dirty="0" smtClean="0"/>
+              <a:t>(java </a:t>
+            </a:r>
+            <a:r>
+              <a:rPr lang="en-GB" dirty="0" err="1" smtClean="0"/>
+              <a:t>args</a:t>
+            </a:r>
+            <a:r>
+              <a:rPr lang="en-GB" dirty="0" smtClean="0"/>
+              <a:t>)</a:t>
+            </a:r>
+          </a:p>
+          <a:p>
+            <a:pPr marL="514350" indent="-514350">
+              <a:buFont typeface="+mj-lt"/>
+              <a:buAutoNum type="arabicPeriod"/>
+            </a:pPr>
+            <a:r>
+              <a:rPr lang="en-GB" dirty="0" smtClean="0"/>
+              <a:t>transform java return value to python return value</a:t>
+            </a:r>
+          </a:p>
+          <a:p>
+            <a:pPr marL="514350" indent="-514350">
+              <a:buFont typeface="+mj-lt"/>
+              <a:buAutoNum type="arabicPeriod"/>
+            </a:pPr>
+            <a:r>
+              <a:rPr lang="en-GB" dirty="0"/>
+              <a:t>clean-up java </a:t>
+            </a:r>
+            <a:r>
+              <a:rPr lang="en-GB" dirty="0" smtClean="0"/>
+              <a:t>self</a:t>
+            </a:r>
+            <a:endParaRPr lang="en-GB" dirty="0"/>
+          </a:p>
+          <a:p>
+            <a:pPr marL="514350" indent="-514350">
+              <a:buFont typeface="+mj-lt"/>
+              <a:buAutoNum type="arabicPeriod"/>
+            </a:pPr>
+            <a:r>
+              <a:rPr lang="en-GB" dirty="0"/>
+              <a:t>clean-up java </a:t>
+            </a:r>
+            <a:r>
+              <a:rPr lang="en-GB" dirty="0" err="1"/>
+              <a:t>args</a:t>
+            </a:r>
+            <a:endParaRPr lang="en-GB" dirty="0"/>
+          </a:p>
+          <a:p>
+            <a:pPr marL="514350" indent="-514350">
+              <a:buFont typeface="+mj-lt"/>
+              <a:buAutoNum type="arabicPeriod"/>
+            </a:pPr>
+            <a:r>
+              <a:rPr lang="en-GB" dirty="0" smtClean="0"/>
+              <a:t>clean-up java return value</a:t>
+            </a:r>
+          </a:p>
+          <a:p>
+            <a:pPr marL="514350" indent="-514350">
+              <a:buFont typeface="+mj-lt"/>
+              <a:buAutoNum type="arabicPeriod"/>
+            </a:pPr>
+            <a:r>
+              <a:rPr lang="en-GB" dirty="0" smtClean="0"/>
+              <a:t>return python return value</a:t>
+            </a:r>
+          </a:p>
+          <a:p>
+            <a:pPr marL="0" indent="0">
+              <a:buNone/>
+            </a:pPr>
+            <a:endParaRPr lang="en-GB" dirty="0"/>
           </a:p>
         </p:txBody>
       </p:sp>
     </p:spTree>
     <p:extLst>
       <p:ext uri="{BB962C8B-B14F-4D97-AF65-F5344CB8AC3E}">
-        <p14:creationId xmlns:p14="http://schemas.microsoft.com/office/powerpoint/2010/main" val="3643622142"/>
+        <p14:creationId xmlns:p14="http://schemas.microsoft.com/office/powerpoint/2010/main" val="2446221413"/>
       </p:ext>
     </p:extLst>
   </p:cSld>
@@ -12984,7 +14059,7 @@
           <a:p>
             <a:r>
               <a:rPr lang="en-GB" dirty="0" smtClean="0"/>
-              <a:t>Compiler Design Issues</a:t>
+              <a:t>Generate C and Python Code</a:t>
             </a:r>
             <a:endParaRPr lang="en-GB" dirty="0"/>
           </a:p>
@@ -13009,75 +14084,68 @@
           <a:p>
             <a:r>
               <a:rPr lang="en-GB" dirty="0" smtClean="0"/>
-              <a:t>In order to avoid binding of all Java code,</a:t>
+              <a:t>Create a compiler that generates the C and Python glue code</a:t>
+            </a:r>
+          </a:p>
+          <a:p>
+            <a:r>
+              <a:rPr lang="en-GB" dirty="0" smtClean="0"/>
+              <a:t>Pro</a:t>
             </a:r>
           </a:p>
           <a:p>
             <a:pPr lvl="1"/>
             <a:r>
               <a:rPr lang="en-GB" dirty="0" smtClean="0"/>
-              <a:t>define a list of types for which code shall be generated (Product, Band, </a:t>
-            </a:r>
-            <a:r>
-              <a:rPr lang="en-GB" dirty="0" err="1" smtClean="0"/>
-              <a:t>TiePointGrid</a:t>
-            </a:r>
-            <a:r>
-              <a:rPr lang="en-GB" dirty="0" smtClean="0"/>
-              <a:t>, …)</a:t>
+              <a:t>Java API changes easily translate into Python/C code</a:t>
             </a:r>
           </a:p>
           <a:p>
             <a:pPr lvl="1"/>
             <a:r>
-              <a:rPr lang="en-GB" dirty="0"/>
-              <a:t>f</a:t>
-            </a:r>
-            <a:r>
-              <a:rPr lang="en-GB" dirty="0" smtClean="0"/>
-              <a:t>or some types or single methods, we will provide hand-written code (File, String, …)</a:t>
-            </a:r>
-            <a:endParaRPr lang="en-GB" dirty="0"/>
+              <a:rPr lang="en-GB" dirty="0" smtClean="0"/>
+              <a:t>Also documentation can be generated from Java sources </a:t>
+            </a:r>
           </a:p>
           <a:p>
             <a:pPr lvl="1"/>
             <a:r>
               <a:rPr lang="en-GB" dirty="0" smtClean="0"/>
-              <a:t>methods that have types in their signature, that are not in this list, will not be translated</a:t>
-            </a:r>
-          </a:p>
-          <a:p>
-            <a:r>
-              <a:rPr lang="en-GB" dirty="0" smtClean="0"/>
-              <a:t>consider </a:t>
-            </a:r>
-            <a:r>
-              <a:rPr lang="en-GB" dirty="0" err="1" smtClean="0"/>
-              <a:t>javacc</a:t>
-            </a:r>
-            <a:r>
-              <a:rPr lang="en-GB" dirty="0" smtClean="0"/>
-              <a:t> to do the job</a:t>
-            </a:r>
-          </a:p>
-          <a:p>
-            <a:r>
-              <a:rPr lang="en-GB" dirty="0" smtClean="0"/>
-              <a:t>consider Java annotations to control code generation (e.g. parameter annotations @In, @Out, @</a:t>
-            </a:r>
-            <a:r>
-              <a:rPr lang="en-GB" dirty="0" err="1" smtClean="0"/>
-              <a:t>InOut</a:t>
-            </a:r>
-            <a:r>
-              <a:rPr lang="en-GB" dirty="0" smtClean="0"/>
-              <a:t>)</a:t>
-            </a:r>
-          </a:p>
-          <a:p>
-            <a:r>
-              <a:rPr lang="en-GB" dirty="0" smtClean="0"/>
-              <a:t>code generation might be done through patterns, e.g. implemented by velocity templates</a:t>
+              <a:t>Code production can be automated</a:t>
+            </a:r>
+          </a:p>
+          <a:p>
+            <a:pPr lvl="1"/>
+            <a:r>
+              <a:rPr lang="en-GB" dirty="0" smtClean="0"/>
+              <a:t>Bugs are fixed in the compiler code, not in glue code</a:t>
+            </a:r>
+          </a:p>
+          <a:p>
+            <a:pPr lvl="1"/>
+            <a:r>
+              <a:rPr lang="en-GB" dirty="0" smtClean="0"/>
+              <a:t>Also test code might be generated</a:t>
+            </a:r>
+          </a:p>
+          <a:p>
+            <a:r>
+              <a:rPr lang="en-GB" dirty="0" smtClean="0"/>
+              <a:t>Contra</a:t>
+            </a:r>
+          </a:p>
+          <a:p>
+            <a:pPr lvl="1"/>
+            <a:r>
+              <a:rPr lang="en-GB" dirty="0" smtClean="0"/>
+              <a:t>It might take a long time to develop a mature compiler</a:t>
+            </a:r>
+          </a:p>
+          <a:p>
+            <a:pPr lvl="1"/>
+            <a:r>
+              <a:rPr lang="en-GB" dirty="0" smtClean="0"/>
+              <a:t>There might be a number of exceptions from rules</a:t>
             </a:r>
           </a:p>
         </p:txBody>
@@ -13085,7 +14153,7 @@
     </p:spTree>
     <p:extLst>
       <p:ext uri="{BB962C8B-B14F-4D97-AF65-F5344CB8AC3E}">
-        <p14:creationId xmlns:p14="http://schemas.microsoft.com/office/powerpoint/2010/main" val="1053306664"/>
+        <p14:creationId xmlns:p14="http://schemas.microsoft.com/office/powerpoint/2010/main" val="3643622142"/>
       </p:ext>
     </p:extLst>
   </p:cSld>

</xml_diff>

<commit_message>
Need to deal with generics / type variables correctly (not fully done)
</commit_message>
<xml_diff>
--- a/docs/beam-extapi.pptx
+++ b/docs/beam-extapi.pptx
@@ -21068,19 +21068,7 @@
                     <a:p>
                       <a:r>
                         <a:rPr lang="en-GB" dirty="0" smtClean="0"/>
-                        <a:t>(</a:t>
-                      </a:r>
-                      <a:r>
-                        <a:rPr lang="en-GB" err="1" smtClean="0"/>
-                        <a:t>r</a:t>
-                      </a:r>
-                      <a:r>
-                        <a:rPr lang="en-GB" smtClean="0"/>
-                        <a:t>, g</a:t>
-                      </a:r>
-                      <a:r>
-                        <a:rPr lang="en-GB" dirty="0" smtClean="0"/>
-                        <a:t>, b)</a:t>
+                        <a:t>(r, g, b)</a:t>
                       </a:r>
                       <a:endParaRPr lang="en-GB" dirty="0"/>
                     </a:p>

</xml_diff>

<commit_message>
A number of changes (may be too  many): 1. implemented fix for generics: <T> --> Object, <T extends C> --> C 2. about too refactor old code generation scheme, see function generation slides in beam-extapi.doc 3. whether to use deprecated classes/methods is now an option in the config
</commit_message>
<xml_diff>
--- a/docs/beam-extapi.pptx
+++ b/docs/beam-extapi.pptx
@@ -11,13 +11,13 @@
     <p:sldId id="262" r:id="rId5"/>
     <p:sldId id="263" r:id="rId6"/>
     <p:sldId id="257" r:id="rId7"/>
-    <p:sldId id="282" r:id="rId8"/>
-    <p:sldId id="283" r:id="rId9"/>
-    <p:sldId id="259" r:id="rId10"/>
-    <p:sldId id="276" r:id="rId11"/>
-    <p:sldId id="279" r:id="rId12"/>
-    <p:sldId id="281" r:id="rId13"/>
-    <p:sldId id="280" r:id="rId14"/>
+    <p:sldId id="286" r:id="rId8"/>
+    <p:sldId id="259" r:id="rId9"/>
+    <p:sldId id="276" r:id="rId10"/>
+    <p:sldId id="279" r:id="rId11"/>
+    <p:sldId id="281" r:id="rId12"/>
+    <p:sldId id="280" r:id="rId13"/>
+    <p:sldId id="282" r:id="rId14"/>
     <p:sldId id="265" r:id="rId15"/>
     <p:sldId id="267" r:id="rId16"/>
     <p:sldId id="266" r:id="rId17"/>
@@ -127,6 +127,12 @@
     </a:lvl9pPr>
   </p:defaultTextStyle>
 </p:presentation>
+</file>
+
+<file path=ppt/commentAuthors.xml><?xml version="1.0" encoding="utf-8"?>
+<p:cmAuthorLst xmlns:a="http://schemas.openxmlformats.org/drawingml/2006/main" xmlns:r="http://schemas.openxmlformats.org/officeDocument/2006/relationships" xmlns:p="http://schemas.openxmlformats.org/presentationml/2006/main">
+  <p:cmAuthor id="0" name="Norman Fomferra" initials="" lastIdx="0" clrIdx="0"/>
+</p:cmAuthorLst>
 </file>
 
 <file path=ppt/slideLayouts/slideLayout1.xml><?xml version="1.0" encoding="utf-8"?>
@@ -310,7 +316,7 @@
           <a:p>
             <a:fld id="{1BA50D42-C9CD-4801-B293-61D1F53EC57E}" type="datetimeFigureOut">
               <a:rPr lang="de-DE" smtClean="0"/>
-              <a:t>08.05.2013</a:t>
+              <a:t>07.06.2013</a:t>
             </a:fld>
             <a:endParaRPr lang="de-DE"/>
           </a:p>
@@ -475,7 +481,7 @@
           <a:p>
             <a:fld id="{1BA50D42-C9CD-4801-B293-61D1F53EC57E}" type="datetimeFigureOut">
               <a:rPr lang="de-DE" smtClean="0"/>
-              <a:t>08.05.2013</a:t>
+              <a:t>07.06.2013</a:t>
             </a:fld>
             <a:endParaRPr lang="de-DE"/>
           </a:p>
@@ -650,7 +656,7 @@
           <a:p>
             <a:fld id="{1BA50D42-C9CD-4801-B293-61D1F53EC57E}" type="datetimeFigureOut">
               <a:rPr lang="de-DE" smtClean="0"/>
-              <a:t>08.05.2013</a:t>
+              <a:t>07.06.2013</a:t>
             </a:fld>
             <a:endParaRPr lang="de-DE"/>
           </a:p>
@@ -815,7 +821,7 @@
           <a:p>
             <a:fld id="{1BA50D42-C9CD-4801-B293-61D1F53EC57E}" type="datetimeFigureOut">
               <a:rPr lang="de-DE" smtClean="0"/>
-              <a:t>08.05.2013</a:t>
+              <a:t>07.06.2013</a:t>
             </a:fld>
             <a:endParaRPr lang="de-DE"/>
           </a:p>
@@ -1056,7 +1062,7 @@
           <a:p>
             <a:fld id="{1BA50D42-C9CD-4801-B293-61D1F53EC57E}" type="datetimeFigureOut">
               <a:rPr lang="de-DE" smtClean="0"/>
-              <a:t>08.05.2013</a:t>
+              <a:t>07.06.2013</a:t>
             </a:fld>
             <a:endParaRPr lang="de-DE"/>
           </a:p>
@@ -1339,7 +1345,7 @@
           <a:p>
             <a:fld id="{1BA50D42-C9CD-4801-B293-61D1F53EC57E}" type="datetimeFigureOut">
               <a:rPr lang="de-DE" smtClean="0"/>
-              <a:t>08.05.2013</a:t>
+              <a:t>07.06.2013</a:t>
             </a:fld>
             <a:endParaRPr lang="de-DE"/>
           </a:p>
@@ -1756,7 +1762,7 @@
           <a:p>
             <a:fld id="{1BA50D42-C9CD-4801-B293-61D1F53EC57E}" type="datetimeFigureOut">
               <a:rPr lang="de-DE" smtClean="0"/>
-              <a:t>08.05.2013</a:t>
+              <a:t>07.06.2013</a:t>
             </a:fld>
             <a:endParaRPr lang="de-DE"/>
           </a:p>
@@ -1869,7 +1875,7 @@
           <a:p>
             <a:fld id="{1BA50D42-C9CD-4801-B293-61D1F53EC57E}" type="datetimeFigureOut">
               <a:rPr lang="de-DE" smtClean="0"/>
-              <a:t>08.05.2013</a:t>
+              <a:t>07.06.2013</a:t>
             </a:fld>
             <a:endParaRPr lang="de-DE"/>
           </a:p>
@@ -1959,7 +1965,7 @@
           <a:p>
             <a:fld id="{1BA50D42-C9CD-4801-B293-61D1F53EC57E}" type="datetimeFigureOut">
               <a:rPr lang="de-DE" smtClean="0"/>
-              <a:t>08.05.2013</a:t>
+              <a:t>07.06.2013</a:t>
             </a:fld>
             <a:endParaRPr lang="de-DE"/>
           </a:p>
@@ -2231,7 +2237,7 @@
           <a:p>
             <a:fld id="{1BA50D42-C9CD-4801-B293-61D1F53EC57E}" type="datetimeFigureOut">
               <a:rPr lang="de-DE" smtClean="0"/>
-              <a:t>08.05.2013</a:t>
+              <a:t>07.06.2013</a:t>
             </a:fld>
             <a:endParaRPr lang="de-DE"/>
           </a:p>
@@ -2479,7 +2485,7 @@
           <a:p>
             <a:fld id="{1BA50D42-C9CD-4801-B293-61D1F53EC57E}" type="datetimeFigureOut">
               <a:rPr lang="de-DE" smtClean="0"/>
-              <a:t>08.05.2013</a:t>
+              <a:t>07.06.2013</a:t>
             </a:fld>
             <a:endParaRPr lang="de-DE"/>
           </a:p>
@@ -2687,7 +2693,7 @@
           <a:p>
             <a:fld id="{1BA50D42-C9CD-4801-B293-61D1F53EC57E}" type="datetimeFigureOut">
               <a:rPr lang="de-DE" smtClean="0"/>
-              <a:t>08.05.2013</a:t>
+              <a:t>07.06.2013</a:t>
             </a:fld>
             <a:endParaRPr lang="de-DE"/>
           </a:p>
@@ -3152,733 +3158,6 @@
         </p:nvSpPr>
         <p:spPr/>
         <p:txBody>
-          <a:bodyPr/>
-          <a:lstStyle/>
-          <a:p>
-            <a:r>
-              <a:rPr lang="en-GB" dirty="0" smtClean="0"/>
-              <a:t>Data Type Mappings</a:t>
-            </a:r>
-            <a:endParaRPr lang="en-GB" dirty="0"/>
-          </a:p>
-        </p:txBody>
-      </p:sp>
-      <p:graphicFrame>
-        <p:nvGraphicFramePr>
-          <p:cNvPr id="4" name="Inhaltsplatzhalter 3"/>
-          <p:cNvGraphicFramePr>
-            <a:graphicFrameLocks noGrp="1"/>
-          </p:cNvGraphicFramePr>
-          <p:nvPr>
-            <p:ph idx="1"/>
-            <p:extLst>
-              <p:ext uri="{D42A27DB-BD31-4B8C-83A1-F6EECF244321}">
-                <p14:modId xmlns:p14="http://schemas.microsoft.com/office/powerpoint/2010/main" val="2904863150"/>
-              </p:ext>
-            </p:extLst>
-          </p:nvPr>
-        </p:nvGraphicFramePr>
-        <p:xfrm>
-          <a:off x="457200" y="1600200"/>
-          <a:ext cx="8229600" cy="4719320"/>
-        </p:xfrm>
-        <a:graphic>
-          <a:graphicData uri="http://schemas.openxmlformats.org/drawingml/2006/table">
-            <a:tbl>
-              <a:tblPr firstRow="1" bandRow="1">
-                <a:tableStyleId>{5C22544A-7EE6-4342-B048-85BDC9FD1C3A}</a:tableStyleId>
-              </a:tblPr>
-              <a:tblGrid>
-                <a:gridCol w="2743200"/>
-                <a:gridCol w="2743200"/>
-                <a:gridCol w="2743200"/>
-              </a:tblGrid>
-              <a:tr h="370840">
-                <a:tc>
-                  <a:txBody>
-                    <a:bodyPr/>
-                    <a:lstStyle/>
-                    <a:p>
-                      <a:r>
-                        <a:rPr lang="en-GB" dirty="0" smtClean="0"/>
-                        <a:t>Java</a:t>
-                      </a:r>
-                      <a:endParaRPr lang="en-GB" dirty="0"/>
-                    </a:p>
-                  </a:txBody>
-                  <a:tcPr/>
-                </a:tc>
-                <a:tc>
-                  <a:txBody>
-                    <a:bodyPr/>
-                    <a:lstStyle/>
-                    <a:p>
-                      <a:r>
-                        <a:rPr lang="en-GB" dirty="0" smtClean="0"/>
-                        <a:t>C</a:t>
-                      </a:r>
-                      <a:endParaRPr lang="en-GB" dirty="0"/>
-                    </a:p>
-                  </a:txBody>
-                  <a:tcPr/>
-                </a:tc>
-                <a:tc>
-                  <a:txBody>
-                    <a:bodyPr/>
-                    <a:lstStyle/>
-                    <a:p>
-                      <a:r>
-                        <a:rPr lang="en-GB" dirty="0" smtClean="0"/>
-                        <a:t>Python</a:t>
-                      </a:r>
-                      <a:endParaRPr lang="en-GB" dirty="0"/>
-                    </a:p>
-                  </a:txBody>
-                  <a:tcPr/>
-                </a:tc>
-              </a:tr>
-              <a:tr h="370840">
-                <a:tc>
-                  <a:txBody>
-                    <a:bodyPr/>
-                    <a:lstStyle/>
-                    <a:p>
-                      <a:r>
-                        <a:rPr lang="en-GB" dirty="0" smtClean="0"/>
-                        <a:t>Object</a:t>
-                      </a:r>
-                      <a:endParaRPr lang="en-GB" dirty="0"/>
-                    </a:p>
-                  </a:txBody>
-                  <a:tcPr/>
-                </a:tc>
-                <a:tc>
-                  <a:txBody>
-                    <a:bodyPr/>
-                    <a:lstStyle/>
-                    <a:p>
-                      <a:pPr marL="0" marR="0" indent="0" algn="l" defTabSz="914400" rtl="0" eaLnBrk="1" fontAlgn="auto" latinLnBrk="0" hangingPunct="1">
-                        <a:lnSpc>
-                          <a:spcPct val="100000"/>
-                        </a:lnSpc>
-                        <a:spcBef>
-                          <a:spcPts val="0"/>
-                        </a:spcBef>
-                        <a:spcAft>
-                          <a:spcPts val="0"/>
-                        </a:spcAft>
-                        <a:buClrTx/>
-                        <a:buSzTx/>
-                        <a:buFontTx/>
-                        <a:buNone/>
-                        <a:tabLst/>
-                        <a:defRPr/>
-                      </a:pPr>
-                      <a:r>
-                        <a:rPr lang="en-GB" dirty="0" smtClean="0"/>
-                        <a:t>void*</a:t>
-                      </a:r>
-                    </a:p>
-                  </a:txBody>
-                  <a:tcPr/>
-                </a:tc>
-                <a:tc>
-                  <a:txBody>
-                    <a:bodyPr/>
-                    <a:lstStyle/>
-                    <a:p>
-                      <a:r>
-                        <a:rPr lang="en-GB" dirty="0" smtClean="0"/>
-                        <a:t>(&lt;type&gt;, &lt;pointer&gt;)</a:t>
-                      </a:r>
-                      <a:endParaRPr lang="en-GB" dirty="0"/>
-                    </a:p>
-                  </a:txBody>
-                  <a:tcPr/>
-                </a:tc>
-              </a:tr>
-              <a:tr h="370840">
-                <a:tc>
-                  <a:txBody>
-                    <a:bodyPr/>
-                    <a:lstStyle/>
-                    <a:p>
-                      <a:r>
-                        <a:rPr lang="en-GB" dirty="0" smtClean="0"/>
-                        <a:t>Prim. arrays</a:t>
-                      </a:r>
-                      <a:endParaRPr lang="en-GB" dirty="0"/>
-                    </a:p>
-                  </a:txBody>
-                  <a:tcPr/>
-                </a:tc>
-                <a:tc>
-                  <a:txBody>
-                    <a:bodyPr/>
-                    <a:lstStyle/>
-                    <a:p>
-                      <a:pPr marL="0" marR="0" indent="0" algn="l" defTabSz="914400" rtl="0" eaLnBrk="1" fontAlgn="auto" latinLnBrk="0" hangingPunct="1">
-                        <a:lnSpc>
-                          <a:spcPct val="100000"/>
-                        </a:lnSpc>
-                        <a:spcBef>
-                          <a:spcPts val="0"/>
-                        </a:spcBef>
-                        <a:spcAft>
-                          <a:spcPts val="0"/>
-                        </a:spcAft>
-                        <a:buClrTx/>
-                        <a:buSzTx/>
-                        <a:buFontTx/>
-                        <a:buNone/>
-                        <a:tabLst/>
-                        <a:defRPr/>
-                      </a:pPr>
-                      <a:r>
-                        <a:rPr lang="en-GB" dirty="0" smtClean="0"/>
-                        <a:t>&lt;type&gt;*, length</a:t>
-                      </a:r>
-                    </a:p>
-                  </a:txBody>
-                  <a:tcPr/>
-                </a:tc>
-                <a:tc>
-                  <a:txBody>
-                    <a:bodyPr/>
-                    <a:lstStyle/>
-                    <a:p>
-                      <a:r>
-                        <a:rPr lang="en-GB" dirty="0" smtClean="0"/>
-                        <a:t>buffer, </a:t>
-                      </a:r>
-                      <a:r>
-                        <a:rPr lang="en-GB" dirty="0" err="1" smtClean="0"/>
-                        <a:t>array.array</a:t>
-                      </a:r>
-                      <a:r>
-                        <a:rPr lang="en-GB" dirty="0" smtClean="0"/>
-                        <a:t>, </a:t>
-                      </a:r>
-                      <a:r>
-                        <a:rPr lang="en-GB" dirty="0" err="1" smtClean="0"/>
-                        <a:t>numpy.array</a:t>
-                      </a:r>
-                      <a:endParaRPr lang="en-GB" dirty="0"/>
-                    </a:p>
-                  </a:txBody>
-                  <a:tcPr/>
-                </a:tc>
-              </a:tr>
-              <a:tr h="370840">
-                <a:tc>
-                  <a:txBody>
-                    <a:bodyPr/>
-                    <a:lstStyle/>
-                    <a:p>
-                      <a:r>
-                        <a:rPr lang="en-GB" dirty="0" smtClean="0"/>
-                        <a:t>String</a:t>
-                      </a:r>
-                      <a:endParaRPr lang="en-GB" dirty="0"/>
-                    </a:p>
-                  </a:txBody>
-                  <a:tcPr/>
-                </a:tc>
-                <a:tc>
-                  <a:txBody>
-                    <a:bodyPr/>
-                    <a:lstStyle/>
-                    <a:p>
-                      <a:r>
-                        <a:rPr lang="en-GB" dirty="0" smtClean="0"/>
-                        <a:t>char* (zero terminated)</a:t>
-                      </a:r>
-                      <a:endParaRPr lang="en-GB" dirty="0"/>
-                    </a:p>
-                  </a:txBody>
-                  <a:tcPr/>
-                </a:tc>
-                <a:tc>
-                  <a:txBody>
-                    <a:bodyPr/>
-                    <a:lstStyle/>
-                    <a:p>
-                      <a:r>
-                        <a:rPr lang="en-GB" dirty="0" smtClean="0"/>
-                        <a:t>string</a:t>
-                      </a:r>
-                      <a:endParaRPr lang="en-GB" dirty="0"/>
-                    </a:p>
-                  </a:txBody>
-                  <a:tcPr/>
-                </a:tc>
-              </a:tr>
-              <a:tr h="370840">
-                <a:tc>
-                  <a:txBody>
-                    <a:bodyPr/>
-                    <a:lstStyle/>
-                    <a:p>
-                      <a:r>
-                        <a:rPr lang="en-GB" dirty="0" smtClean="0"/>
-                        <a:t>Map</a:t>
-                      </a:r>
-                      <a:endParaRPr lang="en-GB" dirty="0"/>
-                    </a:p>
-                  </a:txBody>
-                  <a:tcPr/>
-                </a:tc>
-                <a:tc>
-                  <a:txBody>
-                    <a:bodyPr/>
-                    <a:lstStyle/>
-                    <a:p>
-                      <a:r>
-                        <a:rPr lang="en-GB" dirty="0" err="1" smtClean="0"/>
-                        <a:t>struct</a:t>
-                      </a:r>
-                      <a:r>
-                        <a:rPr lang="en-GB" dirty="0" smtClean="0"/>
-                        <a:t> Map</a:t>
-                      </a:r>
-                      <a:endParaRPr lang="en-GB" dirty="0"/>
-                    </a:p>
-                  </a:txBody>
-                  <a:tcPr/>
-                </a:tc>
-                <a:tc>
-                  <a:txBody>
-                    <a:bodyPr/>
-                    <a:lstStyle/>
-                    <a:p>
-                      <a:r>
-                        <a:rPr lang="en-GB" dirty="0" err="1" smtClean="0"/>
-                        <a:t>dict</a:t>
-                      </a:r>
-                      <a:endParaRPr lang="en-GB" dirty="0"/>
-                    </a:p>
-                  </a:txBody>
-                  <a:tcPr/>
-                </a:tc>
-              </a:tr>
-              <a:tr h="370840">
-                <a:tc>
-                  <a:txBody>
-                    <a:bodyPr/>
-                    <a:lstStyle/>
-                    <a:p>
-                      <a:r>
-                        <a:rPr lang="en-GB" dirty="0" smtClean="0"/>
-                        <a:t>Set</a:t>
-                      </a:r>
-                      <a:endParaRPr lang="en-GB" dirty="0"/>
-                    </a:p>
-                  </a:txBody>
-                  <a:tcPr/>
-                </a:tc>
-                <a:tc>
-                  <a:txBody>
-                    <a:bodyPr/>
-                    <a:lstStyle/>
-                    <a:p>
-                      <a:r>
-                        <a:rPr lang="en-GB" dirty="0" err="1" smtClean="0"/>
-                        <a:t>struct</a:t>
-                      </a:r>
-                      <a:r>
-                        <a:rPr lang="en-GB" dirty="0" smtClean="0"/>
-                        <a:t> </a:t>
-                      </a:r>
-                      <a:r>
-                        <a:rPr lang="en-GB" dirty="0" err="1" smtClean="0"/>
-                        <a:t>Seq</a:t>
-                      </a:r>
-                      <a:endParaRPr lang="en-GB" dirty="0"/>
-                    </a:p>
-                  </a:txBody>
-                  <a:tcPr/>
-                </a:tc>
-                <a:tc>
-                  <a:txBody>
-                    <a:bodyPr/>
-                    <a:lstStyle/>
-                    <a:p>
-                      <a:pPr marL="0" marR="0" indent="0" algn="l" defTabSz="914400" rtl="0" eaLnBrk="1" fontAlgn="auto" latinLnBrk="0" hangingPunct="1">
-                        <a:lnSpc>
-                          <a:spcPct val="100000"/>
-                        </a:lnSpc>
-                        <a:spcBef>
-                          <a:spcPts val="0"/>
-                        </a:spcBef>
-                        <a:spcAft>
-                          <a:spcPts val="0"/>
-                        </a:spcAft>
-                        <a:buClrTx/>
-                        <a:buSzTx/>
-                        <a:buFontTx/>
-                        <a:buNone/>
-                        <a:tabLst/>
-                        <a:defRPr/>
-                      </a:pPr>
-                      <a:r>
-                        <a:rPr lang="en-GB" baseline="0" dirty="0" smtClean="0"/>
-                        <a:t>set, </a:t>
-                      </a:r>
-                      <a:r>
-                        <a:rPr lang="en-GB" baseline="0" dirty="0" err="1" smtClean="0"/>
-                        <a:t>seq</a:t>
-                      </a:r>
-                      <a:endParaRPr lang="en-GB" dirty="0" smtClean="0"/>
-                    </a:p>
-                  </a:txBody>
-                  <a:tcPr/>
-                </a:tc>
-              </a:tr>
-              <a:tr h="370840">
-                <a:tc>
-                  <a:txBody>
-                    <a:bodyPr/>
-                    <a:lstStyle/>
-                    <a:p>
-                      <a:r>
-                        <a:rPr lang="en-GB" dirty="0" smtClean="0"/>
-                        <a:t>List</a:t>
-                      </a:r>
-                      <a:endParaRPr lang="en-GB" dirty="0"/>
-                    </a:p>
-                  </a:txBody>
-                  <a:tcPr/>
-                </a:tc>
-                <a:tc>
-                  <a:txBody>
-                    <a:bodyPr/>
-                    <a:lstStyle/>
-                    <a:p>
-                      <a:r>
-                        <a:rPr lang="en-GB" dirty="0" err="1" smtClean="0"/>
-                        <a:t>struct</a:t>
-                      </a:r>
-                      <a:r>
-                        <a:rPr lang="en-GB" dirty="0" smtClean="0"/>
-                        <a:t> List</a:t>
-                      </a:r>
-                      <a:endParaRPr lang="en-GB" dirty="0"/>
-                    </a:p>
-                  </a:txBody>
-                  <a:tcPr/>
-                </a:tc>
-                <a:tc>
-                  <a:txBody>
-                    <a:bodyPr/>
-                    <a:lstStyle/>
-                    <a:p>
-                      <a:r>
-                        <a:rPr lang="en-GB" baseline="0" dirty="0" err="1" smtClean="0"/>
-                        <a:t>seq</a:t>
-                      </a:r>
-                      <a:endParaRPr lang="en-GB" dirty="0"/>
-                    </a:p>
-                  </a:txBody>
-                  <a:tcPr/>
-                </a:tc>
-              </a:tr>
-              <a:tr h="370840">
-                <a:tc>
-                  <a:txBody>
-                    <a:bodyPr/>
-                    <a:lstStyle/>
-                    <a:p>
-                      <a:r>
-                        <a:rPr lang="en-GB" dirty="0" smtClean="0"/>
-                        <a:t>File</a:t>
-                      </a:r>
-                      <a:endParaRPr lang="en-GB" dirty="0"/>
-                    </a:p>
-                  </a:txBody>
-                  <a:tcPr/>
-                </a:tc>
-                <a:tc>
-                  <a:txBody>
-                    <a:bodyPr/>
-                    <a:lstStyle/>
-                    <a:p>
-                      <a:r>
-                        <a:rPr lang="en-GB" dirty="0" smtClean="0"/>
-                        <a:t>char* (zero terminated)</a:t>
-                      </a:r>
-                      <a:endParaRPr lang="en-GB" dirty="0"/>
-                    </a:p>
-                  </a:txBody>
-                  <a:tcPr/>
-                </a:tc>
-                <a:tc>
-                  <a:txBody>
-                    <a:bodyPr/>
-                    <a:lstStyle/>
-                    <a:p>
-                      <a:r>
-                        <a:rPr lang="en-GB" dirty="0" smtClean="0"/>
-                        <a:t>string</a:t>
-                      </a:r>
-                      <a:endParaRPr lang="en-GB" dirty="0"/>
-                    </a:p>
-                  </a:txBody>
-                  <a:tcPr/>
-                </a:tc>
-              </a:tr>
-              <a:tr h="370840">
-                <a:tc>
-                  <a:txBody>
-                    <a:bodyPr/>
-                    <a:lstStyle/>
-                    <a:p>
-                      <a:r>
-                        <a:rPr lang="en-GB" dirty="0" err="1" smtClean="0"/>
-                        <a:t>GeoPos</a:t>
-                      </a:r>
-                      <a:endParaRPr lang="en-GB" dirty="0"/>
-                    </a:p>
-                  </a:txBody>
-                  <a:tcPr/>
-                </a:tc>
-                <a:tc>
-                  <a:txBody>
-                    <a:bodyPr/>
-                    <a:lstStyle/>
-                    <a:p>
-                      <a:r>
-                        <a:rPr lang="en-GB" dirty="0" smtClean="0"/>
-                        <a:t>float[2]</a:t>
-                      </a:r>
-                      <a:endParaRPr lang="en-GB" dirty="0"/>
-                    </a:p>
-                  </a:txBody>
-                  <a:tcPr/>
-                </a:tc>
-                <a:tc>
-                  <a:txBody>
-                    <a:bodyPr/>
-                    <a:lstStyle/>
-                    <a:p>
-                      <a:r>
-                        <a:rPr lang="en-GB" dirty="0" smtClean="0"/>
-                        <a:t>(</a:t>
-                      </a:r>
-                      <a:r>
-                        <a:rPr lang="en-GB" dirty="0" err="1" smtClean="0"/>
-                        <a:t>lat</a:t>
-                      </a:r>
-                      <a:r>
-                        <a:rPr lang="en-GB" dirty="0" smtClean="0"/>
-                        <a:t>, </a:t>
-                      </a:r>
-                      <a:r>
-                        <a:rPr lang="en-GB" dirty="0" err="1" smtClean="0"/>
-                        <a:t>lon</a:t>
-                      </a:r>
-                      <a:r>
-                        <a:rPr lang="en-GB" dirty="0" smtClean="0"/>
-                        <a:t>)</a:t>
-                      </a:r>
-                      <a:endParaRPr lang="en-GB" dirty="0"/>
-                    </a:p>
-                  </a:txBody>
-                  <a:tcPr/>
-                </a:tc>
-              </a:tr>
-              <a:tr h="370840">
-                <a:tc>
-                  <a:txBody>
-                    <a:bodyPr/>
-                    <a:lstStyle/>
-                    <a:p>
-                      <a:r>
-                        <a:rPr lang="en-GB" dirty="0" err="1" smtClean="0"/>
-                        <a:t>PixelPos</a:t>
-                      </a:r>
-                      <a:endParaRPr lang="en-GB" dirty="0"/>
-                    </a:p>
-                  </a:txBody>
-                  <a:tcPr/>
-                </a:tc>
-                <a:tc>
-                  <a:txBody>
-                    <a:bodyPr/>
-                    <a:lstStyle/>
-                    <a:p>
-                      <a:r>
-                        <a:rPr lang="en-GB" dirty="0" smtClean="0"/>
-                        <a:t>float[2]</a:t>
-                      </a:r>
-                      <a:endParaRPr lang="en-GB" dirty="0"/>
-                    </a:p>
-                  </a:txBody>
-                  <a:tcPr/>
-                </a:tc>
-                <a:tc>
-                  <a:txBody>
-                    <a:bodyPr/>
-                    <a:lstStyle/>
-                    <a:p>
-                      <a:r>
-                        <a:rPr lang="en-GB" dirty="0" smtClean="0"/>
-                        <a:t>(x, y)</a:t>
-                      </a:r>
-                      <a:endParaRPr lang="en-GB" dirty="0"/>
-                    </a:p>
-                  </a:txBody>
-                  <a:tcPr/>
-                </a:tc>
-              </a:tr>
-              <a:tr h="370840">
-                <a:tc>
-                  <a:txBody>
-                    <a:bodyPr/>
-                    <a:lstStyle/>
-                    <a:p>
-                      <a:r>
-                        <a:rPr lang="en-GB" dirty="0" smtClean="0"/>
-                        <a:t>Point, Point2D</a:t>
-                      </a:r>
-                      <a:endParaRPr lang="en-GB" dirty="0"/>
-                    </a:p>
-                  </a:txBody>
-                  <a:tcPr/>
-                </a:tc>
-                <a:tc>
-                  <a:txBody>
-                    <a:bodyPr/>
-                    <a:lstStyle/>
-                    <a:p>
-                      <a:r>
-                        <a:rPr lang="en-GB" dirty="0" err="1" smtClean="0"/>
-                        <a:t>int</a:t>
-                      </a:r>
-                      <a:r>
-                        <a:rPr lang="en-GB" dirty="0" smtClean="0"/>
-                        <a:t>[2], float[2]</a:t>
-                      </a:r>
-                      <a:endParaRPr lang="en-GB" dirty="0"/>
-                    </a:p>
-                  </a:txBody>
-                  <a:tcPr/>
-                </a:tc>
-                <a:tc>
-                  <a:txBody>
-                    <a:bodyPr/>
-                    <a:lstStyle/>
-                    <a:p>
-                      <a:r>
-                        <a:rPr lang="en-GB" dirty="0" smtClean="0"/>
-                        <a:t>(x, y)</a:t>
-                      </a:r>
-                      <a:endParaRPr lang="en-GB" dirty="0"/>
-                    </a:p>
-                  </a:txBody>
-                  <a:tcPr/>
-                </a:tc>
-              </a:tr>
-              <a:tr h="370840">
-                <a:tc>
-                  <a:txBody>
-                    <a:bodyPr/>
-                    <a:lstStyle/>
-                    <a:p>
-                      <a:r>
-                        <a:rPr lang="en-GB" dirty="0" smtClean="0"/>
-                        <a:t>Rectangle, Rectangle2D</a:t>
-                      </a:r>
-                      <a:endParaRPr lang="en-GB" dirty="0"/>
-                    </a:p>
-                  </a:txBody>
-                  <a:tcPr/>
-                </a:tc>
-                <a:tc>
-                  <a:txBody>
-                    <a:bodyPr/>
-                    <a:lstStyle/>
-                    <a:p>
-                      <a:r>
-                        <a:rPr lang="en-GB" dirty="0" err="1" smtClean="0"/>
-                        <a:t>int</a:t>
-                      </a:r>
-                      <a:r>
-                        <a:rPr lang="en-GB" dirty="0" smtClean="0"/>
-                        <a:t>[4], float[4]</a:t>
-                      </a:r>
-                      <a:endParaRPr lang="en-GB" dirty="0"/>
-                    </a:p>
-                  </a:txBody>
-                  <a:tcPr/>
-                </a:tc>
-                <a:tc>
-                  <a:txBody>
-                    <a:bodyPr/>
-                    <a:lstStyle/>
-                    <a:p>
-                      <a:r>
-                        <a:rPr lang="en-GB" dirty="0" smtClean="0"/>
-                        <a:t>(x, y, w, h)</a:t>
-                      </a:r>
-                      <a:endParaRPr lang="en-GB" dirty="0"/>
-                    </a:p>
-                  </a:txBody>
-                  <a:tcPr/>
-                </a:tc>
-              </a:tr>
-            </a:tbl>
-          </a:graphicData>
-        </a:graphic>
-      </p:graphicFrame>
-    </p:spTree>
-    <p:extLst>
-      <p:ext uri="{BB962C8B-B14F-4D97-AF65-F5344CB8AC3E}">
-        <p14:creationId xmlns:p14="http://schemas.microsoft.com/office/powerpoint/2010/main" val="514377977"/>
-      </p:ext>
-    </p:extLst>
-  </p:cSld>
-  <p:clrMapOvr>
-    <a:masterClrMapping/>
-  </p:clrMapOvr>
-  <p:timing>
-    <p:tnLst>
-      <p:par>
-        <p:cTn id="1" dur="indefinite" restart="never" nodeType="tmRoot"/>
-      </p:par>
-    </p:tnLst>
-  </p:timing>
-</p:sld>
-</file>
-
-<file path=ppt/slides/slide11.xml><?xml version="1.0" encoding="utf-8"?>
-<p:sld xmlns:a="http://schemas.openxmlformats.org/drawingml/2006/main" xmlns:r="http://schemas.openxmlformats.org/officeDocument/2006/relationships" xmlns:p="http://schemas.openxmlformats.org/presentationml/2006/main">
-  <p:cSld>
-    <p:spTree>
-      <p:nvGrpSpPr>
-        <p:cNvPr id="1" name=""/>
-        <p:cNvGrpSpPr/>
-        <p:nvPr/>
-      </p:nvGrpSpPr>
-      <p:grpSpPr>
-        <a:xfrm>
-          <a:off x="0" y="0"/>
-          <a:ext cx="0" cy="0"/>
-          <a:chOff x="0" y="0"/>
-          <a:chExt cx="0" cy="0"/>
-        </a:xfrm>
-      </p:grpSpPr>
-      <p:sp>
-        <p:nvSpPr>
-          <p:cNvPr id="2" name="Titel 1"/>
-          <p:cNvSpPr>
-            <a:spLocks noGrp="1"/>
-          </p:cNvSpPr>
-          <p:nvPr>
-            <p:ph type="title"/>
-          </p:nvPr>
-        </p:nvSpPr>
-        <p:spPr/>
-        <p:txBody>
           <a:bodyPr>
             <a:normAutofit/>
           </a:bodyPr>
@@ -4338,7 +3617,7 @@
 </p:sld>
 </file>
 
-<file path=ppt/slides/slide12.xml><?xml version="1.0" encoding="utf-8"?>
+<file path=ppt/slides/slide11.xml><?xml version="1.0" encoding="utf-8"?>
 <p:sld xmlns:a="http://schemas.openxmlformats.org/drawingml/2006/main" xmlns:r="http://schemas.openxmlformats.org/officeDocument/2006/relationships" xmlns:p="http://schemas.openxmlformats.org/presentationml/2006/main">
   <p:cSld>
     <p:spTree>
@@ -8074,7 +7353,7 @@
 </p:sld>
 </file>
 
-<file path=ppt/slides/slide13.xml><?xml version="1.0" encoding="utf-8"?>
+<file path=ppt/slides/slide12.xml><?xml version="1.0" encoding="utf-8"?>
 <p:sld xmlns:a="http://schemas.openxmlformats.org/drawingml/2006/main" xmlns:r="http://schemas.openxmlformats.org/officeDocument/2006/relationships" xmlns:p="http://schemas.openxmlformats.org/presentationml/2006/main">
   <p:cSld>
     <p:spTree>
@@ -11082,6 +10361,616 @@
     <p:extLst>
       <p:ext uri="{BB962C8B-B14F-4D97-AF65-F5344CB8AC3E}">
         <p14:creationId xmlns:p14="http://schemas.microsoft.com/office/powerpoint/2010/main" val="2298274009"/>
+      </p:ext>
+    </p:extLst>
+  </p:cSld>
+  <p:clrMapOvr>
+    <a:masterClrMapping/>
+  </p:clrMapOvr>
+  <p:timing>
+    <p:tnLst>
+      <p:par>
+        <p:cTn id="1" dur="indefinite" restart="never" nodeType="tmRoot"/>
+      </p:par>
+    </p:tnLst>
+  </p:timing>
+</p:sld>
+</file>
+
+<file path=ppt/slides/slide13.xml><?xml version="1.0" encoding="utf-8"?>
+<p:sld xmlns:a="http://schemas.openxmlformats.org/drawingml/2006/main" xmlns:r="http://schemas.openxmlformats.org/officeDocument/2006/relationships" xmlns:p="http://schemas.openxmlformats.org/presentationml/2006/main">
+  <p:cSld>
+    <p:spTree>
+      <p:nvGrpSpPr>
+        <p:cNvPr id="1" name=""/>
+        <p:cNvGrpSpPr/>
+        <p:nvPr/>
+      </p:nvGrpSpPr>
+      <p:grpSpPr>
+        <a:xfrm>
+          <a:off x="0" y="0"/>
+          <a:ext cx="0" cy="0"/>
+          <a:chOff x="0" y="0"/>
+          <a:chExt cx="0" cy="0"/>
+        </a:xfrm>
+      </p:grpSpPr>
+      <p:sp>
+        <p:nvSpPr>
+          <p:cNvPr id="5" name="Titel 4"/>
+          <p:cNvSpPr>
+            <a:spLocks noGrp="1"/>
+          </p:cNvSpPr>
+          <p:nvPr>
+            <p:ph type="title"/>
+          </p:nvPr>
+        </p:nvSpPr>
+        <p:spPr/>
+        <p:txBody>
+          <a:bodyPr/>
+          <a:lstStyle/>
+          <a:p>
+            <a:r>
+              <a:rPr lang="en-GB" b="1" dirty="0">
+                <a:solidFill>
+                  <a:schemeClr val="accent2">
+                    <a:lumMod val="50000"/>
+                  </a:schemeClr>
+                </a:solidFill>
+                <a:latin typeface="+mn-lt"/>
+                <a:ea typeface="+mn-ea"/>
+                <a:cs typeface="+mn-cs"/>
+              </a:rPr>
+              <a:t>X</a:t>
+            </a:r>
+            <a:r>
+              <a:rPr lang="en-GB" dirty="0" smtClean="0"/>
+              <a:t>-Target Function Generator</a:t>
+            </a:r>
+            <a:endParaRPr lang="en-GB" dirty="0"/>
+          </a:p>
+        </p:txBody>
+      </p:sp>
+      <p:sp>
+        <p:nvSpPr>
+          <p:cNvPr id="7" name="Inhaltsplatzhalter 6"/>
+          <p:cNvSpPr>
+            <a:spLocks noGrp="1"/>
+          </p:cNvSpPr>
+          <p:nvPr>
+            <p:ph sz="half" idx="1"/>
+          </p:nvPr>
+        </p:nvSpPr>
+        <p:spPr/>
+        <p:txBody>
+          <a:bodyPr>
+            <a:normAutofit fontScale="92500" lnSpcReduction="20000"/>
+          </a:bodyPr>
+          <a:lstStyle/>
+          <a:p>
+            <a:pPr fontAlgn="t"/>
+            <a:r>
+              <a:rPr lang="en-GB" dirty="0" smtClean="0"/>
+              <a:t>Head</a:t>
+            </a:r>
+          </a:p>
+          <a:p>
+            <a:pPr lvl="1" fontAlgn="t"/>
+            <a:r>
+              <a:rPr lang="en-GB" dirty="0" smtClean="0"/>
+              <a:t>Get </a:t>
+            </a:r>
+            <a:r>
+              <a:rPr lang="en-GB" b="1" dirty="0" smtClean="0">
+                <a:solidFill>
+                  <a:schemeClr val="accent2">
+                    <a:lumMod val="50000"/>
+                  </a:schemeClr>
+                </a:solidFill>
+              </a:rPr>
+              <a:t>X </a:t>
+            </a:r>
+            <a:r>
+              <a:rPr lang="en-GB" dirty="0" smtClean="0"/>
+              <a:t>function </a:t>
+            </a:r>
+            <a:r>
+              <a:rPr lang="en-GB" dirty="0"/>
+              <a:t>return </a:t>
+            </a:r>
+            <a:r>
+              <a:rPr lang="en-GB" dirty="0" smtClean="0"/>
+              <a:t>type</a:t>
+            </a:r>
+            <a:endParaRPr lang="en-GB" dirty="0"/>
+          </a:p>
+          <a:p>
+            <a:pPr lvl="1" fontAlgn="t"/>
+            <a:r>
+              <a:rPr lang="en-GB" dirty="0"/>
+              <a:t>Get </a:t>
+            </a:r>
+            <a:r>
+              <a:rPr lang="en-GB" b="1" dirty="0">
+                <a:solidFill>
+                  <a:schemeClr val="accent2">
+                    <a:lumMod val="50000"/>
+                  </a:schemeClr>
+                </a:solidFill>
+              </a:rPr>
+              <a:t>X </a:t>
+            </a:r>
+            <a:r>
+              <a:rPr lang="en-GB" b="1" dirty="0" smtClean="0">
+                <a:solidFill>
+                  <a:schemeClr val="accent2">
+                    <a:lumMod val="50000"/>
+                  </a:schemeClr>
+                </a:solidFill>
+              </a:rPr>
+              <a:t> </a:t>
+            </a:r>
+            <a:r>
+              <a:rPr lang="en-GB" dirty="0" smtClean="0"/>
+              <a:t>function </a:t>
+            </a:r>
+            <a:r>
+              <a:rPr lang="en-GB" dirty="0"/>
+              <a:t>name</a:t>
+            </a:r>
+          </a:p>
+          <a:p>
+            <a:pPr lvl="1"/>
+            <a:r>
+              <a:rPr lang="en-GB" dirty="0"/>
+              <a:t>Get </a:t>
+            </a:r>
+            <a:r>
+              <a:rPr lang="en-GB" b="1" dirty="0">
+                <a:solidFill>
+                  <a:schemeClr val="accent2">
+                    <a:lumMod val="50000"/>
+                  </a:schemeClr>
+                </a:solidFill>
+              </a:rPr>
+              <a:t>X </a:t>
+            </a:r>
+            <a:r>
+              <a:rPr lang="en-GB" b="1" dirty="0" smtClean="0">
+                <a:solidFill>
+                  <a:schemeClr val="accent2">
+                    <a:lumMod val="50000"/>
+                  </a:schemeClr>
+                </a:solidFill>
+              </a:rPr>
+              <a:t> </a:t>
+            </a:r>
+            <a:r>
+              <a:rPr lang="en-GB" dirty="0" smtClean="0"/>
+              <a:t>function </a:t>
+            </a:r>
+            <a:r>
+              <a:rPr lang="en-GB" u="sng" dirty="0" smtClean="0"/>
+              <a:t>parameters</a:t>
+            </a:r>
+          </a:p>
+          <a:p>
+            <a:endParaRPr lang="en-GB" dirty="0" smtClean="0"/>
+          </a:p>
+          <a:p>
+            <a:endParaRPr lang="en-GB" dirty="0"/>
+          </a:p>
+          <a:p>
+            <a:r>
+              <a:rPr lang="en-GB" dirty="0" smtClean="0"/>
+              <a:t>Body</a:t>
+            </a:r>
+          </a:p>
+          <a:p>
+            <a:pPr lvl="1"/>
+            <a:r>
+              <a:rPr lang="en-GB" dirty="0"/>
+              <a:t>Declare </a:t>
+            </a:r>
+            <a:r>
+              <a:rPr lang="en-GB" b="1" u="sng" dirty="0">
+                <a:solidFill>
+                  <a:schemeClr val="accent2">
+                    <a:lumMod val="50000"/>
+                  </a:schemeClr>
+                </a:solidFill>
+              </a:rPr>
+              <a:t>X </a:t>
+            </a:r>
+            <a:r>
+              <a:rPr lang="en-GB" u="sng" dirty="0" smtClean="0"/>
+              <a:t>arguments</a:t>
+            </a:r>
+            <a:r>
+              <a:rPr lang="en-GB" dirty="0" smtClean="0"/>
+              <a:t> (opt)</a:t>
+            </a:r>
+            <a:endParaRPr lang="en-GB" dirty="0"/>
+          </a:p>
+          <a:p>
+            <a:pPr lvl="1" fontAlgn="t"/>
+            <a:r>
+              <a:rPr lang="en-GB" dirty="0"/>
+              <a:t>Declare </a:t>
+            </a:r>
+            <a:r>
+              <a:rPr lang="en-GB" b="1" u="sng" dirty="0">
+                <a:solidFill>
+                  <a:schemeClr val="accent2">
+                    <a:lumMod val="50000"/>
+                  </a:schemeClr>
+                </a:solidFill>
+              </a:rPr>
+              <a:t>X </a:t>
+            </a:r>
+            <a:r>
+              <a:rPr lang="en-GB" u="sng" dirty="0" smtClean="0"/>
+              <a:t>result</a:t>
+            </a:r>
+            <a:endParaRPr lang="en-GB" u="sng" dirty="0"/>
+          </a:p>
+          <a:p>
+            <a:pPr lvl="1" fontAlgn="t"/>
+            <a:r>
+              <a:rPr lang="en-GB" dirty="0"/>
+              <a:t>Declare </a:t>
+            </a:r>
+            <a:r>
+              <a:rPr lang="en-GB" b="1" u="sng" dirty="0">
+                <a:solidFill>
+                  <a:schemeClr val="accent6">
+                    <a:lumMod val="50000"/>
+                  </a:schemeClr>
+                </a:solidFill>
+              </a:rPr>
+              <a:t>Java</a:t>
+            </a:r>
+            <a:r>
+              <a:rPr lang="en-GB" u="sng" dirty="0"/>
+              <a:t> </a:t>
+            </a:r>
+            <a:r>
+              <a:rPr lang="en-GB" u="sng" dirty="0" smtClean="0"/>
+              <a:t>arguments</a:t>
+            </a:r>
+            <a:endParaRPr lang="en-GB" u="sng" dirty="0"/>
+          </a:p>
+          <a:p>
+            <a:pPr lvl="1" fontAlgn="t"/>
+            <a:r>
+              <a:rPr lang="en-GB" dirty="0"/>
+              <a:t>Declare </a:t>
+            </a:r>
+            <a:r>
+              <a:rPr lang="en-GB" b="1" u="sng" dirty="0">
+                <a:solidFill>
+                  <a:schemeClr val="accent6">
+                    <a:lumMod val="50000"/>
+                  </a:schemeClr>
+                </a:solidFill>
+              </a:rPr>
+              <a:t>Java</a:t>
+            </a:r>
+            <a:r>
+              <a:rPr lang="en-GB" u="sng" dirty="0"/>
+              <a:t> </a:t>
+            </a:r>
+            <a:r>
+              <a:rPr lang="en-GB" u="sng" dirty="0" smtClean="0"/>
+              <a:t>result</a:t>
+            </a:r>
+            <a:endParaRPr lang="en-GB" u="sng" dirty="0"/>
+          </a:p>
+          <a:p>
+            <a:endParaRPr lang="en-GB" dirty="0" smtClean="0"/>
+          </a:p>
+          <a:p>
+            <a:endParaRPr lang="en-GB" dirty="0"/>
+          </a:p>
+          <a:p>
+            <a:endParaRPr lang="en-GB" dirty="0"/>
+          </a:p>
+        </p:txBody>
+      </p:sp>
+      <p:sp>
+        <p:nvSpPr>
+          <p:cNvPr id="8" name="Inhaltsplatzhalter 7"/>
+          <p:cNvSpPr>
+            <a:spLocks noGrp="1"/>
+          </p:cNvSpPr>
+          <p:nvPr>
+            <p:ph sz="half" idx="2"/>
+          </p:nvPr>
+        </p:nvSpPr>
+        <p:spPr/>
+        <p:txBody>
+          <a:bodyPr>
+            <a:normAutofit fontScale="92500" lnSpcReduction="20000"/>
+          </a:bodyPr>
+          <a:lstStyle/>
+          <a:p>
+            <a:r>
+              <a:rPr lang="en-GB" dirty="0" smtClean="0"/>
+              <a:t>Body (cont.)</a:t>
+            </a:r>
+          </a:p>
+          <a:p>
+            <a:pPr lvl="1"/>
+            <a:r>
+              <a:rPr lang="en-GB" dirty="0"/>
+              <a:t>Assign </a:t>
+            </a:r>
+            <a:r>
+              <a:rPr lang="en-GB" b="1" u="sng" dirty="0">
+                <a:solidFill>
+                  <a:schemeClr val="accent2">
+                    <a:lumMod val="50000"/>
+                  </a:schemeClr>
+                </a:solidFill>
+              </a:rPr>
+              <a:t>X </a:t>
+            </a:r>
+            <a:r>
+              <a:rPr lang="en-GB" u="sng" dirty="0" smtClean="0"/>
+              <a:t>arguments</a:t>
+            </a:r>
+            <a:r>
+              <a:rPr lang="en-GB" dirty="0" smtClean="0"/>
+              <a:t> </a:t>
+            </a:r>
+            <a:r>
+              <a:rPr lang="en-GB" dirty="0"/>
+              <a:t>from </a:t>
+            </a:r>
+            <a:r>
+              <a:rPr lang="en-GB" dirty="0" smtClean="0"/>
+              <a:t>parsed </a:t>
+            </a:r>
+            <a:r>
+              <a:rPr lang="en-GB" u="sng" dirty="0" smtClean="0"/>
+              <a:t>parameters</a:t>
+            </a:r>
+            <a:r>
+              <a:rPr lang="en-GB" dirty="0" smtClean="0"/>
+              <a:t> (opt)</a:t>
+            </a:r>
+            <a:endParaRPr lang="en-GB" dirty="0"/>
+          </a:p>
+          <a:p>
+            <a:pPr lvl="1"/>
+            <a:r>
+              <a:rPr lang="en-GB" dirty="0"/>
+              <a:t>Assign </a:t>
+            </a:r>
+            <a:r>
+              <a:rPr lang="en-GB" b="1" u="sng" dirty="0" smtClean="0">
+                <a:solidFill>
+                  <a:schemeClr val="accent6">
+                    <a:lumMod val="50000"/>
+                  </a:schemeClr>
+                </a:solidFill>
+              </a:rPr>
+              <a:t>Java</a:t>
+            </a:r>
+            <a:r>
+              <a:rPr lang="en-GB" u="sng" dirty="0" smtClean="0"/>
+              <a:t> </a:t>
+            </a:r>
+            <a:r>
+              <a:rPr lang="en-GB" u="sng" dirty="0"/>
+              <a:t>arguments</a:t>
+            </a:r>
+            <a:r>
+              <a:rPr lang="en-GB" dirty="0"/>
+              <a:t> from transformed </a:t>
+            </a:r>
+            <a:r>
+              <a:rPr lang="en-GB" b="1" u="sng" dirty="0" smtClean="0">
+                <a:solidFill>
+                  <a:schemeClr val="accent2">
+                    <a:lumMod val="50000"/>
+                  </a:schemeClr>
+                </a:solidFill>
+              </a:rPr>
+              <a:t>X </a:t>
+            </a:r>
+            <a:r>
+              <a:rPr lang="en-GB" u="sng" dirty="0"/>
+              <a:t>arguments</a:t>
+            </a:r>
+            <a:r>
+              <a:rPr lang="en-GB" dirty="0"/>
+              <a:t> </a:t>
+            </a:r>
+          </a:p>
+          <a:p>
+            <a:pPr lvl="1"/>
+            <a:r>
+              <a:rPr lang="en-GB" dirty="0" smtClean="0"/>
+              <a:t>Assign </a:t>
+            </a:r>
+            <a:r>
+              <a:rPr lang="en-GB" b="1" u="sng" dirty="0">
+                <a:solidFill>
+                  <a:schemeClr val="accent6">
+                    <a:lumMod val="50000"/>
+                  </a:schemeClr>
+                </a:solidFill>
+              </a:rPr>
+              <a:t>Java</a:t>
+            </a:r>
+            <a:r>
+              <a:rPr lang="en-GB" u="sng" dirty="0"/>
+              <a:t> </a:t>
+            </a:r>
+            <a:r>
+              <a:rPr lang="en-GB" u="sng" dirty="0" smtClean="0"/>
+              <a:t>result</a:t>
+            </a:r>
+            <a:r>
+              <a:rPr lang="en-GB" dirty="0" smtClean="0"/>
+              <a:t> from </a:t>
+            </a:r>
+            <a:r>
+              <a:rPr lang="en-GB" b="1" dirty="0">
+                <a:solidFill>
+                  <a:schemeClr val="accent6">
+                    <a:lumMod val="50000"/>
+                  </a:schemeClr>
+                </a:solidFill>
+              </a:rPr>
+              <a:t>Java</a:t>
+            </a:r>
+            <a:r>
+              <a:rPr lang="en-GB" dirty="0"/>
+              <a:t> </a:t>
+            </a:r>
+            <a:r>
+              <a:rPr lang="en-GB" dirty="0" smtClean="0"/>
+              <a:t>method call</a:t>
+            </a:r>
+          </a:p>
+          <a:p>
+            <a:pPr lvl="1"/>
+            <a:r>
+              <a:rPr lang="en-GB" dirty="0" smtClean="0"/>
+              <a:t>Assign </a:t>
+            </a:r>
+            <a:r>
+              <a:rPr lang="en-GB" b="1" u="sng" dirty="0" smtClean="0">
+                <a:solidFill>
+                  <a:schemeClr val="accent2">
+                    <a:lumMod val="50000"/>
+                  </a:schemeClr>
+                </a:solidFill>
+              </a:rPr>
+              <a:t>X </a:t>
+            </a:r>
+            <a:r>
+              <a:rPr lang="en-GB" u="sng" dirty="0"/>
+              <a:t>result</a:t>
+            </a:r>
+            <a:r>
+              <a:rPr lang="en-GB" dirty="0"/>
+              <a:t> from transformed </a:t>
+            </a:r>
+            <a:r>
+              <a:rPr lang="en-GB" b="1" u="sng" dirty="0">
+                <a:solidFill>
+                  <a:schemeClr val="accent6">
+                    <a:lumMod val="50000"/>
+                  </a:schemeClr>
+                </a:solidFill>
+              </a:rPr>
+              <a:t>Java</a:t>
+            </a:r>
+            <a:r>
+              <a:rPr lang="en-GB" u="sng" dirty="0"/>
+              <a:t> </a:t>
+            </a:r>
+            <a:r>
+              <a:rPr lang="en-GB" u="sng" dirty="0" smtClean="0"/>
+              <a:t>result</a:t>
+            </a:r>
+          </a:p>
+          <a:p>
+            <a:pPr lvl="1" fontAlgn="t"/>
+            <a:r>
+              <a:rPr lang="en-GB" dirty="0" err="1" smtClean="0"/>
+              <a:t>Deref</a:t>
+            </a:r>
+            <a:r>
+              <a:rPr lang="en-GB" dirty="0" smtClean="0"/>
+              <a:t> </a:t>
+            </a:r>
+            <a:r>
+              <a:rPr lang="en-GB" b="1" u="sng" dirty="0">
+                <a:solidFill>
+                  <a:schemeClr val="accent6">
+                    <a:lumMod val="50000"/>
+                  </a:schemeClr>
+                </a:solidFill>
+              </a:rPr>
+              <a:t>Java</a:t>
+            </a:r>
+            <a:r>
+              <a:rPr lang="en-GB" u="sng" dirty="0"/>
+              <a:t> </a:t>
+            </a:r>
+            <a:r>
+              <a:rPr lang="en-GB" u="sng" dirty="0" smtClean="0"/>
+              <a:t>arguments</a:t>
+            </a:r>
+            <a:endParaRPr lang="en-GB" u="sng" dirty="0"/>
+          </a:p>
+          <a:p>
+            <a:pPr lvl="1"/>
+            <a:r>
+              <a:rPr lang="en-GB" dirty="0" err="1"/>
+              <a:t>Deref</a:t>
+            </a:r>
+            <a:r>
+              <a:rPr lang="en-GB" dirty="0"/>
+              <a:t> </a:t>
+            </a:r>
+            <a:r>
+              <a:rPr lang="en-GB" b="1" u="sng" dirty="0">
+                <a:solidFill>
+                  <a:schemeClr val="accent6">
+                    <a:lumMod val="50000"/>
+                  </a:schemeClr>
+                </a:solidFill>
+              </a:rPr>
+              <a:t>Java</a:t>
+            </a:r>
+            <a:r>
+              <a:rPr lang="en-GB" u="sng" dirty="0"/>
+              <a:t> </a:t>
+            </a:r>
+            <a:r>
+              <a:rPr lang="en-GB" u="sng" dirty="0" smtClean="0"/>
+              <a:t>result</a:t>
+            </a:r>
+            <a:endParaRPr lang="en-GB" u="sng" dirty="0"/>
+          </a:p>
+          <a:p>
+            <a:pPr lvl="1"/>
+            <a:r>
+              <a:rPr lang="en-GB" dirty="0"/>
+              <a:t>Return </a:t>
+            </a:r>
+            <a:r>
+              <a:rPr lang="en-GB" b="1" u="sng" dirty="0">
+                <a:solidFill>
+                  <a:schemeClr val="accent2">
+                    <a:lumMod val="50000"/>
+                  </a:schemeClr>
+                </a:solidFill>
+              </a:rPr>
+              <a:t>X </a:t>
+            </a:r>
+            <a:r>
+              <a:rPr lang="en-GB" u="sng" dirty="0" smtClean="0"/>
+              <a:t>result</a:t>
+            </a:r>
+            <a:endParaRPr lang="en-GB" u="sng" dirty="0"/>
+          </a:p>
+          <a:p>
+            <a:pPr marL="0" indent="0">
+              <a:buNone/>
+            </a:pPr>
+            <a:endParaRPr lang="en-GB" dirty="0"/>
+          </a:p>
+        </p:txBody>
+      </p:sp>
+    </p:spTree>
+    <p:extLst>
+      <p:ext uri="{BB962C8B-B14F-4D97-AF65-F5344CB8AC3E}">
+        <p14:creationId xmlns:p14="http://schemas.microsoft.com/office/powerpoint/2010/main" val="732695745"/>
       </p:ext>
     </p:extLst>
   </p:cSld>
@@ -20173,96 +20062,6 @@
         </p:nvSpPr>
         <p:spPr/>
         <p:txBody>
-          <a:bodyPr/>
-          <a:lstStyle/>
-          <a:p>
-            <a:endParaRPr lang="en-GB"/>
-          </a:p>
-        </p:txBody>
-      </p:sp>
-      <p:sp>
-        <p:nvSpPr>
-          <p:cNvPr id="3" name="Inhaltsplatzhalter 2"/>
-          <p:cNvSpPr>
-            <a:spLocks noGrp="1"/>
-          </p:cNvSpPr>
-          <p:nvPr>
-            <p:ph idx="1"/>
-          </p:nvPr>
-        </p:nvSpPr>
-        <p:spPr/>
-        <p:txBody>
-          <a:bodyPr/>
-          <a:lstStyle/>
-          <a:p>
-            <a:pPr marL="0" indent="0">
-              <a:buNone/>
-            </a:pPr>
-            <a:r>
-              <a:rPr lang="en-GB" dirty="0" smtClean="0"/>
-              <a:t>class Operator:</a:t>
-            </a:r>
-          </a:p>
-          <a:p>
-            <a:pPr marL="0" indent="0">
-              <a:buNone/>
-            </a:pPr>
-            <a:r>
-              <a:rPr lang="en-GB" dirty="0"/>
-              <a:t>	</a:t>
-            </a:r>
-          </a:p>
-        </p:txBody>
-      </p:sp>
-    </p:spTree>
-    <p:extLst>
-      <p:ext uri="{BB962C8B-B14F-4D97-AF65-F5344CB8AC3E}">
-        <p14:creationId xmlns:p14="http://schemas.microsoft.com/office/powerpoint/2010/main" val="9632054"/>
-      </p:ext>
-    </p:extLst>
-  </p:cSld>
-  <p:clrMapOvr>
-    <a:masterClrMapping/>
-  </p:clrMapOvr>
-  <p:timing>
-    <p:tnLst>
-      <p:par>
-        <p:cTn id="1" dur="indefinite" restart="never" nodeType="tmRoot"/>
-      </p:par>
-    </p:tnLst>
-  </p:timing>
-</p:sld>
-</file>
-
-<file path=ppt/slides/slide9.xml><?xml version="1.0" encoding="utf-8"?>
-<p:sld xmlns:a="http://schemas.openxmlformats.org/drawingml/2006/main" xmlns:r="http://schemas.openxmlformats.org/officeDocument/2006/relationships" xmlns:p="http://schemas.openxmlformats.org/presentationml/2006/main">
-  <p:cSld>
-    <p:spTree>
-      <p:nvGrpSpPr>
-        <p:cNvPr id="1" name=""/>
-        <p:cNvGrpSpPr/>
-        <p:nvPr/>
-      </p:nvGrpSpPr>
-      <p:grpSpPr>
-        <a:xfrm>
-          <a:off x="0" y="0"/>
-          <a:ext cx="0" cy="0"/>
-          <a:chOff x="0" y="0"/>
-          <a:chExt cx="0" cy="0"/>
-        </a:xfrm>
-      </p:grpSpPr>
-      <p:sp>
-        <p:nvSpPr>
-          <p:cNvPr id="2" name="Titel 1"/>
-          <p:cNvSpPr>
-            <a:spLocks noGrp="1"/>
-          </p:cNvSpPr>
-          <p:nvPr>
-            <p:ph type="title"/>
-          </p:nvPr>
-        </p:nvSpPr>
-        <p:spPr/>
-        <p:txBody>
           <a:bodyPr>
             <a:normAutofit fontScale="90000"/>
           </a:bodyPr>
@@ -21322,6 +21121,733 @@
     <p:extLst>
       <p:ext uri="{BB962C8B-B14F-4D97-AF65-F5344CB8AC3E}">
         <p14:creationId xmlns:p14="http://schemas.microsoft.com/office/powerpoint/2010/main" val="1969224"/>
+      </p:ext>
+    </p:extLst>
+  </p:cSld>
+  <p:clrMapOvr>
+    <a:masterClrMapping/>
+  </p:clrMapOvr>
+  <p:timing>
+    <p:tnLst>
+      <p:par>
+        <p:cTn id="1" dur="indefinite" restart="never" nodeType="tmRoot"/>
+      </p:par>
+    </p:tnLst>
+  </p:timing>
+</p:sld>
+</file>
+
+<file path=ppt/slides/slide9.xml><?xml version="1.0" encoding="utf-8"?>
+<p:sld xmlns:a="http://schemas.openxmlformats.org/drawingml/2006/main" xmlns:r="http://schemas.openxmlformats.org/officeDocument/2006/relationships" xmlns:p="http://schemas.openxmlformats.org/presentationml/2006/main">
+  <p:cSld>
+    <p:spTree>
+      <p:nvGrpSpPr>
+        <p:cNvPr id="1" name=""/>
+        <p:cNvGrpSpPr/>
+        <p:nvPr/>
+      </p:nvGrpSpPr>
+      <p:grpSpPr>
+        <a:xfrm>
+          <a:off x="0" y="0"/>
+          <a:ext cx="0" cy="0"/>
+          <a:chOff x="0" y="0"/>
+          <a:chExt cx="0" cy="0"/>
+        </a:xfrm>
+      </p:grpSpPr>
+      <p:sp>
+        <p:nvSpPr>
+          <p:cNvPr id="2" name="Titel 1"/>
+          <p:cNvSpPr>
+            <a:spLocks noGrp="1"/>
+          </p:cNvSpPr>
+          <p:nvPr>
+            <p:ph type="title"/>
+          </p:nvPr>
+        </p:nvSpPr>
+        <p:spPr/>
+        <p:txBody>
+          <a:bodyPr/>
+          <a:lstStyle/>
+          <a:p>
+            <a:r>
+              <a:rPr lang="en-GB" dirty="0" smtClean="0"/>
+              <a:t>Data Type Mappings</a:t>
+            </a:r>
+            <a:endParaRPr lang="en-GB" dirty="0"/>
+          </a:p>
+        </p:txBody>
+      </p:sp>
+      <p:graphicFrame>
+        <p:nvGraphicFramePr>
+          <p:cNvPr id="4" name="Inhaltsplatzhalter 3"/>
+          <p:cNvGraphicFramePr>
+            <a:graphicFrameLocks noGrp="1"/>
+          </p:cNvGraphicFramePr>
+          <p:nvPr>
+            <p:ph idx="1"/>
+            <p:extLst>
+              <p:ext uri="{D42A27DB-BD31-4B8C-83A1-F6EECF244321}">
+                <p14:modId xmlns:p14="http://schemas.microsoft.com/office/powerpoint/2010/main" val="2904863150"/>
+              </p:ext>
+            </p:extLst>
+          </p:nvPr>
+        </p:nvGraphicFramePr>
+        <p:xfrm>
+          <a:off x="457200" y="1600200"/>
+          <a:ext cx="8229600" cy="4719320"/>
+        </p:xfrm>
+        <a:graphic>
+          <a:graphicData uri="http://schemas.openxmlformats.org/drawingml/2006/table">
+            <a:tbl>
+              <a:tblPr firstRow="1" bandRow="1">
+                <a:tableStyleId>{5C22544A-7EE6-4342-B048-85BDC9FD1C3A}</a:tableStyleId>
+              </a:tblPr>
+              <a:tblGrid>
+                <a:gridCol w="2743200"/>
+                <a:gridCol w="2743200"/>
+                <a:gridCol w="2743200"/>
+              </a:tblGrid>
+              <a:tr h="370840">
+                <a:tc>
+                  <a:txBody>
+                    <a:bodyPr/>
+                    <a:lstStyle/>
+                    <a:p>
+                      <a:r>
+                        <a:rPr lang="en-GB" dirty="0" smtClean="0"/>
+                        <a:t>Java</a:t>
+                      </a:r>
+                      <a:endParaRPr lang="en-GB" dirty="0"/>
+                    </a:p>
+                  </a:txBody>
+                  <a:tcPr/>
+                </a:tc>
+                <a:tc>
+                  <a:txBody>
+                    <a:bodyPr/>
+                    <a:lstStyle/>
+                    <a:p>
+                      <a:r>
+                        <a:rPr lang="en-GB" dirty="0" smtClean="0"/>
+                        <a:t>C</a:t>
+                      </a:r>
+                      <a:endParaRPr lang="en-GB" dirty="0"/>
+                    </a:p>
+                  </a:txBody>
+                  <a:tcPr/>
+                </a:tc>
+                <a:tc>
+                  <a:txBody>
+                    <a:bodyPr/>
+                    <a:lstStyle/>
+                    <a:p>
+                      <a:r>
+                        <a:rPr lang="en-GB" dirty="0" smtClean="0"/>
+                        <a:t>Python</a:t>
+                      </a:r>
+                      <a:endParaRPr lang="en-GB" dirty="0"/>
+                    </a:p>
+                  </a:txBody>
+                  <a:tcPr/>
+                </a:tc>
+              </a:tr>
+              <a:tr h="370840">
+                <a:tc>
+                  <a:txBody>
+                    <a:bodyPr/>
+                    <a:lstStyle/>
+                    <a:p>
+                      <a:r>
+                        <a:rPr lang="en-GB" dirty="0" smtClean="0"/>
+                        <a:t>Object</a:t>
+                      </a:r>
+                      <a:endParaRPr lang="en-GB" dirty="0"/>
+                    </a:p>
+                  </a:txBody>
+                  <a:tcPr/>
+                </a:tc>
+                <a:tc>
+                  <a:txBody>
+                    <a:bodyPr/>
+                    <a:lstStyle/>
+                    <a:p>
+                      <a:pPr marL="0" marR="0" indent="0" algn="l" defTabSz="914400" rtl="0" eaLnBrk="1" fontAlgn="auto" latinLnBrk="0" hangingPunct="1">
+                        <a:lnSpc>
+                          <a:spcPct val="100000"/>
+                        </a:lnSpc>
+                        <a:spcBef>
+                          <a:spcPts val="0"/>
+                        </a:spcBef>
+                        <a:spcAft>
+                          <a:spcPts val="0"/>
+                        </a:spcAft>
+                        <a:buClrTx/>
+                        <a:buSzTx/>
+                        <a:buFontTx/>
+                        <a:buNone/>
+                        <a:tabLst/>
+                        <a:defRPr/>
+                      </a:pPr>
+                      <a:r>
+                        <a:rPr lang="en-GB" dirty="0" smtClean="0"/>
+                        <a:t>void*</a:t>
+                      </a:r>
+                    </a:p>
+                  </a:txBody>
+                  <a:tcPr/>
+                </a:tc>
+                <a:tc>
+                  <a:txBody>
+                    <a:bodyPr/>
+                    <a:lstStyle/>
+                    <a:p>
+                      <a:r>
+                        <a:rPr lang="en-GB" dirty="0" smtClean="0"/>
+                        <a:t>(&lt;type&gt;, &lt;pointer&gt;)</a:t>
+                      </a:r>
+                      <a:endParaRPr lang="en-GB" dirty="0"/>
+                    </a:p>
+                  </a:txBody>
+                  <a:tcPr/>
+                </a:tc>
+              </a:tr>
+              <a:tr h="370840">
+                <a:tc>
+                  <a:txBody>
+                    <a:bodyPr/>
+                    <a:lstStyle/>
+                    <a:p>
+                      <a:r>
+                        <a:rPr lang="en-GB" dirty="0" smtClean="0"/>
+                        <a:t>Prim. arrays</a:t>
+                      </a:r>
+                      <a:endParaRPr lang="en-GB" dirty="0"/>
+                    </a:p>
+                  </a:txBody>
+                  <a:tcPr/>
+                </a:tc>
+                <a:tc>
+                  <a:txBody>
+                    <a:bodyPr/>
+                    <a:lstStyle/>
+                    <a:p>
+                      <a:pPr marL="0" marR="0" indent="0" algn="l" defTabSz="914400" rtl="0" eaLnBrk="1" fontAlgn="auto" latinLnBrk="0" hangingPunct="1">
+                        <a:lnSpc>
+                          <a:spcPct val="100000"/>
+                        </a:lnSpc>
+                        <a:spcBef>
+                          <a:spcPts val="0"/>
+                        </a:spcBef>
+                        <a:spcAft>
+                          <a:spcPts val="0"/>
+                        </a:spcAft>
+                        <a:buClrTx/>
+                        <a:buSzTx/>
+                        <a:buFontTx/>
+                        <a:buNone/>
+                        <a:tabLst/>
+                        <a:defRPr/>
+                      </a:pPr>
+                      <a:r>
+                        <a:rPr lang="en-GB" dirty="0" smtClean="0"/>
+                        <a:t>&lt;type&gt;*, length</a:t>
+                      </a:r>
+                    </a:p>
+                  </a:txBody>
+                  <a:tcPr/>
+                </a:tc>
+                <a:tc>
+                  <a:txBody>
+                    <a:bodyPr/>
+                    <a:lstStyle/>
+                    <a:p>
+                      <a:r>
+                        <a:rPr lang="en-GB" dirty="0" smtClean="0"/>
+                        <a:t>buffer, </a:t>
+                      </a:r>
+                      <a:r>
+                        <a:rPr lang="en-GB" dirty="0" err="1" smtClean="0"/>
+                        <a:t>array.array</a:t>
+                      </a:r>
+                      <a:r>
+                        <a:rPr lang="en-GB" dirty="0" smtClean="0"/>
+                        <a:t>, </a:t>
+                      </a:r>
+                      <a:r>
+                        <a:rPr lang="en-GB" dirty="0" err="1" smtClean="0"/>
+                        <a:t>numpy.array</a:t>
+                      </a:r>
+                      <a:endParaRPr lang="en-GB" dirty="0"/>
+                    </a:p>
+                  </a:txBody>
+                  <a:tcPr/>
+                </a:tc>
+              </a:tr>
+              <a:tr h="370840">
+                <a:tc>
+                  <a:txBody>
+                    <a:bodyPr/>
+                    <a:lstStyle/>
+                    <a:p>
+                      <a:r>
+                        <a:rPr lang="en-GB" dirty="0" smtClean="0"/>
+                        <a:t>String</a:t>
+                      </a:r>
+                      <a:endParaRPr lang="en-GB" dirty="0"/>
+                    </a:p>
+                  </a:txBody>
+                  <a:tcPr/>
+                </a:tc>
+                <a:tc>
+                  <a:txBody>
+                    <a:bodyPr/>
+                    <a:lstStyle/>
+                    <a:p>
+                      <a:r>
+                        <a:rPr lang="en-GB" dirty="0" smtClean="0"/>
+                        <a:t>char* (zero terminated)</a:t>
+                      </a:r>
+                      <a:endParaRPr lang="en-GB" dirty="0"/>
+                    </a:p>
+                  </a:txBody>
+                  <a:tcPr/>
+                </a:tc>
+                <a:tc>
+                  <a:txBody>
+                    <a:bodyPr/>
+                    <a:lstStyle/>
+                    <a:p>
+                      <a:r>
+                        <a:rPr lang="en-GB" dirty="0" smtClean="0"/>
+                        <a:t>string</a:t>
+                      </a:r>
+                      <a:endParaRPr lang="en-GB" dirty="0"/>
+                    </a:p>
+                  </a:txBody>
+                  <a:tcPr/>
+                </a:tc>
+              </a:tr>
+              <a:tr h="370840">
+                <a:tc>
+                  <a:txBody>
+                    <a:bodyPr/>
+                    <a:lstStyle/>
+                    <a:p>
+                      <a:r>
+                        <a:rPr lang="en-GB" dirty="0" smtClean="0"/>
+                        <a:t>Map</a:t>
+                      </a:r>
+                      <a:endParaRPr lang="en-GB" dirty="0"/>
+                    </a:p>
+                  </a:txBody>
+                  <a:tcPr/>
+                </a:tc>
+                <a:tc>
+                  <a:txBody>
+                    <a:bodyPr/>
+                    <a:lstStyle/>
+                    <a:p>
+                      <a:r>
+                        <a:rPr lang="en-GB" dirty="0" err="1" smtClean="0"/>
+                        <a:t>struct</a:t>
+                      </a:r>
+                      <a:r>
+                        <a:rPr lang="en-GB" dirty="0" smtClean="0"/>
+                        <a:t> Map</a:t>
+                      </a:r>
+                      <a:endParaRPr lang="en-GB" dirty="0"/>
+                    </a:p>
+                  </a:txBody>
+                  <a:tcPr/>
+                </a:tc>
+                <a:tc>
+                  <a:txBody>
+                    <a:bodyPr/>
+                    <a:lstStyle/>
+                    <a:p>
+                      <a:r>
+                        <a:rPr lang="en-GB" dirty="0" err="1" smtClean="0"/>
+                        <a:t>dict</a:t>
+                      </a:r>
+                      <a:endParaRPr lang="en-GB" dirty="0"/>
+                    </a:p>
+                  </a:txBody>
+                  <a:tcPr/>
+                </a:tc>
+              </a:tr>
+              <a:tr h="370840">
+                <a:tc>
+                  <a:txBody>
+                    <a:bodyPr/>
+                    <a:lstStyle/>
+                    <a:p>
+                      <a:r>
+                        <a:rPr lang="en-GB" dirty="0" smtClean="0"/>
+                        <a:t>Set</a:t>
+                      </a:r>
+                      <a:endParaRPr lang="en-GB" dirty="0"/>
+                    </a:p>
+                  </a:txBody>
+                  <a:tcPr/>
+                </a:tc>
+                <a:tc>
+                  <a:txBody>
+                    <a:bodyPr/>
+                    <a:lstStyle/>
+                    <a:p>
+                      <a:r>
+                        <a:rPr lang="en-GB" dirty="0" err="1" smtClean="0"/>
+                        <a:t>struct</a:t>
+                      </a:r>
+                      <a:r>
+                        <a:rPr lang="en-GB" dirty="0" smtClean="0"/>
+                        <a:t> </a:t>
+                      </a:r>
+                      <a:r>
+                        <a:rPr lang="en-GB" dirty="0" err="1" smtClean="0"/>
+                        <a:t>Seq</a:t>
+                      </a:r>
+                      <a:endParaRPr lang="en-GB" dirty="0"/>
+                    </a:p>
+                  </a:txBody>
+                  <a:tcPr/>
+                </a:tc>
+                <a:tc>
+                  <a:txBody>
+                    <a:bodyPr/>
+                    <a:lstStyle/>
+                    <a:p>
+                      <a:pPr marL="0" marR="0" indent="0" algn="l" defTabSz="914400" rtl="0" eaLnBrk="1" fontAlgn="auto" latinLnBrk="0" hangingPunct="1">
+                        <a:lnSpc>
+                          <a:spcPct val="100000"/>
+                        </a:lnSpc>
+                        <a:spcBef>
+                          <a:spcPts val="0"/>
+                        </a:spcBef>
+                        <a:spcAft>
+                          <a:spcPts val="0"/>
+                        </a:spcAft>
+                        <a:buClrTx/>
+                        <a:buSzTx/>
+                        <a:buFontTx/>
+                        <a:buNone/>
+                        <a:tabLst/>
+                        <a:defRPr/>
+                      </a:pPr>
+                      <a:r>
+                        <a:rPr lang="en-GB" baseline="0" dirty="0" smtClean="0"/>
+                        <a:t>set, </a:t>
+                      </a:r>
+                      <a:r>
+                        <a:rPr lang="en-GB" baseline="0" dirty="0" err="1" smtClean="0"/>
+                        <a:t>seq</a:t>
+                      </a:r>
+                      <a:endParaRPr lang="en-GB" dirty="0" smtClean="0"/>
+                    </a:p>
+                  </a:txBody>
+                  <a:tcPr/>
+                </a:tc>
+              </a:tr>
+              <a:tr h="370840">
+                <a:tc>
+                  <a:txBody>
+                    <a:bodyPr/>
+                    <a:lstStyle/>
+                    <a:p>
+                      <a:r>
+                        <a:rPr lang="en-GB" dirty="0" smtClean="0"/>
+                        <a:t>List</a:t>
+                      </a:r>
+                      <a:endParaRPr lang="en-GB" dirty="0"/>
+                    </a:p>
+                  </a:txBody>
+                  <a:tcPr/>
+                </a:tc>
+                <a:tc>
+                  <a:txBody>
+                    <a:bodyPr/>
+                    <a:lstStyle/>
+                    <a:p>
+                      <a:r>
+                        <a:rPr lang="en-GB" dirty="0" err="1" smtClean="0"/>
+                        <a:t>struct</a:t>
+                      </a:r>
+                      <a:r>
+                        <a:rPr lang="en-GB" dirty="0" smtClean="0"/>
+                        <a:t> List</a:t>
+                      </a:r>
+                      <a:endParaRPr lang="en-GB" dirty="0"/>
+                    </a:p>
+                  </a:txBody>
+                  <a:tcPr/>
+                </a:tc>
+                <a:tc>
+                  <a:txBody>
+                    <a:bodyPr/>
+                    <a:lstStyle/>
+                    <a:p>
+                      <a:r>
+                        <a:rPr lang="en-GB" baseline="0" dirty="0" err="1" smtClean="0"/>
+                        <a:t>seq</a:t>
+                      </a:r>
+                      <a:endParaRPr lang="en-GB" dirty="0"/>
+                    </a:p>
+                  </a:txBody>
+                  <a:tcPr/>
+                </a:tc>
+              </a:tr>
+              <a:tr h="370840">
+                <a:tc>
+                  <a:txBody>
+                    <a:bodyPr/>
+                    <a:lstStyle/>
+                    <a:p>
+                      <a:r>
+                        <a:rPr lang="en-GB" dirty="0" smtClean="0"/>
+                        <a:t>File</a:t>
+                      </a:r>
+                      <a:endParaRPr lang="en-GB" dirty="0"/>
+                    </a:p>
+                  </a:txBody>
+                  <a:tcPr/>
+                </a:tc>
+                <a:tc>
+                  <a:txBody>
+                    <a:bodyPr/>
+                    <a:lstStyle/>
+                    <a:p>
+                      <a:r>
+                        <a:rPr lang="en-GB" dirty="0" smtClean="0"/>
+                        <a:t>char* (zero terminated)</a:t>
+                      </a:r>
+                      <a:endParaRPr lang="en-GB" dirty="0"/>
+                    </a:p>
+                  </a:txBody>
+                  <a:tcPr/>
+                </a:tc>
+                <a:tc>
+                  <a:txBody>
+                    <a:bodyPr/>
+                    <a:lstStyle/>
+                    <a:p>
+                      <a:r>
+                        <a:rPr lang="en-GB" dirty="0" smtClean="0"/>
+                        <a:t>string</a:t>
+                      </a:r>
+                      <a:endParaRPr lang="en-GB" dirty="0"/>
+                    </a:p>
+                  </a:txBody>
+                  <a:tcPr/>
+                </a:tc>
+              </a:tr>
+              <a:tr h="370840">
+                <a:tc>
+                  <a:txBody>
+                    <a:bodyPr/>
+                    <a:lstStyle/>
+                    <a:p>
+                      <a:r>
+                        <a:rPr lang="en-GB" dirty="0" err="1" smtClean="0"/>
+                        <a:t>GeoPos</a:t>
+                      </a:r>
+                      <a:endParaRPr lang="en-GB" dirty="0"/>
+                    </a:p>
+                  </a:txBody>
+                  <a:tcPr/>
+                </a:tc>
+                <a:tc>
+                  <a:txBody>
+                    <a:bodyPr/>
+                    <a:lstStyle/>
+                    <a:p>
+                      <a:r>
+                        <a:rPr lang="en-GB" dirty="0" smtClean="0"/>
+                        <a:t>float[2]</a:t>
+                      </a:r>
+                      <a:endParaRPr lang="en-GB" dirty="0"/>
+                    </a:p>
+                  </a:txBody>
+                  <a:tcPr/>
+                </a:tc>
+                <a:tc>
+                  <a:txBody>
+                    <a:bodyPr/>
+                    <a:lstStyle/>
+                    <a:p>
+                      <a:r>
+                        <a:rPr lang="en-GB" dirty="0" smtClean="0"/>
+                        <a:t>(</a:t>
+                      </a:r>
+                      <a:r>
+                        <a:rPr lang="en-GB" dirty="0" err="1" smtClean="0"/>
+                        <a:t>lat</a:t>
+                      </a:r>
+                      <a:r>
+                        <a:rPr lang="en-GB" dirty="0" smtClean="0"/>
+                        <a:t>, </a:t>
+                      </a:r>
+                      <a:r>
+                        <a:rPr lang="en-GB" dirty="0" err="1" smtClean="0"/>
+                        <a:t>lon</a:t>
+                      </a:r>
+                      <a:r>
+                        <a:rPr lang="en-GB" dirty="0" smtClean="0"/>
+                        <a:t>)</a:t>
+                      </a:r>
+                      <a:endParaRPr lang="en-GB" dirty="0"/>
+                    </a:p>
+                  </a:txBody>
+                  <a:tcPr/>
+                </a:tc>
+              </a:tr>
+              <a:tr h="370840">
+                <a:tc>
+                  <a:txBody>
+                    <a:bodyPr/>
+                    <a:lstStyle/>
+                    <a:p>
+                      <a:r>
+                        <a:rPr lang="en-GB" dirty="0" err="1" smtClean="0"/>
+                        <a:t>PixelPos</a:t>
+                      </a:r>
+                      <a:endParaRPr lang="en-GB" dirty="0"/>
+                    </a:p>
+                  </a:txBody>
+                  <a:tcPr/>
+                </a:tc>
+                <a:tc>
+                  <a:txBody>
+                    <a:bodyPr/>
+                    <a:lstStyle/>
+                    <a:p>
+                      <a:r>
+                        <a:rPr lang="en-GB" dirty="0" smtClean="0"/>
+                        <a:t>float[2]</a:t>
+                      </a:r>
+                      <a:endParaRPr lang="en-GB" dirty="0"/>
+                    </a:p>
+                  </a:txBody>
+                  <a:tcPr/>
+                </a:tc>
+                <a:tc>
+                  <a:txBody>
+                    <a:bodyPr/>
+                    <a:lstStyle/>
+                    <a:p>
+                      <a:r>
+                        <a:rPr lang="en-GB" dirty="0" smtClean="0"/>
+                        <a:t>(x, y)</a:t>
+                      </a:r>
+                      <a:endParaRPr lang="en-GB" dirty="0"/>
+                    </a:p>
+                  </a:txBody>
+                  <a:tcPr/>
+                </a:tc>
+              </a:tr>
+              <a:tr h="370840">
+                <a:tc>
+                  <a:txBody>
+                    <a:bodyPr/>
+                    <a:lstStyle/>
+                    <a:p>
+                      <a:r>
+                        <a:rPr lang="en-GB" dirty="0" smtClean="0"/>
+                        <a:t>Point, Point2D</a:t>
+                      </a:r>
+                      <a:endParaRPr lang="en-GB" dirty="0"/>
+                    </a:p>
+                  </a:txBody>
+                  <a:tcPr/>
+                </a:tc>
+                <a:tc>
+                  <a:txBody>
+                    <a:bodyPr/>
+                    <a:lstStyle/>
+                    <a:p>
+                      <a:r>
+                        <a:rPr lang="en-GB" dirty="0" err="1" smtClean="0"/>
+                        <a:t>int</a:t>
+                      </a:r>
+                      <a:r>
+                        <a:rPr lang="en-GB" dirty="0" smtClean="0"/>
+                        <a:t>[2], float[2]</a:t>
+                      </a:r>
+                      <a:endParaRPr lang="en-GB" dirty="0"/>
+                    </a:p>
+                  </a:txBody>
+                  <a:tcPr/>
+                </a:tc>
+                <a:tc>
+                  <a:txBody>
+                    <a:bodyPr/>
+                    <a:lstStyle/>
+                    <a:p>
+                      <a:r>
+                        <a:rPr lang="en-GB" dirty="0" smtClean="0"/>
+                        <a:t>(x, y)</a:t>
+                      </a:r>
+                      <a:endParaRPr lang="en-GB" dirty="0"/>
+                    </a:p>
+                  </a:txBody>
+                  <a:tcPr/>
+                </a:tc>
+              </a:tr>
+              <a:tr h="370840">
+                <a:tc>
+                  <a:txBody>
+                    <a:bodyPr/>
+                    <a:lstStyle/>
+                    <a:p>
+                      <a:r>
+                        <a:rPr lang="en-GB" dirty="0" smtClean="0"/>
+                        <a:t>Rectangle, Rectangle2D</a:t>
+                      </a:r>
+                      <a:endParaRPr lang="en-GB" dirty="0"/>
+                    </a:p>
+                  </a:txBody>
+                  <a:tcPr/>
+                </a:tc>
+                <a:tc>
+                  <a:txBody>
+                    <a:bodyPr/>
+                    <a:lstStyle/>
+                    <a:p>
+                      <a:r>
+                        <a:rPr lang="en-GB" dirty="0" err="1" smtClean="0"/>
+                        <a:t>int</a:t>
+                      </a:r>
+                      <a:r>
+                        <a:rPr lang="en-GB" dirty="0" smtClean="0"/>
+                        <a:t>[4], float[4]</a:t>
+                      </a:r>
+                      <a:endParaRPr lang="en-GB" dirty="0"/>
+                    </a:p>
+                  </a:txBody>
+                  <a:tcPr/>
+                </a:tc>
+                <a:tc>
+                  <a:txBody>
+                    <a:bodyPr/>
+                    <a:lstStyle/>
+                    <a:p>
+                      <a:r>
+                        <a:rPr lang="en-GB" dirty="0" smtClean="0"/>
+                        <a:t>(x, y, w, h)</a:t>
+                      </a:r>
+                      <a:endParaRPr lang="en-GB" dirty="0"/>
+                    </a:p>
+                  </a:txBody>
+                  <a:tcPr/>
+                </a:tc>
+              </a:tr>
+            </a:tbl>
+          </a:graphicData>
+        </a:graphic>
+      </p:graphicFrame>
+    </p:spTree>
+    <p:extLst>
+      <p:ext uri="{BB962C8B-B14F-4D97-AF65-F5344CB8AC3E}">
+        <p14:creationId xmlns:p14="http://schemas.microsoft.com/office/powerpoint/2010/main" val="514377977"/>
       </p:ext>
     </p:extLst>
   </p:cSld>

</xml_diff>

<commit_message>
refactoring towards new function generator design
</commit_message>
<xml_diff>
--- a/docs/beam-extapi.pptx
+++ b/docs/beam-extapi.pptx
@@ -316,7 +316,7 @@
           <a:p>
             <a:fld id="{1BA50D42-C9CD-4801-B293-61D1F53EC57E}" type="datetimeFigureOut">
               <a:rPr lang="de-DE" smtClean="0"/>
-              <a:t>07.06.2013</a:t>
+              <a:t>08.06.2013</a:t>
             </a:fld>
             <a:endParaRPr lang="de-DE"/>
           </a:p>
@@ -481,7 +481,7 @@
           <a:p>
             <a:fld id="{1BA50D42-C9CD-4801-B293-61D1F53EC57E}" type="datetimeFigureOut">
               <a:rPr lang="de-DE" smtClean="0"/>
-              <a:t>07.06.2013</a:t>
+              <a:t>08.06.2013</a:t>
             </a:fld>
             <a:endParaRPr lang="de-DE"/>
           </a:p>
@@ -656,7 +656,7 @@
           <a:p>
             <a:fld id="{1BA50D42-C9CD-4801-B293-61D1F53EC57E}" type="datetimeFigureOut">
               <a:rPr lang="de-DE" smtClean="0"/>
-              <a:t>07.06.2013</a:t>
+              <a:t>08.06.2013</a:t>
             </a:fld>
             <a:endParaRPr lang="de-DE"/>
           </a:p>
@@ -821,7 +821,7 @@
           <a:p>
             <a:fld id="{1BA50D42-C9CD-4801-B293-61D1F53EC57E}" type="datetimeFigureOut">
               <a:rPr lang="de-DE" smtClean="0"/>
-              <a:t>07.06.2013</a:t>
+              <a:t>08.06.2013</a:t>
             </a:fld>
             <a:endParaRPr lang="de-DE"/>
           </a:p>
@@ -1062,7 +1062,7 @@
           <a:p>
             <a:fld id="{1BA50D42-C9CD-4801-B293-61D1F53EC57E}" type="datetimeFigureOut">
               <a:rPr lang="de-DE" smtClean="0"/>
-              <a:t>07.06.2013</a:t>
+              <a:t>08.06.2013</a:t>
             </a:fld>
             <a:endParaRPr lang="de-DE"/>
           </a:p>
@@ -1345,7 +1345,7 @@
           <a:p>
             <a:fld id="{1BA50D42-C9CD-4801-B293-61D1F53EC57E}" type="datetimeFigureOut">
               <a:rPr lang="de-DE" smtClean="0"/>
-              <a:t>07.06.2013</a:t>
+              <a:t>08.06.2013</a:t>
             </a:fld>
             <a:endParaRPr lang="de-DE"/>
           </a:p>
@@ -1762,7 +1762,7 @@
           <a:p>
             <a:fld id="{1BA50D42-C9CD-4801-B293-61D1F53EC57E}" type="datetimeFigureOut">
               <a:rPr lang="de-DE" smtClean="0"/>
-              <a:t>07.06.2013</a:t>
+              <a:t>08.06.2013</a:t>
             </a:fld>
             <a:endParaRPr lang="de-DE"/>
           </a:p>
@@ -1875,7 +1875,7 @@
           <a:p>
             <a:fld id="{1BA50D42-C9CD-4801-B293-61D1F53EC57E}" type="datetimeFigureOut">
               <a:rPr lang="de-DE" smtClean="0"/>
-              <a:t>07.06.2013</a:t>
+              <a:t>08.06.2013</a:t>
             </a:fld>
             <a:endParaRPr lang="de-DE"/>
           </a:p>
@@ -1965,7 +1965,7 @@
           <a:p>
             <a:fld id="{1BA50D42-C9CD-4801-B293-61D1F53EC57E}" type="datetimeFigureOut">
               <a:rPr lang="de-DE" smtClean="0"/>
-              <a:t>07.06.2013</a:t>
+              <a:t>08.06.2013</a:t>
             </a:fld>
             <a:endParaRPr lang="de-DE"/>
           </a:p>
@@ -2237,7 +2237,7 @@
           <a:p>
             <a:fld id="{1BA50D42-C9CD-4801-B293-61D1F53EC57E}" type="datetimeFigureOut">
               <a:rPr lang="de-DE" smtClean="0"/>
-              <a:t>07.06.2013</a:t>
+              <a:t>08.06.2013</a:t>
             </a:fld>
             <a:endParaRPr lang="de-DE"/>
           </a:p>
@@ -2485,7 +2485,7 @@
           <a:p>
             <a:fld id="{1BA50D42-C9CD-4801-B293-61D1F53EC57E}" type="datetimeFigureOut">
               <a:rPr lang="de-DE" smtClean="0"/>
-              <a:t>07.06.2013</a:t>
+              <a:t>08.06.2013</a:t>
             </a:fld>
             <a:endParaRPr lang="de-DE"/>
           </a:p>
@@ -2693,7 +2693,7 @@
           <a:p>
             <a:fld id="{1BA50D42-C9CD-4801-B293-61D1F53EC57E}" type="datetimeFigureOut">
               <a:rPr lang="de-DE" smtClean="0"/>
-              <a:t>07.06.2013</a:t>
+              <a:t>08.06.2013</a:t>
             </a:fld>
             <a:endParaRPr lang="de-DE"/>
           </a:p>
@@ -10410,7 +10410,7 @@
           <a:lstStyle/>
           <a:p>
             <a:r>
-              <a:rPr lang="en-GB" b="1" dirty="0">
+              <a:rPr lang="en-GB" b="1" dirty="0" smtClean="0">
                 <a:solidFill>
                   <a:schemeClr val="accent2">
                     <a:lumMod val="50000"/>
@@ -10420,11 +10420,23 @@
                 <a:ea typeface="+mn-ea"/>
                 <a:cs typeface="+mn-cs"/>
               </a:rPr>
-              <a:t>X</a:t>
-            </a:r>
-            <a:r>
-              <a:rPr lang="en-GB" dirty="0" smtClean="0"/>
-              <a:t>-Target Function Generator</a:t>
+              <a:t>T</a:t>
+            </a:r>
+            <a:r>
+              <a:rPr lang="en-GB" dirty="0"/>
+              <a:t> </a:t>
+            </a:r>
+            <a:r>
+              <a:rPr lang="en-GB" dirty="0" smtClean="0"/>
+              <a:t>(</a:t>
+            </a:r>
+            <a:r>
+              <a:rPr lang="en-GB" dirty="0" smtClean="0"/>
+              <a:t>Target) </a:t>
+            </a:r>
+            <a:r>
+              <a:rPr lang="en-GB" dirty="0" smtClean="0"/>
+              <a:t>Function Generator</a:t>
             </a:r>
             <a:endParaRPr lang="en-GB" dirty="0"/>
           </a:p>
@@ -10443,7 +10455,7 @@
         <p:spPr/>
         <p:txBody>
           <a:bodyPr>
-            <a:normAutofit fontScale="92500" lnSpcReduction="20000"/>
+            <a:normAutofit fontScale="92500" lnSpcReduction="10000"/>
           </a:bodyPr>
           <a:lstStyle/>
           <a:p>
@@ -10467,7 +10479,7 @@
                   </a:schemeClr>
                 </a:solidFill>
               </a:rPr>
-              <a:t>X </a:t>
+              <a:t>T </a:t>
             </a:r>
             <a:r>
               <a:rPr lang="en-GB" dirty="0" smtClean="0"/>
@@ -10488,16 +10500,6 @@
             <a:r>
               <a:rPr lang="en-GB" dirty="0"/>
               <a:t>Get </a:t>
-            </a:r>
-            <a:r>
-              <a:rPr lang="en-GB" b="1" dirty="0">
-                <a:solidFill>
-                  <a:schemeClr val="accent2">
-                    <a:lumMod val="50000"/>
-                  </a:schemeClr>
-                </a:solidFill>
-              </a:rPr>
-              <a:t>X </a:t>
             </a:r>
             <a:r>
               <a:rPr lang="en-GB" b="1" dirty="0" smtClean="0">
@@ -10507,7 +10509,7 @@
                   </a:schemeClr>
                 </a:solidFill>
               </a:rPr>
-              <a:t> </a:t>
+              <a:t>T  </a:t>
             </a:r>
             <a:r>
               <a:rPr lang="en-GB" dirty="0" smtClean="0"/>
@@ -10523,16 +10525,6 @@
             <a:r>
               <a:rPr lang="en-GB" dirty="0"/>
               <a:t>Get </a:t>
-            </a:r>
-            <a:r>
-              <a:rPr lang="en-GB" b="1" dirty="0">
-                <a:solidFill>
-                  <a:schemeClr val="accent2">
-                    <a:lumMod val="50000"/>
-                  </a:schemeClr>
-                </a:solidFill>
-              </a:rPr>
-              <a:t>X </a:t>
             </a:r>
             <a:r>
               <a:rPr lang="en-GB" b="1" dirty="0" smtClean="0">
@@ -10542,7 +10534,7 @@
                   </a:schemeClr>
                 </a:solidFill>
               </a:rPr>
-              <a:t> </a:t>
+              <a:t>T  </a:t>
             </a:r>
             <a:r>
               <a:rPr lang="en-GB" dirty="0" smtClean="0"/>
@@ -10567,6 +10559,36 @@
           </a:p>
           <a:p>
             <a:pPr lvl="1"/>
+            <a:r>
+              <a:rPr lang="en-GB" dirty="0"/>
+              <a:t>Declare </a:t>
+            </a:r>
+            <a:r>
+              <a:rPr lang="en-GB" b="1" u="sng" dirty="0" smtClean="0">
+                <a:solidFill>
+                  <a:schemeClr val="accent2">
+                    <a:lumMod val="50000"/>
+                  </a:schemeClr>
+                </a:solidFill>
+              </a:rPr>
+              <a:t>T </a:t>
+            </a:r>
+            <a:r>
+              <a:rPr lang="en-GB" u="sng" dirty="0" err="1" smtClean="0"/>
+              <a:t>args</a:t>
+            </a:r>
+            <a:r>
+              <a:rPr lang="en-GB" dirty="0" smtClean="0"/>
+              <a:t> </a:t>
+            </a:r>
+            <a:r>
+              <a:rPr lang="en-GB" dirty="0" smtClean="0"/>
+              <a:t>(opt)</a:t>
+            </a:r>
+            <a:endParaRPr lang="en-GB" dirty="0"/>
+          </a:p>
+          <a:p>
+            <a:pPr lvl="1" fontAlgn="t"/>
             <a:r>
               <a:rPr lang="en-GB" dirty="0"/>
               <a:t>Declare </a:t>
@@ -10579,33 +10601,17 @@
                   </a:schemeClr>
                 </a:solidFill>
               </a:rPr>
-              <a:t>X </a:t>
-            </a:r>
-            <a:r>
-              <a:rPr lang="en-GB" u="sng" dirty="0" smtClean="0"/>
-              <a:t>arguments</a:t>
-            </a:r>
-            <a:r>
-              <a:rPr lang="en-GB" dirty="0" smtClean="0"/>
-              <a:t> (opt)</a:t>
-            </a:r>
-            <a:endParaRPr lang="en-GB" dirty="0"/>
-          </a:p>
-          <a:p>
-            <a:pPr lvl="1" fontAlgn="t"/>
-            <a:r>
-              <a:rPr lang="en-GB" dirty="0"/>
-              <a:t>Declare </a:t>
-            </a:r>
-            <a:r>
-              <a:rPr lang="en-GB" b="1" u="sng" dirty="0">
+              <a:t>T</a:t>
+            </a:r>
+            <a:r>
+              <a:rPr lang="en-GB" b="1" u="sng" dirty="0" smtClean="0">
                 <a:solidFill>
                   <a:schemeClr val="accent2">
                     <a:lumMod val="50000"/>
                   </a:schemeClr>
                 </a:solidFill>
               </a:rPr>
-              <a:t>X </a:t>
+              <a:t> </a:t>
             </a:r>
             <a:r>
               <a:rPr lang="en-GB" u="sng" dirty="0" smtClean="0"/>
@@ -10620,22 +10626,22 @@
               <a:t>Declare </a:t>
             </a:r>
             <a:r>
-              <a:rPr lang="en-GB" b="1" u="sng" dirty="0">
+              <a:rPr lang="en-GB" b="1" u="sng" dirty="0" smtClean="0">
                 <a:solidFill>
                   <a:schemeClr val="accent6">
                     <a:lumMod val="50000"/>
                   </a:schemeClr>
                 </a:solidFill>
               </a:rPr>
-              <a:t>Java</a:t>
-            </a:r>
-            <a:r>
-              <a:rPr lang="en-GB" u="sng" dirty="0"/>
+              <a:t>JNI</a:t>
+            </a:r>
+            <a:r>
+              <a:rPr lang="en-GB" u="sng" dirty="0" smtClean="0"/>
               <a:t> </a:t>
             </a:r>
             <a:r>
-              <a:rPr lang="en-GB" u="sng" dirty="0" smtClean="0"/>
-              <a:t>arguments</a:t>
+              <a:rPr lang="en-GB" u="sng" dirty="0" err="1" smtClean="0"/>
+              <a:t>args</a:t>
             </a:r>
             <a:endParaRPr lang="en-GB" u="sng" dirty="0"/>
           </a:p>
@@ -10646,17 +10652,17 @@
               <a:t>Declare </a:t>
             </a:r>
             <a:r>
-              <a:rPr lang="en-GB" b="1" u="sng" dirty="0">
+              <a:rPr lang="en-GB" b="1" u="sng" dirty="0" smtClean="0">
                 <a:solidFill>
                   <a:schemeClr val="accent6">
                     <a:lumMod val="50000"/>
                   </a:schemeClr>
                 </a:solidFill>
               </a:rPr>
-              <a:t>Java</a:t>
-            </a:r>
-            <a:r>
-              <a:rPr lang="en-GB" u="sng" dirty="0"/>
+              <a:t>JNI</a:t>
+            </a:r>
+            <a:r>
+              <a:rPr lang="en-GB" u="sng" dirty="0" smtClean="0"/>
               <a:t> </a:t>
             </a:r>
             <a:r>
@@ -10689,7 +10695,7 @@
         <p:spPr/>
         <p:txBody>
           <a:bodyPr>
-            <a:normAutofit fontScale="92500" lnSpcReduction="20000"/>
+            <a:normAutofit fontScale="92500" lnSpcReduction="10000"/>
           </a:bodyPr>
           <a:lstStyle/>
           <a:p>
@@ -10712,11 +10718,21 @@
                   </a:schemeClr>
                 </a:solidFill>
               </a:rPr>
-              <a:t>X </a:t>
-            </a:r>
-            <a:r>
-              <a:rPr lang="en-GB" u="sng" dirty="0" smtClean="0"/>
-              <a:t>arguments</a:t>
+              <a:t>T</a:t>
+            </a:r>
+            <a:r>
+              <a:rPr lang="en-GB" b="1" u="sng" dirty="0" smtClean="0">
+                <a:solidFill>
+                  <a:schemeClr val="accent2">
+                    <a:lumMod val="50000"/>
+                  </a:schemeClr>
+                </a:solidFill>
+              </a:rPr>
+              <a:t> </a:t>
+            </a:r>
+            <a:r>
+              <a:rPr lang="en-GB" u="sng" dirty="0" err="1" smtClean="0"/>
+              <a:t>args</a:t>
             </a:r>
             <a:r>
               <a:rPr lang="en-GB" dirty="0" smtClean="0"/>
@@ -10754,19 +10770,23 @@
                   </a:schemeClr>
                 </a:solidFill>
               </a:rPr>
-              <a:t>Java</a:t>
+              <a:t>JNI</a:t>
             </a:r>
             <a:r>
               <a:rPr lang="en-GB" u="sng" dirty="0" smtClean="0"/>
               <a:t> </a:t>
             </a:r>
             <a:r>
-              <a:rPr lang="en-GB" u="sng" dirty="0"/>
-              <a:t>arguments</a:t>
+              <a:rPr lang="en-GB" u="sng" dirty="0" err="1" smtClean="0"/>
+              <a:t>args</a:t>
+            </a:r>
+            <a:r>
+              <a:rPr lang="en-GB" dirty="0" smtClean="0"/>
+              <a:t> </a:t>
             </a:r>
             <a:r>
               <a:rPr lang="en-GB" dirty="0"/>
-              <a:t> from transformed </a:t>
+              <a:t>from transformed </a:t>
             </a:r>
             <a:r>
               <a:rPr lang="en-GB" b="1" u="sng" dirty="0" smtClean="0">
@@ -10776,16 +10796,17 @@
                   </a:schemeClr>
                 </a:solidFill>
               </a:rPr>
-              <a:t>X </a:t>
-            </a:r>
-            <a:r>
-              <a:rPr lang="en-GB" u="sng" dirty="0"/>
-              <a:t>arguments</a:t>
-            </a:r>
-            <a:r>
-              <a:rPr lang="en-GB" dirty="0"/>
+              <a:t>T </a:t>
+            </a:r>
+            <a:r>
+              <a:rPr lang="en-GB" u="sng" dirty="0" err="1" smtClean="0"/>
+              <a:t>args</a:t>
+            </a:r>
+            <a:r>
+              <a:rPr lang="en-GB" dirty="0" smtClean="0"/>
               <a:t> </a:t>
             </a:r>
+            <a:endParaRPr lang="en-GB" dirty="0"/>
           </a:p>
           <a:p>
             <a:pPr lvl="1"/>
@@ -10794,17 +10815,17 @@
               <a:t>Assign </a:t>
             </a:r>
             <a:r>
-              <a:rPr lang="en-GB" b="1" u="sng" dirty="0">
+              <a:rPr lang="en-GB" b="1" u="sng" dirty="0" smtClean="0">
                 <a:solidFill>
                   <a:schemeClr val="accent6">
                     <a:lumMod val="50000"/>
                   </a:schemeClr>
                 </a:solidFill>
               </a:rPr>
-              <a:t>Java</a:t>
-            </a:r>
-            <a:r>
-              <a:rPr lang="en-GB" u="sng" dirty="0"/>
+              <a:t>JNI</a:t>
+            </a:r>
+            <a:r>
+              <a:rPr lang="en-GB" u="sng" dirty="0" smtClean="0"/>
               <a:t> </a:t>
             </a:r>
             <a:r>
@@ -10816,17 +10837,17 @@
               <a:t> from </a:t>
             </a:r>
             <a:r>
-              <a:rPr lang="en-GB" b="1" dirty="0">
+              <a:rPr lang="en-GB" b="1" dirty="0" smtClean="0">
                 <a:solidFill>
                   <a:schemeClr val="accent6">
                     <a:lumMod val="50000"/>
                   </a:schemeClr>
                 </a:solidFill>
               </a:rPr>
-              <a:t>Java</a:t>
-            </a:r>
-            <a:r>
-              <a:rPr lang="en-GB" dirty="0"/>
+              <a:t>JNI</a:t>
+            </a:r>
+            <a:r>
+              <a:rPr lang="en-GB" dirty="0" smtClean="0"/>
               <a:t> </a:t>
             </a:r>
             <a:r>
@@ -10848,7 +10869,7 @@
                   </a:schemeClr>
                 </a:solidFill>
               </a:rPr>
-              <a:t>X </a:t>
+              <a:t>T </a:t>
             </a:r>
             <a:r>
               <a:rPr lang="en-GB" u="sng" dirty="0"/>
@@ -10859,17 +10880,17 @@
               <a:t> from transformed </a:t>
             </a:r>
             <a:r>
-              <a:rPr lang="en-GB" b="1" u="sng" dirty="0">
+              <a:rPr lang="en-GB" b="1" u="sng" dirty="0" smtClean="0">
                 <a:solidFill>
                   <a:schemeClr val="accent6">
                     <a:lumMod val="50000"/>
                   </a:schemeClr>
                 </a:solidFill>
               </a:rPr>
-              <a:t>Java</a:t>
-            </a:r>
-            <a:r>
-              <a:rPr lang="en-GB" u="sng" dirty="0"/>
+              <a:t>JNI</a:t>
+            </a:r>
+            <a:r>
+              <a:rPr lang="en-GB" u="sng" dirty="0" smtClean="0"/>
               <a:t> </a:t>
             </a:r>
             <a:r>
@@ -10888,22 +10909,22 @@
               <a:t> </a:t>
             </a:r>
             <a:r>
-              <a:rPr lang="en-GB" b="1" u="sng" dirty="0">
+              <a:rPr lang="en-GB" b="1" u="sng" dirty="0" smtClean="0">
                 <a:solidFill>
                   <a:schemeClr val="accent6">
                     <a:lumMod val="50000"/>
                   </a:schemeClr>
                 </a:solidFill>
               </a:rPr>
-              <a:t>Java</a:t>
-            </a:r>
-            <a:r>
-              <a:rPr lang="en-GB" u="sng" dirty="0"/>
+              <a:t>JNI</a:t>
+            </a:r>
+            <a:r>
+              <a:rPr lang="en-GB" u="sng" dirty="0" smtClean="0"/>
               <a:t> </a:t>
             </a:r>
             <a:r>
-              <a:rPr lang="en-GB" u="sng" dirty="0" smtClean="0"/>
-              <a:t>arguments</a:t>
+              <a:rPr lang="en-GB" u="sng" dirty="0" err="1" smtClean="0"/>
+              <a:t>args</a:t>
             </a:r>
             <a:endParaRPr lang="en-GB" u="sng" dirty="0"/>
           </a:p>
@@ -10918,22 +10939,18 @@
               <a:t> </a:t>
             </a:r>
             <a:r>
-              <a:rPr lang="en-GB" b="1" u="sng" dirty="0">
+              <a:rPr lang="en-GB" b="1" u="sng" smtClean="0">
                 <a:solidFill>
                   <a:schemeClr val="accent6">
                     <a:lumMod val="50000"/>
                   </a:schemeClr>
                 </a:solidFill>
               </a:rPr>
-              <a:t>Java</a:t>
-            </a:r>
-            <a:r>
-              <a:rPr lang="en-GB" u="sng" dirty="0"/>
-              <a:t> </a:t>
-            </a:r>
-            <a:r>
-              <a:rPr lang="en-GB" u="sng" dirty="0" smtClean="0"/>
-              <a:t>result</a:t>
+              <a:t>JNI</a:t>
+            </a:r>
+            <a:r>
+              <a:rPr lang="en-GB" u="sng" smtClean="0"/>
+              <a:t> result</a:t>
             </a:r>
             <a:endParaRPr lang="en-GB" u="sng" dirty="0"/>
           </a:p>
@@ -10944,18 +10961,18 @@
               <a:t>Return </a:t>
             </a:r>
             <a:r>
-              <a:rPr lang="en-GB" b="1" u="sng" dirty="0">
+              <a:rPr lang="en-GB" b="1" u="sng" dirty="0" smtClean="0">
                 <a:solidFill>
                   <a:schemeClr val="accent2">
                     <a:lumMod val="50000"/>
                   </a:schemeClr>
                 </a:solidFill>
               </a:rPr>
-              <a:t>X </a:t>
+              <a:t>T</a:t>
             </a:r>
             <a:r>
               <a:rPr lang="en-GB" u="sng" dirty="0" smtClean="0"/>
-              <a:t>result</a:t>
+              <a:t> result</a:t>
             </a:r>
             <a:endParaRPr lang="en-GB" u="sng" dirty="0"/>
           </a:p>

</xml_diff>

<commit_message>
updated with overview of conversion functions
</commit_message>
<xml_diff>
--- a/docs/beam-extapi.pptx
+++ b/docs/beam-extapi.pptx
@@ -18,16 +18,20 @@
     <p:sldId id="281" r:id="rId12"/>
     <p:sldId id="280" r:id="rId13"/>
     <p:sldId id="282" r:id="rId14"/>
-    <p:sldId id="265" r:id="rId15"/>
-    <p:sldId id="267" r:id="rId16"/>
-    <p:sldId id="266" r:id="rId17"/>
-    <p:sldId id="268" r:id="rId18"/>
-    <p:sldId id="272" r:id="rId19"/>
-    <p:sldId id="275" r:id="rId20"/>
-    <p:sldId id="274" r:id="rId21"/>
-    <p:sldId id="269" r:id="rId22"/>
-    <p:sldId id="270" r:id="rId23"/>
-    <p:sldId id="273" r:id="rId24"/>
+    <p:sldId id="289" r:id="rId15"/>
+    <p:sldId id="290" r:id="rId16"/>
+    <p:sldId id="291" r:id="rId17"/>
+    <p:sldId id="292" r:id="rId18"/>
+    <p:sldId id="265" r:id="rId19"/>
+    <p:sldId id="267" r:id="rId20"/>
+    <p:sldId id="266" r:id="rId21"/>
+    <p:sldId id="268" r:id="rId22"/>
+    <p:sldId id="272" r:id="rId23"/>
+    <p:sldId id="275" r:id="rId24"/>
+    <p:sldId id="274" r:id="rId25"/>
+    <p:sldId id="269" r:id="rId26"/>
+    <p:sldId id="270" r:id="rId27"/>
+    <p:sldId id="273" r:id="rId28"/>
   </p:sldIdLst>
   <p:sldSz cx="9144000" cy="6858000" type="screen4x3"/>
   <p:notesSz cx="6858000" cy="9144000"/>
@@ -316,7 +320,7 @@
           <a:p>
             <a:fld id="{1BA50D42-C9CD-4801-B293-61D1F53EC57E}" type="datetimeFigureOut">
               <a:rPr lang="de-DE" smtClean="0"/>
-              <a:t>10.06.2013</a:t>
+              <a:t>11.06.2013</a:t>
             </a:fld>
             <a:endParaRPr lang="de-DE"/>
           </a:p>
@@ -481,7 +485,7 @@
           <a:p>
             <a:fld id="{1BA50D42-C9CD-4801-B293-61D1F53EC57E}" type="datetimeFigureOut">
               <a:rPr lang="de-DE" smtClean="0"/>
-              <a:t>10.06.2013</a:t>
+              <a:t>11.06.2013</a:t>
             </a:fld>
             <a:endParaRPr lang="de-DE"/>
           </a:p>
@@ -656,7 +660,7 @@
           <a:p>
             <a:fld id="{1BA50D42-C9CD-4801-B293-61D1F53EC57E}" type="datetimeFigureOut">
               <a:rPr lang="de-DE" smtClean="0"/>
-              <a:t>10.06.2013</a:t>
+              <a:t>11.06.2013</a:t>
             </a:fld>
             <a:endParaRPr lang="de-DE"/>
           </a:p>
@@ -821,7 +825,7 @@
           <a:p>
             <a:fld id="{1BA50D42-C9CD-4801-B293-61D1F53EC57E}" type="datetimeFigureOut">
               <a:rPr lang="de-DE" smtClean="0"/>
-              <a:t>10.06.2013</a:t>
+              <a:t>11.06.2013</a:t>
             </a:fld>
             <a:endParaRPr lang="de-DE"/>
           </a:p>
@@ -1062,7 +1066,7 @@
           <a:p>
             <a:fld id="{1BA50D42-C9CD-4801-B293-61D1F53EC57E}" type="datetimeFigureOut">
               <a:rPr lang="de-DE" smtClean="0"/>
-              <a:t>10.06.2013</a:t>
+              <a:t>11.06.2013</a:t>
             </a:fld>
             <a:endParaRPr lang="de-DE"/>
           </a:p>
@@ -1345,7 +1349,7 @@
           <a:p>
             <a:fld id="{1BA50D42-C9CD-4801-B293-61D1F53EC57E}" type="datetimeFigureOut">
               <a:rPr lang="de-DE" smtClean="0"/>
-              <a:t>10.06.2013</a:t>
+              <a:t>11.06.2013</a:t>
             </a:fld>
             <a:endParaRPr lang="de-DE"/>
           </a:p>
@@ -1762,7 +1766,7 @@
           <a:p>
             <a:fld id="{1BA50D42-C9CD-4801-B293-61D1F53EC57E}" type="datetimeFigureOut">
               <a:rPr lang="de-DE" smtClean="0"/>
-              <a:t>10.06.2013</a:t>
+              <a:t>11.06.2013</a:t>
             </a:fld>
             <a:endParaRPr lang="de-DE"/>
           </a:p>
@@ -1875,7 +1879,7 @@
           <a:p>
             <a:fld id="{1BA50D42-C9CD-4801-B293-61D1F53EC57E}" type="datetimeFigureOut">
               <a:rPr lang="de-DE" smtClean="0"/>
-              <a:t>10.06.2013</a:t>
+              <a:t>11.06.2013</a:t>
             </a:fld>
             <a:endParaRPr lang="de-DE"/>
           </a:p>
@@ -1965,7 +1969,7 @@
           <a:p>
             <a:fld id="{1BA50D42-C9CD-4801-B293-61D1F53EC57E}" type="datetimeFigureOut">
               <a:rPr lang="de-DE" smtClean="0"/>
-              <a:t>10.06.2013</a:t>
+              <a:t>11.06.2013</a:t>
             </a:fld>
             <a:endParaRPr lang="de-DE"/>
           </a:p>
@@ -2237,7 +2241,7 @@
           <a:p>
             <a:fld id="{1BA50D42-C9CD-4801-B293-61D1F53EC57E}" type="datetimeFigureOut">
               <a:rPr lang="de-DE" smtClean="0"/>
-              <a:t>10.06.2013</a:t>
+              <a:t>11.06.2013</a:t>
             </a:fld>
             <a:endParaRPr lang="de-DE"/>
           </a:p>
@@ -2485,7 +2489,7 @@
           <a:p>
             <a:fld id="{1BA50D42-C9CD-4801-B293-61D1F53EC57E}" type="datetimeFigureOut">
               <a:rPr lang="de-DE" smtClean="0"/>
-              <a:t>10.06.2013</a:t>
+              <a:t>11.06.2013</a:t>
             </a:fld>
             <a:endParaRPr lang="de-DE"/>
           </a:p>
@@ -2693,7 +2697,7 @@
           <a:p>
             <a:fld id="{1BA50D42-C9CD-4801-B293-61D1F53EC57E}" type="datetimeFigureOut">
               <a:rPr lang="de-DE" smtClean="0"/>
-              <a:t>10.06.2013</a:t>
+              <a:t>11.06.2013</a:t>
             </a:fld>
             <a:endParaRPr lang="de-DE"/>
           </a:p>
@@ -5179,7 +5183,7 @@
           <p:nvPr>
             <p:extLst>
               <p:ext uri="{D42A27DB-BD31-4B8C-83A1-F6EECF244321}">
-                <p14:modId xmlns:p14="http://schemas.microsoft.com/office/powerpoint/2010/main" val="3483966802"/>
+                <p14:modId xmlns:p14="http://schemas.microsoft.com/office/powerpoint/2010/main" val="1799130856"/>
               </p:ext>
             </p:extLst>
           </p:nvPr>
@@ -5791,7 +5795,20 @@
                           <a:ea typeface="+mn-ea"/>
                           <a:cs typeface="+mn-cs"/>
                         </a:rPr>
-                        <a:t> = p2jObject(</a:t>
+                        <a:t> = </a:t>
+                      </a:r>
+                      <a:r>
+                        <a:rPr lang="en-GB" sz="1200" kern="1200" dirty="0" smtClean="0">
+                          <a:solidFill>
+                            <a:schemeClr val="accent1">
+                              <a:lumMod val="75000"/>
+                            </a:schemeClr>
+                          </a:solidFill>
+                          <a:latin typeface="+mn-lt"/>
+                          <a:ea typeface="+mn-ea"/>
+                          <a:cs typeface="+mn-cs"/>
+                        </a:rPr>
+                        <a:t>py2jObject(</a:t>
                       </a:r>
                       <a:r>
                         <a:rPr lang="en-GB" sz="1200" kern="1200" dirty="0" err="1" smtClean="0">
@@ -5875,7 +5892,33 @@
                           <a:ea typeface="+mn-ea"/>
                           <a:cs typeface="+mn-cs"/>
                         </a:rPr>
-                        <a:t> = c2jString(s);</a:t>
+                        <a:t> = </a:t>
+                      </a:r>
+                      <a:r>
+                        <a:rPr lang="en-GB" sz="1200" kern="1200" dirty="0" smtClean="0">
+                          <a:solidFill>
+                            <a:schemeClr val="accent1">
+                              <a:lumMod val="75000"/>
+                            </a:schemeClr>
+                          </a:solidFill>
+                          <a:latin typeface="+mn-lt"/>
+                          <a:ea typeface="+mn-ea"/>
+                          <a:cs typeface="+mn-cs"/>
+                        </a:rPr>
+                        <a:t>py2jString(s</a:t>
+                      </a:r>
+                      <a:r>
+                        <a:rPr lang="en-GB" sz="1200" kern="1200" dirty="0" smtClean="0">
+                          <a:solidFill>
+                            <a:schemeClr val="accent1">
+                              <a:lumMod val="75000"/>
+                            </a:schemeClr>
+                          </a:solidFill>
+                          <a:latin typeface="+mn-lt"/>
+                          <a:ea typeface="+mn-ea"/>
+                          <a:cs typeface="+mn-cs"/>
+                        </a:rPr>
+                        <a:t>);</a:t>
                       </a:r>
                     </a:p>
                     <a:p>
@@ -5965,7 +6008,33 @@
                           <a:ea typeface="+mn-ea"/>
                           <a:cs typeface="+mn-cs"/>
                         </a:rPr>
-                        <a:t> = c2jRectangle(r);</a:t>
+                        <a:t> = </a:t>
+                      </a:r>
+                      <a:r>
+                        <a:rPr lang="en-GB" sz="1200" kern="1200" dirty="0" smtClean="0">
+                          <a:solidFill>
+                            <a:schemeClr val="accent1">
+                              <a:lumMod val="75000"/>
+                            </a:schemeClr>
+                          </a:solidFill>
+                          <a:latin typeface="+mn-lt"/>
+                          <a:ea typeface="+mn-ea"/>
+                          <a:cs typeface="+mn-cs"/>
+                        </a:rPr>
+                        <a:t>py2jRectangle(r</a:t>
+                      </a:r>
+                      <a:r>
+                        <a:rPr lang="en-GB" sz="1200" kern="1200" dirty="0" smtClean="0">
+                          <a:solidFill>
+                            <a:schemeClr val="accent1">
+                              <a:lumMod val="75000"/>
+                            </a:schemeClr>
+                          </a:solidFill>
+                          <a:latin typeface="+mn-lt"/>
+                          <a:ea typeface="+mn-ea"/>
+                          <a:cs typeface="+mn-cs"/>
+                        </a:rPr>
+                        <a:t>);</a:t>
                       </a:r>
                     </a:p>
                     <a:p>
@@ -5997,7 +6066,20 @@
                           <a:ea typeface="+mn-ea"/>
                           <a:cs typeface="+mn-cs"/>
                         </a:rPr>
-                        <a:t> = p2jObject(</a:t>
+                        <a:t> = </a:t>
+                      </a:r>
+                      <a:r>
+                        <a:rPr lang="en-GB" sz="1200" kern="1200" dirty="0" smtClean="0">
+                          <a:solidFill>
+                            <a:schemeClr val="accent1">
+                              <a:lumMod val="75000"/>
+                            </a:schemeClr>
+                          </a:solidFill>
+                          <a:latin typeface="+mn-lt"/>
+                          <a:ea typeface="+mn-ea"/>
+                          <a:cs typeface="+mn-cs"/>
+                        </a:rPr>
+                        <a:t>py2jObject(</a:t>
                       </a:r>
                       <a:r>
                         <a:rPr lang="en-GB" sz="1200" kern="1200" dirty="0" err="1" smtClean="0">
@@ -10571,11 +10653,7 @@
             </a:r>
             <a:r>
               <a:rPr lang="en-GB" dirty="0" smtClean="0"/>
-              <a:t> </a:t>
-            </a:r>
-            <a:r>
-              <a:rPr lang="en-GB" dirty="0" smtClean="0"/>
-              <a:t>¹ (</a:t>
+              <a:t> ¹ (</a:t>
             </a:r>
             <a:r>
               <a:rPr lang="en-GB" dirty="0"/>
@@ -10810,7 +10888,6 @@
               <a:rPr lang="en-GB" dirty="0"/>
               <a:t>¹</a:t>
             </a:r>
-            <a:endParaRPr lang="en-GB" dirty="0"/>
           </a:p>
           <a:p>
             <a:pPr lvl="1"/>
@@ -10887,13 +10964,8 @@
             </a:r>
             <a:r>
               <a:rPr lang="en-GB" u="sng" dirty="0" smtClean="0"/>
-              <a:t> </a:t>
-            </a:r>
-            <a:r>
-              <a:rPr lang="en-GB" u="sng" dirty="0" smtClean="0"/>
-              <a:t>result</a:t>
-            </a:r>
-            <a:endParaRPr lang="en-GB" u="sng" dirty="0" smtClean="0"/>
+              <a:t> result</a:t>
+            </a:r>
           </a:p>
           <a:p>
             <a:pPr lvl="1" fontAlgn="t"/>
@@ -10977,11 +11049,7 @@
             </a:r>
             <a:r>
               <a:rPr lang="en-GB" u="sng" dirty="0" smtClean="0"/>
-              <a:t> </a:t>
-            </a:r>
-            <a:r>
-              <a:rPr lang="en-GB" u="sng" dirty="0" smtClean="0"/>
-              <a:t>result</a:t>
+              <a:t> result</a:t>
             </a:r>
           </a:p>
           <a:p>
@@ -11081,7 +11149,17 @@
           <a:p>
             <a:r>
               <a:rPr lang="en-GB" dirty="0" smtClean="0"/>
-              <a:t>Generate C and Python Code</a:t>
+              <a:t>Object Type Conversion: </a:t>
+            </a:r>
+            <a:r>
+              <a:rPr lang="en-GB" dirty="0" err="1" smtClean="0"/>
+              <a:t>Java</a:t>
+            </a:r>
+            <a:r>
+              <a:rPr lang="en-GB" dirty="0" err="1" smtClean="0">
+                <a:sym typeface="Wingdings" pitchFamily="2" charset="2"/>
+              </a:rPr>
+              <a:t>C</a:t>
             </a:r>
             <a:endParaRPr lang="en-GB" dirty="0"/>
           </a:p>
@@ -11100,82 +11178,400 @@
         <p:spPr/>
         <p:txBody>
           <a:bodyPr>
-            <a:normAutofit fontScale="85000" lnSpcReduction="20000"/>
+            <a:normAutofit lnSpcReduction="10000"/>
           </a:bodyPr>
           <a:lstStyle/>
           <a:p>
             <a:r>
-              <a:rPr lang="en-GB" dirty="0" smtClean="0"/>
-              <a:t>Create a compiler that generates the C and Python glue code</a:t>
-            </a:r>
-          </a:p>
-          <a:p>
-            <a:r>
-              <a:rPr lang="en-GB" dirty="0" smtClean="0"/>
-              <a:t>Pro</a:t>
+              <a:rPr lang="en-GB" sz="2400" dirty="0" smtClean="0"/>
+              <a:t>Conversion / Construction</a:t>
             </a:r>
           </a:p>
           <a:p>
             <a:pPr lvl="1"/>
             <a:r>
-              <a:rPr lang="en-GB" dirty="0" smtClean="0"/>
-              <a:t>Java API changes easily translate into Python/C code</a:t>
+              <a:rPr lang="en-GB" sz="2000" dirty="0" smtClean="0"/>
+              <a:t>void* </a:t>
+            </a:r>
+            <a:r>
+              <a:rPr lang="en-GB" sz="2000" dirty="0" err="1" smtClean="0"/>
+              <a:t>beam_toCObject</a:t>
+            </a:r>
+            <a:r>
+              <a:rPr lang="en-GB" sz="2000" dirty="0" smtClean="0"/>
+              <a:t> (</a:t>
+            </a:r>
+            <a:r>
+              <a:rPr lang="en-GB" sz="2000" dirty="0" err="1" smtClean="0"/>
+              <a:t>jobject</a:t>
+            </a:r>
+            <a:r>
+              <a:rPr lang="en-GB" sz="2000" dirty="0" smtClean="0"/>
+              <a:t> o)</a:t>
             </a:r>
           </a:p>
           <a:p>
             <a:pPr lvl="1"/>
             <a:r>
-              <a:rPr lang="en-GB" dirty="0" smtClean="0"/>
-              <a:t>Also documentation can be generated from Java sources </a:t>
+              <a:rPr lang="en-GB" sz="2000" dirty="0" smtClean="0"/>
+              <a:t>char</a:t>
+            </a:r>
+            <a:r>
+              <a:rPr lang="en-GB" sz="2000" dirty="0"/>
+              <a:t>* </a:t>
+            </a:r>
+            <a:r>
+              <a:rPr lang="en-GB" sz="2000" dirty="0" err="1"/>
+              <a:t>beam_newCString</a:t>
+            </a:r>
+            <a:r>
+              <a:rPr lang="en-GB" sz="2000" dirty="0"/>
+              <a:t>(</a:t>
+            </a:r>
+            <a:r>
+              <a:rPr lang="en-GB" sz="2000" dirty="0" err="1"/>
+              <a:t>jstring</a:t>
+            </a:r>
+            <a:r>
+              <a:rPr lang="en-GB" sz="2000" dirty="0"/>
+              <a:t> s</a:t>
+            </a:r>
+            <a:r>
+              <a:rPr lang="en-GB" sz="2000" dirty="0" smtClean="0"/>
+              <a:t>)</a:t>
             </a:r>
           </a:p>
           <a:p>
             <a:pPr lvl="1"/>
             <a:r>
-              <a:rPr lang="en-GB" dirty="0" smtClean="0"/>
-              <a:t>Code production can be automated</a:t>
+              <a:rPr lang="en-GB" sz="2000" dirty="0" smtClean="0"/>
+              <a:t>&lt;</a:t>
+            </a:r>
+            <a:r>
+              <a:rPr lang="en-GB" sz="2000" dirty="0"/>
+              <a:t>T&gt;* </a:t>
+            </a:r>
+            <a:r>
+              <a:rPr lang="en-GB" sz="2000" dirty="0" err="1"/>
+              <a:t>beam_newC</a:t>
+            </a:r>
+            <a:r>
+              <a:rPr lang="en-GB" sz="2000" dirty="0"/>
+              <a:t>&lt;T&gt;Array(</a:t>
+            </a:r>
+            <a:r>
+              <a:rPr lang="en-GB" sz="2000" dirty="0" err="1"/>
+              <a:t>jarray</a:t>
+            </a:r>
+            <a:r>
+              <a:rPr lang="en-GB" sz="2000" dirty="0"/>
+              <a:t> a, </a:t>
+            </a:r>
+            <a:r>
+              <a:rPr lang="en-GB" sz="2000" dirty="0" err="1" smtClean="0"/>
+              <a:t>int</a:t>
+            </a:r>
+            <a:r>
+              <a:rPr lang="en-GB" sz="2000" dirty="0"/>
+              <a:t>* </a:t>
+            </a:r>
+            <a:r>
+              <a:rPr lang="en-GB" sz="2000" dirty="0" err="1" smtClean="0"/>
+              <a:t>len</a:t>
+            </a:r>
+            <a:r>
+              <a:rPr lang="en-GB" sz="2000" dirty="0" smtClean="0"/>
+              <a:t>)</a:t>
+            </a:r>
+            <a:r>
+              <a:rPr lang="en-GB" sz="2000" baseline="30000" dirty="0" smtClean="0"/>
+              <a:t>1</a:t>
             </a:r>
           </a:p>
           <a:p>
             <a:pPr lvl="1"/>
             <a:r>
-              <a:rPr lang="en-GB" dirty="0" smtClean="0"/>
-              <a:t>Bugs are fixed in the compiler code, not in glue code</a:t>
+              <a:rPr lang="en-GB" sz="2000" dirty="0" smtClean="0"/>
+              <a:t>void** </a:t>
+            </a:r>
+            <a:r>
+              <a:rPr lang="en-GB" sz="2000" dirty="0" err="1" smtClean="0"/>
+              <a:t>beam_newC</a:t>
+            </a:r>
+            <a:r>
+              <a:rPr lang="en-GB" sz="2000" dirty="0" err="1"/>
+              <a:t>Object</a:t>
+            </a:r>
+            <a:r>
+              <a:rPr lang="en-GB" sz="2000" dirty="0" err="1" smtClean="0"/>
+              <a:t>Array</a:t>
+            </a:r>
+            <a:r>
+              <a:rPr lang="en-GB" sz="2000" dirty="0" smtClean="0"/>
+              <a:t>(</a:t>
+            </a:r>
+            <a:r>
+              <a:rPr lang="en-GB" sz="2000" dirty="0" err="1" smtClean="0"/>
+              <a:t>jarray</a:t>
+            </a:r>
+            <a:r>
+              <a:rPr lang="en-GB" sz="2000" dirty="0" smtClean="0"/>
+              <a:t> a, </a:t>
+            </a:r>
+            <a:r>
+              <a:rPr lang="en-GB" sz="2000" dirty="0" err="1" smtClean="0"/>
+              <a:t>int</a:t>
+            </a:r>
+            <a:r>
+              <a:rPr lang="en-GB" sz="2000" dirty="0" smtClean="0"/>
+              <a:t>* </a:t>
+            </a:r>
+            <a:r>
+              <a:rPr lang="en-GB" sz="2000" dirty="0" err="1" smtClean="0"/>
+              <a:t>len</a:t>
+            </a:r>
+            <a:r>
+              <a:rPr lang="en-GB" sz="2000" dirty="0" smtClean="0"/>
+              <a:t>)</a:t>
             </a:r>
           </a:p>
           <a:p>
             <a:pPr lvl="1"/>
             <a:r>
-              <a:rPr lang="en-GB" dirty="0" smtClean="0"/>
-              <a:t>Also test code might be generated</a:t>
-            </a:r>
-          </a:p>
-          <a:p>
-            <a:r>
-              <a:rPr lang="en-GB" dirty="0" smtClean="0"/>
-              <a:t>Contra</a:t>
+              <a:rPr lang="en-GB" sz="2000" dirty="0" smtClean="0"/>
+              <a:t>char</a:t>
+            </a:r>
+            <a:r>
+              <a:rPr lang="en-GB" sz="2000" dirty="0"/>
+              <a:t>** </a:t>
+            </a:r>
+            <a:r>
+              <a:rPr lang="en-GB" sz="2000" dirty="0" err="1" smtClean="0"/>
+              <a:t>beam_newCStringArray</a:t>
+            </a:r>
+            <a:r>
+              <a:rPr lang="en-GB" sz="2000" dirty="0" smtClean="0"/>
+              <a:t>(</a:t>
+            </a:r>
+            <a:r>
+              <a:rPr lang="en-GB" sz="2000" dirty="0" err="1" smtClean="0"/>
+              <a:t>jstringArray</a:t>
+            </a:r>
+            <a:r>
+              <a:rPr lang="en-GB" sz="2000" dirty="0" smtClean="0"/>
+              <a:t> </a:t>
+            </a:r>
+            <a:r>
+              <a:rPr lang="en-GB" sz="2000" dirty="0"/>
+              <a:t>a, </a:t>
+            </a:r>
+            <a:r>
+              <a:rPr lang="en-GB" sz="2000" dirty="0" err="1" smtClean="0"/>
+              <a:t>int</a:t>
+            </a:r>
+            <a:r>
+              <a:rPr lang="en-GB" sz="2000" dirty="0"/>
+              <a:t>* </a:t>
+            </a:r>
+            <a:r>
+              <a:rPr lang="en-GB" sz="2000" dirty="0" err="1" smtClean="0"/>
+              <a:t>len</a:t>
+            </a:r>
+            <a:r>
+              <a:rPr lang="en-GB" sz="2000" dirty="0" smtClean="0"/>
+              <a:t>)</a:t>
+            </a:r>
+          </a:p>
+          <a:p>
+            <a:r>
+              <a:rPr lang="en-GB" sz="2400" dirty="0" smtClean="0"/>
+              <a:t>Destruction</a:t>
             </a:r>
           </a:p>
           <a:p>
             <a:pPr lvl="1"/>
             <a:r>
-              <a:rPr lang="en-GB" dirty="0" smtClean="0"/>
-              <a:t>It might take a long time to develop a mature compiler</a:t>
+              <a:rPr lang="en-GB" sz="2000" dirty="0"/>
+              <a:t>void </a:t>
+            </a:r>
+            <a:r>
+              <a:rPr lang="en-GB" sz="2000" dirty="0" err="1"/>
+              <a:t>beam_deleteCString</a:t>
+            </a:r>
+            <a:r>
+              <a:rPr lang="en-GB" sz="2000" dirty="0"/>
+              <a:t>(char* s)</a:t>
             </a:r>
           </a:p>
           <a:p>
             <a:pPr lvl="1"/>
             <a:r>
-              <a:rPr lang="en-GB" dirty="0" smtClean="0"/>
-              <a:t>There might be a number of exceptions from rules</a:t>
-            </a:r>
+              <a:rPr lang="en-GB" sz="2000" dirty="0" smtClean="0"/>
+              <a:t>void </a:t>
+            </a:r>
+            <a:r>
+              <a:rPr lang="en-GB" sz="2000" dirty="0" err="1" smtClean="0"/>
+              <a:t>beam_deleteC</a:t>
+            </a:r>
+            <a:r>
+              <a:rPr lang="en-GB" sz="2000" dirty="0" smtClean="0"/>
+              <a:t>&lt;T&gt;Array</a:t>
+            </a:r>
+            <a:r>
+              <a:rPr lang="en-GB" sz="2000" dirty="0"/>
+              <a:t>(&lt;T&gt;* </a:t>
+            </a:r>
+            <a:r>
+              <a:rPr lang="en-GB" sz="2000" dirty="0" smtClean="0"/>
+              <a:t>a, </a:t>
+            </a:r>
+            <a:r>
+              <a:rPr lang="en-GB" sz="2000" dirty="0" err="1" smtClean="0"/>
+              <a:t>int</a:t>
+            </a:r>
+            <a:r>
+              <a:rPr lang="en-GB" sz="2000" dirty="0" smtClean="0"/>
+              <a:t> </a:t>
+            </a:r>
+            <a:r>
+              <a:rPr lang="en-GB" sz="2000" dirty="0" err="1" smtClean="0"/>
+              <a:t>len</a:t>
+            </a:r>
+            <a:r>
+              <a:rPr lang="en-GB" sz="2000" dirty="0" smtClean="0"/>
+              <a:t>)</a:t>
+            </a:r>
+            <a:r>
+              <a:rPr lang="en-GB" sz="2000" baseline="30000" dirty="0" smtClean="0"/>
+              <a:t> </a:t>
+            </a:r>
+            <a:r>
+              <a:rPr lang="en-GB" sz="2000" baseline="30000" dirty="0"/>
+              <a:t>1</a:t>
+            </a:r>
+            <a:endParaRPr lang="en-GB" sz="2000" dirty="0"/>
+          </a:p>
+          <a:p>
+            <a:pPr lvl="1"/>
+            <a:r>
+              <a:rPr lang="en-GB" sz="2000" dirty="0" smtClean="0"/>
+              <a:t>void </a:t>
+            </a:r>
+            <a:r>
+              <a:rPr lang="en-GB" sz="2000" dirty="0" err="1" smtClean="0"/>
+              <a:t>beam_deleteCObjectArray</a:t>
+            </a:r>
+            <a:r>
+              <a:rPr lang="en-GB" sz="2000" dirty="0" smtClean="0"/>
+              <a:t>(void</a:t>
+            </a:r>
+            <a:r>
+              <a:rPr lang="en-GB" sz="2000" dirty="0"/>
+              <a:t>** a, </a:t>
+            </a:r>
+            <a:r>
+              <a:rPr lang="en-GB" sz="2000" dirty="0" err="1" smtClean="0"/>
+              <a:t>int</a:t>
+            </a:r>
+            <a:r>
+              <a:rPr lang="en-GB" sz="2000" dirty="0" smtClean="0"/>
+              <a:t> </a:t>
+            </a:r>
+            <a:r>
+              <a:rPr lang="en-GB" sz="2000" dirty="0" err="1"/>
+              <a:t>len</a:t>
+            </a:r>
+            <a:r>
+              <a:rPr lang="en-GB" sz="2000" dirty="0" smtClean="0"/>
+              <a:t>)</a:t>
+            </a:r>
+            <a:endParaRPr lang="en-GB" sz="2000" dirty="0"/>
+          </a:p>
+          <a:p>
+            <a:pPr lvl="1"/>
+            <a:r>
+              <a:rPr lang="en-GB" sz="2000" dirty="0" smtClean="0"/>
+              <a:t>void </a:t>
+            </a:r>
+            <a:r>
+              <a:rPr lang="en-GB" sz="2000" dirty="0" err="1" smtClean="0"/>
+              <a:t>beam_deleteCStringArray</a:t>
+            </a:r>
+            <a:r>
+              <a:rPr lang="en-GB" sz="2000" dirty="0" smtClean="0"/>
+              <a:t>(char** a, </a:t>
+            </a:r>
+            <a:r>
+              <a:rPr lang="en-GB" sz="2000" dirty="0" err="1" smtClean="0"/>
+              <a:t>int</a:t>
+            </a:r>
+            <a:r>
+              <a:rPr lang="en-GB" sz="2000" dirty="0" smtClean="0"/>
+              <a:t> </a:t>
+            </a:r>
+            <a:r>
+              <a:rPr lang="en-GB" sz="2000" dirty="0" err="1" smtClean="0"/>
+              <a:t>len</a:t>
+            </a:r>
+            <a:r>
+              <a:rPr lang="en-GB" sz="2000" dirty="0" smtClean="0"/>
+              <a:t>)</a:t>
+            </a:r>
+          </a:p>
+          <a:p>
+            <a:pPr marL="0" indent="0">
+              <a:buNone/>
+            </a:pPr>
+            <a:endParaRPr lang="en-GB" sz="2400" baseline="30000" dirty="0"/>
+          </a:p>
+          <a:p>
+            <a:pPr marL="0" indent="0">
+              <a:buNone/>
+            </a:pPr>
+            <a:r>
+              <a:rPr lang="en-GB" sz="1800" baseline="30000" dirty="0" smtClean="0"/>
+              <a:t>1 </a:t>
+            </a:r>
+            <a:r>
+              <a:rPr lang="en-GB" sz="1800" dirty="0" smtClean="0"/>
+              <a:t>T = </a:t>
+            </a:r>
+            <a:r>
+              <a:rPr lang="en-GB" sz="1800" dirty="0" err="1" smtClean="0"/>
+              <a:t>boolean</a:t>
+            </a:r>
+            <a:r>
+              <a:rPr lang="en-GB" sz="1800" dirty="0" smtClean="0"/>
+              <a:t>, byte, char, short, </a:t>
+            </a:r>
+            <a:r>
+              <a:rPr lang="en-GB" sz="1800" dirty="0" err="1" smtClean="0"/>
+              <a:t>int</a:t>
+            </a:r>
+            <a:r>
+              <a:rPr lang="en-GB" sz="1800" dirty="0" smtClean="0"/>
+              <a:t>, long, float, double</a:t>
+            </a:r>
+            <a:endParaRPr lang="en-GB" sz="1800" dirty="0"/>
+          </a:p>
+          <a:p>
+            <a:pPr lvl="1"/>
+            <a:endParaRPr lang="en-GB" sz="2000" dirty="0" smtClean="0"/>
+          </a:p>
+          <a:p>
+            <a:pPr lvl="1"/>
+            <a:endParaRPr lang="en-GB" dirty="0" smtClean="0"/>
+          </a:p>
+          <a:p>
+            <a:pPr lvl="1"/>
+            <a:endParaRPr lang="en-GB" dirty="0"/>
           </a:p>
         </p:txBody>
       </p:sp>
     </p:spTree>
     <p:extLst>
       <p:ext uri="{BB962C8B-B14F-4D97-AF65-F5344CB8AC3E}">
-        <p14:creationId xmlns:p14="http://schemas.microsoft.com/office/powerpoint/2010/main" val="3643622142"/>
+        <p14:creationId xmlns:p14="http://schemas.microsoft.com/office/powerpoint/2010/main" val="2870151392"/>
       </p:ext>
     </p:extLst>
   </p:cSld>
@@ -11226,7 +11622,17 @@
           <a:p>
             <a:r>
               <a:rPr lang="en-GB" dirty="0" smtClean="0"/>
-              <a:t>Compiler Design Issues</a:t>
+              <a:t>Object Type Conversion: </a:t>
+            </a:r>
+            <a:r>
+              <a:rPr lang="en-GB" dirty="0" err="1" smtClean="0"/>
+              <a:t>C</a:t>
+            </a:r>
+            <a:r>
+              <a:rPr lang="en-GB" dirty="0" err="1" smtClean="0">
+                <a:sym typeface="Wingdings" pitchFamily="2" charset="2"/>
+              </a:rPr>
+              <a:t>Java</a:t>
             </a:r>
             <a:endParaRPr lang="en-GB" dirty="0"/>
           </a:p>
@@ -11245,89 +11651,301 @@
         <p:spPr/>
         <p:txBody>
           <a:bodyPr>
-            <a:normAutofit fontScale="85000" lnSpcReduction="20000"/>
+            <a:normAutofit/>
           </a:bodyPr>
           <a:lstStyle/>
           <a:p>
             <a:r>
-              <a:rPr lang="en-GB" dirty="0" smtClean="0"/>
-              <a:t>In order to avoid binding of all Java code,</a:t>
+              <a:rPr lang="en-GB" sz="2400" dirty="0" smtClean="0"/>
+              <a:t>Conversion</a:t>
             </a:r>
           </a:p>
           <a:p>
             <a:pPr lvl="1"/>
             <a:r>
-              <a:rPr lang="en-GB" dirty="0" smtClean="0"/>
-              <a:t>define a list of types for which code shall be generated (Product, Band, </a:t>
-            </a:r>
-            <a:r>
-              <a:rPr lang="en-GB" dirty="0" err="1" smtClean="0"/>
-              <a:t>TiePointGrid</a:t>
-            </a:r>
-            <a:r>
-              <a:rPr lang="en-GB" dirty="0" smtClean="0"/>
-              <a:t>, …)</a:t>
-            </a:r>
+              <a:rPr lang="en-GB" sz="2000" dirty="0" err="1" smtClean="0"/>
+              <a:t>jobject</a:t>
+            </a:r>
+            <a:r>
+              <a:rPr lang="en-GB" sz="2000" dirty="0" smtClean="0"/>
+              <a:t> </a:t>
+            </a:r>
+            <a:r>
+              <a:rPr lang="en-GB" sz="2000" dirty="0" err="1"/>
+              <a:t>Object_</a:t>
+            </a:r>
+            <a:r>
+              <a:rPr lang="en-GB" sz="2000" dirty="0" err="1" smtClean="0"/>
+              <a:t>toJObject</a:t>
+            </a:r>
+            <a:r>
+              <a:rPr lang="en-GB" sz="2000" dirty="0" smtClean="0"/>
+              <a:t> (</a:t>
+            </a:r>
+            <a:r>
+              <a:rPr lang="en-GB" sz="2000" dirty="0"/>
+              <a:t>void* </a:t>
+            </a:r>
+            <a:r>
+              <a:rPr lang="en-GB" sz="2000" dirty="0" smtClean="0"/>
+              <a:t>o)</a:t>
+            </a:r>
+          </a:p>
+          <a:p>
+            <a:r>
+              <a:rPr lang="en-GB" sz="2400" dirty="0"/>
+              <a:t>Object </a:t>
+            </a:r>
+            <a:r>
+              <a:rPr lang="en-GB" sz="2400" dirty="0" smtClean="0"/>
+              <a:t>Construction</a:t>
+            </a:r>
+            <a:endParaRPr lang="en-GB" sz="2000" dirty="0" smtClean="0"/>
           </a:p>
           <a:p>
             <a:pPr lvl="1"/>
             <a:r>
-              <a:rPr lang="en-GB" dirty="0"/>
-              <a:t>f</a:t>
-            </a:r>
-            <a:r>
-              <a:rPr lang="en-GB" dirty="0" smtClean="0"/>
-              <a:t>or some types or single methods, we will provide hand-written code (File, String, …)</a:t>
-            </a:r>
+              <a:rPr lang="en-GB" sz="2000" dirty="0" err="1" smtClean="0"/>
+              <a:t>jstring</a:t>
+            </a:r>
+            <a:r>
+              <a:rPr lang="en-GB" sz="2000" dirty="0" smtClean="0"/>
+              <a:t> </a:t>
+            </a:r>
+            <a:r>
+              <a:rPr lang="en-GB" sz="2000" dirty="0" err="1"/>
+              <a:t>Object_</a:t>
+            </a:r>
+            <a:r>
+              <a:rPr lang="en-GB" sz="2000" dirty="0" err="1" smtClean="0"/>
+              <a:t>newJString</a:t>
+            </a:r>
+            <a:r>
+              <a:rPr lang="en-GB" sz="2000" dirty="0" smtClean="0"/>
+              <a:t>(</a:t>
+            </a:r>
+            <a:r>
+              <a:rPr lang="en-GB" sz="2000" dirty="0" err="1" smtClean="0"/>
+              <a:t>const</a:t>
+            </a:r>
+            <a:r>
+              <a:rPr lang="en-GB" sz="2000" dirty="0" smtClean="0"/>
+              <a:t> char* s)</a:t>
+            </a:r>
+          </a:p>
+          <a:p>
+            <a:pPr lvl="1"/>
+            <a:r>
+              <a:rPr lang="en-GB" sz="2000" dirty="0" err="1"/>
+              <a:t>jarray</a:t>
+            </a:r>
+            <a:r>
+              <a:rPr lang="en-GB" sz="2000" dirty="0"/>
+              <a:t> </a:t>
+            </a:r>
+            <a:r>
+              <a:rPr lang="en-GB" sz="2000" dirty="0" err="1"/>
+              <a:t>Object_</a:t>
+            </a:r>
+            <a:r>
+              <a:rPr lang="en-GB" sz="2000" dirty="0" err="1" smtClean="0"/>
+              <a:t>newJ</a:t>
+            </a:r>
+            <a:r>
+              <a:rPr lang="en-GB" sz="2000" dirty="0" smtClean="0"/>
+              <a:t>&lt;T&gt;Array</a:t>
+            </a:r>
+            <a:r>
+              <a:rPr lang="en-GB" sz="2000" dirty="0"/>
+              <a:t>(&lt;T&gt;* a, </a:t>
+            </a:r>
+            <a:r>
+              <a:rPr lang="en-GB" sz="2000" dirty="0" err="1"/>
+              <a:t>int</a:t>
+            </a:r>
+            <a:r>
+              <a:rPr lang="en-GB" sz="2000" dirty="0"/>
+              <a:t> </a:t>
+            </a:r>
+            <a:r>
+              <a:rPr lang="en-GB" sz="2000" dirty="0" err="1" smtClean="0"/>
+              <a:t>len</a:t>
+            </a:r>
+            <a:r>
+              <a:rPr lang="en-GB" sz="2000" dirty="0" smtClean="0"/>
+              <a:t>)</a:t>
+            </a:r>
+            <a:r>
+              <a:rPr lang="en-GB" sz="2000" baseline="30000" dirty="0" smtClean="0"/>
+              <a:t>1</a:t>
+            </a:r>
+            <a:endParaRPr lang="en-GB" sz="2000" baseline="30000" dirty="0"/>
+          </a:p>
+          <a:p>
+            <a:pPr lvl="1"/>
+            <a:r>
+              <a:rPr lang="en-GB" sz="2000" dirty="0" err="1" smtClean="0"/>
+              <a:t>jarray</a:t>
+            </a:r>
+            <a:r>
+              <a:rPr lang="en-GB" sz="2000" dirty="0" smtClean="0"/>
+              <a:t> </a:t>
+            </a:r>
+            <a:r>
+              <a:rPr lang="en-GB" sz="2000" dirty="0" err="1"/>
+              <a:t>Object_</a:t>
+            </a:r>
+            <a:r>
+              <a:rPr lang="en-GB" sz="2000" dirty="0" err="1" smtClean="0"/>
+              <a:t>newJObjectArray</a:t>
+            </a:r>
+            <a:r>
+              <a:rPr lang="en-GB" sz="2000" dirty="0" smtClean="0"/>
+              <a:t>(void** a, </a:t>
+            </a:r>
+            <a:r>
+              <a:rPr lang="en-GB" sz="2000" dirty="0" err="1" smtClean="0"/>
+              <a:t>int</a:t>
+            </a:r>
+            <a:r>
+              <a:rPr lang="en-GB" sz="2000" dirty="0" smtClean="0"/>
+              <a:t> </a:t>
+            </a:r>
+            <a:r>
+              <a:rPr lang="en-GB" sz="2000" dirty="0" err="1" smtClean="0"/>
+              <a:t>len</a:t>
+            </a:r>
+            <a:r>
+              <a:rPr lang="en-GB" sz="2000" dirty="0" smtClean="0"/>
+              <a:t>)</a:t>
+            </a:r>
+          </a:p>
+          <a:p>
+            <a:pPr lvl="1"/>
+            <a:r>
+              <a:rPr lang="en-GB" sz="2000" dirty="0" err="1" smtClean="0"/>
+              <a:t>jstringArray</a:t>
+            </a:r>
+            <a:r>
+              <a:rPr lang="en-GB" sz="2000" dirty="0" smtClean="0"/>
+              <a:t> </a:t>
+            </a:r>
+            <a:r>
+              <a:rPr lang="en-GB" sz="2000" dirty="0" err="1"/>
+              <a:t>Object_</a:t>
+            </a:r>
+            <a:r>
+              <a:rPr lang="en-GB" sz="2000" dirty="0" err="1" smtClean="0"/>
+              <a:t>newJStringArray</a:t>
+            </a:r>
+            <a:r>
+              <a:rPr lang="en-GB" sz="2000" dirty="0" smtClean="0"/>
+              <a:t>(</a:t>
+            </a:r>
+            <a:r>
+              <a:rPr lang="en-GB" sz="2000" dirty="0" err="1" smtClean="0"/>
+              <a:t>const</a:t>
+            </a:r>
+            <a:r>
+              <a:rPr lang="en-GB" sz="2000" dirty="0" smtClean="0"/>
+              <a:t> char** </a:t>
+            </a:r>
+            <a:r>
+              <a:rPr lang="en-GB" sz="2000" dirty="0"/>
+              <a:t>a, </a:t>
+            </a:r>
+            <a:r>
+              <a:rPr lang="en-GB" sz="2000" dirty="0" err="1"/>
+              <a:t>int</a:t>
+            </a:r>
+            <a:r>
+              <a:rPr lang="en-GB" sz="2000" dirty="0"/>
+              <a:t>* </a:t>
+            </a:r>
+            <a:r>
+              <a:rPr lang="en-GB" sz="2000" dirty="0" err="1"/>
+              <a:t>len</a:t>
+            </a:r>
+            <a:r>
+              <a:rPr lang="en-GB" sz="2000" dirty="0" smtClean="0"/>
+              <a:t>)</a:t>
+            </a:r>
+          </a:p>
+          <a:p>
+            <a:r>
+              <a:rPr lang="en-GB" sz="2400" dirty="0" smtClean="0"/>
+              <a:t>Object Destruction</a:t>
+            </a:r>
+          </a:p>
+          <a:p>
+            <a:pPr lvl="1"/>
+            <a:r>
+              <a:rPr lang="en-GB" sz="2000" dirty="0" err="1"/>
+              <a:t>DeleteLocalRef</a:t>
+            </a:r>
+            <a:r>
+              <a:rPr lang="en-GB" sz="2000" dirty="0"/>
+              <a:t>   (from JNI </a:t>
+            </a:r>
+            <a:r>
+              <a:rPr lang="en-GB" sz="2000" dirty="0" smtClean="0"/>
+              <a:t>API, for objects with local scope)</a:t>
+            </a:r>
+            <a:endParaRPr lang="en-GB" sz="2000" dirty="0"/>
+          </a:p>
+          <a:p>
+            <a:endParaRPr lang="en-GB" sz="2400" baseline="30000" dirty="0"/>
+          </a:p>
+          <a:p>
+            <a:endParaRPr lang="en-GB" sz="2400" baseline="30000" dirty="0" smtClean="0"/>
+          </a:p>
+          <a:p>
+            <a:pPr marL="0" indent="0">
+              <a:buNone/>
+            </a:pPr>
+            <a:r>
+              <a:rPr lang="en-GB" sz="1800" baseline="30000" dirty="0" smtClean="0"/>
+              <a:t>1 </a:t>
+            </a:r>
+            <a:r>
+              <a:rPr lang="en-GB" sz="1800" dirty="0"/>
+              <a:t>T = </a:t>
+            </a:r>
+            <a:r>
+              <a:rPr lang="en-GB" sz="1800" dirty="0" err="1"/>
+              <a:t>boolean</a:t>
+            </a:r>
+            <a:r>
+              <a:rPr lang="en-GB" sz="1800" dirty="0"/>
+              <a:t>, byte, char, short, </a:t>
+            </a:r>
+            <a:r>
+              <a:rPr lang="en-GB" sz="1800" dirty="0" err="1"/>
+              <a:t>int</a:t>
+            </a:r>
+            <a:r>
+              <a:rPr lang="en-GB" sz="1800" dirty="0"/>
+              <a:t>, long, float, double</a:t>
+            </a:r>
+          </a:p>
+          <a:p>
+            <a:pPr lvl="1"/>
+            <a:endParaRPr lang="en-GB" sz="2000" dirty="0" smtClean="0"/>
+          </a:p>
+          <a:p>
+            <a:pPr lvl="1"/>
+            <a:endParaRPr lang="en-GB" dirty="0" smtClean="0"/>
+          </a:p>
+          <a:p>
+            <a:pPr lvl="1"/>
             <a:endParaRPr lang="en-GB" dirty="0"/>
-          </a:p>
-          <a:p>
-            <a:pPr lvl="1"/>
-            <a:r>
-              <a:rPr lang="en-GB" dirty="0" smtClean="0"/>
-              <a:t>methods that have types in their signature, that are not in this list, will not be translated</a:t>
-            </a:r>
-          </a:p>
-          <a:p>
-            <a:r>
-              <a:rPr lang="en-GB" dirty="0" smtClean="0"/>
-              <a:t>consider </a:t>
-            </a:r>
-            <a:r>
-              <a:rPr lang="en-GB" dirty="0" err="1" smtClean="0"/>
-              <a:t>javacc</a:t>
-            </a:r>
-            <a:r>
-              <a:rPr lang="en-GB" dirty="0" smtClean="0"/>
-              <a:t> to do the job</a:t>
-            </a:r>
-          </a:p>
-          <a:p>
-            <a:r>
-              <a:rPr lang="en-GB" dirty="0" smtClean="0"/>
-              <a:t>consider Java annotations to control code generation (e.g. parameter annotations @In, @Out, @</a:t>
-            </a:r>
-            <a:r>
-              <a:rPr lang="en-GB" dirty="0" err="1" smtClean="0"/>
-              <a:t>InOut</a:t>
-            </a:r>
-            <a:r>
-              <a:rPr lang="en-GB" dirty="0" smtClean="0"/>
-              <a:t>)</a:t>
-            </a:r>
-          </a:p>
-          <a:p>
-            <a:r>
-              <a:rPr lang="en-GB" dirty="0" smtClean="0"/>
-              <a:t>code generation might be done through patterns, e.g. implemented by velocity templates</a:t>
-            </a:r>
           </a:p>
         </p:txBody>
       </p:sp>
     </p:spTree>
     <p:extLst>
       <p:ext uri="{BB962C8B-B14F-4D97-AF65-F5344CB8AC3E}">
-        <p14:creationId xmlns:p14="http://schemas.microsoft.com/office/powerpoint/2010/main" val="1053306664"/>
+        <p14:creationId xmlns:p14="http://schemas.microsoft.com/office/powerpoint/2010/main" val="1952445805"/>
       </p:ext>
     </p:extLst>
   </p:cSld>
@@ -11378,11 +11996,17 @@
           <a:p>
             <a:r>
               <a:rPr lang="en-GB" dirty="0" smtClean="0"/>
-              <a:t>Design </a:t>
+              <a:t>Object Type Conversion: </a:t>
             </a:r>
             <a:r>
               <a:rPr lang="en-GB" dirty="0" err="1" smtClean="0"/>
-              <a:t>Decisons</a:t>
+              <a:t>Java</a:t>
+            </a:r>
+            <a:r>
+              <a:rPr lang="en-GB" dirty="0" err="1" smtClean="0">
+                <a:sym typeface="Wingdings" pitchFamily="2" charset="2"/>
+              </a:rPr>
+              <a:t>Py</a:t>
             </a:r>
             <a:endParaRPr lang="en-GB" dirty="0"/>
           </a:p>
@@ -11401,294 +12025,320 @@
         <p:spPr/>
         <p:txBody>
           <a:bodyPr>
-            <a:normAutofit fontScale="47500" lnSpcReduction="20000"/>
+            <a:normAutofit/>
           </a:bodyPr>
           <a:lstStyle/>
           <a:p>
             <a:r>
-              <a:rPr lang="en-GB" dirty="0"/>
-              <a:t>Use JNI types in </a:t>
-            </a:r>
-            <a:r>
-              <a:rPr lang="en-GB" dirty="0" smtClean="0"/>
-              <a:t>C-interfaces</a:t>
+              <a:rPr lang="en-GB" sz="2400" dirty="0" smtClean="0"/>
+              <a:t>Object Construction</a:t>
             </a:r>
           </a:p>
           <a:p>
             <a:pPr lvl="1"/>
             <a:r>
-              <a:rPr lang="en-GB" dirty="0" smtClean="0"/>
-              <a:t>Yes</a:t>
-            </a:r>
-            <a:r>
-              <a:rPr lang="en-GB" dirty="0"/>
-              <a:t>, because BEAM API is Java and as such it is much less </a:t>
-            </a:r>
-            <a:r>
-              <a:rPr lang="en-GB" dirty="0" err="1"/>
-              <a:t>verbous</a:t>
-            </a:r>
-            <a:r>
-              <a:rPr lang="en-GB" dirty="0"/>
-              <a:t> and more concise to reuse JNI types, and is </a:t>
-            </a:r>
-            <a:r>
-              <a:rPr lang="en-GB" dirty="0" err="1"/>
-              <a:t>aloso</a:t>
-            </a:r>
-            <a:r>
-              <a:rPr lang="en-GB" dirty="0"/>
-              <a:t> less </a:t>
-            </a:r>
-            <a:r>
-              <a:rPr lang="en-GB" dirty="0" smtClean="0"/>
-              <a:t>work</a:t>
-            </a:r>
+              <a:rPr lang="en-GB" sz="2000" dirty="0" err="1"/>
+              <a:t>PyObject</a:t>
+            </a:r>
+            <a:r>
+              <a:rPr lang="en-GB" sz="2000" dirty="0"/>
+              <a:t>* </a:t>
+            </a:r>
+            <a:r>
+              <a:rPr lang="en-GB" sz="2000" dirty="0" err="1" smtClean="0"/>
+              <a:t>beam_newP</a:t>
+            </a:r>
+            <a:r>
+              <a:rPr lang="en-GB" sz="2000" dirty="0" smtClean="0"/>
+              <a:t>&lt;T&gt;(j</a:t>
+            </a:r>
+            <a:r>
+              <a:rPr lang="en-GB" sz="2000" dirty="0"/>
+              <a:t>&lt;T&gt;</a:t>
+            </a:r>
+            <a:r>
+              <a:rPr lang="en-GB" sz="2000" dirty="0" smtClean="0"/>
+              <a:t> v)</a:t>
+            </a:r>
+            <a:r>
+              <a:rPr lang="en-GB" sz="2000" baseline="30000" dirty="0" smtClean="0"/>
+              <a:t>1</a:t>
+            </a:r>
+            <a:endParaRPr lang="en-GB" sz="2000" dirty="0" smtClean="0"/>
           </a:p>
           <a:p>
             <a:pPr lvl="1"/>
             <a:r>
-              <a:rPr lang="en-GB" dirty="0" smtClean="0"/>
-              <a:t>No</a:t>
-            </a:r>
-            <a:r>
-              <a:rPr lang="en-GB" dirty="0"/>
-              <a:t>, because the C-API shall be independent of its implementation or </a:t>
-            </a:r>
-            <a:r>
-              <a:rPr lang="en-GB" dirty="0" smtClean="0"/>
-              <a:t>origin</a:t>
-            </a:r>
-            <a:endParaRPr lang="en-GB" dirty="0"/>
-          </a:p>
-          <a:p>
-            <a:r>
-              <a:rPr lang="en-GB" dirty="0"/>
-              <a:t>Duplicate Java API (or parts) 1:1?  (e.g. any method in Java gets its C counterpart)</a:t>
+              <a:rPr lang="en-GB" sz="2000" dirty="0" err="1" smtClean="0"/>
+              <a:t>PyObject</a:t>
+            </a:r>
+            <a:r>
+              <a:rPr lang="en-GB" sz="2000" dirty="0"/>
+              <a:t>*</a:t>
+            </a:r>
+            <a:r>
+              <a:rPr lang="en-GB" sz="2000" dirty="0" smtClean="0"/>
+              <a:t> </a:t>
+            </a:r>
+            <a:r>
+              <a:rPr lang="en-GB" sz="2000" dirty="0" err="1" smtClean="0"/>
+              <a:t>beam_newPyObject</a:t>
+            </a:r>
+            <a:r>
+              <a:rPr lang="en-GB" sz="2000" dirty="0" smtClean="0"/>
+              <a:t> (</a:t>
+            </a:r>
+            <a:r>
+              <a:rPr lang="en-GB" sz="2000" dirty="0" err="1" smtClean="0"/>
+              <a:t>jobject</a:t>
+            </a:r>
+            <a:r>
+              <a:rPr lang="en-GB" sz="2000" dirty="0" smtClean="0"/>
+              <a:t> o)</a:t>
             </a:r>
           </a:p>
           <a:p>
             <a:pPr lvl="1"/>
             <a:r>
-              <a:rPr lang="en-GB" dirty="0" smtClean="0"/>
-              <a:t>Yes</a:t>
-            </a:r>
-            <a:r>
-              <a:rPr lang="en-GB" dirty="0"/>
-              <a:t>, because the Java API docs can be reused for C API</a:t>
-            </a:r>
-            <a:r>
-              <a:rPr lang="en-GB" dirty="0" smtClean="0"/>
+              <a:rPr lang="en-GB" sz="2000" dirty="0" err="1" smtClean="0"/>
+              <a:t>PyObject</a:t>
+            </a:r>
+            <a:r>
+              <a:rPr lang="en-GB" sz="2000" dirty="0" smtClean="0"/>
+              <a:t>* </a:t>
+            </a:r>
+            <a:r>
+              <a:rPr lang="en-GB" sz="2000" dirty="0" err="1" smtClean="0"/>
+              <a:t>beam_newPyString</a:t>
+            </a:r>
+            <a:r>
+              <a:rPr lang="en-GB" sz="2000" dirty="0" smtClean="0"/>
+              <a:t>(</a:t>
+            </a:r>
+            <a:r>
+              <a:rPr lang="en-GB" sz="2000" dirty="0" err="1" smtClean="0"/>
+              <a:t>jstring</a:t>
+            </a:r>
+            <a:r>
+              <a:rPr lang="en-GB" sz="2000" dirty="0" smtClean="0"/>
+              <a:t> </a:t>
+            </a:r>
+            <a:r>
+              <a:rPr lang="en-GB" sz="2000" dirty="0"/>
+              <a:t>s</a:t>
+            </a:r>
+            <a:r>
+              <a:rPr lang="en-GB" sz="2000" dirty="0" smtClean="0"/>
+              <a:t>)</a:t>
+            </a:r>
+          </a:p>
+          <a:p>
+            <a:pPr lvl="1"/>
+            <a:r>
+              <a:rPr lang="en-GB" sz="2000" dirty="0" err="1"/>
+              <a:t>PyObject</a:t>
+            </a:r>
+            <a:r>
+              <a:rPr lang="en-GB" sz="2000" dirty="0"/>
+              <a:t>* </a:t>
+            </a:r>
+            <a:r>
+              <a:rPr lang="en-GB" sz="2000" dirty="0" err="1" smtClean="0"/>
+              <a:t>beam_newPy</a:t>
+            </a:r>
+            <a:r>
+              <a:rPr lang="en-GB" sz="2000" dirty="0" smtClean="0"/>
+              <a:t>&lt;T&gt;Array(</a:t>
+            </a:r>
+            <a:r>
+              <a:rPr lang="en-GB" sz="2000" dirty="0" err="1" smtClean="0"/>
+              <a:t>jarray</a:t>
+            </a:r>
+            <a:r>
+              <a:rPr lang="en-GB" sz="2000" dirty="0" smtClean="0"/>
+              <a:t> </a:t>
+            </a:r>
+            <a:r>
+              <a:rPr lang="en-GB" sz="2000" dirty="0"/>
+              <a:t>a, </a:t>
+            </a:r>
+            <a:r>
+              <a:rPr lang="en-GB" sz="2000" dirty="0" err="1"/>
+              <a:t>int</a:t>
+            </a:r>
+            <a:r>
+              <a:rPr lang="en-GB" sz="2000" dirty="0"/>
+              <a:t>* </a:t>
+            </a:r>
+            <a:r>
+              <a:rPr lang="en-GB" sz="2000" dirty="0" err="1" smtClean="0"/>
+              <a:t>len</a:t>
+            </a:r>
+            <a:r>
+              <a:rPr lang="en-GB" sz="2000" dirty="0" smtClean="0"/>
+              <a:t>)</a:t>
+            </a:r>
+            <a:r>
+              <a:rPr lang="en-GB" sz="2000" baseline="30000" dirty="0" smtClean="0"/>
+              <a:t>1</a:t>
+            </a:r>
+          </a:p>
+          <a:p>
+            <a:pPr lvl="1"/>
+            <a:r>
+              <a:rPr lang="en-GB" sz="2000" dirty="0" err="1"/>
+              <a:t>PyObject</a:t>
+            </a:r>
+            <a:r>
+              <a:rPr lang="en-GB" sz="2000" dirty="0"/>
+              <a:t>* </a:t>
+            </a:r>
+            <a:r>
+              <a:rPr lang="en-GB" sz="2000" dirty="0" err="1" smtClean="0"/>
+              <a:t>beam_newPyObjectList</a:t>
+            </a:r>
+            <a:r>
+              <a:rPr lang="en-GB" sz="2000" dirty="0" smtClean="0"/>
+              <a:t>(</a:t>
+            </a:r>
+            <a:r>
+              <a:rPr lang="en-GB" sz="2000" dirty="0" err="1" smtClean="0"/>
+              <a:t>jarray</a:t>
+            </a:r>
+            <a:r>
+              <a:rPr lang="en-GB" sz="2000" dirty="0" smtClean="0"/>
+              <a:t> a, </a:t>
+            </a:r>
+            <a:r>
+              <a:rPr lang="en-GB" sz="2000" dirty="0" err="1" smtClean="0"/>
+              <a:t>int</a:t>
+            </a:r>
+            <a:r>
+              <a:rPr lang="en-GB" sz="2000" dirty="0" smtClean="0"/>
+              <a:t>* </a:t>
+            </a:r>
+            <a:r>
+              <a:rPr lang="en-GB" sz="2000" dirty="0" err="1" smtClean="0"/>
+              <a:t>len</a:t>
+            </a:r>
+            <a:r>
+              <a:rPr lang="en-GB" sz="2000" dirty="0" smtClean="0"/>
+              <a:t>)</a:t>
+            </a:r>
+          </a:p>
+          <a:p>
+            <a:pPr lvl="1"/>
+            <a:r>
+              <a:rPr lang="en-GB" sz="2000" dirty="0" err="1"/>
+              <a:t>PyObject</a:t>
+            </a:r>
+            <a:r>
+              <a:rPr lang="en-GB" sz="2000" dirty="0"/>
+              <a:t>* </a:t>
+            </a:r>
+            <a:r>
+              <a:rPr lang="en-GB" sz="2000" dirty="0" err="1" smtClean="0"/>
+              <a:t>beam_newPyStringList</a:t>
+            </a:r>
+            <a:r>
+              <a:rPr lang="en-GB" sz="2000" dirty="0" smtClean="0"/>
+              <a:t>(</a:t>
+            </a:r>
+            <a:r>
+              <a:rPr lang="en-GB" sz="2000" dirty="0" err="1" smtClean="0"/>
+              <a:t>jstringArray</a:t>
+            </a:r>
+            <a:r>
+              <a:rPr lang="en-GB" sz="2000" dirty="0" smtClean="0"/>
+              <a:t> </a:t>
+            </a:r>
+            <a:r>
+              <a:rPr lang="en-GB" sz="2000" dirty="0"/>
+              <a:t>a, </a:t>
+            </a:r>
+            <a:r>
+              <a:rPr lang="en-GB" sz="2000" dirty="0" err="1"/>
+              <a:t>int</a:t>
+            </a:r>
+            <a:r>
+              <a:rPr lang="en-GB" sz="2000" dirty="0"/>
+              <a:t>* </a:t>
+            </a:r>
+            <a:r>
+              <a:rPr lang="en-GB" sz="2000" dirty="0" err="1" smtClean="0"/>
+              <a:t>len</a:t>
+            </a:r>
+            <a:r>
+              <a:rPr lang="en-GB" sz="2000" dirty="0" smtClean="0"/>
+              <a:t>)</a:t>
+            </a:r>
+          </a:p>
+          <a:p>
+            <a:endParaRPr lang="en-GB" sz="2400" dirty="0" smtClean="0"/>
+          </a:p>
+          <a:p>
+            <a:r>
+              <a:rPr lang="en-GB" sz="2400" dirty="0" smtClean="0"/>
+              <a:t>Object Destruction</a:t>
+            </a:r>
+          </a:p>
+          <a:p>
+            <a:pPr lvl="1"/>
+            <a:r>
+              <a:rPr lang="en-GB" sz="2000" dirty="0" err="1" smtClean="0"/>
+              <a:t>n.a</a:t>
+            </a:r>
+            <a:r>
+              <a:rPr lang="en-GB" sz="2000" dirty="0" smtClean="0"/>
               <a:t>.</a:t>
             </a:r>
           </a:p>
           <a:p>
+            <a:pPr marL="0" indent="0">
+              <a:buNone/>
+            </a:pPr>
+            <a:endParaRPr lang="en-GB" sz="2400" baseline="30000" dirty="0"/>
+          </a:p>
+          <a:p>
+            <a:pPr marL="0" indent="0">
+              <a:buNone/>
+            </a:pPr>
+            <a:r>
+              <a:rPr lang="en-GB" sz="1800" baseline="30000" dirty="0" smtClean="0"/>
+              <a:t>1 </a:t>
+            </a:r>
+            <a:r>
+              <a:rPr lang="en-GB" sz="1800" dirty="0" smtClean="0"/>
+              <a:t>T = </a:t>
+            </a:r>
+            <a:r>
+              <a:rPr lang="en-GB" sz="1800" dirty="0" err="1" smtClean="0"/>
+              <a:t>boolean</a:t>
+            </a:r>
+            <a:r>
+              <a:rPr lang="en-GB" sz="1800" dirty="0" smtClean="0"/>
+              <a:t>, byte, char, short, </a:t>
+            </a:r>
+            <a:r>
+              <a:rPr lang="en-GB" sz="1800" dirty="0" err="1" smtClean="0"/>
+              <a:t>int</a:t>
+            </a:r>
+            <a:r>
+              <a:rPr lang="en-GB" sz="1800" dirty="0" smtClean="0"/>
+              <a:t>, long, float, double</a:t>
+            </a:r>
+            <a:endParaRPr lang="en-GB" sz="1800" dirty="0"/>
+          </a:p>
+          <a:p>
             <a:pPr lvl="1"/>
-            <a:r>
-              <a:rPr lang="en-GB" dirty="0" smtClean="0"/>
-              <a:t>No</a:t>
-            </a:r>
-            <a:r>
-              <a:rPr lang="en-GB" dirty="0"/>
-              <a:t>, because a more concise C-API can be generated. And no, because changes in the Java API need to be reflected </a:t>
-            </a:r>
-            <a:r>
-              <a:rPr lang="en-GB" dirty="0" smtClean="0"/>
-              <a:t>in the </a:t>
-            </a:r>
-            <a:r>
-              <a:rPr lang="en-GB" dirty="0"/>
-              <a:t>C API </a:t>
-            </a:r>
-            <a:r>
-              <a:rPr lang="en-GB" dirty="0" smtClean="0"/>
-              <a:t>which </a:t>
-            </a:r>
-            <a:r>
-              <a:rPr lang="en-GB" dirty="0"/>
-              <a:t>will introduce a lot of work</a:t>
-            </a:r>
-            <a:r>
-              <a:rPr lang="en-GB" dirty="0" smtClean="0"/>
-              <a:t>.</a:t>
-            </a:r>
-            <a:endParaRPr lang="en-GB" dirty="0"/>
-          </a:p>
-          <a:p>
-            <a:r>
-              <a:rPr lang="en-GB" dirty="0"/>
-              <a:t>Shall C API functions return string buffers that users have to release </a:t>
-            </a:r>
-            <a:r>
-              <a:rPr lang="en-GB" dirty="0" smtClean="0"/>
-              <a:t>later?</a:t>
-            </a:r>
+            <a:endParaRPr lang="en-GB" sz="2000" dirty="0" smtClean="0"/>
           </a:p>
           <a:p>
             <a:pPr lvl="1"/>
-            <a:r>
-              <a:rPr lang="en-GB" dirty="0" smtClean="0"/>
-              <a:t>Yes</a:t>
-            </a:r>
-            <a:r>
-              <a:rPr lang="en-GB" dirty="0"/>
-              <a:t>, otherwise the signature of Java counterparts is will be different, because by-reference arguments passing </a:t>
-            </a:r>
-            <a:r>
-              <a:rPr lang="en-GB" dirty="0" smtClean="0"/>
-              <a:t>is required then.</a:t>
-            </a:r>
-            <a:br>
-              <a:rPr lang="en-GB" dirty="0" smtClean="0"/>
-            </a:br>
-            <a:r>
-              <a:rPr lang="en-GB" dirty="0" smtClean="0"/>
-              <a:t>E.g</a:t>
-            </a:r>
-            <a:r>
-              <a:rPr lang="en-GB" dirty="0"/>
-              <a:t>. instead </a:t>
-            </a:r>
-            <a:r>
-              <a:rPr lang="en-GB" dirty="0" smtClean="0"/>
-              <a:t>of</a:t>
-            </a:r>
-            <a:br>
-              <a:rPr lang="en-GB" dirty="0" smtClean="0"/>
-            </a:br>
-            <a:r>
-              <a:rPr lang="en-GB" dirty="0" smtClean="0"/>
-              <a:t>             </a:t>
-            </a:r>
-            <a:r>
-              <a:rPr lang="en-GB" dirty="0"/>
-              <a:t>char* name = </a:t>
-            </a:r>
-            <a:r>
-              <a:rPr lang="en-GB" dirty="0" err="1"/>
-              <a:t>get_name</a:t>
-            </a:r>
-            <a:r>
-              <a:rPr lang="en-GB" dirty="0"/>
-              <a:t>(</a:t>
-            </a:r>
-            <a:r>
-              <a:rPr lang="en-GB" dirty="0" err="1"/>
-              <a:t>obj</a:t>
-            </a:r>
-            <a:r>
-              <a:rPr lang="en-GB" dirty="0" smtClean="0"/>
-              <a:t>);</a:t>
-            </a:r>
-            <a:br>
-              <a:rPr lang="en-GB" dirty="0" smtClean="0"/>
-            </a:br>
-            <a:r>
-              <a:rPr lang="en-GB" dirty="0" smtClean="0"/>
-              <a:t>              ...</a:t>
-            </a:r>
-            <a:br>
-              <a:rPr lang="en-GB" dirty="0" smtClean="0"/>
-            </a:br>
-            <a:r>
-              <a:rPr lang="en-GB" dirty="0" smtClean="0"/>
-              <a:t>              </a:t>
-            </a:r>
-            <a:r>
-              <a:rPr lang="en-GB" dirty="0"/>
-              <a:t>free(name</a:t>
-            </a:r>
-            <a:r>
-              <a:rPr lang="en-GB" dirty="0" smtClean="0"/>
-              <a:t>);</a:t>
-            </a:r>
-            <a:br>
-              <a:rPr lang="en-GB" dirty="0" smtClean="0"/>
-            </a:br>
-            <a:r>
-              <a:rPr lang="en-GB" dirty="0" smtClean="0"/>
-              <a:t>we have</a:t>
-            </a:r>
-            <a:br>
-              <a:rPr lang="en-GB" dirty="0" smtClean="0"/>
-            </a:br>
-            <a:r>
-              <a:rPr lang="en-GB" dirty="0" smtClean="0"/>
-              <a:t>              </a:t>
-            </a:r>
-            <a:r>
-              <a:rPr lang="en-GB" dirty="0"/>
-              <a:t>char name[81</a:t>
-            </a:r>
-            <a:r>
-              <a:rPr lang="en-GB" dirty="0" smtClean="0"/>
-              <a:t>];</a:t>
-            </a:r>
-            <a:br>
-              <a:rPr lang="en-GB" dirty="0" smtClean="0"/>
-            </a:br>
-            <a:r>
-              <a:rPr lang="en-GB" dirty="0" smtClean="0"/>
-              <a:t>              </a:t>
-            </a:r>
-            <a:r>
-              <a:rPr lang="en-GB" dirty="0" err="1"/>
-              <a:t>get_name</a:t>
-            </a:r>
-            <a:r>
-              <a:rPr lang="en-GB" dirty="0"/>
-              <a:t>(</a:t>
-            </a:r>
-            <a:r>
-              <a:rPr lang="en-GB" dirty="0" err="1"/>
-              <a:t>obj</a:t>
-            </a:r>
-            <a:r>
-              <a:rPr lang="en-GB" dirty="0"/>
-              <a:t>, name, 80</a:t>
-            </a:r>
-            <a:r>
-              <a:rPr lang="en-GB" dirty="0" smtClean="0"/>
-              <a:t>);</a:t>
-            </a:r>
+            <a:endParaRPr lang="en-GB" dirty="0" smtClean="0"/>
           </a:p>
           <a:p>
             <a:pPr lvl="1"/>
-            <a:r>
-              <a:rPr lang="en-GB" dirty="0" smtClean="0"/>
-              <a:t>No</a:t>
-            </a:r>
-            <a:r>
-              <a:rPr lang="en-GB" dirty="0"/>
-              <a:t>, because it is </a:t>
-            </a:r>
-            <a:r>
-              <a:rPr lang="en-GB" dirty="0" smtClean="0"/>
-              <a:t>obvious </a:t>
-            </a:r>
-            <a:r>
-              <a:rPr lang="en-GB" dirty="0"/>
-              <a:t>that strings need to be freed on the users side</a:t>
-            </a:r>
-            <a:r>
-              <a:rPr lang="en-GB" dirty="0" smtClean="0"/>
-              <a:t>.</a:t>
-            </a:r>
-          </a:p>
-          <a:p>
-            <a:r>
-              <a:rPr lang="en-GB" dirty="0" smtClean="0"/>
-              <a:t>Shall </a:t>
-            </a:r>
-            <a:r>
-              <a:rPr lang="en-GB" dirty="0"/>
-              <a:t>the API allow for modification of single structures elements that are passed as arguments by-reference.?</a:t>
-            </a:r>
-          </a:p>
-          <a:p>
-            <a:endParaRPr lang="en-GB" dirty="0"/>
-          </a:p>
-          <a:p>
             <a:endParaRPr lang="en-GB" dirty="0"/>
           </a:p>
         </p:txBody>
@@ -11696,7 +12346,7 @@
     </p:spTree>
     <p:extLst>
       <p:ext uri="{BB962C8B-B14F-4D97-AF65-F5344CB8AC3E}">
-        <p14:creationId xmlns:p14="http://schemas.microsoft.com/office/powerpoint/2010/main" val="1103487878"/>
+        <p14:creationId xmlns:p14="http://schemas.microsoft.com/office/powerpoint/2010/main" val="3300826174"/>
       </p:ext>
     </p:extLst>
   </p:cSld>
@@ -11747,7 +12397,17 @@
           <a:p>
             <a:r>
               <a:rPr lang="en-GB" dirty="0" smtClean="0"/>
-              <a:t>Data Arrays (1/3)</a:t>
+              <a:t>Object Type Conversion: </a:t>
+            </a:r>
+            <a:r>
+              <a:rPr lang="en-GB" dirty="0" err="1" smtClean="0"/>
+              <a:t>Py</a:t>
+            </a:r>
+            <a:r>
+              <a:rPr lang="en-GB" dirty="0" err="1" smtClean="0">
+                <a:sym typeface="Wingdings" pitchFamily="2" charset="2"/>
+              </a:rPr>
+              <a:t>Java</a:t>
             </a:r>
             <a:endParaRPr lang="en-GB" dirty="0"/>
           </a:p>
@@ -11766,395 +12426,312 @@
         <p:spPr/>
         <p:txBody>
           <a:bodyPr>
-            <a:normAutofit fontScale="47500" lnSpcReduction="20000"/>
+            <a:normAutofit lnSpcReduction="10000"/>
           </a:bodyPr>
           <a:lstStyle/>
           <a:p>
             <a:r>
-              <a:rPr lang="en-GB" dirty="0" smtClean="0"/>
-              <a:t>We shall try to find a way to directly use the arrays allocated and returned by the C-API without copying them</a:t>
-            </a:r>
-          </a:p>
-          <a:p>
+              <a:rPr lang="en-GB" sz="2400" dirty="0" smtClean="0"/>
+              <a:t>Conversion</a:t>
+            </a:r>
+          </a:p>
+          <a:p>
+            <a:pPr lvl="1"/>
+            <a:r>
+              <a:rPr lang="en-GB" sz="2000" dirty="0" smtClean="0"/>
+              <a:t>j&lt;T&gt; </a:t>
+            </a:r>
+            <a:r>
+              <a:rPr lang="en-GB" sz="2000" dirty="0" err="1"/>
+              <a:t>beam_</a:t>
+            </a:r>
+            <a:r>
+              <a:rPr lang="en-GB" sz="2000" dirty="0" err="1" smtClean="0"/>
+              <a:t>toJ</a:t>
+            </a:r>
+            <a:r>
+              <a:rPr lang="en-GB" sz="2000" dirty="0" smtClean="0"/>
+              <a:t>&lt;T&gt; </a:t>
+            </a:r>
+            <a:r>
+              <a:rPr lang="en-GB" sz="2000" dirty="0"/>
+              <a:t>(</a:t>
+            </a:r>
+            <a:r>
+              <a:rPr lang="en-GB" sz="2000" dirty="0" err="1"/>
+              <a:t>PyObject</a:t>
+            </a:r>
+            <a:r>
+              <a:rPr lang="en-GB" sz="2000" dirty="0"/>
+              <a:t>* a</a:t>
+            </a:r>
+            <a:r>
+              <a:rPr lang="en-GB" sz="2000" dirty="0" smtClean="0"/>
+              <a:t>)</a:t>
+            </a:r>
+            <a:r>
+              <a:rPr lang="en-GB" sz="2000" baseline="30000" dirty="0"/>
+              <a:t> 1</a:t>
+            </a:r>
+            <a:endParaRPr lang="en-GB" sz="2000" dirty="0" smtClean="0"/>
+          </a:p>
+          <a:p>
+            <a:pPr lvl="1"/>
+            <a:r>
+              <a:rPr lang="en-GB" sz="2000" dirty="0" err="1" smtClean="0"/>
+              <a:t>jobject</a:t>
+            </a:r>
+            <a:r>
+              <a:rPr lang="en-GB" sz="2000" dirty="0" smtClean="0"/>
+              <a:t> </a:t>
+            </a:r>
+            <a:r>
+              <a:rPr lang="en-GB" sz="2000" dirty="0" err="1"/>
+              <a:t>beam_</a:t>
+            </a:r>
+            <a:r>
+              <a:rPr lang="en-GB" sz="2000" dirty="0" err="1" smtClean="0"/>
+              <a:t>toJObject</a:t>
+            </a:r>
+            <a:r>
+              <a:rPr lang="en-GB" sz="2000" dirty="0" smtClean="0"/>
+              <a:t> (</a:t>
+            </a:r>
+            <a:r>
+              <a:rPr lang="en-GB" sz="2000" dirty="0" err="1"/>
+              <a:t>PyObject</a:t>
+            </a:r>
+            <a:r>
+              <a:rPr lang="en-GB" sz="2000" dirty="0"/>
+              <a:t>* a</a:t>
+            </a:r>
+            <a:r>
+              <a:rPr lang="en-GB" sz="2000" dirty="0" smtClean="0"/>
+              <a:t>)</a:t>
+            </a:r>
+          </a:p>
+          <a:p>
+            <a:r>
+              <a:rPr lang="en-GB" sz="2400" dirty="0"/>
+              <a:t>Object Construction</a:t>
+            </a:r>
+            <a:endParaRPr lang="en-GB" sz="2400" dirty="0" smtClean="0"/>
+          </a:p>
+          <a:p>
+            <a:pPr lvl="1"/>
+            <a:r>
+              <a:rPr lang="en-GB" sz="2000" dirty="0" err="1" smtClean="0"/>
+              <a:t>jstring</a:t>
+            </a:r>
+            <a:r>
+              <a:rPr lang="en-GB" sz="2000" dirty="0"/>
+              <a:t> </a:t>
+            </a:r>
+            <a:r>
+              <a:rPr lang="en-GB" sz="2000" dirty="0" err="1" smtClean="0"/>
+              <a:t>beam_newJString</a:t>
+            </a:r>
+            <a:r>
+              <a:rPr lang="en-GB" sz="2000" dirty="0" smtClean="0"/>
+              <a:t>(</a:t>
+            </a:r>
+            <a:r>
+              <a:rPr lang="en-GB" sz="2000" dirty="0" err="1" smtClean="0"/>
+              <a:t>PyObject</a:t>
+            </a:r>
+            <a:r>
+              <a:rPr lang="en-GB" sz="2000" dirty="0"/>
+              <a:t>* </a:t>
+            </a:r>
+            <a:r>
+              <a:rPr lang="en-GB" sz="2000" dirty="0" smtClean="0"/>
+              <a:t>s)</a:t>
+            </a:r>
+          </a:p>
+          <a:p>
+            <a:pPr lvl="1"/>
+            <a:r>
+              <a:rPr lang="en-GB" sz="2000" dirty="0" err="1"/>
+              <a:t>jarray</a:t>
+            </a:r>
+            <a:r>
+              <a:rPr lang="en-GB" sz="2000" dirty="0"/>
+              <a:t> </a:t>
+            </a:r>
+            <a:r>
+              <a:rPr lang="en-GB" sz="2000" dirty="0" err="1"/>
+              <a:t>beam_</a:t>
+            </a:r>
+            <a:r>
+              <a:rPr lang="en-GB" sz="2000" dirty="0" err="1" smtClean="0"/>
+              <a:t>newJ</a:t>
+            </a:r>
+            <a:r>
+              <a:rPr lang="en-GB" sz="2000" dirty="0" smtClean="0"/>
+              <a:t>&lt;T&gt;Array(</a:t>
+            </a:r>
+            <a:r>
+              <a:rPr lang="en-GB" sz="2000" dirty="0" err="1" smtClean="0"/>
+              <a:t>PyObject</a:t>
+            </a:r>
+            <a:r>
+              <a:rPr lang="en-GB" sz="2000" dirty="0"/>
+              <a:t>* </a:t>
+            </a:r>
+            <a:r>
+              <a:rPr lang="en-GB" sz="2000" dirty="0" smtClean="0"/>
+              <a:t>a)</a:t>
+            </a:r>
+            <a:r>
+              <a:rPr lang="en-GB" sz="2000" baseline="30000" dirty="0" smtClean="0"/>
+              <a:t>1</a:t>
+            </a:r>
+            <a:endParaRPr lang="en-GB" sz="2000" baseline="30000" dirty="0"/>
+          </a:p>
+          <a:p>
+            <a:pPr lvl="1"/>
+            <a:r>
+              <a:rPr lang="en-GB" sz="2000" dirty="0" err="1" smtClean="0"/>
+              <a:t>jarray</a:t>
+            </a:r>
+            <a:r>
+              <a:rPr lang="en-GB" sz="2000" dirty="0" smtClean="0"/>
+              <a:t> </a:t>
+            </a:r>
+            <a:r>
+              <a:rPr lang="en-GB" sz="2000" dirty="0" err="1"/>
+              <a:t>beam_</a:t>
+            </a:r>
+            <a:r>
+              <a:rPr lang="en-GB" sz="2000" dirty="0" err="1" smtClean="0"/>
+              <a:t>newJObjectArray</a:t>
+            </a:r>
+            <a:r>
+              <a:rPr lang="en-GB" sz="2000" dirty="0" smtClean="0"/>
+              <a:t>(</a:t>
+            </a:r>
+            <a:r>
+              <a:rPr lang="en-GB" sz="2000" dirty="0" err="1" smtClean="0"/>
+              <a:t>PyObject</a:t>
+            </a:r>
+            <a:r>
+              <a:rPr lang="en-GB" sz="2000" dirty="0" smtClean="0"/>
+              <a:t>* a)</a:t>
+            </a:r>
+          </a:p>
+          <a:p>
+            <a:pPr lvl="1"/>
+            <a:r>
+              <a:rPr lang="en-GB" sz="2000" dirty="0" err="1" smtClean="0"/>
+              <a:t>jstringArray</a:t>
+            </a:r>
+            <a:r>
+              <a:rPr lang="en-GB" sz="2000" dirty="0" smtClean="0"/>
+              <a:t> </a:t>
+            </a:r>
+            <a:r>
+              <a:rPr lang="en-GB" sz="2000" dirty="0" err="1"/>
+              <a:t>beam_</a:t>
+            </a:r>
+            <a:r>
+              <a:rPr lang="en-GB" sz="2000" dirty="0" err="1" smtClean="0"/>
+              <a:t>newJStringArray</a:t>
+            </a:r>
+            <a:r>
+              <a:rPr lang="en-GB" sz="2000" dirty="0" smtClean="0"/>
+              <a:t>(</a:t>
+            </a:r>
+            <a:r>
+              <a:rPr lang="en-GB" sz="2000" dirty="0" err="1" smtClean="0"/>
+              <a:t>PyObject</a:t>
+            </a:r>
+            <a:r>
+              <a:rPr lang="en-GB" sz="2000" dirty="0"/>
+              <a:t>* a</a:t>
+            </a:r>
+            <a:r>
+              <a:rPr lang="en-GB" sz="2000" dirty="0" smtClean="0"/>
+              <a:t>)</a:t>
+            </a:r>
+          </a:p>
+          <a:p>
+            <a:r>
+              <a:rPr lang="en-GB" sz="2400" dirty="0" smtClean="0"/>
+              <a:t>Object Destruction</a:t>
+            </a:r>
+          </a:p>
+          <a:p>
+            <a:pPr lvl="1"/>
+            <a:r>
+              <a:rPr lang="en-GB" sz="2000" dirty="0" err="1" smtClean="0"/>
+              <a:t>DeleteLocalRef</a:t>
+            </a:r>
+            <a:r>
+              <a:rPr lang="en-GB" sz="2000" dirty="0" smtClean="0"/>
+              <a:t>   (from JNI API, </a:t>
+            </a:r>
+            <a:r>
+              <a:rPr lang="en-GB" sz="2000" dirty="0"/>
+              <a:t>for objects with local scope</a:t>
+            </a:r>
+            <a:r>
+              <a:rPr lang="en-GB" sz="2000" dirty="0" smtClean="0"/>
+              <a:t>)</a:t>
+            </a:r>
+          </a:p>
+          <a:p>
+            <a:endParaRPr lang="en-GB" sz="2400" baseline="30000" dirty="0"/>
+          </a:p>
+          <a:p>
+            <a:endParaRPr lang="en-GB" sz="2400" baseline="30000" dirty="0" smtClean="0"/>
+          </a:p>
+          <a:p>
+            <a:pPr marL="0" indent="0">
+              <a:buNone/>
+            </a:pPr>
+            <a:r>
+              <a:rPr lang="en-GB" sz="1800" baseline="30000" dirty="0" smtClean="0"/>
+              <a:t>1 </a:t>
+            </a:r>
+            <a:r>
+              <a:rPr lang="en-GB" sz="1800" dirty="0"/>
+              <a:t>T = </a:t>
+            </a:r>
+            <a:r>
+              <a:rPr lang="en-GB" sz="1800" dirty="0" err="1"/>
+              <a:t>boolean</a:t>
+            </a:r>
+            <a:r>
+              <a:rPr lang="en-GB" sz="1800" dirty="0"/>
+              <a:t>, byte, char, short, </a:t>
+            </a:r>
+            <a:r>
+              <a:rPr lang="en-GB" sz="1800" dirty="0" err="1"/>
+              <a:t>int</a:t>
+            </a:r>
+            <a:r>
+              <a:rPr lang="en-GB" sz="1800" dirty="0"/>
+              <a:t>, long, float, double</a:t>
+            </a:r>
+          </a:p>
+          <a:p>
+            <a:pPr lvl="1"/>
+            <a:endParaRPr lang="en-GB" sz="2000" dirty="0" smtClean="0"/>
+          </a:p>
+          <a:p>
+            <a:pPr lvl="1"/>
             <a:endParaRPr lang="en-GB" dirty="0" smtClean="0"/>
           </a:p>
           <a:p>
-            <a:r>
-              <a:rPr lang="en-GB" b="1" dirty="0" smtClean="0"/>
-              <a:t>array</a:t>
-            </a:r>
-          </a:p>
-          <a:p>
             <a:pPr lvl="1"/>
-            <a:r>
-              <a:rPr lang="en-GB" b="1" dirty="0" smtClean="0"/>
-              <a:t>array</a:t>
-            </a:r>
-            <a:r>
-              <a:rPr lang="en-GB" dirty="0" smtClean="0"/>
-              <a:t>(</a:t>
-            </a:r>
-            <a:r>
-              <a:rPr lang="en-GB" i="1" dirty="0" err="1" smtClean="0"/>
-              <a:t>typecode</a:t>
-            </a:r>
-            <a:r>
-              <a:rPr lang="en-GB" dirty="0"/>
-              <a:t>[, </a:t>
-            </a:r>
-            <a:r>
-              <a:rPr lang="en-GB" i="1" dirty="0"/>
-              <a:t>initializer</a:t>
-            </a:r>
-            <a:r>
-              <a:rPr lang="en-GB" dirty="0"/>
-              <a:t>])</a:t>
-            </a:r>
-            <a:br>
-              <a:rPr lang="en-GB" dirty="0"/>
-            </a:br>
-            <a:r>
-              <a:rPr lang="en-GB" sz="2900" i="1" dirty="0">
-                <a:solidFill>
-                  <a:schemeClr val="accent1">
-                    <a:lumMod val="75000"/>
-                  </a:schemeClr>
-                </a:solidFill>
-              </a:rPr>
-              <a:t>A new array whose items are restricted by </a:t>
-            </a:r>
-            <a:r>
-              <a:rPr lang="en-GB" sz="2900" i="1" dirty="0" err="1">
-                <a:solidFill>
-                  <a:schemeClr val="accent1">
-                    <a:lumMod val="75000"/>
-                  </a:schemeClr>
-                </a:solidFill>
-              </a:rPr>
-              <a:t>typecode</a:t>
-            </a:r>
-            <a:r>
-              <a:rPr lang="en-GB" sz="2900" i="1" dirty="0">
-                <a:solidFill>
-                  <a:schemeClr val="accent1">
-                    <a:lumMod val="75000"/>
-                  </a:schemeClr>
-                </a:solidFill>
-              </a:rPr>
-              <a:t>, and initialized from the optional initializer value, which must be a list, object supporting the buffer interface, or </a:t>
-            </a:r>
-            <a:r>
-              <a:rPr lang="en-GB" sz="2900" i="1" dirty="0" err="1">
-                <a:solidFill>
-                  <a:schemeClr val="accent1">
-                    <a:lumMod val="75000"/>
-                  </a:schemeClr>
-                </a:solidFill>
-              </a:rPr>
-              <a:t>iterable</a:t>
-            </a:r>
-            <a:r>
-              <a:rPr lang="en-GB" sz="2900" i="1" dirty="0">
-                <a:solidFill>
-                  <a:schemeClr val="accent1">
-                    <a:lumMod val="75000"/>
-                  </a:schemeClr>
-                </a:solidFill>
-              </a:rPr>
-              <a:t> over elements of the appropriate type.</a:t>
-            </a:r>
-          </a:p>
-          <a:p>
-            <a:pPr lvl="1"/>
-            <a:r>
-              <a:rPr lang="en-GB" dirty="0" smtClean="0"/>
-              <a:t>Note: the </a:t>
-            </a:r>
-            <a:r>
-              <a:rPr lang="en-GB" b="1" dirty="0" smtClean="0"/>
-              <a:t>array</a:t>
-            </a:r>
-            <a:r>
-              <a:rPr lang="en-GB" dirty="0" smtClean="0"/>
-              <a:t> constructor always make copies of buffers passed in as </a:t>
-            </a:r>
-            <a:r>
-              <a:rPr lang="en-GB" i="1" dirty="0"/>
-              <a:t>initializer</a:t>
-            </a:r>
-            <a:r>
-              <a:rPr lang="en-GB" dirty="0" smtClean="0"/>
-              <a:t> </a:t>
-            </a:r>
-          </a:p>
-          <a:p>
-            <a:pPr lvl="1"/>
-            <a:r>
-              <a:rPr lang="en-GB" dirty="0" smtClean="0"/>
-              <a:t>Note: arrays support the buffer interface</a:t>
-            </a:r>
-          </a:p>
-          <a:p>
-            <a:r>
-              <a:rPr lang="en-GB" b="1" dirty="0" err="1" smtClean="0"/>
-              <a:t>numpy</a:t>
-            </a:r>
-            <a:endParaRPr lang="en-GB" b="1" dirty="0" smtClean="0"/>
-          </a:p>
-          <a:p>
-            <a:pPr lvl="1"/>
-            <a:r>
-              <a:rPr lang="en-GB" b="1" dirty="0" err="1" smtClean="0"/>
-              <a:t>frombuffer</a:t>
-            </a:r>
-            <a:r>
-              <a:rPr lang="en-GB" dirty="0" smtClean="0"/>
-              <a:t>(buffer</a:t>
-            </a:r>
-            <a:r>
-              <a:rPr lang="en-GB" dirty="0"/>
-              <a:t>[, </a:t>
-            </a:r>
-            <a:r>
-              <a:rPr lang="en-GB" dirty="0" err="1"/>
-              <a:t>dtype</a:t>
-            </a:r>
-            <a:r>
-              <a:rPr lang="en-GB" dirty="0"/>
-              <a:t>, count, offset</a:t>
-            </a:r>
-            <a:r>
-              <a:rPr lang="en-GB" dirty="0" smtClean="0"/>
-              <a:t>]) </a:t>
-            </a:r>
-            <a:br>
-              <a:rPr lang="en-GB" dirty="0" smtClean="0"/>
-            </a:br>
-            <a:r>
-              <a:rPr lang="en-GB" i="1" dirty="0" smtClean="0">
-                <a:solidFill>
-                  <a:schemeClr val="accent1">
-                    <a:lumMod val="75000"/>
-                  </a:schemeClr>
-                </a:solidFill>
-              </a:rPr>
-              <a:t>Interpret </a:t>
-            </a:r>
-            <a:r>
-              <a:rPr lang="en-GB" i="1" dirty="0">
-                <a:solidFill>
-                  <a:schemeClr val="accent1">
-                    <a:lumMod val="75000"/>
-                  </a:schemeClr>
-                </a:solidFill>
-              </a:rPr>
-              <a:t>a buffer as a 1-dimensional </a:t>
-            </a:r>
-            <a:r>
-              <a:rPr lang="en-GB" i="1" dirty="0" smtClean="0">
-                <a:solidFill>
-                  <a:schemeClr val="accent1">
-                    <a:lumMod val="75000"/>
-                  </a:schemeClr>
-                </a:solidFill>
-              </a:rPr>
-              <a:t>array.</a:t>
-            </a:r>
-            <a:endParaRPr lang="en-GB" i="1" dirty="0">
-              <a:solidFill>
-                <a:schemeClr val="accent1">
-                  <a:lumMod val="75000"/>
-                </a:schemeClr>
-              </a:solidFill>
-            </a:endParaRPr>
-          </a:p>
-          <a:p>
-            <a:pPr lvl="1"/>
-            <a:r>
-              <a:rPr lang="en-GB" b="1" dirty="0" smtClean="0"/>
-              <a:t>reshape</a:t>
-            </a:r>
-            <a:r>
-              <a:rPr lang="en-GB" dirty="0" smtClean="0"/>
-              <a:t>(array,</a:t>
-            </a:r>
-            <a:r>
-              <a:rPr lang="en-GB" dirty="0"/>
-              <a:t> </a:t>
-            </a:r>
-            <a:r>
-              <a:rPr lang="en-GB" dirty="0" err="1" smtClean="0"/>
-              <a:t>newshape</a:t>
-            </a:r>
-            <a:r>
-              <a:rPr lang="en-GB" dirty="0" smtClean="0"/>
-              <a:t>[,</a:t>
-            </a:r>
-            <a:r>
-              <a:rPr lang="en-GB" dirty="0"/>
-              <a:t> </a:t>
-            </a:r>
-            <a:r>
-              <a:rPr lang="en-GB" dirty="0" smtClean="0"/>
-              <a:t>order])</a:t>
-            </a:r>
-            <a:br>
-              <a:rPr lang="en-GB" dirty="0" smtClean="0"/>
-            </a:br>
-            <a:r>
-              <a:rPr lang="en-GB" i="1" dirty="0">
-                <a:solidFill>
-                  <a:schemeClr val="accent1">
-                    <a:lumMod val="75000"/>
-                  </a:schemeClr>
-                </a:solidFill>
-              </a:rPr>
-              <a:t>Gives a new shape to an array without changing its data</a:t>
-            </a:r>
-            <a:r>
-              <a:rPr lang="en-GB" i="1" dirty="0" smtClean="0">
-                <a:solidFill>
-                  <a:schemeClr val="accent1">
-                    <a:lumMod val="75000"/>
-                  </a:schemeClr>
-                </a:solidFill>
-              </a:rPr>
-              <a:t>.</a:t>
-            </a:r>
-          </a:p>
-          <a:p>
-            <a:pPr lvl="1"/>
-            <a:r>
-              <a:rPr lang="en-GB" dirty="0"/>
-              <a:t>Note: </a:t>
-            </a:r>
-            <a:r>
-              <a:rPr lang="en-GB" dirty="0" smtClean="0"/>
-              <a:t>Neither </a:t>
-            </a:r>
-            <a:r>
-              <a:rPr lang="en-GB" b="1" dirty="0" err="1"/>
-              <a:t>frombuffer</a:t>
-            </a:r>
-            <a:r>
-              <a:rPr lang="en-GB" dirty="0" smtClean="0"/>
-              <a:t> nor </a:t>
-            </a:r>
-            <a:r>
-              <a:rPr lang="en-GB" b="1" dirty="0" smtClean="0"/>
-              <a:t>reshape </a:t>
-            </a:r>
-            <a:r>
-              <a:rPr lang="en-GB" dirty="0" smtClean="0"/>
-              <a:t>make copies of the input data</a:t>
-            </a:r>
-          </a:p>
-          <a:p>
-            <a:endParaRPr lang="en-GB" u="sng" dirty="0" smtClean="0"/>
-          </a:p>
-          <a:p>
-            <a:r>
-              <a:rPr lang="en-GB" u="sng" dirty="0" smtClean="0"/>
-              <a:t>Conclusion</a:t>
-            </a:r>
-            <a:r>
-              <a:rPr lang="en-GB" dirty="0" smtClean="0"/>
-              <a:t>: pixel data passed in and returned by the BEAM Python API shall be Python objects that support the </a:t>
-            </a:r>
-            <a:r>
-              <a:rPr lang="en-GB" b="1" i="1" dirty="0" smtClean="0"/>
-              <a:t>buffer interface </a:t>
-            </a:r>
-            <a:r>
-              <a:rPr lang="en-GB" dirty="0" smtClean="0"/>
-              <a:t>so that the data can be efficiently used with </a:t>
-            </a:r>
-            <a:r>
-              <a:rPr lang="en-GB" dirty="0" err="1" smtClean="0"/>
-              <a:t>numpy</a:t>
-            </a:r>
-            <a:r>
-              <a:rPr lang="en-GB" dirty="0" smtClean="0"/>
-              <a:t>.</a:t>
-            </a:r>
-          </a:p>
-          <a:p>
-            <a:pPr lvl="1"/>
-            <a:r>
-              <a:rPr lang="en-GB" dirty="0">
-                <a:hlinkClick r:id="rId2"/>
-              </a:rPr>
-              <a:t>http://</a:t>
-            </a:r>
-            <a:r>
-              <a:rPr lang="en-GB" dirty="0" smtClean="0">
-                <a:hlinkClick r:id="rId2"/>
-              </a:rPr>
-              <a:t>docs.python.org/3.2/c-api/buffer.html?highlight=buffer#Py_buffer</a:t>
-            </a:r>
-            <a:r>
-              <a:rPr lang="en-GB" dirty="0" smtClean="0"/>
-              <a:t> </a:t>
-            </a:r>
-          </a:p>
-          <a:p>
-            <a:pPr lvl="1"/>
-            <a:r>
-              <a:rPr lang="en-GB" dirty="0">
-                <a:hlinkClick r:id="rId3"/>
-              </a:rPr>
-              <a:t>http://</a:t>
-            </a:r>
-            <a:r>
-              <a:rPr lang="en-GB" dirty="0" smtClean="0">
-                <a:hlinkClick r:id="rId3"/>
-              </a:rPr>
-              <a:t>docs.python.org/3.2/c-api/typeobj.html#buffer-structs</a:t>
-            </a:r>
-            <a:endParaRPr lang="en-GB" dirty="0" smtClean="0"/>
-          </a:p>
-          <a:p>
-            <a:pPr lvl="1"/>
-            <a:r>
-              <a:rPr lang="en-GB" dirty="0" smtClean="0">
-                <a:hlinkClick r:id="rId4"/>
-              </a:rPr>
-              <a:t>http</a:t>
-            </a:r>
-            <a:r>
-              <a:rPr lang="en-GB" dirty="0">
-                <a:hlinkClick r:id="rId4"/>
-              </a:rPr>
-              <a:t>://</a:t>
-            </a:r>
-            <a:r>
-              <a:rPr lang="en-GB" dirty="0" smtClean="0">
-                <a:hlinkClick r:id="rId4"/>
-              </a:rPr>
-              <a:t>docs.python.org/3.2/library/stdtypes.html#memoryview</a:t>
-            </a:r>
-            <a:r>
-              <a:rPr lang="en-GB" dirty="0" smtClean="0"/>
-              <a:t> </a:t>
-            </a:r>
             <a:endParaRPr lang="en-GB" dirty="0"/>
-          </a:p>
-          <a:p>
-            <a:pPr lvl="1"/>
-            <a:endParaRPr lang="en-GB" i="1" dirty="0">
-              <a:solidFill>
-                <a:schemeClr val="accent1">
-                  <a:lumMod val="75000"/>
-                </a:schemeClr>
-              </a:solidFill>
-            </a:endParaRPr>
           </a:p>
         </p:txBody>
       </p:sp>
     </p:spTree>
     <p:extLst>
       <p:ext uri="{BB962C8B-B14F-4D97-AF65-F5344CB8AC3E}">
-        <p14:creationId xmlns:p14="http://schemas.microsoft.com/office/powerpoint/2010/main" val="3309612122"/>
+        <p14:creationId xmlns:p14="http://schemas.microsoft.com/office/powerpoint/2010/main" val="429934936"/>
       </p:ext>
     </p:extLst>
   </p:cSld>
@@ -12205,7 +12782,7 @@
           <a:p>
             <a:r>
               <a:rPr lang="en-GB" dirty="0" smtClean="0"/>
-              <a:t>Data Arrays (2/3)</a:t>
+              <a:t>Generate C and Python Code</a:t>
             </a:r>
             <a:endParaRPr lang="en-GB" dirty="0"/>
           </a:p>
@@ -12224,281 +12801,74 @@
         <p:spPr/>
         <p:txBody>
           <a:bodyPr>
-            <a:normAutofit fontScale="62500" lnSpcReduction="20000"/>
+            <a:normAutofit fontScale="85000" lnSpcReduction="20000"/>
           </a:bodyPr>
           <a:lstStyle/>
           <a:p>
             <a:r>
               <a:rPr lang="en-GB" dirty="0" smtClean="0"/>
-              <a:t>Parsing buffer arguments:</a:t>
-            </a:r>
-          </a:p>
-          <a:p>
-            <a:pPr marL="457200" lvl="1" indent="0">
-              <a:buNone/>
-            </a:pPr>
-            <a:r>
-              <a:rPr lang="en-GB" dirty="0" err="1" smtClean="0"/>
-              <a:t>Py_buffer</a:t>
-            </a:r>
-            <a:r>
-              <a:rPr lang="en-GB" dirty="0"/>
-              <a:t> </a:t>
-            </a:r>
-            <a:r>
-              <a:rPr lang="en-GB" dirty="0" smtClean="0"/>
-              <a:t>b;</a:t>
-            </a:r>
-            <a:endParaRPr lang="en-GB" dirty="0"/>
-          </a:p>
-          <a:p>
-            <a:pPr marL="457200" lvl="1" indent="0">
-              <a:buNone/>
-            </a:pPr>
-            <a:r>
-              <a:rPr lang="en-GB" dirty="0"/>
-              <a:t>ret = </a:t>
-            </a:r>
-            <a:r>
-              <a:rPr lang="en-GB" dirty="0" err="1" smtClean="0"/>
-              <a:t>PyArg_ParseTuple</a:t>
-            </a:r>
-            <a:r>
-              <a:rPr lang="en-GB" dirty="0" smtClean="0"/>
-              <a:t>(</a:t>
-            </a:r>
-            <a:r>
-              <a:rPr lang="en-GB" dirty="0" err="1" smtClean="0"/>
-              <a:t>args</a:t>
-            </a:r>
-            <a:r>
-              <a:rPr lang="en-GB" dirty="0"/>
-              <a:t>, </a:t>
-            </a:r>
-            <a:r>
-              <a:rPr lang="en-GB" dirty="0" smtClean="0"/>
-              <a:t>“y*”, &amp;b); </a:t>
+              <a:t>Create a compiler that generates the C and Python glue code</a:t>
+            </a:r>
+          </a:p>
+          <a:p>
+            <a:r>
+              <a:rPr lang="en-GB" dirty="0" smtClean="0"/>
+              <a:t>Pro</a:t>
             </a:r>
           </a:p>
           <a:p>
             <a:pPr lvl="1"/>
             <a:r>
               <a:rPr lang="en-GB" dirty="0" smtClean="0"/>
-              <a:t>See “Parsing </a:t>
-            </a:r>
-            <a:r>
-              <a:rPr lang="en-GB" dirty="0"/>
-              <a:t>arguments and building </a:t>
-            </a:r>
-            <a:r>
-              <a:rPr lang="en-GB" dirty="0" smtClean="0"/>
-              <a:t>values” in Python/C API Reference Manual</a:t>
-            </a:r>
-          </a:p>
-          <a:p>
-            <a:r>
-              <a:rPr lang="en-GB" dirty="0" smtClean="0"/>
-              <a:t>Directly using buffer arguments</a:t>
-            </a:r>
-          </a:p>
-          <a:p>
-            <a:pPr marL="457200" lvl="1" indent="0">
-              <a:buNone/>
-            </a:pPr>
-            <a:r>
-              <a:rPr lang="en-GB" dirty="0" err="1" smtClean="0"/>
-              <a:t>PyObject_CheckBuffer</a:t>
-            </a:r>
-            <a:r>
-              <a:rPr lang="en-GB" dirty="0" smtClean="0"/>
-              <a:t>(</a:t>
-            </a:r>
-            <a:r>
-              <a:rPr lang="en-GB" dirty="0" err="1" smtClean="0"/>
-              <a:t>obj</a:t>
-            </a:r>
-            <a:r>
-              <a:rPr lang="en-GB" dirty="0" smtClean="0"/>
-              <a:t>) == 1</a:t>
-            </a:r>
-            <a:r>
-              <a:rPr lang="en-GB" dirty="0"/>
-              <a:t/>
-            </a:r>
-            <a:br>
-              <a:rPr lang="en-GB" dirty="0"/>
-            </a:br>
-            <a:r>
-              <a:rPr lang="en-GB" dirty="0"/>
-              <a:t>ret = </a:t>
-            </a:r>
-            <a:r>
-              <a:rPr lang="en-GB" dirty="0" err="1" smtClean="0"/>
-              <a:t>PyObject_GetBuffer</a:t>
-            </a:r>
-            <a:r>
-              <a:rPr lang="en-GB" dirty="0" smtClean="0"/>
-              <a:t>(</a:t>
-            </a:r>
-            <a:r>
-              <a:rPr lang="en-GB" dirty="0" err="1" smtClean="0"/>
-              <a:t>obj</a:t>
-            </a:r>
-            <a:r>
-              <a:rPr lang="en-GB" dirty="0"/>
-              <a:t>, </a:t>
-            </a:r>
-            <a:r>
-              <a:rPr lang="en-GB" dirty="0" smtClean="0"/>
-              <a:t>&amp;</a:t>
-            </a:r>
-            <a:r>
-              <a:rPr lang="en-GB" dirty="0"/>
-              <a:t>b, </a:t>
-            </a:r>
-            <a:r>
-              <a:rPr lang="en-GB" dirty="0" err="1" smtClean="0"/>
-              <a:t>PyBUF_WRITABLE</a:t>
-            </a:r>
-            <a:r>
-              <a:rPr lang="en-GB" dirty="0" smtClean="0"/>
-              <a:t>); </a:t>
-            </a:r>
-          </a:p>
-          <a:p>
-            <a:r>
-              <a:rPr lang="en-GB" dirty="0" smtClean="0"/>
-              <a:t>In any case</a:t>
-            </a:r>
-            <a:endParaRPr lang="en-GB" dirty="0"/>
-          </a:p>
-          <a:p>
-            <a:pPr marL="457200" lvl="1" indent="0">
-              <a:buNone/>
-            </a:pPr>
-            <a:r>
-              <a:rPr lang="en-GB" dirty="0" err="1" smtClean="0"/>
-              <a:t>PyBuffer_Release</a:t>
-            </a:r>
-            <a:r>
-              <a:rPr lang="en-GB" dirty="0" smtClean="0"/>
-              <a:t>(&amp;b);</a:t>
-            </a:r>
-          </a:p>
-          <a:p>
-            <a:r>
-              <a:rPr lang="en-GB" dirty="0" smtClean="0"/>
-              <a:t>Consider</a:t>
-            </a:r>
-          </a:p>
-          <a:p>
-            <a:pPr marL="457200" lvl="1" indent="0">
-              <a:buNone/>
-            </a:pPr>
-            <a:r>
-              <a:rPr lang="en-GB" dirty="0"/>
-              <a:t>ret = </a:t>
-            </a:r>
-            <a:r>
-              <a:rPr lang="en-GB" dirty="0" err="1" smtClean="0"/>
-              <a:t>PyObject_TypeCheck</a:t>
-            </a:r>
-            <a:r>
-              <a:rPr lang="en-GB" dirty="0" smtClean="0"/>
-              <a:t>(</a:t>
-            </a:r>
-            <a:r>
-              <a:rPr lang="en-GB" dirty="0" err="1" smtClean="0"/>
-              <a:t>obj</a:t>
-            </a:r>
-            <a:r>
-              <a:rPr lang="en-GB" dirty="0" smtClean="0"/>
-              <a:t>, </a:t>
-            </a:r>
-            <a:r>
-              <a:rPr lang="en-GB" dirty="0" err="1" smtClean="0"/>
-              <a:t>type_obj</a:t>
-            </a:r>
-            <a:r>
-              <a:rPr lang="en-GB" dirty="0" smtClean="0"/>
-              <a:t>);</a:t>
-            </a:r>
-          </a:p>
-          <a:p>
-            <a:pPr marL="457200" lvl="1" indent="0">
-              <a:buNone/>
-            </a:pPr>
-            <a:r>
-              <a:rPr lang="en-GB" dirty="0" smtClean="0"/>
-              <a:t>or</a:t>
-            </a:r>
-          </a:p>
-          <a:p>
-            <a:pPr marL="457200" lvl="1" indent="0">
-              <a:buNone/>
-            </a:pPr>
-            <a:r>
-              <a:rPr lang="en-GB" dirty="0" err="1" smtClean="0"/>
-              <a:t>PyObject_Type</a:t>
-            </a:r>
-            <a:r>
-              <a:rPr lang="en-GB" dirty="0" smtClean="0"/>
-              <a:t>(</a:t>
-            </a:r>
-            <a:r>
-              <a:rPr lang="en-GB" dirty="0" err="1" smtClean="0"/>
-              <a:t>obj</a:t>
-            </a:r>
-            <a:r>
-              <a:rPr lang="en-GB" dirty="0" smtClean="0"/>
-              <a:t>) == </a:t>
-            </a:r>
-            <a:r>
-              <a:rPr lang="en-GB" dirty="0" err="1" smtClean="0"/>
-              <a:t>type_obj</a:t>
-            </a:r>
-            <a:endParaRPr lang="en-GB" dirty="0" smtClean="0"/>
-          </a:p>
-          <a:p>
-            <a:pPr marL="457200" lvl="1" indent="0">
-              <a:buNone/>
-            </a:pPr>
-            <a:r>
-              <a:rPr lang="en-GB" dirty="0" smtClean="0"/>
-              <a:t>or simpler</a:t>
-            </a:r>
-          </a:p>
-          <a:p>
-            <a:pPr marL="457200" lvl="1" indent="0">
-              <a:buNone/>
-            </a:pPr>
-            <a:r>
-              <a:rPr lang="en-GB" dirty="0" err="1" smtClean="0"/>
-              <a:t>obj</a:t>
-            </a:r>
-            <a:r>
-              <a:rPr lang="en-GB" dirty="0"/>
-              <a:t>-</a:t>
-            </a:r>
-            <a:r>
-              <a:rPr lang="en-GB" dirty="0" smtClean="0"/>
-              <a:t>&gt;</a:t>
-            </a:r>
-            <a:r>
-              <a:rPr lang="en-GB" dirty="0" err="1" smtClean="0"/>
-              <a:t>ob_type</a:t>
-            </a:r>
-            <a:r>
-              <a:rPr lang="en-GB" dirty="0" smtClean="0"/>
-              <a:t> == </a:t>
-            </a:r>
-            <a:r>
-              <a:rPr lang="en-GB" dirty="0" err="1" smtClean="0"/>
-              <a:t>type_obj</a:t>
-            </a:r>
-            <a:r>
-              <a:rPr lang="en-GB" dirty="0" smtClean="0"/>
-              <a:t>  </a:t>
+              <a:t>Java API changes easily translate into Python/C code</a:t>
+            </a:r>
+          </a:p>
+          <a:p>
+            <a:pPr lvl="1"/>
+            <a:r>
+              <a:rPr lang="en-GB" dirty="0" smtClean="0"/>
+              <a:t>Also documentation can be generated from Java sources </a:t>
+            </a:r>
+          </a:p>
+          <a:p>
+            <a:pPr lvl="1"/>
+            <a:r>
+              <a:rPr lang="en-GB" dirty="0" smtClean="0"/>
+              <a:t>Code production can be automated</a:t>
+            </a:r>
+          </a:p>
+          <a:p>
+            <a:pPr lvl="1"/>
+            <a:r>
+              <a:rPr lang="en-GB" dirty="0" smtClean="0"/>
+              <a:t>Bugs are fixed in the compiler code, not in glue code</a:t>
+            </a:r>
+          </a:p>
+          <a:p>
+            <a:pPr lvl="1"/>
+            <a:r>
+              <a:rPr lang="en-GB" dirty="0" smtClean="0"/>
+              <a:t>Also test code might be generated</a:t>
+            </a:r>
+          </a:p>
+          <a:p>
+            <a:r>
+              <a:rPr lang="en-GB" dirty="0" smtClean="0"/>
+              <a:t>Contra</a:t>
+            </a:r>
+          </a:p>
+          <a:p>
+            <a:pPr lvl="1"/>
+            <a:r>
+              <a:rPr lang="en-GB" dirty="0" smtClean="0"/>
+              <a:t>It might take a long time to develop a mature compiler</a:t>
+            </a:r>
+          </a:p>
+          <a:p>
+            <a:pPr lvl="1"/>
+            <a:r>
+              <a:rPr lang="en-GB" dirty="0" smtClean="0"/>
+              <a:t>There might be a number of exceptions from rules</a:t>
             </a:r>
           </a:p>
         </p:txBody>
@@ -12506,7 +12876,7 @@
     </p:spTree>
     <p:extLst>
       <p:ext uri="{BB962C8B-B14F-4D97-AF65-F5344CB8AC3E}">
-        <p14:creationId xmlns:p14="http://schemas.microsoft.com/office/powerpoint/2010/main" val="2973595614"/>
+        <p14:creationId xmlns:p14="http://schemas.microsoft.com/office/powerpoint/2010/main" val="3643622142"/>
       </p:ext>
     </p:extLst>
   </p:cSld>
@@ -12557,15 +12927,7 @@
           <a:p>
             <a:r>
               <a:rPr lang="en-GB" dirty="0" smtClean="0"/>
-              <a:t>Data Arrays (</a:t>
-            </a:r>
-            <a:r>
-              <a:rPr lang="en-GB" dirty="0"/>
-              <a:t>3</a:t>
-            </a:r>
-            <a:r>
-              <a:rPr lang="en-GB" dirty="0" smtClean="0"/>
-              <a:t>/3)</a:t>
+              <a:t>Compiler Design Issues</a:t>
             </a:r>
             <a:endParaRPr lang="en-GB" dirty="0"/>
           </a:p>
@@ -12584,104 +12946,89 @@
         <p:spPr/>
         <p:txBody>
           <a:bodyPr>
-            <a:normAutofit/>
+            <a:normAutofit fontScale="85000" lnSpcReduction="20000"/>
           </a:bodyPr>
           <a:lstStyle/>
           <a:p>
             <a:r>
+              <a:rPr lang="en-GB" dirty="0" smtClean="0"/>
+              <a:t>In order to avoid binding of all Java code,</a:t>
+            </a:r>
+          </a:p>
+          <a:p>
+            <a:pPr lvl="1"/>
+            <a:r>
+              <a:rPr lang="en-GB" dirty="0" smtClean="0"/>
+              <a:t>define a list of types for which code shall be generated (Product, Band, </a:t>
+            </a:r>
+            <a:r>
               <a:rPr lang="en-GB" dirty="0" err="1" smtClean="0"/>
-              <a:t>CArray</a:t>
-            </a:r>
-            <a:endParaRPr lang="en-GB" dirty="0" smtClean="0"/>
+              <a:t>TiePointGrid</a:t>
+            </a:r>
+            <a:r>
+              <a:rPr lang="en-GB" dirty="0" smtClean="0"/>
+              <a:t>, …)</a:t>
+            </a:r>
           </a:p>
           <a:p>
             <a:pPr lvl="1"/>
             <a:r>
-              <a:rPr lang="en-GB" dirty="0" smtClean="0"/>
-              <a:t>implements Buffer protocol  </a:t>
-            </a:r>
+              <a:rPr lang="en-GB" dirty="0"/>
+              <a:t>f</a:t>
+            </a:r>
+            <a:r>
+              <a:rPr lang="en-GB" dirty="0" smtClean="0"/>
+              <a:t>or some types or single methods, we will provide hand-written code (File, String, …)</a:t>
+            </a:r>
+            <a:endParaRPr lang="en-GB" dirty="0"/>
           </a:p>
           <a:p>
             <a:pPr lvl="1"/>
             <a:r>
               <a:rPr lang="en-GB" dirty="0" smtClean="0"/>
-              <a:t>implements Sequence protocol</a:t>
-            </a:r>
-          </a:p>
-          <a:p>
-            <a:r>
-              <a:rPr lang="en-GB" dirty="0" smtClean="0"/>
-              <a:t>TODO</a:t>
-            </a:r>
-          </a:p>
-          <a:p>
-            <a:pPr lvl="1"/>
-            <a:r>
-              <a:rPr lang="en-GB" dirty="0" smtClean="0"/>
-              <a:t>Make </a:t>
+              <a:t>methods that have types in their signature, that are not in this list, will not be translated</a:t>
+            </a:r>
+          </a:p>
+          <a:p>
+            <a:r>
+              <a:rPr lang="en-GB" dirty="0" smtClean="0"/>
+              <a:t>consider </a:t>
             </a:r>
             <a:r>
               <a:rPr lang="en-GB" dirty="0" err="1" smtClean="0"/>
-              <a:t>dtype</a:t>
-            </a:r>
-            <a:r>
-              <a:rPr lang="en-GB" dirty="0" smtClean="0"/>
-              <a:t>-format-string conform to Python ‘</a:t>
+              <a:t>javacc</a:t>
+            </a:r>
+            <a:r>
+              <a:rPr lang="en-GB" dirty="0" smtClean="0"/>
+              <a:t> to do the job</a:t>
+            </a:r>
+          </a:p>
+          <a:p>
+            <a:r>
+              <a:rPr lang="en-GB" dirty="0" smtClean="0"/>
+              <a:t>consider Java annotations to control code generation (e.g. parameter annotations @In, @Out, @</a:t>
             </a:r>
             <a:r>
               <a:rPr lang="en-GB" dirty="0" err="1" smtClean="0"/>
-              <a:t>struct</a:t>
-            </a:r>
-            <a:r>
-              <a:rPr lang="en-GB" dirty="0" smtClean="0"/>
-              <a:t>’ module, see </a:t>
-            </a:r>
-            <a:br>
-              <a:rPr lang="en-GB" dirty="0" smtClean="0"/>
-            </a:br>
-            <a:r>
-              <a:rPr lang="en-GB" dirty="0" smtClean="0"/>
-              <a:t>6.3.  </a:t>
-            </a:r>
-            <a:r>
-              <a:rPr lang="en-GB" dirty="0" err="1" smtClean="0"/>
-              <a:t>struct</a:t>
-            </a:r>
-            <a:r>
-              <a:rPr lang="en-GB" dirty="0" smtClean="0"/>
-              <a:t> </a:t>
-            </a:r>
-            <a:r>
-              <a:rPr lang="en-GB" dirty="0"/>
-              <a:t>— Interpret bytes as packed binary </a:t>
-            </a:r>
-            <a:r>
-              <a:rPr lang="en-GB" dirty="0" smtClean="0"/>
-              <a:t>data, see also</a:t>
-            </a:r>
-            <a:br>
-              <a:rPr lang="en-GB" dirty="0" smtClean="0"/>
-            </a:br>
-            <a:r>
-              <a:rPr lang="en-GB" dirty="0" err="1" smtClean="0"/>
-              <a:t>PyBuffer_SizeFromFormat</a:t>
-            </a:r>
-            <a:r>
-              <a:rPr lang="en-GB" dirty="0" smtClean="0"/>
-              <a:t>(format) </a:t>
-            </a:r>
-            <a:endParaRPr lang="en-GB" dirty="0"/>
-          </a:p>
-          <a:p>
-            <a:pPr lvl="1"/>
-            <a:endParaRPr lang="en-GB" dirty="0" smtClean="0"/>
+              <a:t>InOut</a:t>
+            </a:r>
+            <a:r>
+              <a:rPr lang="en-GB" dirty="0" smtClean="0"/>
+              <a:t>)</a:t>
+            </a:r>
+          </a:p>
+          <a:p>
+            <a:r>
+              <a:rPr lang="en-GB" dirty="0" smtClean="0"/>
+              <a:t>code generation might be done through patterns, e.g. implemented by velocity templates</a:t>
+            </a:r>
           </a:p>
         </p:txBody>
       </p:sp>
     </p:spTree>
     <p:extLst>
       <p:ext uri="{BB962C8B-B14F-4D97-AF65-F5344CB8AC3E}">
-        <p14:creationId xmlns:p14="http://schemas.microsoft.com/office/powerpoint/2010/main" val="845572741"/>
+        <p14:creationId xmlns:p14="http://schemas.microsoft.com/office/powerpoint/2010/main" val="1053306664"/>
       </p:ext>
     </p:extLst>
   </p:cSld>
@@ -12957,7 +13304,11 @@
           <a:p>
             <a:r>
               <a:rPr lang="en-GB" dirty="0" smtClean="0"/>
-              <a:t>Multithreading</a:t>
+              <a:t>Design </a:t>
+            </a:r>
+            <a:r>
+              <a:rPr lang="en-GB" dirty="0" err="1" smtClean="0"/>
+              <a:t>Decisons</a:t>
             </a:r>
             <a:endParaRPr lang="en-GB" dirty="0"/>
           </a:p>
@@ -12976,113 +13327,294 @@
         <p:spPr/>
         <p:txBody>
           <a:bodyPr>
-            <a:normAutofit lnSpcReduction="10000"/>
+            <a:normAutofit fontScale="47500" lnSpcReduction="20000"/>
           </a:bodyPr>
           <a:lstStyle/>
           <a:p>
             <a:r>
-              <a:rPr lang="en-GB" dirty="0" smtClean="0"/>
-              <a:t>If BEAM Java calls into Python from multiple Java threads for executing e.g. a tile computation, we can consider</a:t>
+              <a:rPr lang="en-GB" dirty="0"/>
+              <a:t>Use JNI types in </a:t>
+            </a:r>
+            <a:r>
+              <a:rPr lang="en-GB" dirty="0" smtClean="0"/>
+              <a:t>C-interfaces</a:t>
             </a:r>
           </a:p>
           <a:p>
             <a:pPr lvl="1"/>
             <a:r>
-              <a:rPr lang="en-GB" dirty="0" err="1" smtClean="0"/>
-              <a:t>PyThreadState</a:t>
-            </a:r>
-            <a:r>
-              <a:rPr lang="en-GB" dirty="0" smtClean="0"/>
-              <a:t>* </a:t>
-            </a:r>
-            <a:r>
-              <a:rPr lang="en-GB" dirty="0" err="1" smtClean="0"/>
-              <a:t>tstate</a:t>
-            </a:r>
-            <a:r>
-              <a:rPr lang="en-GB" dirty="0" smtClean="0"/>
-              <a:t>;</a:t>
+              <a:rPr lang="en-GB" dirty="0" smtClean="0"/>
+              <a:t>Yes</a:t>
+            </a:r>
+            <a:r>
+              <a:rPr lang="en-GB" dirty="0"/>
+              <a:t>, because BEAM API is Java and as such it is much less </a:t>
+            </a:r>
+            <a:r>
+              <a:rPr lang="en-GB" dirty="0" err="1"/>
+              <a:t>verbous</a:t>
+            </a:r>
+            <a:r>
+              <a:rPr lang="en-GB" dirty="0"/>
+              <a:t> and more concise to reuse JNI types, and is </a:t>
+            </a:r>
+            <a:r>
+              <a:rPr lang="en-GB" dirty="0" err="1"/>
+              <a:t>aloso</a:t>
+            </a:r>
+            <a:r>
+              <a:rPr lang="en-GB" dirty="0"/>
+              <a:t> less </a:t>
+            </a:r>
+            <a:r>
+              <a:rPr lang="en-GB" dirty="0" smtClean="0"/>
+              <a:t>work</a:t>
             </a:r>
           </a:p>
           <a:p>
             <a:pPr lvl="1"/>
             <a:r>
-              <a:rPr lang="en-GB" dirty="0" err="1" smtClean="0"/>
-              <a:t>tstate</a:t>
-            </a:r>
-            <a:r>
-              <a:rPr lang="en-GB" dirty="0" smtClean="0"/>
-              <a:t> = </a:t>
+              <a:rPr lang="en-GB" dirty="0" smtClean="0"/>
+              <a:t>No</a:t>
+            </a:r>
+            <a:r>
+              <a:rPr lang="en-GB" dirty="0"/>
+              <a:t>, because the C-API shall be independent of its implementation or </a:t>
+            </a:r>
+            <a:r>
+              <a:rPr lang="en-GB" dirty="0" smtClean="0"/>
+              <a:t>origin</a:t>
+            </a:r>
+            <a:endParaRPr lang="en-GB" dirty="0"/>
+          </a:p>
+          <a:p>
+            <a:r>
+              <a:rPr lang="en-GB" dirty="0"/>
+              <a:t>Duplicate Java API (or parts) 1:1?  (e.g. any method in Java gets its C counterpart)</a:t>
+            </a:r>
+          </a:p>
+          <a:p>
+            <a:pPr lvl="1"/>
+            <a:r>
+              <a:rPr lang="en-GB" dirty="0" smtClean="0"/>
+              <a:t>Yes</a:t>
+            </a:r>
+            <a:r>
+              <a:rPr lang="en-GB" dirty="0"/>
+              <a:t>, because the Java API docs can be reused for C API</a:t>
+            </a:r>
+            <a:r>
+              <a:rPr lang="en-GB" dirty="0" smtClean="0"/>
+              <a:t>.</a:t>
+            </a:r>
+          </a:p>
+          <a:p>
+            <a:pPr lvl="1"/>
+            <a:r>
+              <a:rPr lang="en-GB" dirty="0" smtClean="0"/>
+              <a:t>No</a:t>
+            </a:r>
+            <a:r>
+              <a:rPr lang="en-GB" dirty="0"/>
+              <a:t>, because a more concise C-API can be generated. And no, because changes in the Java API need to be reflected </a:t>
+            </a:r>
+            <a:r>
+              <a:rPr lang="en-GB" dirty="0" smtClean="0"/>
+              <a:t>in the </a:t>
+            </a:r>
+            <a:r>
+              <a:rPr lang="en-GB" dirty="0"/>
+              <a:t>C API </a:t>
+            </a:r>
+            <a:r>
+              <a:rPr lang="en-GB" dirty="0" smtClean="0"/>
+              <a:t>which </a:t>
+            </a:r>
+            <a:r>
+              <a:rPr lang="en-GB" dirty="0"/>
+              <a:t>will introduce a lot of work</a:t>
+            </a:r>
+            <a:r>
+              <a:rPr lang="en-GB" dirty="0" smtClean="0"/>
+              <a:t>.</a:t>
+            </a:r>
+            <a:endParaRPr lang="en-GB" dirty="0"/>
+          </a:p>
+          <a:p>
+            <a:r>
+              <a:rPr lang="en-GB" dirty="0"/>
+              <a:t>Shall C API functions return string buffers that users have to release </a:t>
+            </a:r>
+            <a:r>
+              <a:rPr lang="en-GB" dirty="0" smtClean="0"/>
+              <a:t>later?</a:t>
+            </a:r>
+          </a:p>
+          <a:p>
+            <a:pPr lvl="1"/>
+            <a:r>
+              <a:rPr lang="en-GB" dirty="0" smtClean="0"/>
+              <a:t>Yes</a:t>
+            </a:r>
+            <a:r>
+              <a:rPr lang="en-GB" dirty="0"/>
+              <a:t>, otherwise the signature of Java counterparts is will be different, because by-reference arguments passing </a:t>
+            </a:r>
+            <a:r>
+              <a:rPr lang="en-GB" dirty="0" smtClean="0"/>
+              <a:t>is required then.</a:t>
+            </a:r>
+            <a:br>
+              <a:rPr lang="en-GB" dirty="0" smtClean="0"/>
+            </a:br>
+            <a:r>
+              <a:rPr lang="en-GB" dirty="0" smtClean="0"/>
+              <a:t>E.g</a:t>
+            </a:r>
+            <a:r>
+              <a:rPr lang="en-GB" dirty="0"/>
+              <a:t>. instead </a:t>
+            </a:r>
+            <a:r>
+              <a:rPr lang="en-GB" dirty="0" smtClean="0"/>
+              <a:t>of</a:t>
+            </a:r>
+            <a:br>
+              <a:rPr lang="en-GB" dirty="0" smtClean="0"/>
+            </a:br>
+            <a:r>
+              <a:rPr lang="en-GB" dirty="0" smtClean="0"/>
+              <a:t>             </a:t>
+            </a:r>
+            <a:r>
+              <a:rPr lang="en-GB" dirty="0"/>
+              <a:t>char* name = </a:t>
             </a:r>
             <a:r>
               <a:rPr lang="en-GB" dirty="0" err="1"/>
-              <a:t>Py_NewInterpreter</a:t>
-            </a:r>
-            <a:r>
-              <a:rPr lang="en-GB" dirty="0" smtClean="0"/>
-              <a:t>();</a:t>
+              <a:t>get_name</a:t>
+            </a:r>
+            <a:r>
+              <a:rPr lang="en-GB" dirty="0"/>
+              <a:t>(</a:t>
+            </a:r>
+            <a:r>
+              <a:rPr lang="en-GB" dirty="0" err="1"/>
+              <a:t>obj</a:t>
+            </a:r>
+            <a:r>
+              <a:rPr lang="en-GB" dirty="0" smtClean="0"/>
+              <a:t>);</a:t>
+            </a:r>
+            <a:br>
+              <a:rPr lang="en-GB" dirty="0" smtClean="0"/>
+            </a:br>
+            <a:r>
+              <a:rPr lang="en-GB" dirty="0" smtClean="0"/>
+              <a:t>              ...</a:t>
+            </a:r>
+            <a:br>
+              <a:rPr lang="en-GB" dirty="0" smtClean="0"/>
+            </a:br>
+            <a:r>
+              <a:rPr lang="en-GB" dirty="0" smtClean="0"/>
+              <a:t>              </a:t>
+            </a:r>
+            <a:r>
+              <a:rPr lang="en-GB" dirty="0"/>
+              <a:t>free(name</a:t>
+            </a:r>
+            <a:r>
+              <a:rPr lang="en-GB" dirty="0" smtClean="0"/>
+              <a:t>);</a:t>
+            </a:r>
+            <a:br>
+              <a:rPr lang="en-GB" dirty="0" smtClean="0"/>
+            </a:br>
+            <a:r>
+              <a:rPr lang="en-GB" dirty="0" smtClean="0"/>
+              <a:t>we have</a:t>
+            </a:r>
+            <a:br>
+              <a:rPr lang="en-GB" dirty="0" smtClean="0"/>
+            </a:br>
+            <a:r>
+              <a:rPr lang="en-GB" dirty="0" smtClean="0"/>
+              <a:t>              </a:t>
+            </a:r>
+            <a:r>
+              <a:rPr lang="en-GB" dirty="0"/>
+              <a:t>char name[81</a:t>
+            </a:r>
+            <a:r>
+              <a:rPr lang="en-GB" dirty="0" smtClean="0"/>
+              <a:t>];</a:t>
+            </a:r>
+            <a:br>
+              <a:rPr lang="en-GB" dirty="0" smtClean="0"/>
+            </a:br>
+            <a:r>
+              <a:rPr lang="en-GB" dirty="0" smtClean="0"/>
+              <a:t>              </a:t>
+            </a:r>
+            <a:r>
+              <a:rPr lang="en-GB" dirty="0" err="1"/>
+              <a:t>get_name</a:t>
+            </a:r>
+            <a:r>
+              <a:rPr lang="en-GB" dirty="0"/>
+              <a:t>(</a:t>
+            </a:r>
+            <a:r>
+              <a:rPr lang="en-GB" dirty="0" err="1"/>
+              <a:t>obj</a:t>
+            </a:r>
+            <a:r>
+              <a:rPr lang="en-GB" dirty="0"/>
+              <a:t>, name, 80</a:t>
+            </a:r>
+            <a:r>
+              <a:rPr lang="en-GB" dirty="0" smtClean="0"/>
+              <a:t>);</a:t>
             </a:r>
           </a:p>
           <a:p>
             <a:pPr lvl="1"/>
             <a:r>
               <a:rPr lang="en-GB" dirty="0" smtClean="0"/>
-              <a:t>…</a:t>
-            </a:r>
-            <a:r>
-              <a:rPr lang="en-GB" i="1" dirty="0" smtClean="0"/>
-              <a:t> call into python code</a:t>
-            </a:r>
-          </a:p>
-          <a:p>
-            <a:pPr lvl="1"/>
-            <a:r>
-              <a:rPr lang="en-GB" dirty="0" err="1" smtClean="0"/>
-              <a:t>Py_EndInterpreter</a:t>
-            </a:r>
-            <a:r>
-              <a:rPr lang="en-GB" dirty="0" smtClean="0"/>
-              <a:t>(</a:t>
-            </a:r>
-            <a:r>
-              <a:rPr lang="en-GB" dirty="0" err="1" smtClean="0"/>
-              <a:t>tstate</a:t>
-            </a:r>
-            <a:r>
-              <a:rPr lang="en-GB" dirty="0" smtClean="0"/>
-              <a:t>);  </a:t>
-            </a:r>
-          </a:p>
-          <a:p>
-            <a:pPr marL="342900" lvl="1" indent="-342900">
-              <a:buFont typeface="Arial" pitchFamily="34" charset="0"/>
-              <a:buChar char="•"/>
-            </a:pPr>
+              <a:t>No</a:t>
+            </a:r>
             <a:r>
               <a:rPr lang="en-GB" dirty="0"/>
-              <a:t>See </a:t>
-            </a:r>
-            <a:r>
-              <a:rPr lang="en-GB" dirty="0" smtClean="0"/>
-              <a:t>“Initialization</a:t>
+              <a:t>, because it is </a:t>
+            </a:r>
+            <a:r>
+              <a:rPr lang="en-GB" dirty="0" smtClean="0"/>
+              <a:t>obvious </a:t>
             </a:r>
             <a:r>
               <a:rPr lang="en-GB" dirty="0"/>
-              <a:t>, Finalization, and </a:t>
-            </a:r>
-            <a:r>
-              <a:rPr lang="en-GB" dirty="0" smtClean="0"/>
-              <a:t>Threads” </a:t>
+              <a:t>that strings need to be freed on the users side</a:t>
+            </a:r>
+            <a:r>
+              <a:rPr lang="en-GB" dirty="0" smtClean="0"/>
+              <a:t>.</a:t>
+            </a:r>
+          </a:p>
+          <a:p>
+            <a:r>
+              <a:rPr lang="en-GB" dirty="0" smtClean="0"/>
+              <a:t>Shall </a:t>
             </a:r>
             <a:r>
               <a:rPr lang="en-GB" dirty="0"/>
-              <a:t>in Python/C API Reference Manual</a:t>
-            </a:r>
-          </a:p>
-          <a:p>
-            <a:pPr marL="0" indent="0">
-              <a:buNone/>
-            </a:pPr>
+              <a:t>the API allow for modification of single structures elements that are passed as arguments by-reference.?</a:t>
+            </a:r>
+          </a:p>
+          <a:p>
+            <a:endParaRPr lang="en-GB" dirty="0"/>
+          </a:p>
+          <a:p>
             <a:endParaRPr lang="en-GB" dirty="0"/>
           </a:p>
         </p:txBody>
@@ -13090,7 +13622,7 @@
     </p:spTree>
     <p:extLst>
       <p:ext uri="{BB962C8B-B14F-4D97-AF65-F5344CB8AC3E}">
-        <p14:creationId xmlns:p14="http://schemas.microsoft.com/office/powerpoint/2010/main" val="183588086"/>
+        <p14:creationId xmlns:p14="http://schemas.microsoft.com/office/powerpoint/2010/main" val="1103487878"/>
       </p:ext>
     </p:extLst>
   </p:cSld>
@@ -13141,7 +13673,7 @@
           <a:p>
             <a:r>
               <a:rPr lang="en-GB" dirty="0" smtClean="0"/>
-              <a:t>Alternatives (1/2)</a:t>
+              <a:t>Data Arrays (1/3)</a:t>
             </a:r>
             <a:endParaRPr lang="en-GB" dirty="0"/>
           </a:p>
@@ -13159,87 +13691,396 @@
         </p:nvSpPr>
         <p:spPr/>
         <p:txBody>
-          <a:bodyPr/>
+          <a:bodyPr>
+            <a:normAutofit fontScale="47500" lnSpcReduction="20000"/>
+          </a:bodyPr>
           <a:lstStyle/>
           <a:p>
             <a:r>
+              <a:rPr lang="en-GB" dirty="0" smtClean="0"/>
+              <a:t>We shall try to find a way to directly use the arrays allocated and returned by the C-API without copying them</a:t>
+            </a:r>
+          </a:p>
+          <a:p>
+            <a:endParaRPr lang="en-GB" dirty="0" smtClean="0"/>
+          </a:p>
+          <a:p>
+            <a:r>
+              <a:rPr lang="en-GB" b="1" dirty="0" smtClean="0"/>
+              <a:t>array</a:t>
+            </a:r>
+          </a:p>
+          <a:p>
+            <a:pPr lvl="1"/>
+            <a:r>
+              <a:rPr lang="en-GB" b="1" dirty="0" smtClean="0"/>
+              <a:t>array</a:t>
+            </a:r>
+            <a:r>
+              <a:rPr lang="en-GB" dirty="0" smtClean="0"/>
+              <a:t>(</a:t>
+            </a:r>
+            <a:r>
+              <a:rPr lang="en-GB" i="1" dirty="0" err="1" smtClean="0"/>
+              <a:t>typecode</a:t>
+            </a:r>
+            <a:r>
+              <a:rPr lang="en-GB" dirty="0"/>
+              <a:t>[, </a:t>
+            </a:r>
+            <a:r>
+              <a:rPr lang="en-GB" i="1" dirty="0"/>
+              <a:t>initializer</a:t>
+            </a:r>
+            <a:r>
+              <a:rPr lang="en-GB" dirty="0"/>
+              <a:t>])</a:t>
+            </a:r>
+            <a:br>
+              <a:rPr lang="en-GB" dirty="0"/>
+            </a:br>
+            <a:r>
+              <a:rPr lang="en-GB" sz="2900" i="1" dirty="0">
+                <a:solidFill>
+                  <a:schemeClr val="accent1">
+                    <a:lumMod val="75000"/>
+                  </a:schemeClr>
+                </a:solidFill>
+              </a:rPr>
+              <a:t>A new array whose items are restricted by </a:t>
+            </a:r>
+            <a:r>
+              <a:rPr lang="en-GB" sz="2900" i="1" dirty="0" err="1">
+                <a:solidFill>
+                  <a:schemeClr val="accent1">
+                    <a:lumMod val="75000"/>
+                  </a:schemeClr>
+                </a:solidFill>
+              </a:rPr>
+              <a:t>typecode</a:t>
+            </a:r>
+            <a:r>
+              <a:rPr lang="en-GB" sz="2900" i="1" dirty="0">
+                <a:solidFill>
+                  <a:schemeClr val="accent1">
+                    <a:lumMod val="75000"/>
+                  </a:schemeClr>
+                </a:solidFill>
+              </a:rPr>
+              <a:t>, and initialized from the optional initializer value, which must be a list, object supporting the buffer interface, or </a:t>
+            </a:r>
+            <a:r>
+              <a:rPr lang="en-GB" sz="2900" i="1" dirty="0" err="1">
+                <a:solidFill>
+                  <a:schemeClr val="accent1">
+                    <a:lumMod val="75000"/>
+                  </a:schemeClr>
+                </a:solidFill>
+              </a:rPr>
+              <a:t>iterable</a:t>
+            </a:r>
+            <a:r>
+              <a:rPr lang="en-GB" sz="2900" i="1" dirty="0">
+                <a:solidFill>
+                  <a:schemeClr val="accent1">
+                    <a:lumMod val="75000"/>
+                  </a:schemeClr>
+                </a:solidFill>
+              </a:rPr>
+              <a:t> over elements of the appropriate type.</a:t>
+            </a:r>
+          </a:p>
+          <a:p>
+            <a:pPr lvl="1"/>
+            <a:r>
+              <a:rPr lang="en-GB" dirty="0" smtClean="0"/>
+              <a:t>Note: the </a:t>
+            </a:r>
+            <a:r>
+              <a:rPr lang="en-GB" b="1" dirty="0" smtClean="0"/>
+              <a:t>array</a:t>
+            </a:r>
+            <a:r>
+              <a:rPr lang="en-GB" dirty="0" smtClean="0"/>
+              <a:t> constructor always make copies of buffers passed in as </a:t>
+            </a:r>
+            <a:r>
+              <a:rPr lang="en-GB" i="1" dirty="0"/>
+              <a:t>initializer</a:t>
+            </a:r>
+            <a:r>
+              <a:rPr lang="en-GB" dirty="0" smtClean="0"/>
+              <a:t> </a:t>
+            </a:r>
+          </a:p>
+          <a:p>
+            <a:pPr lvl="1"/>
+            <a:r>
+              <a:rPr lang="en-GB" dirty="0" smtClean="0"/>
+              <a:t>Note: arrays support the buffer interface</a:t>
+            </a:r>
+          </a:p>
+          <a:p>
+            <a:r>
+              <a:rPr lang="en-GB" b="1" dirty="0" err="1" smtClean="0"/>
+              <a:t>numpy</a:t>
+            </a:r>
+            <a:endParaRPr lang="en-GB" b="1" dirty="0" smtClean="0"/>
+          </a:p>
+          <a:p>
+            <a:pPr lvl="1"/>
+            <a:r>
+              <a:rPr lang="en-GB" b="1" dirty="0" err="1" smtClean="0"/>
+              <a:t>frombuffer</a:t>
+            </a:r>
+            <a:r>
+              <a:rPr lang="en-GB" dirty="0" smtClean="0"/>
+              <a:t>(buffer</a:t>
+            </a:r>
+            <a:r>
+              <a:rPr lang="en-GB" dirty="0"/>
+              <a:t>[, </a:t>
+            </a:r>
+            <a:r>
+              <a:rPr lang="en-GB" dirty="0" err="1"/>
+              <a:t>dtype</a:t>
+            </a:r>
+            <a:r>
+              <a:rPr lang="en-GB" dirty="0"/>
+              <a:t>, count, offset</a:t>
+            </a:r>
+            <a:r>
+              <a:rPr lang="en-GB" dirty="0" smtClean="0"/>
+              <a:t>]) </a:t>
+            </a:r>
+            <a:br>
+              <a:rPr lang="en-GB" dirty="0" smtClean="0"/>
+            </a:br>
+            <a:r>
+              <a:rPr lang="en-GB" i="1" dirty="0" smtClean="0">
+                <a:solidFill>
+                  <a:schemeClr val="accent1">
+                    <a:lumMod val="75000"/>
+                  </a:schemeClr>
+                </a:solidFill>
+              </a:rPr>
+              <a:t>Interpret </a:t>
+            </a:r>
+            <a:r>
+              <a:rPr lang="en-GB" i="1" dirty="0">
+                <a:solidFill>
+                  <a:schemeClr val="accent1">
+                    <a:lumMod val="75000"/>
+                  </a:schemeClr>
+                </a:solidFill>
+              </a:rPr>
+              <a:t>a buffer as a 1-dimensional </a:t>
+            </a:r>
+            <a:r>
+              <a:rPr lang="en-GB" i="1" dirty="0" smtClean="0">
+                <a:solidFill>
+                  <a:schemeClr val="accent1">
+                    <a:lumMod val="75000"/>
+                  </a:schemeClr>
+                </a:solidFill>
+              </a:rPr>
+              <a:t>array.</a:t>
+            </a:r>
+            <a:endParaRPr lang="en-GB" i="1" dirty="0">
+              <a:solidFill>
+                <a:schemeClr val="accent1">
+                  <a:lumMod val="75000"/>
+                </a:schemeClr>
+              </a:solidFill>
+            </a:endParaRPr>
+          </a:p>
+          <a:p>
+            <a:pPr lvl="1"/>
+            <a:r>
+              <a:rPr lang="en-GB" b="1" dirty="0" smtClean="0"/>
+              <a:t>reshape</a:t>
+            </a:r>
+            <a:r>
+              <a:rPr lang="en-GB" dirty="0" smtClean="0"/>
+              <a:t>(array,</a:t>
+            </a:r>
+            <a:r>
+              <a:rPr lang="en-GB" dirty="0"/>
+              <a:t> </a:t>
+            </a:r>
+            <a:r>
+              <a:rPr lang="en-GB" dirty="0" err="1" smtClean="0"/>
+              <a:t>newshape</a:t>
+            </a:r>
+            <a:r>
+              <a:rPr lang="en-GB" dirty="0" smtClean="0"/>
+              <a:t>[,</a:t>
+            </a:r>
+            <a:r>
+              <a:rPr lang="en-GB" dirty="0"/>
+              <a:t> </a:t>
+            </a:r>
+            <a:r>
+              <a:rPr lang="en-GB" dirty="0" smtClean="0"/>
+              <a:t>order])</a:t>
+            </a:r>
+            <a:br>
+              <a:rPr lang="en-GB" dirty="0" smtClean="0"/>
+            </a:br>
+            <a:r>
+              <a:rPr lang="en-GB" i="1" dirty="0">
+                <a:solidFill>
+                  <a:schemeClr val="accent1">
+                    <a:lumMod val="75000"/>
+                  </a:schemeClr>
+                </a:solidFill>
+              </a:rPr>
+              <a:t>Gives a new shape to an array without changing its data</a:t>
+            </a:r>
+            <a:r>
+              <a:rPr lang="en-GB" i="1" dirty="0" smtClean="0">
+                <a:solidFill>
+                  <a:schemeClr val="accent1">
+                    <a:lumMod val="75000"/>
+                  </a:schemeClr>
+                </a:solidFill>
+              </a:rPr>
+              <a:t>.</a:t>
+            </a:r>
+          </a:p>
+          <a:p>
+            <a:pPr lvl="1"/>
+            <a:r>
+              <a:rPr lang="en-GB" dirty="0"/>
+              <a:t>Note: </a:t>
+            </a:r>
+            <a:r>
+              <a:rPr lang="en-GB" dirty="0" smtClean="0"/>
+              <a:t>Neither </a:t>
+            </a:r>
+            <a:r>
               <a:rPr lang="en-GB" b="1" dirty="0" err="1"/>
-              <a:t>Jep</a:t>
-            </a:r>
-            <a:r>
-              <a:rPr lang="en-GB" dirty="0"/>
-              <a:t> - Java Embedded Python</a:t>
+              <a:t>frombuffer</a:t>
+            </a:r>
+            <a:r>
+              <a:rPr lang="en-GB" dirty="0" smtClean="0"/>
+              <a:t> nor </a:t>
+            </a:r>
+            <a:r>
+              <a:rPr lang="en-GB" b="1" dirty="0" smtClean="0"/>
+              <a:t>reshape </a:t>
+            </a:r>
+            <a:r>
+              <a:rPr lang="en-GB" dirty="0" smtClean="0"/>
+              <a:t>make copies of the input data</a:t>
+            </a:r>
+          </a:p>
+          <a:p>
+            <a:endParaRPr lang="en-GB" u="sng" dirty="0" smtClean="0"/>
+          </a:p>
+          <a:p>
+            <a:r>
+              <a:rPr lang="en-GB" u="sng" dirty="0" smtClean="0"/>
+              <a:t>Conclusion</a:t>
+            </a:r>
+            <a:r>
+              <a:rPr lang="en-GB" dirty="0" smtClean="0"/>
+              <a:t>: pixel data passed in and returned by the BEAM Python API shall be Python objects that support the </a:t>
+            </a:r>
+            <a:r>
+              <a:rPr lang="en-GB" b="1" i="1" dirty="0" smtClean="0"/>
+              <a:t>buffer interface </a:t>
+            </a:r>
+            <a:r>
+              <a:rPr lang="en-GB" dirty="0" smtClean="0"/>
+              <a:t>so that the data can be efficiently used with </a:t>
+            </a:r>
+            <a:r>
+              <a:rPr lang="en-GB" dirty="0" err="1" smtClean="0"/>
+              <a:t>numpy</a:t>
+            </a:r>
+            <a:r>
+              <a:rPr lang="en-GB" dirty="0" smtClean="0"/>
+              <a:t>.</a:t>
             </a:r>
           </a:p>
           <a:p>
             <a:pPr lvl="1"/>
             <a:r>
-              <a:rPr lang="en-GB" dirty="0" err="1"/>
-              <a:t>Jep</a:t>
-            </a:r>
-            <a:r>
-              <a:rPr lang="en-GB" dirty="0"/>
-              <a:t> embeds </a:t>
-            </a:r>
-            <a:r>
-              <a:rPr lang="en-GB" dirty="0" err="1"/>
-              <a:t>CPython</a:t>
-            </a:r>
-            <a:r>
-              <a:rPr lang="en-GB" dirty="0"/>
-              <a:t> in Java. It is safe to use in a heavily threaded environment, it is quite fast and its stability is a main feature and goal.</a:t>
-            </a:r>
-          </a:p>
-          <a:p>
-            <a:pPr lvl="1"/>
+              <a:rPr lang="en-GB" dirty="0">
+                <a:hlinkClick r:id="rId2"/>
+              </a:rPr>
+              <a:t>http://</a:t>
+            </a:r>
             <a:r>
               <a:rPr lang="en-GB" dirty="0" smtClean="0">
                 <a:hlinkClick r:id="rId2"/>
               </a:rPr>
-              <a:t>https</a:t>
-            </a:r>
+              <a:t>docs.python.org/3.2/c-api/buffer.html?highlight=buffer#Py_buffer</a:t>
+            </a:r>
+            <a:r>
+              <a:rPr lang="en-GB" dirty="0" smtClean="0"/>
+              <a:t> </a:t>
+            </a:r>
+          </a:p>
+          <a:p>
+            <a:pPr lvl="1"/>
             <a:r>
               <a:rPr lang="en-GB" dirty="0">
-                <a:hlinkClick r:id="rId2"/>
+                <a:hlinkClick r:id="rId3"/>
+              </a:rPr>
+              <a:t>http://</a:t>
+            </a:r>
+            <a:r>
+              <a:rPr lang="en-GB" dirty="0" smtClean="0">
+                <a:hlinkClick r:id="rId3"/>
+              </a:rPr>
+              <a:t>docs.python.org/3.2/c-api/typeobj.html#buffer-structs</a:t>
+            </a:r>
+            <a:endParaRPr lang="en-GB" dirty="0" smtClean="0"/>
+          </a:p>
+          <a:p>
+            <a:pPr lvl="1"/>
+            <a:r>
+              <a:rPr lang="en-GB" dirty="0" smtClean="0">
+                <a:hlinkClick r:id="rId4"/>
+              </a:rPr>
+              <a:t>http</a:t>
+            </a:r>
+            <a:r>
+              <a:rPr lang="en-GB" dirty="0">
+                <a:hlinkClick r:id="rId4"/>
               </a:rPr>
               <a:t>://</a:t>
             </a:r>
             <a:r>
               <a:rPr lang="en-GB" dirty="0" smtClean="0">
-                <a:hlinkClick r:id="rId2"/>
+                <a:hlinkClick r:id="rId4"/>
               </a:rPr>
-              <a:t>github.com/mrj0/jep</a:t>
-            </a:r>
-            <a:endParaRPr lang="en-GB" dirty="0" smtClean="0"/>
+              <a:t>docs.python.org/3.2/library/stdtypes.html#memoryview</a:t>
+            </a:r>
+            <a:r>
+              <a:rPr lang="en-GB" dirty="0" smtClean="0"/>
+              <a:t> </a:t>
+            </a:r>
+            <a:endParaRPr lang="en-GB" dirty="0"/>
           </a:p>
           <a:p>
             <a:pPr lvl="1"/>
-            <a:r>
-              <a:rPr lang="en-GB" dirty="0" smtClean="0"/>
-              <a:t>Check: can it be used to call Python from Java</a:t>
-            </a:r>
-          </a:p>
-          <a:p>
-            <a:pPr lvl="1"/>
-            <a:r>
-              <a:rPr lang="en-GB" dirty="0" smtClean="0"/>
-              <a:t>Check: No windows support</a:t>
-            </a:r>
-          </a:p>
-          <a:p>
-            <a:pPr lvl="1"/>
-            <a:r>
-              <a:rPr lang="en-GB" dirty="0" smtClean="0"/>
-              <a:t>Check: last activity 9 months ago</a:t>
-            </a:r>
-            <a:endParaRPr lang="en-GB" dirty="0"/>
+            <a:endParaRPr lang="en-GB" i="1" dirty="0">
+              <a:solidFill>
+                <a:schemeClr val="accent1">
+                  <a:lumMod val="75000"/>
+                </a:schemeClr>
+              </a:solidFill>
+            </a:endParaRPr>
           </a:p>
         </p:txBody>
       </p:sp>
     </p:spTree>
     <p:extLst>
       <p:ext uri="{BB962C8B-B14F-4D97-AF65-F5344CB8AC3E}">
-        <p14:creationId xmlns:p14="http://schemas.microsoft.com/office/powerpoint/2010/main" val="1310829027"/>
+        <p14:creationId xmlns:p14="http://schemas.microsoft.com/office/powerpoint/2010/main" val="3309612122"/>
       </p:ext>
     </p:extLst>
   </p:cSld>
@@ -13290,6 +14131,866 @@
           <a:p>
             <a:r>
               <a:rPr lang="en-GB" dirty="0" smtClean="0"/>
+              <a:t>Data Arrays (2/3)</a:t>
+            </a:r>
+            <a:endParaRPr lang="en-GB" dirty="0"/>
+          </a:p>
+        </p:txBody>
+      </p:sp>
+      <p:sp>
+        <p:nvSpPr>
+          <p:cNvPr id="3" name="Inhaltsplatzhalter 2"/>
+          <p:cNvSpPr>
+            <a:spLocks noGrp="1"/>
+          </p:cNvSpPr>
+          <p:nvPr>
+            <p:ph idx="1"/>
+          </p:nvPr>
+        </p:nvSpPr>
+        <p:spPr/>
+        <p:txBody>
+          <a:bodyPr>
+            <a:normAutofit fontScale="62500" lnSpcReduction="20000"/>
+          </a:bodyPr>
+          <a:lstStyle/>
+          <a:p>
+            <a:r>
+              <a:rPr lang="en-GB" dirty="0" smtClean="0"/>
+              <a:t>Parsing buffer arguments:</a:t>
+            </a:r>
+          </a:p>
+          <a:p>
+            <a:pPr marL="457200" lvl="1" indent="0">
+              <a:buNone/>
+            </a:pPr>
+            <a:r>
+              <a:rPr lang="en-GB" dirty="0" err="1" smtClean="0"/>
+              <a:t>Py_buffer</a:t>
+            </a:r>
+            <a:r>
+              <a:rPr lang="en-GB" dirty="0"/>
+              <a:t> </a:t>
+            </a:r>
+            <a:r>
+              <a:rPr lang="en-GB" dirty="0" smtClean="0"/>
+              <a:t>b;</a:t>
+            </a:r>
+            <a:endParaRPr lang="en-GB" dirty="0"/>
+          </a:p>
+          <a:p>
+            <a:pPr marL="457200" lvl="1" indent="0">
+              <a:buNone/>
+            </a:pPr>
+            <a:r>
+              <a:rPr lang="en-GB" dirty="0"/>
+              <a:t>ret = </a:t>
+            </a:r>
+            <a:r>
+              <a:rPr lang="en-GB" dirty="0" err="1" smtClean="0"/>
+              <a:t>PyArg_ParseTuple</a:t>
+            </a:r>
+            <a:r>
+              <a:rPr lang="en-GB" dirty="0" smtClean="0"/>
+              <a:t>(</a:t>
+            </a:r>
+            <a:r>
+              <a:rPr lang="en-GB" dirty="0" err="1" smtClean="0"/>
+              <a:t>args</a:t>
+            </a:r>
+            <a:r>
+              <a:rPr lang="en-GB" dirty="0"/>
+              <a:t>, </a:t>
+            </a:r>
+            <a:r>
+              <a:rPr lang="en-GB" dirty="0" smtClean="0"/>
+              <a:t>“y*”, &amp;b); </a:t>
+            </a:r>
+          </a:p>
+          <a:p>
+            <a:pPr lvl="1"/>
+            <a:r>
+              <a:rPr lang="en-GB" dirty="0" smtClean="0"/>
+              <a:t>See “Parsing </a:t>
+            </a:r>
+            <a:r>
+              <a:rPr lang="en-GB" dirty="0"/>
+              <a:t>arguments and building </a:t>
+            </a:r>
+            <a:r>
+              <a:rPr lang="en-GB" dirty="0" smtClean="0"/>
+              <a:t>values” in Python/C API Reference Manual</a:t>
+            </a:r>
+          </a:p>
+          <a:p>
+            <a:r>
+              <a:rPr lang="en-GB" dirty="0" smtClean="0"/>
+              <a:t>Directly using buffer arguments</a:t>
+            </a:r>
+          </a:p>
+          <a:p>
+            <a:pPr marL="457200" lvl="1" indent="0">
+              <a:buNone/>
+            </a:pPr>
+            <a:r>
+              <a:rPr lang="en-GB" dirty="0" err="1" smtClean="0"/>
+              <a:t>PyObject_CheckBuffer</a:t>
+            </a:r>
+            <a:r>
+              <a:rPr lang="en-GB" dirty="0" smtClean="0"/>
+              <a:t>(</a:t>
+            </a:r>
+            <a:r>
+              <a:rPr lang="en-GB" dirty="0" err="1" smtClean="0"/>
+              <a:t>obj</a:t>
+            </a:r>
+            <a:r>
+              <a:rPr lang="en-GB" dirty="0" smtClean="0"/>
+              <a:t>) == 1</a:t>
+            </a:r>
+            <a:r>
+              <a:rPr lang="en-GB" dirty="0"/>
+              <a:t/>
+            </a:r>
+            <a:br>
+              <a:rPr lang="en-GB" dirty="0"/>
+            </a:br>
+            <a:r>
+              <a:rPr lang="en-GB" dirty="0"/>
+              <a:t>ret = </a:t>
+            </a:r>
+            <a:r>
+              <a:rPr lang="en-GB" dirty="0" err="1" smtClean="0"/>
+              <a:t>PyObject_GetBuffer</a:t>
+            </a:r>
+            <a:r>
+              <a:rPr lang="en-GB" dirty="0" smtClean="0"/>
+              <a:t>(</a:t>
+            </a:r>
+            <a:r>
+              <a:rPr lang="en-GB" dirty="0" err="1" smtClean="0"/>
+              <a:t>obj</a:t>
+            </a:r>
+            <a:r>
+              <a:rPr lang="en-GB" dirty="0"/>
+              <a:t>, </a:t>
+            </a:r>
+            <a:r>
+              <a:rPr lang="en-GB" dirty="0" smtClean="0"/>
+              <a:t>&amp;</a:t>
+            </a:r>
+            <a:r>
+              <a:rPr lang="en-GB" dirty="0"/>
+              <a:t>b, </a:t>
+            </a:r>
+            <a:r>
+              <a:rPr lang="en-GB" dirty="0" err="1" smtClean="0"/>
+              <a:t>PyBUF_WRITABLE</a:t>
+            </a:r>
+            <a:r>
+              <a:rPr lang="en-GB" dirty="0" smtClean="0"/>
+              <a:t>); </a:t>
+            </a:r>
+          </a:p>
+          <a:p>
+            <a:r>
+              <a:rPr lang="en-GB" dirty="0" smtClean="0"/>
+              <a:t>In any case</a:t>
+            </a:r>
+            <a:endParaRPr lang="en-GB" dirty="0"/>
+          </a:p>
+          <a:p>
+            <a:pPr marL="457200" lvl="1" indent="0">
+              <a:buNone/>
+            </a:pPr>
+            <a:r>
+              <a:rPr lang="en-GB" dirty="0" err="1" smtClean="0"/>
+              <a:t>PyBuffer_Release</a:t>
+            </a:r>
+            <a:r>
+              <a:rPr lang="en-GB" dirty="0" smtClean="0"/>
+              <a:t>(&amp;b);</a:t>
+            </a:r>
+          </a:p>
+          <a:p>
+            <a:r>
+              <a:rPr lang="en-GB" dirty="0" smtClean="0"/>
+              <a:t>Consider</a:t>
+            </a:r>
+          </a:p>
+          <a:p>
+            <a:pPr marL="457200" lvl="1" indent="0">
+              <a:buNone/>
+            </a:pPr>
+            <a:r>
+              <a:rPr lang="en-GB" dirty="0"/>
+              <a:t>ret = </a:t>
+            </a:r>
+            <a:r>
+              <a:rPr lang="en-GB" dirty="0" err="1" smtClean="0"/>
+              <a:t>PyObject_TypeCheck</a:t>
+            </a:r>
+            <a:r>
+              <a:rPr lang="en-GB" dirty="0" smtClean="0"/>
+              <a:t>(</a:t>
+            </a:r>
+            <a:r>
+              <a:rPr lang="en-GB" dirty="0" err="1" smtClean="0"/>
+              <a:t>obj</a:t>
+            </a:r>
+            <a:r>
+              <a:rPr lang="en-GB" dirty="0" smtClean="0"/>
+              <a:t>, </a:t>
+            </a:r>
+            <a:r>
+              <a:rPr lang="en-GB" dirty="0" err="1" smtClean="0"/>
+              <a:t>type_obj</a:t>
+            </a:r>
+            <a:r>
+              <a:rPr lang="en-GB" dirty="0" smtClean="0"/>
+              <a:t>);</a:t>
+            </a:r>
+          </a:p>
+          <a:p>
+            <a:pPr marL="457200" lvl="1" indent="0">
+              <a:buNone/>
+            </a:pPr>
+            <a:r>
+              <a:rPr lang="en-GB" dirty="0" smtClean="0"/>
+              <a:t>or</a:t>
+            </a:r>
+          </a:p>
+          <a:p>
+            <a:pPr marL="457200" lvl="1" indent="0">
+              <a:buNone/>
+            </a:pPr>
+            <a:r>
+              <a:rPr lang="en-GB" dirty="0" err="1" smtClean="0"/>
+              <a:t>PyObject_Type</a:t>
+            </a:r>
+            <a:r>
+              <a:rPr lang="en-GB" dirty="0" smtClean="0"/>
+              <a:t>(</a:t>
+            </a:r>
+            <a:r>
+              <a:rPr lang="en-GB" dirty="0" err="1" smtClean="0"/>
+              <a:t>obj</a:t>
+            </a:r>
+            <a:r>
+              <a:rPr lang="en-GB" dirty="0" smtClean="0"/>
+              <a:t>) == </a:t>
+            </a:r>
+            <a:r>
+              <a:rPr lang="en-GB" dirty="0" err="1" smtClean="0"/>
+              <a:t>type_obj</a:t>
+            </a:r>
+            <a:endParaRPr lang="en-GB" dirty="0" smtClean="0"/>
+          </a:p>
+          <a:p>
+            <a:pPr marL="457200" lvl="1" indent="0">
+              <a:buNone/>
+            </a:pPr>
+            <a:r>
+              <a:rPr lang="en-GB" dirty="0" smtClean="0"/>
+              <a:t>or simpler</a:t>
+            </a:r>
+          </a:p>
+          <a:p>
+            <a:pPr marL="457200" lvl="1" indent="0">
+              <a:buNone/>
+            </a:pPr>
+            <a:r>
+              <a:rPr lang="en-GB" dirty="0" err="1" smtClean="0"/>
+              <a:t>obj</a:t>
+            </a:r>
+            <a:r>
+              <a:rPr lang="en-GB" dirty="0"/>
+              <a:t>-</a:t>
+            </a:r>
+            <a:r>
+              <a:rPr lang="en-GB" dirty="0" smtClean="0"/>
+              <a:t>&gt;</a:t>
+            </a:r>
+            <a:r>
+              <a:rPr lang="en-GB" dirty="0" err="1" smtClean="0"/>
+              <a:t>ob_type</a:t>
+            </a:r>
+            <a:r>
+              <a:rPr lang="en-GB" dirty="0" smtClean="0"/>
+              <a:t> == </a:t>
+            </a:r>
+            <a:r>
+              <a:rPr lang="en-GB" dirty="0" err="1" smtClean="0"/>
+              <a:t>type_obj</a:t>
+            </a:r>
+            <a:r>
+              <a:rPr lang="en-GB" dirty="0" smtClean="0"/>
+              <a:t>  </a:t>
+            </a:r>
+          </a:p>
+        </p:txBody>
+      </p:sp>
+    </p:spTree>
+    <p:extLst>
+      <p:ext uri="{BB962C8B-B14F-4D97-AF65-F5344CB8AC3E}">
+        <p14:creationId xmlns:p14="http://schemas.microsoft.com/office/powerpoint/2010/main" val="2973595614"/>
+      </p:ext>
+    </p:extLst>
+  </p:cSld>
+  <p:clrMapOvr>
+    <a:masterClrMapping/>
+  </p:clrMapOvr>
+  <p:timing>
+    <p:tnLst>
+      <p:par>
+        <p:cTn id="1" dur="indefinite" restart="never" nodeType="tmRoot"/>
+      </p:par>
+    </p:tnLst>
+  </p:timing>
+</p:sld>
+</file>
+
+<file path=ppt/slides/slide23.xml><?xml version="1.0" encoding="utf-8"?>
+<p:sld xmlns:a="http://schemas.openxmlformats.org/drawingml/2006/main" xmlns:r="http://schemas.openxmlformats.org/officeDocument/2006/relationships" xmlns:p="http://schemas.openxmlformats.org/presentationml/2006/main">
+  <p:cSld>
+    <p:spTree>
+      <p:nvGrpSpPr>
+        <p:cNvPr id="1" name=""/>
+        <p:cNvGrpSpPr/>
+        <p:nvPr/>
+      </p:nvGrpSpPr>
+      <p:grpSpPr>
+        <a:xfrm>
+          <a:off x="0" y="0"/>
+          <a:ext cx="0" cy="0"/>
+          <a:chOff x="0" y="0"/>
+          <a:chExt cx="0" cy="0"/>
+        </a:xfrm>
+      </p:grpSpPr>
+      <p:sp>
+        <p:nvSpPr>
+          <p:cNvPr id="2" name="Titel 1"/>
+          <p:cNvSpPr>
+            <a:spLocks noGrp="1"/>
+          </p:cNvSpPr>
+          <p:nvPr>
+            <p:ph type="title"/>
+          </p:nvPr>
+        </p:nvSpPr>
+        <p:spPr/>
+        <p:txBody>
+          <a:bodyPr/>
+          <a:lstStyle/>
+          <a:p>
+            <a:r>
+              <a:rPr lang="en-GB" dirty="0" smtClean="0"/>
+              <a:t>Data Arrays (</a:t>
+            </a:r>
+            <a:r>
+              <a:rPr lang="en-GB" dirty="0"/>
+              <a:t>3</a:t>
+            </a:r>
+            <a:r>
+              <a:rPr lang="en-GB" dirty="0" smtClean="0"/>
+              <a:t>/3)</a:t>
+            </a:r>
+            <a:endParaRPr lang="en-GB" dirty="0"/>
+          </a:p>
+        </p:txBody>
+      </p:sp>
+      <p:sp>
+        <p:nvSpPr>
+          <p:cNvPr id="3" name="Inhaltsplatzhalter 2"/>
+          <p:cNvSpPr>
+            <a:spLocks noGrp="1"/>
+          </p:cNvSpPr>
+          <p:nvPr>
+            <p:ph idx="1"/>
+          </p:nvPr>
+        </p:nvSpPr>
+        <p:spPr/>
+        <p:txBody>
+          <a:bodyPr>
+            <a:normAutofit/>
+          </a:bodyPr>
+          <a:lstStyle/>
+          <a:p>
+            <a:r>
+              <a:rPr lang="en-GB" dirty="0" err="1" smtClean="0"/>
+              <a:t>CArray</a:t>
+            </a:r>
+            <a:endParaRPr lang="en-GB" dirty="0" smtClean="0"/>
+          </a:p>
+          <a:p>
+            <a:pPr lvl="1"/>
+            <a:r>
+              <a:rPr lang="en-GB" dirty="0" smtClean="0"/>
+              <a:t>implements Buffer protocol  </a:t>
+            </a:r>
+          </a:p>
+          <a:p>
+            <a:pPr lvl="1"/>
+            <a:r>
+              <a:rPr lang="en-GB" dirty="0" smtClean="0"/>
+              <a:t>implements Sequence protocol</a:t>
+            </a:r>
+          </a:p>
+          <a:p>
+            <a:r>
+              <a:rPr lang="en-GB" dirty="0" smtClean="0"/>
+              <a:t>TODO</a:t>
+            </a:r>
+          </a:p>
+          <a:p>
+            <a:pPr lvl="1"/>
+            <a:r>
+              <a:rPr lang="en-GB" dirty="0" smtClean="0"/>
+              <a:t>Make </a:t>
+            </a:r>
+            <a:r>
+              <a:rPr lang="en-GB" dirty="0" err="1" smtClean="0"/>
+              <a:t>dtype</a:t>
+            </a:r>
+            <a:r>
+              <a:rPr lang="en-GB" dirty="0" smtClean="0"/>
+              <a:t>-format-string conform to Python ‘</a:t>
+            </a:r>
+            <a:r>
+              <a:rPr lang="en-GB" dirty="0" err="1" smtClean="0"/>
+              <a:t>struct</a:t>
+            </a:r>
+            <a:r>
+              <a:rPr lang="en-GB" dirty="0" smtClean="0"/>
+              <a:t>’ module, see </a:t>
+            </a:r>
+            <a:br>
+              <a:rPr lang="en-GB" dirty="0" smtClean="0"/>
+            </a:br>
+            <a:r>
+              <a:rPr lang="en-GB" dirty="0" smtClean="0"/>
+              <a:t>6.3.  </a:t>
+            </a:r>
+            <a:r>
+              <a:rPr lang="en-GB" dirty="0" err="1" smtClean="0"/>
+              <a:t>struct</a:t>
+            </a:r>
+            <a:r>
+              <a:rPr lang="en-GB" dirty="0" smtClean="0"/>
+              <a:t> </a:t>
+            </a:r>
+            <a:r>
+              <a:rPr lang="en-GB" dirty="0"/>
+              <a:t>— Interpret bytes as packed binary </a:t>
+            </a:r>
+            <a:r>
+              <a:rPr lang="en-GB" dirty="0" smtClean="0"/>
+              <a:t>data, see also</a:t>
+            </a:r>
+            <a:br>
+              <a:rPr lang="en-GB" dirty="0" smtClean="0"/>
+            </a:br>
+            <a:r>
+              <a:rPr lang="en-GB" dirty="0" err="1" smtClean="0"/>
+              <a:t>PyBuffer_SizeFromFormat</a:t>
+            </a:r>
+            <a:r>
+              <a:rPr lang="en-GB" dirty="0" smtClean="0"/>
+              <a:t>(format) </a:t>
+            </a:r>
+            <a:endParaRPr lang="en-GB" dirty="0"/>
+          </a:p>
+          <a:p>
+            <a:pPr lvl="1"/>
+            <a:endParaRPr lang="en-GB" dirty="0" smtClean="0"/>
+          </a:p>
+        </p:txBody>
+      </p:sp>
+    </p:spTree>
+    <p:extLst>
+      <p:ext uri="{BB962C8B-B14F-4D97-AF65-F5344CB8AC3E}">
+        <p14:creationId xmlns:p14="http://schemas.microsoft.com/office/powerpoint/2010/main" val="845572741"/>
+      </p:ext>
+    </p:extLst>
+  </p:cSld>
+  <p:clrMapOvr>
+    <a:masterClrMapping/>
+  </p:clrMapOvr>
+  <p:timing>
+    <p:tnLst>
+      <p:par>
+        <p:cTn id="1" dur="indefinite" restart="never" nodeType="tmRoot"/>
+      </p:par>
+    </p:tnLst>
+  </p:timing>
+</p:sld>
+</file>
+
+<file path=ppt/slides/slide24.xml><?xml version="1.0" encoding="utf-8"?>
+<p:sld xmlns:a="http://schemas.openxmlformats.org/drawingml/2006/main" xmlns:r="http://schemas.openxmlformats.org/officeDocument/2006/relationships" xmlns:p="http://schemas.openxmlformats.org/presentationml/2006/main">
+  <p:cSld>
+    <p:spTree>
+      <p:nvGrpSpPr>
+        <p:cNvPr id="1" name=""/>
+        <p:cNvGrpSpPr/>
+        <p:nvPr/>
+      </p:nvGrpSpPr>
+      <p:grpSpPr>
+        <a:xfrm>
+          <a:off x="0" y="0"/>
+          <a:ext cx="0" cy="0"/>
+          <a:chOff x="0" y="0"/>
+          <a:chExt cx="0" cy="0"/>
+        </a:xfrm>
+      </p:grpSpPr>
+      <p:sp>
+        <p:nvSpPr>
+          <p:cNvPr id="2" name="Titel 1"/>
+          <p:cNvSpPr>
+            <a:spLocks noGrp="1"/>
+          </p:cNvSpPr>
+          <p:nvPr>
+            <p:ph type="title"/>
+          </p:nvPr>
+        </p:nvSpPr>
+        <p:spPr/>
+        <p:txBody>
+          <a:bodyPr/>
+          <a:lstStyle/>
+          <a:p>
+            <a:r>
+              <a:rPr lang="en-GB" dirty="0" smtClean="0"/>
+              <a:t>Multithreading</a:t>
+            </a:r>
+            <a:endParaRPr lang="en-GB" dirty="0"/>
+          </a:p>
+        </p:txBody>
+      </p:sp>
+      <p:sp>
+        <p:nvSpPr>
+          <p:cNvPr id="3" name="Inhaltsplatzhalter 2"/>
+          <p:cNvSpPr>
+            <a:spLocks noGrp="1"/>
+          </p:cNvSpPr>
+          <p:nvPr>
+            <p:ph idx="1"/>
+          </p:nvPr>
+        </p:nvSpPr>
+        <p:spPr/>
+        <p:txBody>
+          <a:bodyPr>
+            <a:normAutofit lnSpcReduction="10000"/>
+          </a:bodyPr>
+          <a:lstStyle/>
+          <a:p>
+            <a:r>
+              <a:rPr lang="en-GB" dirty="0" smtClean="0"/>
+              <a:t>If BEAM Java calls into Python from multiple Java threads for executing e.g. a tile computation, we can consider</a:t>
+            </a:r>
+          </a:p>
+          <a:p>
+            <a:pPr lvl="1"/>
+            <a:r>
+              <a:rPr lang="en-GB" dirty="0" err="1" smtClean="0"/>
+              <a:t>PyThreadState</a:t>
+            </a:r>
+            <a:r>
+              <a:rPr lang="en-GB" dirty="0" smtClean="0"/>
+              <a:t>* </a:t>
+            </a:r>
+            <a:r>
+              <a:rPr lang="en-GB" dirty="0" err="1" smtClean="0"/>
+              <a:t>tstate</a:t>
+            </a:r>
+            <a:r>
+              <a:rPr lang="en-GB" dirty="0" smtClean="0"/>
+              <a:t>;</a:t>
+            </a:r>
+          </a:p>
+          <a:p>
+            <a:pPr lvl="1"/>
+            <a:r>
+              <a:rPr lang="en-GB" dirty="0" err="1" smtClean="0"/>
+              <a:t>tstate</a:t>
+            </a:r>
+            <a:r>
+              <a:rPr lang="en-GB" dirty="0" smtClean="0"/>
+              <a:t> = </a:t>
+            </a:r>
+            <a:r>
+              <a:rPr lang="en-GB" dirty="0" err="1"/>
+              <a:t>Py_NewInterpreter</a:t>
+            </a:r>
+            <a:r>
+              <a:rPr lang="en-GB" dirty="0" smtClean="0"/>
+              <a:t>();</a:t>
+            </a:r>
+          </a:p>
+          <a:p>
+            <a:pPr lvl="1"/>
+            <a:r>
+              <a:rPr lang="en-GB" dirty="0" smtClean="0"/>
+              <a:t>…</a:t>
+            </a:r>
+            <a:r>
+              <a:rPr lang="en-GB" i="1" dirty="0" smtClean="0"/>
+              <a:t> call into python code</a:t>
+            </a:r>
+          </a:p>
+          <a:p>
+            <a:pPr lvl="1"/>
+            <a:r>
+              <a:rPr lang="en-GB" dirty="0" err="1" smtClean="0"/>
+              <a:t>Py_EndInterpreter</a:t>
+            </a:r>
+            <a:r>
+              <a:rPr lang="en-GB" dirty="0" smtClean="0"/>
+              <a:t>(</a:t>
+            </a:r>
+            <a:r>
+              <a:rPr lang="en-GB" dirty="0" err="1" smtClean="0"/>
+              <a:t>tstate</a:t>
+            </a:r>
+            <a:r>
+              <a:rPr lang="en-GB" dirty="0" smtClean="0"/>
+              <a:t>);  </a:t>
+            </a:r>
+          </a:p>
+          <a:p>
+            <a:pPr marL="342900" lvl="1" indent="-342900">
+              <a:buFont typeface="Arial" pitchFamily="34" charset="0"/>
+              <a:buChar char="•"/>
+            </a:pPr>
+            <a:r>
+              <a:rPr lang="en-GB" dirty="0"/>
+              <a:t>See </a:t>
+            </a:r>
+            <a:r>
+              <a:rPr lang="en-GB" dirty="0" smtClean="0"/>
+              <a:t>“Initialization</a:t>
+            </a:r>
+            <a:r>
+              <a:rPr lang="en-GB" dirty="0"/>
+              <a:t>, Finalization, and </a:t>
+            </a:r>
+            <a:r>
+              <a:rPr lang="en-GB" dirty="0" smtClean="0"/>
+              <a:t>Threads” </a:t>
+            </a:r>
+            <a:r>
+              <a:rPr lang="en-GB" dirty="0"/>
+              <a:t>in Python/C API Reference Manual</a:t>
+            </a:r>
+          </a:p>
+          <a:p>
+            <a:pPr marL="0" indent="0">
+              <a:buNone/>
+            </a:pPr>
+            <a:endParaRPr lang="en-GB" dirty="0"/>
+          </a:p>
+        </p:txBody>
+      </p:sp>
+    </p:spTree>
+    <p:extLst>
+      <p:ext uri="{BB962C8B-B14F-4D97-AF65-F5344CB8AC3E}">
+        <p14:creationId xmlns:p14="http://schemas.microsoft.com/office/powerpoint/2010/main" val="183588086"/>
+      </p:ext>
+    </p:extLst>
+  </p:cSld>
+  <p:clrMapOvr>
+    <a:masterClrMapping/>
+  </p:clrMapOvr>
+  <p:timing>
+    <p:tnLst>
+      <p:par>
+        <p:cTn id="1" dur="indefinite" restart="never" nodeType="tmRoot"/>
+      </p:par>
+    </p:tnLst>
+  </p:timing>
+</p:sld>
+</file>
+
+<file path=ppt/slides/slide25.xml><?xml version="1.0" encoding="utf-8"?>
+<p:sld xmlns:a="http://schemas.openxmlformats.org/drawingml/2006/main" xmlns:r="http://schemas.openxmlformats.org/officeDocument/2006/relationships" xmlns:p="http://schemas.openxmlformats.org/presentationml/2006/main">
+  <p:cSld>
+    <p:spTree>
+      <p:nvGrpSpPr>
+        <p:cNvPr id="1" name=""/>
+        <p:cNvGrpSpPr/>
+        <p:nvPr/>
+      </p:nvGrpSpPr>
+      <p:grpSpPr>
+        <a:xfrm>
+          <a:off x="0" y="0"/>
+          <a:ext cx="0" cy="0"/>
+          <a:chOff x="0" y="0"/>
+          <a:chExt cx="0" cy="0"/>
+        </a:xfrm>
+      </p:grpSpPr>
+      <p:sp>
+        <p:nvSpPr>
+          <p:cNvPr id="2" name="Titel 1"/>
+          <p:cNvSpPr>
+            <a:spLocks noGrp="1"/>
+          </p:cNvSpPr>
+          <p:nvPr>
+            <p:ph type="title"/>
+          </p:nvPr>
+        </p:nvSpPr>
+        <p:spPr/>
+        <p:txBody>
+          <a:bodyPr/>
+          <a:lstStyle/>
+          <a:p>
+            <a:r>
+              <a:rPr lang="en-GB" dirty="0" smtClean="0"/>
+              <a:t>Alternatives (1/2)</a:t>
+            </a:r>
+            <a:endParaRPr lang="en-GB" dirty="0"/>
+          </a:p>
+        </p:txBody>
+      </p:sp>
+      <p:sp>
+        <p:nvSpPr>
+          <p:cNvPr id="3" name="Inhaltsplatzhalter 2"/>
+          <p:cNvSpPr>
+            <a:spLocks noGrp="1"/>
+          </p:cNvSpPr>
+          <p:nvPr>
+            <p:ph idx="1"/>
+          </p:nvPr>
+        </p:nvSpPr>
+        <p:spPr/>
+        <p:txBody>
+          <a:bodyPr/>
+          <a:lstStyle/>
+          <a:p>
+            <a:r>
+              <a:rPr lang="en-GB" b="1" dirty="0" err="1"/>
+              <a:t>Jep</a:t>
+            </a:r>
+            <a:r>
+              <a:rPr lang="en-GB" dirty="0"/>
+              <a:t> - Java Embedded Python</a:t>
+            </a:r>
+          </a:p>
+          <a:p>
+            <a:pPr lvl="1"/>
+            <a:r>
+              <a:rPr lang="en-GB" dirty="0" err="1"/>
+              <a:t>Jep</a:t>
+            </a:r>
+            <a:r>
+              <a:rPr lang="en-GB" dirty="0"/>
+              <a:t> embeds </a:t>
+            </a:r>
+            <a:r>
+              <a:rPr lang="en-GB" dirty="0" err="1"/>
+              <a:t>CPython</a:t>
+            </a:r>
+            <a:r>
+              <a:rPr lang="en-GB" dirty="0"/>
+              <a:t> in Java. It is safe to use in a heavily threaded environment, it is quite fast and its stability is a main feature and goal.</a:t>
+            </a:r>
+          </a:p>
+          <a:p>
+            <a:pPr lvl="1"/>
+            <a:r>
+              <a:rPr lang="en-GB" dirty="0" smtClean="0">
+                <a:hlinkClick r:id="rId2"/>
+              </a:rPr>
+              <a:t>https</a:t>
+            </a:r>
+            <a:r>
+              <a:rPr lang="en-GB" dirty="0">
+                <a:hlinkClick r:id="rId2"/>
+              </a:rPr>
+              <a:t>://</a:t>
+            </a:r>
+            <a:r>
+              <a:rPr lang="en-GB" dirty="0" smtClean="0">
+                <a:hlinkClick r:id="rId2"/>
+              </a:rPr>
+              <a:t>github.com/mrj0/jep</a:t>
+            </a:r>
+            <a:endParaRPr lang="en-GB" dirty="0" smtClean="0"/>
+          </a:p>
+          <a:p>
+            <a:pPr lvl="1"/>
+            <a:r>
+              <a:rPr lang="en-GB" dirty="0" smtClean="0"/>
+              <a:t>Check: can it be used to call Python from Java</a:t>
+            </a:r>
+          </a:p>
+          <a:p>
+            <a:pPr lvl="1"/>
+            <a:r>
+              <a:rPr lang="en-GB" dirty="0" smtClean="0"/>
+              <a:t>Check: No windows support</a:t>
+            </a:r>
+          </a:p>
+          <a:p>
+            <a:pPr lvl="1"/>
+            <a:r>
+              <a:rPr lang="en-GB" dirty="0" smtClean="0"/>
+              <a:t>Check: last activity 9 months ago</a:t>
+            </a:r>
+            <a:endParaRPr lang="en-GB" dirty="0"/>
+          </a:p>
+        </p:txBody>
+      </p:sp>
+    </p:spTree>
+    <p:extLst>
+      <p:ext uri="{BB962C8B-B14F-4D97-AF65-F5344CB8AC3E}">
+        <p14:creationId xmlns:p14="http://schemas.microsoft.com/office/powerpoint/2010/main" val="1310829027"/>
+      </p:ext>
+    </p:extLst>
+  </p:cSld>
+  <p:clrMapOvr>
+    <a:masterClrMapping/>
+  </p:clrMapOvr>
+  <p:timing>
+    <p:tnLst>
+      <p:par>
+        <p:cTn id="1" dur="indefinite" restart="never" nodeType="tmRoot"/>
+      </p:par>
+    </p:tnLst>
+  </p:timing>
+</p:sld>
+</file>
+
+<file path=ppt/slides/slide26.xml><?xml version="1.0" encoding="utf-8"?>
+<p:sld xmlns:a="http://schemas.openxmlformats.org/drawingml/2006/main" xmlns:r="http://schemas.openxmlformats.org/officeDocument/2006/relationships" xmlns:p="http://schemas.openxmlformats.org/presentationml/2006/main">
+  <p:cSld>
+    <p:spTree>
+      <p:nvGrpSpPr>
+        <p:cNvPr id="1" name=""/>
+        <p:cNvGrpSpPr/>
+        <p:nvPr/>
+      </p:nvGrpSpPr>
+      <p:grpSpPr>
+        <a:xfrm>
+          <a:off x="0" y="0"/>
+          <a:ext cx="0" cy="0"/>
+          <a:chOff x="0" y="0"/>
+          <a:chExt cx="0" cy="0"/>
+        </a:xfrm>
+      </p:grpSpPr>
+      <p:sp>
+        <p:nvSpPr>
+          <p:cNvPr id="2" name="Titel 1"/>
+          <p:cNvSpPr>
+            <a:spLocks noGrp="1"/>
+          </p:cNvSpPr>
+          <p:nvPr>
+            <p:ph type="title"/>
+          </p:nvPr>
+        </p:nvSpPr>
+        <p:spPr/>
+        <p:txBody>
+          <a:bodyPr/>
+          <a:lstStyle/>
+          <a:p>
+            <a:r>
+              <a:rPr lang="en-GB" dirty="0" smtClean="0"/>
               <a:t>Alternatives (2/2)</a:t>
             </a:r>
             <a:endParaRPr lang="en-GB" dirty="0"/>
@@ -13450,7 +15151,7 @@
 </p:sld>
 </file>
 
-<file path=ppt/slides/slide23.xml><?xml version="1.0" encoding="utf-8"?>
+<file path=ppt/slides/slide27.xml><?xml version="1.0" encoding="utf-8"?>
 <p:sld xmlns:a="http://schemas.openxmlformats.org/drawingml/2006/main" xmlns:r="http://schemas.openxmlformats.org/officeDocument/2006/relationships" xmlns:p="http://schemas.openxmlformats.org/presentationml/2006/main">
   <p:cSld>
     <p:spTree>

</xml_diff>

<commit_message>
added more design goals (cherry picked from commit 174e8e8)
</commit_message>
<xml_diff>
--- a/docs/beam-extapi.pptx
+++ b/docs/beam-extapi.pptx
@@ -322,7 +322,7 @@
           <a:p>
             <a:fld id="{1BA50D42-C9CD-4801-B293-61D1F53EC57E}" type="datetimeFigureOut">
               <a:rPr lang="de-DE" smtClean="0"/>
-              <a:t>13.06.2013</a:t>
+              <a:t>14.06.2013</a:t>
             </a:fld>
             <a:endParaRPr lang="de-DE"/>
           </a:p>
@@ -487,7 +487,7 @@
           <a:p>
             <a:fld id="{1BA50D42-C9CD-4801-B293-61D1F53EC57E}" type="datetimeFigureOut">
               <a:rPr lang="de-DE" smtClean="0"/>
-              <a:t>13.06.2013</a:t>
+              <a:t>14.06.2013</a:t>
             </a:fld>
             <a:endParaRPr lang="de-DE"/>
           </a:p>
@@ -662,7 +662,7 @@
           <a:p>
             <a:fld id="{1BA50D42-C9CD-4801-B293-61D1F53EC57E}" type="datetimeFigureOut">
               <a:rPr lang="de-DE" smtClean="0"/>
-              <a:t>13.06.2013</a:t>
+              <a:t>14.06.2013</a:t>
             </a:fld>
             <a:endParaRPr lang="de-DE"/>
           </a:p>
@@ -827,7 +827,7 @@
           <a:p>
             <a:fld id="{1BA50D42-C9CD-4801-B293-61D1F53EC57E}" type="datetimeFigureOut">
               <a:rPr lang="de-DE" smtClean="0"/>
-              <a:t>13.06.2013</a:t>
+              <a:t>14.06.2013</a:t>
             </a:fld>
             <a:endParaRPr lang="de-DE"/>
           </a:p>
@@ -1068,7 +1068,7 @@
           <a:p>
             <a:fld id="{1BA50D42-C9CD-4801-B293-61D1F53EC57E}" type="datetimeFigureOut">
               <a:rPr lang="de-DE" smtClean="0"/>
-              <a:t>13.06.2013</a:t>
+              <a:t>14.06.2013</a:t>
             </a:fld>
             <a:endParaRPr lang="de-DE"/>
           </a:p>
@@ -1351,7 +1351,7 @@
           <a:p>
             <a:fld id="{1BA50D42-C9CD-4801-B293-61D1F53EC57E}" type="datetimeFigureOut">
               <a:rPr lang="de-DE" smtClean="0"/>
-              <a:t>13.06.2013</a:t>
+              <a:t>14.06.2013</a:t>
             </a:fld>
             <a:endParaRPr lang="de-DE"/>
           </a:p>
@@ -1768,7 +1768,7 @@
           <a:p>
             <a:fld id="{1BA50D42-C9CD-4801-B293-61D1F53EC57E}" type="datetimeFigureOut">
               <a:rPr lang="de-DE" smtClean="0"/>
-              <a:t>13.06.2013</a:t>
+              <a:t>14.06.2013</a:t>
             </a:fld>
             <a:endParaRPr lang="de-DE"/>
           </a:p>
@@ -1881,7 +1881,7 @@
           <a:p>
             <a:fld id="{1BA50D42-C9CD-4801-B293-61D1F53EC57E}" type="datetimeFigureOut">
               <a:rPr lang="de-DE" smtClean="0"/>
-              <a:t>13.06.2013</a:t>
+              <a:t>14.06.2013</a:t>
             </a:fld>
             <a:endParaRPr lang="de-DE"/>
           </a:p>
@@ -1971,7 +1971,7 @@
           <a:p>
             <a:fld id="{1BA50D42-C9CD-4801-B293-61D1F53EC57E}" type="datetimeFigureOut">
               <a:rPr lang="de-DE" smtClean="0"/>
-              <a:t>13.06.2013</a:t>
+              <a:t>14.06.2013</a:t>
             </a:fld>
             <a:endParaRPr lang="de-DE"/>
           </a:p>
@@ -2243,7 +2243,7 @@
           <a:p>
             <a:fld id="{1BA50D42-C9CD-4801-B293-61D1F53EC57E}" type="datetimeFigureOut">
               <a:rPr lang="de-DE" smtClean="0"/>
-              <a:t>13.06.2013</a:t>
+              <a:t>14.06.2013</a:t>
             </a:fld>
             <a:endParaRPr lang="de-DE"/>
           </a:p>
@@ -2491,7 +2491,7 @@
           <a:p>
             <a:fld id="{1BA50D42-C9CD-4801-B293-61D1F53EC57E}" type="datetimeFigureOut">
               <a:rPr lang="de-DE" smtClean="0"/>
-              <a:t>13.06.2013</a:t>
+              <a:t>14.06.2013</a:t>
             </a:fld>
             <a:endParaRPr lang="de-DE"/>
           </a:p>
@@ -2699,7 +2699,7 @@
           <a:p>
             <a:fld id="{1BA50D42-C9CD-4801-B293-61D1F53EC57E}" type="datetimeFigureOut">
               <a:rPr lang="de-DE" smtClean="0"/>
-              <a:t>13.06.2013</a:t>
+              <a:t>14.06.2013</a:t>
             </a:fld>
             <a:endParaRPr lang="de-DE"/>
           </a:p>
@@ -23230,95 +23230,113 @@
         <p:spPr/>
         <p:txBody>
           <a:bodyPr>
-            <a:normAutofit fontScale="85000" lnSpcReduction="20000"/>
+            <a:normAutofit fontScale="62500" lnSpcReduction="20000"/>
           </a:bodyPr>
           <a:lstStyle/>
           <a:p>
             <a:r>
               <a:rPr lang="en-GB" dirty="0" smtClean="0"/>
+              <a:t>General</a:t>
+            </a:r>
+          </a:p>
+          <a:p>
+            <a:pPr lvl="1"/>
+            <a:r>
+              <a:rPr lang="en-GB" dirty="0"/>
+              <a:t>Shall reflect Java </a:t>
+            </a:r>
+            <a:r>
+              <a:rPr lang="en-GB" dirty="0" smtClean="0"/>
+              <a:t>interfaces and classes </a:t>
+            </a:r>
+            <a:r>
+              <a:rPr lang="en-GB" dirty="0"/>
+              <a:t>1:1</a:t>
+            </a:r>
+          </a:p>
+          <a:p>
+            <a:pPr lvl="1"/>
+            <a:r>
+              <a:rPr lang="en-GB" dirty="0"/>
+              <a:t>Shall reuse Java  API </a:t>
+            </a:r>
+            <a:r>
+              <a:rPr lang="en-GB" dirty="0" smtClean="0"/>
+              <a:t>doc</a:t>
+            </a:r>
+          </a:p>
+          <a:p>
+            <a:pPr lvl="1"/>
+            <a:r>
+              <a:rPr lang="en-GB" dirty="0" smtClean="0"/>
+              <a:t>Shall be easy to setup and install</a:t>
+            </a:r>
+          </a:p>
+          <a:p>
+            <a:r>
+              <a:rPr lang="en-GB" dirty="0" smtClean="0"/>
               <a:t>C-API</a:t>
             </a:r>
+            <a:endParaRPr lang="en-GB" dirty="0" smtClean="0"/>
           </a:p>
           <a:p>
             <a:pPr lvl="1"/>
             <a:r>
               <a:rPr lang="en-GB" dirty="0"/>
-              <a:t>Header should </a:t>
-            </a:r>
-            <a:r>
-              <a:rPr lang="en-GB" dirty="0" smtClean="0"/>
-              <a:t>use only </a:t>
+              <a:t>Shall have no dependencies other than to Java SE 7 and BEAM</a:t>
+            </a:r>
+          </a:p>
+          <a:p>
+            <a:pPr lvl="1"/>
+            <a:r>
+              <a:rPr lang="en-GB" dirty="0" smtClean="0"/>
+              <a:t>Shall use only </a:t>
+            </a:r>
+            <a:r>
+              <a:rPr lang="en-GB" dirty="0" smtClean="0"/>
+              <a:t>basic C-types in header (e.g. don’t export </a:t>
             </a:r>
             <a:r>
               <a:rPr lang="en-GB" dirty="0"/>
-              <a:t>use basic C-types </a:t>
-            </a:r>
-          </a:p>
-          <a:p>
-            <a:pPr lvl="1"/>
-            <a:r>
-              <a:rPr lang="en-GB" dirty="0" smtClean="0"/>
-              <a:t>Header should not export any JNI declarations</a:t>
-            </a:r>
-            <a:br>
-              <a:rPr lang="en-GB" dirty="0" smtClean="0"/>
-            </a:br>
-            <a:r>
-              <a:rPr lang="en-GB" dirty="0" smtClean="0"/>
-              <a:t>(hide </a:t>
-            </a:r>
-            <a:r>
-              <a:rPr lang="en-GB" dirty="0" err="1" smtClean="0"/>
+              <a:t>JNI types, </a:t>
+            </a:r>
+            <a:r>
+              <a:rPr lang="en-GB" dirty="0" err="1"/>
               <a:t>jint</a:t>
             </a:r>
             <a:r>
-              <a:rPr lang="en-GB" dirty="0" smtClean="0"/>
+              <a:rPr lang="en-GB" dirty="0"/>
               <a:t>, </a:t>
             </a:r>
             <a:r>
-              <a:rPr lang="en-GB" dirty="0" err="1" smtClean="0"/>
+              <a:rPr lang="en-GB" dirty="0" err="1"/>
               <a:t>jobject</a:t>
             </a:r>
             <a:r>
-              <a:rPr lang="en-GB" dirty="0" smtClean="0"/>
+              <a:rPr lang="en-GB" dirty="0"/>
               <a:t>, </a:t>
             </a:r>
             <a:r>
-              <a:rPr lang="en-GB" dirty="0" err="1" smtClean="0"/>
+              <a:rPr lang="en-GB" dirty="0" err="1"/>
               <a:t>jarray</a:t>
             </a:r>
             <a:r>
-              <a:rPr lang="en-GB" dirty="0" smtClean="0"/>
+              <a:rPr lang="en-GB" dirty="0"/>
               <a:t>, </a:t>
             </a:r>
             <a:r>
-              <a:rPr lang="en-GB" dirty="0" err="1" smtClean="0"/>
+              <a:rPr lang="en-GB" dirty="0" err="1"/>
               <a:t>JNIEnv</a:t>
             </a:r>
             <a:r>
-              <a:rPr lang="en-GB" dirty="0" smtClean="0"/>
-              <a:t>, etc.)</a:t>
-            </a:r>
-          </a:p>
-          <a:p>
-            <a:pPr lvl="1"/>
-            <a:r>
-              <a:rPr lang="en-GB" dirty="0" smtClean="0"/>
-              <a:t>Shall have no dependencies other than the Java SE 7 and BEAM</a:t>
-            </a:r>
-          </a:p>
-          <a:p>
-            <a:r>
-              <a:rPr lang="en-GB" dirty="0" smtClean="0"/>
-              <a:t>C-Python API</a:t>
-            </a:r>
-          </a:p>
-          <a:p>
-            <a:pPr lvl="1"/>
-            <a:r>
-              <a:rPr lang="en-GB" dirty="0" smtClean="0"/>
-              <a:t>Header currently not needed</a:t>
-            </a:r>
+              <a:rPr lang="en-GB" dirty="0"/>
+              <a:t>, etc</a:t>
+            </a:r>
+            <a:r>
+              <a:rPr lang="en-GB" dirty="0" smtClean="0"/>
+              <a:t>.)</a:t>
+            </a:r>
+            <a:endParaRPr lang="en-GB" dirty="0" smtClean="0"/>
           </a:p>
           <a:p>
             <a:r>
@@ -23333,17 +23351,80 @@
           <a:p>
             <a:pPr lvl="1"/>
             <a:r>
-              <a:rPr lang="en-GB" dirty="0" smtClean="0"/>
-              <a:t>Should reflect Java classes as far as possible</a:t>
+              <a:rPr lang="en-GB" dirty="0"/>
+              <a:t>Shall have no dependencies other than to Java SE 7 and BEAM, and standard Python 3 (e.g. don’t require </a:t>
+            </a:r>
+            <a:r>
+              <a:rPr lang="en-GB" dirty="0" err="1"/>
+              <a:t>numpy</a:t>
+            </a:r>
+            <a:r>
+              <a:rPr lang="en-GB" dirty="0"/>
+              <a:t>)</a:t>
             </a:r>
           </a:p>
           <a:p>
             <a:pPr lvl="1"/>
             <a:r>
               <a:rPr lang="en-GB" dirty="0" smtClean="0"/>
-              <a:t>Shall have no other dependencies other than to standard Python 3, Java SE 7 and BEAM</a:t>
-            </a:r>
-            <a:endParaRPr lang="en-GB" dirty="0"/>
+              <a:t>Should </a:t>
+            </a:r>
+            <a:r>
+              <a:rPr lang="en-GB" dirty="0"/>
+              <a:t>be “</a:t>
+            </a:r>
+            <a:r>
+              <a:rPr lang="en-GB" dirty="0" err="1"/>
+              <a:t>pythonic</a:t>
+            </a:r>
+            <a:r>
+              <a:rPr lang="en-GB" dirty="0"/>
+              <a:t>” as far as possible</a:t>
+            </a:r>
+          </a:p>
+          <a:p>
+            <a:pPr lvl="2"/>
+            <a:r>
+              <a:rPr lang="en-GB" dirty="0"/>
+              <a:t>Use of Python buffer protocol for Java primitive arrays</a:t>
+            </a:r>
+          </a:p>
+          <a:p>
+            <a:pPr lvl="2"/>
+            <a:r>
+              <a:rPr lang="en-GB" dirty="0"/>
+              <a:t>Use of Python sequence/list protocol  for Java Object array and List collection </a:t>
+            </a:r>
+          </a:p>
+          <a:p>
+            <a:pPr lvl="2"/>
+            <a:r>
+              <a:rPr lang="en-GB" dirty="0"/>
+              <a:t>Use of Python </a:t>
+            </a:r>
+            <a:r>
+              <a:rPr lang="en-GB" dirty="0" err="1"/>
+              <a:t>dict</a:t>
+            </a:r>
+            <a:r>
+              <a:rPr lang="en-GB" dirty="0"/>
+              <a:t> protocol for Java Map collection </a:t>
+            </a:r>
+          </a:p>
+          <a:p>
+            <a:pPr lvl="2"/>
+            <a:r>
+              <a:rPr lang="en-GB" dirty="0"/>
+              <a:t>Use of Python tuples for Java “structure-like” objects, e.g. </a:t>
+            </a:r>
+            <a:r>
+              <a:rPr lang="en-GB" dirty="0" smtClean="0"/>
+              <a:t>Rectangle</a:t>
+            </a:r>
+          </a:p>
+          <a:p>
+            <a:pPr lvl="1"/>
+            <a:endParaRPr lang="en-GB" dirty="0" smtClean="0"/>
           </a:p>
           <a:p>
             <a:pPr lvl="1"/>
@@ -23458,11 +23539,7 @@
             </a:r>
             <a:r>
               <a:rPr lang="en-GB" dirty="0" smtClean="0"/>
-              <a:t> void* </a:t>
-            </a:r>
-            <a:r>
-              <a:rPr lang="en-GB" dirty="0" smtClean="0"/>
-              <a:t>&lt;</a:t>
+              <a:t> void* &lt;</a:t>
             </a:r>
             <a:r>
               <a:rPr lang="en-GB" dirty="0" err="1" smtClean="0"/>
@@ -23472,7 +23549,6 @@
               <a:rPr lang="en-GB" dirty="0" smtClean="0"/>
               <a:t>&gt;</a:t>
             </a:r>
-            <a:endParaRPr lang="en-GB" dirty="0" smtClean="0"/>
           </a:p>
           <a:p>
             <a:pPr lvl="1"/>
@@ -23485,11 +23561,7 @@
             <a:pPr lvl="2"/>
             <a:r>
               <a:rPr lang="en-GB" dirty="0" smtClean="0"/>
-              <a:t>all functions have a </a:t>
-            </a:r>
-            <a:r>
-              <a:rPr lang="en-GB" dirty="0" smtClean="0"/>
-              <a:t>prefix: &lt;prefix&gt;_&lt;</a:t>
+              <a:t>all functions have a prefix: &lt;prefix&gt;_&lt;</a:t>
             </a:r>
             <a:r>
               <a:rPr lang="en-GB" dirty="0" err="1" smtClean="0"/>
@@ -23499,17 +23571,12 @@
               <a:rPr lang="en-GB" dirty="0" smtClean="0"/>
               <a:t>&gt;</a:t>
             </a:r>
-            <a:endParaRPr lang="en-GB" dirty="0" smtClean="0"/>
           </a:p>
           <a:p>
             <a:pPr lvl="2"/>
             <a:r>
               <a:rPr lang="en-GB" dirty="0" smtClean="0"/>
-              <a:t>beam</a:t>
-            </a:r>
-            <a:r>
-              <a:rPr lang="en-GB" dirty="0" smtClean="0"/>
-              <a:t>_&lt;</a:t>
+              <a:t>beam_&lt;</a:t>
             </a:r>
             <a:r>
               <a:rPr lang="en-GB" dirty="0" err="1" smtClean="0"/>
@@ -23573,7 +23640,6 @@
               <a:rPr lang="en-GB" dirty="0" smtClean="0"/>
               <a:t>&gt;(…)</a:t>
             </a:r>
-            <a:endParaRPr lang="en-GB" dirty="0" smtClean="0"/>
           </a:p>
           <a:p>
             <a:pPr lvl="2"/>

</xml_diff>

<commit_message>
added more design goals
</commit_message>
<xml_diff>
--- a/docs/beam-extapi.pptx
+++ b/docs/beam-extapi.pptx
@@ -322,7 +322,7 @@
           <a:p>
             <a:fld id="{1BA50D42-C9CD-4801-B293-61D1F53EC57E}" type="datetimeFigureOut">
               <a:rPr lang="de-DE" smtClean="0"/>
-              <a:t>13.06.2013</a:t>
+              <a:t>14.06.2013</a:t>
             </a:fld>
             <a:endParaRPr lang="de-DE"/>
           </a:p>
@@ -487,7 +487,7 @@
           <a:p>
             <a:fld id="{1BA50D42-C9CD-4801-B293-61D1F53EC57E}" type="datetimeFigureOut">
               <a:rPr lang="de-DE" smtClean="0"/>
-              <a:t>13.06.2013</a:t>
+              <a:t>14.06.2013</a:t>
             </a:fld>
             <a:endParaRPr lang="de-DE"/>
           </a:p>
@@ -662,7 +662,7 @@
           <a:p>
             <a:fld id="{1BA50D42-C9CD-4801-B293-61D1F53EC57E}" type="datetimeFigureOut">
               <a:rPr lang="de-DE" smtClean="0"/>
-              <a:t>13.06.2013</a:t>
+              <a:t>14.06.2013</a:t>
             </a:fld>
             <a:endParaRPr lang="de-DE"/>
           </a:p>
@@ -827,7 +827,7 @@
           <a:p>
             <a:fld id="{1BA50D42-C9CD-4801-B293-61D1F53EC57E}" type="datetimeFigureOut">
               <a:rPr lang="de-DE" smtClean="0"/>
-              <a:t>13.06.2013</a:t>
+              <a:t>14.06.2013</a:t>
             </a:fld>
             <a:endParaRPr lang="de-DE"/>
           </a:p>
@@ -1068,7 +1068,7 @@
           <a:p>
             <a:fld id="{1BA50D42-C9CD-4801-B293-61D1F53EC57E}" type="datetimeFigureOut">
               <a:rPr lang="de-DE" smtClean="0"/>
-              <a:t>13.06.2013</a:t>
+              <a:t>14.06.2013</a:t>
             </a:fld>
             <a:endParaRPr lang="de-DE"/>
           </a:p>
@@ -1351,7 +1351,7 @@
           <a:p>
             <a:fld id="{1BA50D42-C9CD-4801-B293-61D1F53EC57E}" type="datetimeFigureOut">
               <a:rPr lang="de-DE" smtClean="0"/>
-              <a:t>13.06.2013</a:t>
+              <a:t>14.06.2013</a:t>
             </a:fld>
             <a:endParaRPr lang="de-DE"/>
           </a:p>
@@ -1768,7 +1768,7 @@
           <a:p>
             <a:fld id="{1BA50D42-C9CD-4801-B293-61D1F53EC57E}" type="datetimeFigureOut">
               <a:rPr lang="de-DE" smtClean="0"/>
-              <a:t>13.06.2013</a:t>
+              <a:t>14.06.2013</a:t>
             </a:fld>
             <a:endParaRPr lang="de-DE"/>
           </a:p>
@@ -1881,7 +1881,7 @@
           <a:p>
             <a:fld id="{1BA50D42-C9CD-4801-B293-61D1F53EC57E}" type="datetimeFigureOut">
               <a:rPr lang="de-DE" smtClean="0"/>
-              <a:t>13.06.2013</a:t>
+              <a:t>14.06.2013</a:t>
             </a:fld>
             <a:endParaRPr lang="de-DE"/>
           </a:p>
@@ -1971,7 +1971,7 @@
           <a:p>
             <a:fld id="{1BA50D42-C9CD-4801-B293-61D1F53EC57E}" type="datetimeFigureOut">
               <a:rPr lang="de-DE" smtClean="0"/>
-              <a:t>13.06.2013</a:t>
+              <a:t>14.06.2013</a:t>
             </a:fld>
             <a:endParaRPr lang="de-DE"/>
           </a:p>
@@ -2243,7 +2243,7 @@
           <a:p>
             <a:fld id="{1BA50D42-C9CD-4801-B293-61D1F53EC57E}" type="datetimeFigureOut">
               <a:rPr lang="de-DE" smtClean="0"/>
-              <a:t>13.06.2013</a:t>
+              <a:t>14.06.2013</a:t>
             </a:fld>
             <a:endParaRPr lang="de-DE"/>
           </a:p>
@@ -2491,7 +2491,7 @@
           <a:p>
             <a:fld id="{1BA50D42-C9CD-4801-B293-61D1F53EC57E}" type="datetimeFigureOut">
               <a:rPr lang="de-DE" smtClean="0"/>
-              <a:t>13.06.2013</a:t>
+              <a:t>14.06.2013</a:t>
             </a:fld>
             <a:endParaRPr lang="de-DE"/>
           </a:p>
@@ -2699,7 +2699,7 @@
           <a:p>
             <a:fld id="{1BA50D42-C9CD-4801-B293-61D1F53EC57E}" type="datetimeFigureOut">
               <a:rPr lang="de-DE" smtClean="0"/>
-              <a:t>13.06.2013</a:t>
+              <a:t>14.06.2013</a:t>
             </a:fld>
             <a:endParaRPr lang="de-DE"/>
           </a:p>
@@ -23230,95 +23230,113 @@
         <p:spPr/>
         <p:txBody>
           <a:bodyPr>
-            <a:normAutofit fontScale="85000" lnSpcReduction="20000"/>
+            <a:normAutofit fontScale="62500" lnSpcReduction="20000"/>
           </a:bodyPr>
           <a:lstStyle/>
           <a:p>
             <a:r>
               <a:rPr lang="en-GB" dirty="0" smtClean="0"/>
+              <a:t>General</a:t>
+            </a:r>
+          </a:p>
+          <a:p>
+            <a:pPr lvl="1"/>
+            <a:r>
+              <a:rPr lang="en-GB" dirty="0"/>
+              <a:t>Shall reflect Java </a:t>
+            </a:r>
+            <a:r>
+              <a:rPr lang="en-GB" dirty="0" smtClean="0"/>
+              <a:t>interfaces and classes </a:t>
+            </a:r>
+            <a:r>
+              <a:rPr lang="en-GB" dirty="0"/>
+              <a:t>1:1</a:t>
+            </a:r>
+          </a:p>
+          <a:p>
+            <a:pPr lvl="1"/>
+            <a:r>
+              <a:rPr lang="en-GB" dirty="0"/>
+              <a:t>Shall reuse Java  API </a:t>
+            </a:r>
+            <a:r>
+              <a:rPr lang="en-GB" dirty="0" smtClean="0"/>
+              <a:t>doc</a:t>
+            </a:r>
+          </a:p>
+          <a:p>
+            <a:pPr lvl="1"/>
+            <a:r>
+              <a:rPr lang="en-GB" dirty="0" smtClean="0"/>
+              <a:t>Shall be easy to setup and install</a:t>
+            </a:r>
+          </a:p>
+          <a:p>
+            <a:r>
+              <a:rPr lang="en-GB" dirty="0" smtClean="0"/>
               <a:t>C-API</a:t>
             </a:r>
+            <a:endParaRPr lang="en-GB" dirty="0" smtClean="0"/>
           </a:p>
           <a:p>
             <a:pPr lvl="1"/>
             <a:r>
               <a:rPr lang="en-GB" dirty="0"/>
-              <a:t>Header should </a:t>
-            </a:r>
-            <a:r>
-              <a:rPr lang="en-GB" dirty="0" smtClean="0"/>
-              <a:t>use only </a:t>
+              <a:t>Shall have no dependencies other than to Java SE 7 and BEAM</a:t>
+            </a:r>
+          </a:p>
+          <a:p>
+            <a:pPr lvl="1"/>
+            <a:r>
+              <a:rPr lang="en-GB" dirty="0" smtClean="0"/>
+              <a:t>Shall use only </a:t>
+            </a:r>
+            <a:r>
+              <a:rPr lang="en-GB" dirty="0" smtClean="0"/>
+              <a:t>basic C-types in header (e.g. don’t export </a:t>
             </a:r>
             <a:r>
               <a:rPr lang="en-GB" dirty="0"/>
-              <a:t>use basic C-types </a:t>
-            </a:r>
-          </a:p>
-          <a:p>
-            <a:pPr lvl="1"/>
-            <a:r>
-              <a:rPr lang="en-GB" dirty="0" smtClean="0"/>
-              <a:t>Header should not export any JNI declarations</a:t>
-            </a:r>
-            <a:br>
-              <a:rPr lang="en-GB" dirty="0" smtClean="0"/>
-            </a:br>
-            <a:r>
-              <a:rPr lang="en-GB" dirty="0" smtClean="0"/>
-              <a:t>(hide </a:t>
-            </a:r>
-            <a:r>
-              <a:rPr lang="en-GB" dirty="0" err="1" smtClean="0"/>
+              <a:t>JNI types, </a:t>
+            </a:r>
+            <a:r>
+              <a:rPr lang="en-GB" dirty="0" err="1"/>
               <a:t>jint</a:t>
             </a:r>
             <a:r>
-              <a:rPr lang="en-GB" dirty="0" smtClean="0"/>
+              <a:rPr lang="en-GB" dirty="0"/>
               <a:t>, </a:t>
             </a:r>
             <a:r>
-              <a:rPr lang="en-GB" dirty="0" err="1" smtClean="0"/>
+              <a:rPr lang="en-GB" dirty="0" err="1"/>
               <a:t>jobject</a:t>
             </a:r>
             <a:r>
-              <a:rPr lang="en-GB" dirty="0" smtClean="0"/>
+              <a:rPr lang="en-GB" dirty="0"/>
               <a:t>, </a:t>
             </a:r>
             <a:r>
-              <a:rPr lang="en-GB" dirty="0" err="1" smtClean="0"/>
+              <a:rPr lang="en-GB" dirty="0" err="1"/>
               <a:t>jarray</a:t>
             </a:r>
             <a:r>
-              <a:rPr lang="en-GB" dirty="0" smtClean="0"/>
+              <a:rPr lang="en-GB" dirty="0"/>
               <a:t>, </a:t>
             </a:r>
             <a:r>
-              <a:rPr lang="en-GB" dirty="0" err="1" smtClean="0"/>
+              <a:rPr lang="en-GB" dirty="0" err="1"/>
               <a:t>JNIEnv</a:t>
             </a:r>
             <a:r>
-              <a:rPr lang="en-GB" dirty="0" smtClean="0"/>
-              <a:t>, etc.)</a:t>
-            </a:r>
-          </a:p>
-          <a:p>
-            <a:pPr lvl="1"/>
-            <a:r>
-              <a:rPr lang="en-GB" dirty="0" smtClean="0"/>
-              <a:t>Shall have no dependencies other than the Java SE 7 and BEAM</a:t>
-            </a:r>
-          </a:p>
-          <a:p>
-            <a:r>
-              <a:rPr lang="en-GB" dirty="0" smtClean="0"/>
-              <a:t>C-Python API</a:t>
-            </a:r>
-          </a:p>
-          <a:p>
-            <a:pPr lvl="1"/>
-            <a:r>
-              <a:rPr lang="en-GB" dirty="0" smtClean="0"/>
-              <a:t>Header currently not needed</a:t>
-            </a:r>
+              <a:rPr lang="en-GB" dirty="0"/>
+              <a:t>, etc</a:t>
+            </a:r>
+            <a:r>
+              <a:rPr lang="en-GB" dirty="0" smtClean="0"/>
+              <a:t>.)</a:t>
+            </a:r>
+            <a:endParaRPr lang="en-GB" dirty="0" smtClean="0"/>
           </a:p>
           <a:p>
             <a:r>
@@ -23333,17 +23351,80 @@
           <a:p>
             <a:pPr lvl="1"/>
             <a:r>
-              <a:rPr lang="en-GB" dirty="0" smtClean="0"/>
-              <a:t>Should reflect Java classes as far as possible</a:t>
+              <a:rPr lang="en-GB" dirty="0"/>
+              <a:t>Shall have no dependencies other than to Java SE 7 and BEAM, and standard Python 3 (e.g. don’t require </a:t>
+            </a:r>
+            <a:r>
+              <a:rPr lang="en-GB" dirty="0" err="1"/>
+              <a:t>numpy</a:t>
+            </a:r>
+            <a:r>
+              <a:rPr lang="en-GB" dirty="0"/>
+              <a:t>)</a:t>
             </a:r>
           </a:p>
           <a:p>
             <a:pPr lvl="1"/>
             <a:r>
               <a:rPr lang="en-GB" dirty="0" smtClean="0"/>
-              <a:t>Shall have no other dependencies other than to standard Python 3, Java SE 7 and BEAM</a:t>
-            </a:r>
-            <a:endParaRPr lang="en-GB" dirty="0"/>
+              <a:t>Should </a:t>
+            </a:r>
+            <a:r>
+              <a:rPr lang="en-GB" dirty="0"/>
+              <a:t>be “</a:t>
+            </a:r>
+            <a:r>
+              <a:rPr lang="en-GB" dirty="0" err="1"/>
+              <a:t>pythonic</a:t>
+            </a:r>
+            <a:r>
+              <a:rPr lang="en-GB" dirty="0"/>
+              <a:t>” as far as possible</a:t>
+            </a:r>
+          </a:p>
+          <a:p>
+            <a:pPr lvl="2"/>
+            <a:r>
+              <a:rPr lang="en-GB" dirty="0"/>
+              <a:t>Use of Python buffer protocol for Java primitive arrays</a:t>
+            </a:r>
+          </a:p>
+          <a:p>
+            <a:pPr lvl="2"/>
+            <a:r>
+              <a:rPr lang="en-GB" dirty="0"/>
+              <a:t>Use of Python sequence/list protocol  for Java Object array and List collection </a:t>
+            </a:r>
+          </a:p>
+          <a:p>
+            <a:pPr lvl="2"/>
+            <a:r>
+              <a:rPr lang="en-GB" dirty="0"/>
+              <a:t>Use of Python </a:t>
+            </a:r>
+            <a:r>
+              <a:rPr lang="en-GB" dirty="0" err="1"/>
+              <a:t>dict</a:t>
+            </a:r>
+            <a:r>
+              <a:rPr lang="en-GB" dirty="0"/>
+              <a:t> protocol for Java Map collection </a:t>
+            </a:r>
+          </a:p>
+          <a:p>
+            <a:pPr lvl="2"/>
+            <a:r>
+              <a:rPr lang="en-GB" dirty="0"/>
+              <a:t>Use of Python tuples for Java “structure-like” objects, e.g. </a:t>
+            </a:r>
+            <a:r>
+              <a:rPr lang="en-GB" dirty="0" smtClean="0"/>
+              <a:t>Rectangle</a:t>
+            </a:r>
+          </a:p>
+          <a:p>
+            <a:pPr lvl="1"/>
+            <a:endParaRPr lang="en-GB" dirty="0" smtClean="0"/>
           </a:p>
           <a:p>
             <a:pPr lvl="1"/>
@@ -23458,11 +23539,7 @@
             </a:r>
             <a:r>
               <a:rPr lang="en-GB" dirty="0" smtClean="0"/>
-              <a:t> void* </a:t>
-            </a:r>
-            <a:r>
-              <a:rPr lang="en-GB" dirty="0" smtClean="0"/>
-              <a:t>&lt;</a:t>
+              <a:t> void* &lt;</a:t>
             </a:r>
             <a:r>
               <a:rPr lang="en-GB" dirty="0" err="1" smtClean="0"/>
@@ -23472,7 +23549,6 @@
               <a:rPr lang="en-GB" dirty="0" smtClean="0"/>
               <a:t>&gt;</a:t>
             </a:r>
-            <a:endParaRPr lang="en-GB" dirty="0" smtClean="0"/>
           </a:p>
           <a:p>
             <a:pPr lvl="1"/>
@@ -23485,11 +23561,7 @@
             <a:pPr lvl="2"/>
             <a:r>
               <a:rPr lang="en-GB" dirty="0" smtClean="0"/>
-              <a:t>all functions have a </a:t>
-            </a:r>
-            <a:r>
-              <a:rPr lang="en-GB" dirty="0" smtClean="0"/>
-              <a:t>prefix: &lt;prefix&gt;_&lt;</a:t>
+              <a:t>all functions have a prefix: &lt;prefix&gt;_&lt;</a:t>
             </a:r>
             <a:r>
               <a:rPr lang="en-GB" dirty="0" err="1" smtClean="0"/>
@@ -23499,17 +23571,12 @@
               <a:rPr lang="en-GB" dirty="0" smtClean="0"/>
               <a:t>&gt;</a:t>
             </a:r>
-            <a:endParaRPr lang="en-GB" dirty="0" smtClean="0"/>
           </a:p>
           <a:p>
             <a:pPr lvl="2"/>
             <a:r>
               <a:rPr lang="en-GB" dirty="0" smtClean="0"/>
-              <a:t>beam</a:t>
-            </a:r>
-            <a:r>
-              <a:rPr lang="en-GB" dirty="0" smtClean="0"/>
-              <a:t>_&lt;</a:t>
+              <a:t>beam_&lt;</a:t>
             </a:r>
             <a:r>
               <a:rPr lang="en-GB" dirty="0" err="1" smtClean="0"/>
@@ -23573,7 +23640,6 @@
               <a:rPr lang="en-GB" dirty="0" smtClean="0"/>
               <a:t>&gt;(…)</a:t>
             </a:r>
-            <a:endParaRPr lang="en-GB" dirty="0" smtClean="0"/>
           </a:p>
           <a:p>
             <a:pPr lvl="2"/>

</xml_diff>